<commit_message>
work on pos creator onboarding presentation
</commit_message>
<xml_diff>
--- a/for-poscreators/presentation/onboarding_de.pptx
+++ b/for-poscreators/presentation/onboarding_de.pptx
@@ -5,20 +5,21 @@
     <p:sldMasterId id="2147483648" r:id="rId1"/>
   </p:sldMasterIdLst>
   <p:notesMasterIdLst>
-    <p:notesMasterId r:id="rId13"/>
+    <p:notesMasterId r:id="rId14"/>
   </p:notesMasterIdLst>
   <p:sldIdLst>
     <p:sldId id="256" r:id="rId2"/>
     <p:sldId id="287" r:id="rId3"/>
     <p:sldId id="288" r:id="rId4"/>
-    <p:sldId id="289" r:id="rId5"/>
-    <p:sldId id="290" r:id="rId6"/>
-    <p:sldId id="291" r:id="rId7"/>
-    <p:sldId id="292" r:id="rId8"/>
-    <p:sldId id="293" r:id="rId9"/>
-    <p:sldId id="295" r:id="rId10"/>
-    <p:sldId id="296" r:id="rId11"/>
-    <p:sldId id="297" r:id="rId12"/>
+    <p:sldId id="298" r:id="rId5"/>
+    <p:sldId id="289" r:id="rId6"/>
+    <p:sldId id="290" r:id="rId7"/>
+    <p:sldId id="291" r:id="rId8"/>
+    <p:sldId id="292" r:id="rId9"/>
+    <p:sldId id="293" r:id="rId10"/>
+    <p:sldId id="295" r:id="rId11"/>
+    <p:sldId id="296" r:id="rId12"/>
+    <p:sldId id="297" r:id="rId13"/>
   </p:sldIdLst>
   <p:sldSz cx="12192000" cy="6858000"/>
   <p:notesSz cx="6858000" cy="9144000"/>
@@ -117,6 +118,11 @@
       </a:defRPr>
     </a:lvl9pPr>
   </p:defaultTextStyle>
+  <p:extLst>
+    <p:ext uri="{EFAFB233-063F-42B5-8137-9DF3F51BA10A}">
+      <p15:sldGuideLst xmlns:p15="http://schemas.microsoft.com/office/powerpoint/2012/main"/>
+    </p:ext>
+  </p:extLst>
 </p:presentation>
 </file>
 
@@ -202,7 +208,7 @@
           <a:p>
             <a:fld id="{F2594EC8-14C7-C244-BB5F-14DF0BFDF1DB}" type="datetimeFigureOut">
               <a:rPr lang="en-US" smtClean="0"/>
-              <a:t>8/7/20</a:t>
+              <a:t>8/10/20</a:t>
             </a:fld>
             <a:endParaRPr lang="en-US"/>
           </a:p>
@@ -514,1007 +520,7 @@
           <a:bodyPr/>
           <a:lstStyle/>
           <a:p>
-            <a:pPr marL="0" marR="0" lvl="0" indent="0" algn="l" defTabSz="914400" rtl="0" eaLnBrk="1" fontAlgn="auto" latinLnBrk="0" hangingPunct="1">
-              <a:lnSpc>
-                <a:spcPct val="100000"/>
-              </a:lnSpc>
-              <a:spcBef>
-                <a:spcPts val="0"/>
-              </a:spcBef>
-              <a:spcAft>
-                <a:spcPts val="0"/>
-              </a:spcAft>
-              <a:buClrTx/>
-              <a:buSzTx/>
-              <a:buFontTx/>
-              <a:buNone/>
-              <a:tabLst/>
-              <a:defRPr/>
-            </a:pPr>
-            <a:r>
-              <a:rPr lang="de-DE" sz="1200" kern="1200" noProof="0" dirty="0">
-                <a:solidFill>
-                  <a:schemeClr val="tx1"/>
-                </a:solidFill>
-                <a:effectLst/>
-                <a:latin typeface="+mn-lt"/>
-                <a:ea typeface="+mn-ea"/>
-                <a:cs typeface="+mn-cs"/>
-              </a:rPr>
-              <a:t>Ab dem 1.1.2020 gelten neue Vorschriften </a:t>
-            </a:r>
-            <a:r>
-              <a:rPr lang="de-DE" sz="1200" kern="1200" noProof="0" dirty="0" err="1">
-                <a:solidFill>
-                  <a:schemeClr val="tx1"/>
-                </a:solidFill>
-                <a:effectLst/>
-                <a:latin typeface="+mn-lt"/>
-                <a:ea typeface="+mn-ea"/>
-                <a:cs typeface="+mn-cs"/>
-              </a:rPr>
-              <a:t>für</a:t>
-            </a:r>
-            <a:r>
-              <a:rPr lang="de-DE" sz="1200" kern="1200" noProof="0" dirty="0">
-                <a:solidFill>
-                  <a:schemeClr val="tx1"/>
-                </a:solidFill>
-                <a:effectLst/>
-                <a:latin typeface="+mn-lt"/>
-                <a:ea typeface="+mn-ea"/>
-                <a:cs typeface="+mn-cs"/>
-              </a:rPr>
-              <a:t> „elektronische Aufzeichnungssysteme, die </a:t>
-            </a:r>
-            <a:r>
-              <a:rPr lang="de-DE" sz="1200" i="1" kern="1200" noProof="0" dirty="0">
-                <a:solidFill>
-                  <a:schemeClr val="tx1"/>
-                </a:solidFill>
-                <a:effectLst/>
-                <a:latin typeface="+mn-lt"/>
-                <a:ea typeface="+mn-ea"/>
-                <a:cs typeface="+mn-cs"/>
-              </a:rPr>
-              <a:t>‚</a:t>
-            </a:r>
-            <a:r>
-              <a:rPr lang="de-DE" sz="1200" kern="1200" noProof="0" dirty="0">
-                <a:solidFill>
-                  <a:schemeClr val="tx1"/>
-                </a:solidFill>
-                <a:effectLst/>
-                <a:latin typeface="+mn-lt"/>
-                <a:ea typeface="+mn-ea"/>
-                <a:cs typeface="+mn-cs"/>
-              </a:rPr>
-              <a:t>Kassenfunktion’ haben”:</a:t>
-            </a:r>
-          </a:p>
-          <a:p>
-            <a:pPr marL="171450" marR="0" lvl="0" indent="-171450" algn="l" defTabSz="914400" rtl="0" eaLnBrk="1" fontAlgn="auto" latinLnBrk="0" hangingPunct="1">
-              <a:lnSpc>
-                <a:spcPct val="100000"/>
-              </a:lnSpc>
-              <a:spcBef>
-                <a:spcPts val="0"/>
-              </a:spcBef>
-              <a:spcAft>
-                <a:spcPts val="0"/>
-              </a:spcAft>
-              <a:buClrTx/>
-              <a:buSzTx/>
-              <a:buFontTx/>
-              <a:buChar char="-"/>
-              <a:tabLst/>
-              <a:defRPr/>
-            </a:pPr>
-            <a:r>
-              <a:rPr lang="de-DE" sz="1200" kern="1200" dirty="0">
-                <a:solidFill>
-                  <a:schemeClr val="tx1"/>
-                </a:solidFill>
-                <a:effectLst/>
-                <a:latin typeface="+mn-lt"/>
-                <a:ea typeface="+mn-ea"/>
-                <a:cs typeface="+mn-cs"/>
-              </a:rPr>
-              <a:t>Die mit diesen Systemen aufgezeichneten Daten </a:t>
-            </a:r>
-            <a:r>
-              <a:rPr lang="de-DE" sz="1200" kern="1200" dirty="0" err="1">
-                <a:solidFill>
-                  <a:schemeClr val="tx1"/>
-                </a:solidFill>
-                <a:effectLst/>
-                <a:latin typeface="+mn-lt"/>
-                <a:ea typeface="+mn-ea"/>
-                <a:cs typeface="+mn-cs"/>
-              </a:rPr>
-              <a:t>müssen</a:t>
-            </a:r>
-            <a:r>
-              <a:rPr lang="de-DE" sz="1200" kern="1200" dirty="0">
-                <a:solidFill>
-                  <a:schemeClr val="tx1"/>
-                </a:solidFill>
-                <a:effectLst/>
-                <a:latin typeface="+mn-lt"/>
-                <a:ea typeface="+mn-ea"/>
-                <a:cs typeface="+mn-cs"/>
-              </a:rPr>
-              <a:t> durch eine zertifizierte technische Sicherheitseinrichtung (TSE) gegen </a:t>
-            </a:r>
-            <a:r>
-              <a:rPr lang="de-DE" sz="1200" kern="1200" dirty="0" err="1">
-                <a:solidFill>
-                  <a:schemeClr val="tx1"/>
-                </a:solidFill>
-                <a:effectLst/>
-                <a:latin typeface="+mn-lt"/>
-                <a:ea typeface="+mn-ea"/>
-                <a:cs typeface="+mn-cs"/>
-              </a:rPr>
-              <a:t>nachträgliche</a:t>
-            </a:r>
-            <a:r>
-              <a:rPr lang="de-DE" sz="1200" kern="1200" dirty="0">
-                <a:solidFill>
-                  <a:schemeClr val="tx1"/>
-                </a:solidFill>
-                <a:effectLst/>
-                <a:latin typeface="+mn-lt"/>
-                <a:ea typeface="+mn-ea"/>
-                <a:cs typeface="+mn-cs"/>
-              </a:rPr>
-              <a:t> </a:t>
-            </a:r>
-            <a:r>
-              <a:rPr lang="de-DE" sz="1200" kern="1200" dirty="0" err="1">
-                <a:solidFill>
-                  <a:schemeClr val="tx1"/>
-                </a:solidFill>
-                <a:effectLst/>
-                <a:latin typeface="+mn-lt"/>
-                <a:ea typeface="+mn-ea"/>
-                <a:cs typeface="+mn-cs"/>
-              </a:rPr>
-              <a:t>Veränderungen</a:t>
-            </a:r>
-            <a:r>
-              <a:rPr lang="de-DE" sz="1200" kern="1200" dirty="0">
-                <a:solidFill>
-                  <a:schemeClr val="tx1"/>
-                </a:solidFill>
-                <a:effectLst/>
-                <a:latin typeface="+mn-lt"/>
-                <a:ea typeface="+mn-ea"/>
-                <a:cs typeface="+mn-cs"/>
-              </a:rPr>
-              <a:t> </a:t>
-            </a:r>
-            <a:r>
-              <a:rPr lang="de-DE" sz="1200" kern="1200" dirty="0" err="1">
-                <a:solidFill>
-                  <a:schemeClr val="tx1"/>
-                </a:solidFill>
-                <a:effectLst/>
-                <a:latin typeface="+mn-lt"/>
-                <a:ea typeface="+mn-ea"/>
-                <a:cs typeface="+mn-cs"/>
-              </a:rPr>
-              <a:t>geschützt</a:t>
-            </a:r>
-            <a:r>
-              <a:rPr lang="de-DE" sz="1200" kern="1200" dirty="0">
-                <a:solidFill>
-                  <a:schemeClr val="tx1"/>
-                </a:solidFill>
-                <a:effectLst/>
-                <a:latin typeface="+mn-lt"/>
-                <a:ea typeface="+mn-ea"/>
-                <a:cs typeface="+mn-cs"/>
-              </a:rPr>
-              <a:t> werden. </a:t>
-            </a:r>
-          </a:p>
-          <a:p>
-            <a:pPr marL="171450" marR="0" lvl="0" indent="-171450" algn="l" defTabSz="914400" rtl="0" eaLnBrk="1" fontAlgn="auto" latinLnBrk="0" hangingPunct="1">
-              <a:lnSpc>
-                <a:spcPct val="100000"/>
-              </a:lnSpc>
-              <a:spcBef>
-                <a:spcPts val="0"/>
-              </a:spcBef>
-              <a:spcAft>
-                <a:spcPts val="0"/>
-              </a:spcAft>
-              <a:buClrTx/>
-              <a:buSzTx/>
-              <a:buFontTx/>
-              <a:buChar char="-"/>
-              <a:tabLst/>
-              <a:defRPr/>
-            </a:pPr>
-            <a:r>
-              <a:rPr lang="de-DE" sz="1200" kern="1200" dirty="0">
-                <a:solidFill>
-                  <a:schemeClr val="tx1"/>
-                </a:solidFill>
-                <a:effectLst/>
-                <a:latin typeface="+mn-lt"/>
-                <a:ea typeface="+mn-ea"/>
-                <a:cs typeface="+mn-cs"/>
-              </a:rPr>
-              <a:t>Bei </a:t>
-            </a:r>
-            <a:r>
-              <a:rPr lang="de-DE" sz="1200" kern="1200" dirty="0" err="1">
-                <a:solidFill>
-                  <a:schemeClr val="tx1"/>
-                </a:solidFill>
-                <a:effectLst/>
-                <a:latin typeface="+mn-lt"/>
-                <a:ea typeface="+mn-ea"/>
-                <a:cs typeface="+mn-cs"/>
-              </a:rPr>
-              <a:t>Betriebsprüfungen</a:t>
-            </a:r>
-            <a:r>
-              <a:rPr lang="de-DE" sz="1200" kern="1200" dirty="0">
-                <a:solidFill>
-                  <a:schemeClr val="tx1"/>
-                </a:solidFill>
-                <a:effectLst/>
-                <a:latin typeface="+mn-lt"/>
-                <a:ea typeface="+mn-ea"/>
-                <a:cs typeface="+mn-cs"/>
-              </a:rPr>
-              <a:t> </a:t>
-            </a:r>
-            <a:r>
-              <a:rPr lang="de-DE" sz="1200" kern="1200" dirty="0" err="1">
-                <a:solidFill>
-                  <a:schemeClr val="tx1"/>
-                </a:solidFill>
-                <a:effectLst/>
-                <a:latin typeface="+mn-lt"/>
-                <a:ea typeface="+mn-ea"/>
-                <a:cs typeface="+mn-cs"/>
-              </a:rPr>
-              <a:t>müssen</a:t>
-            </a:r>
-            <a:r>
-              <a:rPr lang="de-DE" sz="1200" kern="1200" dirty="0">
-                <a:solidFill>
-                  <a:schemeClr val="tx1"/>
-                </a:solidFill>
-                <a:effectLst/>
-                <a:latin typeface="+mn-lt"/>
-                <a:ea typeface="+mn-ea"/>
-                <a:cs typeface="+mn-cs"/>
-              </a:rPr>
-              <a:t> die aufgezeichneten Daten in einem standardisierten Format – der „Digitalen Schnittstelle der Finanzverwaltung </a:t>
-            </a:r>
-            <a:r>
-              <a:rPr lang="de-DE" sz="1200" kern="1200" dirty="0" err="1">
-                <a:solidFill>
-                  <a:schemeClr val="tx1"/>
-                </a:solidFill>
-                <a:effectLst/>
-                <a:latin typeface="+mn-lt"/>
-                <a:ea typeface="+mn-ea"/>
-                <a:cs typeface="+mn-cs"/>
-              </a:rPr>
-              <a:t>für</a:t>
-            </a:r>
-            <a:r>
-              <a:rPr lang="de-DE" sz="1200" kern="1200" dirty="0">
-                <a:solidFill>
-                  <a:schemeClr val="tx1"/>
-                </a:solidFill>
-                <a:effectLst/>
-                <a:latin typeface="+mn-lt"/>
-                <a:ea typeface="+mn-ea"/>
-                <a:cs typeface="+mn-cs"/>
-              </a:rPr>
-              <a:t> Kassensysteme” (</a:t>
-            </a:r>
-            <a:r>
-              <a:rPr lang="de-DE" sz="1200" kern="1200" dirty="0" err="1">
-                <a:solidFill>
-                  <a:schemeClr val="tx1"/>
-                </a:solidFill>
-                <a:effectLst/>
-                <a:latin typeface="+mn-lt"/>
-                <a:ea typeface="+mn-ea"/>
-                <a:cs typeface="+mn-cs"/>
-              </a:rPr>
-              <a:t>DSFinV</a:t>
-            </a:r>
-            <a:r>
-              <a:rPr lang="de-DE" sz="1200" kern="1200" dirty="0">
-                <a:solidFill>
-                  <a:schemeClr val="tx1"/>
-                </a:solidFill>
-                <a:effectLst/>
-                <a:latin typeface="+mn-lt"/>
-                <a:ea typeface="+mn-ea"/>
-                <a:cs typeface="+mn-cs"/>
-              </a:rPr>
-              <a:t>-K) – vorgelegt werden. </a:t>
-            </a:r>
-            <a:endParaRPr lang="de-DE" dirty="0"/>
-          </a:p>
-          <a:p>
-            <a:pPr marL="171450" marR="0" lvl="0" indent="-171450" algn="l" defTabSz="914400" rtl="0" eaLnBrk="1" fontAlgn="auto" latinLnBrk="0" hangingPunct="1">
-              <a:lnSpc>
-                <a:spcPct val="100000"/>
-              </a:lnSpc>
-              <a:spcBef>
-                <a:spcPts val="0"/>
-              </a:spcBef>
-              <a:spcAft>
-                <a:spcPts val="0"/>
-              </a:spcAft>
-              <a:buClrTx/>
-              <a:buSzTx/>
-              <a:buFontTx/>
-              <a:buChar char="-"/>
-              <a:tabLst/>
-              <a:defRPr/>
-            </a:pPr>
-            <a:endParaRPr lang="de-DE" dirty="0"/>
-          </a:p>
-          <a:p>
-            <a:pPr marL="0" marR="0" lvl="0" indent="0" algn="l" defTabSz="914400" rtl="0" eaLnBrk="1" fontAlgn="auto" latinLnBrk="0" hangingPunct="1">
-              <a:lnSpc>
-                <a:spcPct val="100000"/>
-              </a:lnSpc>
-              <a:spcBef>
-                <a:spcPts val="0"/>
-              </a:spcBef>
-              <a:spcAft>
-                <a:spcPts val="0"/>
-              </a:spcAft>
-              <a:buClrTx/>
-              <a:buSzTx/>
-              <a:buFontTx/>
-              <a:buNone/>
-              <a:tabLst/>
-              <a:defRPr/>
-            </a:pPr>
-            <a:r>
-              <a:rPr lang="de-DE" sz="1200" kern="1200" dirty="0">
-                <a:solidFill>
-                  <a:schemeClr val="tx1"/>
-                </a:solidFill>
-                <a:effectLst/>
-                <a:latin typeface="+mn-lt"/>
-                <a:ea typeface="+mn-ea"/>
-                <a:cs typeface="+mn-cs"/>
-              </a:rPr>
-              <a:t>Die neuen Pflichten </a:t>
-            </a:r>
-            <a:endParaRPr lang="de-DE" dirty="0">
-              <a:effectLst/>
-            </a:endParaRPr>
-          </a:p>
-          <a:p>
-            <a:pPr marL="0" marR="0" lvl="0" indent="0" algn="l" defTabSz="914400" rtl="0" eaLnBrk="1" fontAlgn="auto" latinLnBrk="0" hangingPunct="1">
-              <a:lnSpc>
-                <a:spcPct val="100000"/>
-              </a:lnSpc>
-              <a:spcBef>
-                <a:spcPts val="0"/>
-              </a:spcBef>
-              <a:spcAft>
-                <a:spcPts val="0"/>
-              </a:spcAft>
-              <a:buClrTx/>
-              <a:buSzTx/>
-              <a:buFontTx/>
-              <a:buNone/>
-              <a:tabLst/>
-              <a:defRPr/>
-            </a:pPr>
-            <a:endParaRPr lang="de-DE" noProof="0" dirty="0"/>
-          </a:p>
-          <a:p>
-            <a:r>
-              <a:rPr lang="de-DE" sz="1200" kern="1200" dirty="0">
-                <a:solidFill>
-                  <a:schemeClr val="tx1"/>
-                </a:solidFill>
-                <a:effectLst/>
-                <a:latin typeface="+mn-lt"/>
-                <a:ea typeface="+mn-ea"/>
-                <a:cs typeface="+mn-cs"/>
-              </a:rPr>
-              <a:t>Die wesentlichen Anforderungen ergeben sich direkt aus dem Gesetz (§146a Abgabenord- </a:t>
-            </a:r>
-            <a:endParaRPr lang="de-DE" dirty="0">
-              <a:effectLst/>
-            </a:endParaRPr>
-          </a:p>
-          <a:p>
-            <a:r>
-              <a:rPr lang="de-DE" sz="1200" kern="1200" dirty="0" err="1">
-                <a:solidFill>
-                  <a:schemeClr val="tx1"/>
-                </a:solidFill>
-                <a:effectLst/>
-                <a:latin typeface="+mn-lt"/>
-                <a:ea typeface="+mn-ea"/>
-                <a:cs typeface="+mn-cs"/>
-              </a:rPr>
-              <a:t>nung</a:t>
-            </a:r>
-            <a:r>
-              <a:rPr lang="de-DE" sz="1200" kern="1200" dirty="0">
-                <a:solidFill>
-                  <a:schemeClr val="tx1"/>
-                </a:solidFill>
-                <a:effectLst/>
-                <a:latin typeface="+mn-lt"/>
-                <a:ea typeface="+mn-ea"/>
-                <a:cs typeface="+mn-cs"/>
-              </a:rPr>
-              <a:t>) und der Kassensicherungsverordnung (KassenSichV): </a:t>
-            </a:r>
-            <a:endParaRPr lang="de-DE" dirty="0">
-              <a:effectLst/>
-            </a:endParaRPr>
-          </a:p>
-          <a:p>
-            <a:pPr lvl="1"/>
-            <a:r>
-              <a:rPr lang="de-DE" sz="1200" kern="1200" dirty="0">
-                <a:solidFill>
-                  <a:schemeClr val="tx1"/>
-                </a:solidFill>
-                <a:effectLst/>
-                <a:latin typeface="+mn-lt"/>
-                <a:ea typeface="+mn-ea"/>
-                <a:cs typeface="+mn-cs"/>
-              </a:rPr>
-              <a:t>●  </a:t>
-            </a:r>
-            <a:r>
-              <a:rPr lang="de-DE" sz="1200" b="1" kern="1200" dirty="0">
-                <a:solidFill>
-                  <a:schemeClr val="tx1"/>
-                </a:solidFill>
-                <a:effectLst/>
-                <a:latin typeface="+mn-lt"/>
-                <a:ea typeface="+mn-ea"/>
-                <a:cs typeface="+mn-cs"/>
-              </a:rPr>
-              <a:t>Einzelaufzeichnung: </a:t>
-            </a:r>
-            <a:r>
-              <a:rPr lang="de-DE" sz="1200" kern="1200" dirty="0">
-                <a:solidFill>
-                  <a:schemeClr val="tx1"/>
-                </a:solidFill>
-                <a:effectLst/>
-                <a:latin typeface="+mn-lt"/>
-                <a:ea typeface="+mn-ea"/>
-                <a:cs typeface="+mn-cs"/>
-              </a:rPr>
-              <a:t>Die </a:t>
-            </a:r>
-            <a:r>
-              <a:rPr lang="de-DE" sz="1200" kern="1200" dirty="0" err="1">
-                <a:solidFill>
-                  <a:schemeClr val="tx1"/>
-                </a:solidFill>
-                <a:effectLst/>
-                <a:latin typeface="+mn-lt"/>
-                <a:ea typeface="+mn-ea"/>
-                <a:cs typeface="+mn-cs"/>
-              </a:rPr>
-              <a:t>Geschäftsvorfälle</a:t>
-            </a:r>
-            <a:r>
-              <a:rPr lang="de-DE" sz="1200" kern="1200" dirty="0">
-                <a:solidFill>
-                  <a:schemeClr val="tx1"/>
-                </a:solidFill>
-                <a:effectLst/>
-                <a:latin typeface="+mn-lt"/>
-                <a:ea typeface="+mn-ea"/>
-                <a:cs typeface="+mn-cs"/>
-              </a:rPr>
-              <a:t> und anderen </a:t>
-            </a:r>
-            <a:r>
-              <a:rPr lang="de-DE" sz="1200" kern="1200" dirty="0" err="1">
-                <a:solidFill>
-                  <a:schemeClr val="tx1"/>
-                </a:solidFill>
-                <a:effectLst/>
-                <a:latin typeface="+mn-lt"/>
-                <a:ea typeface="+mn-ea"/>
-                <a:cs typeface="+mn-cs"/>
-              </a:rPr>
-              <a:t>Vorgänge</a:t>
-            </a:r>
-            <a:r>
-              <a:rPr lang="de-DE" sz="1200" kern="1200" dirty="0">
-                <a:solidFill>
-                  <a:schemeClr val="tx1"/>
-                </a:solidFill>
-                <a:effectLst/>
-                <a:latin typeface="+mn-lt"/>
-                <a:ea typeface="+mn-ea"/>
-                <a:cs typeface="+mn-cs"/>
-              </a:rPr>
-              <a:t> </a:t>
-            </a:r>
-            <a:r>
-              <a:rPr lang="de-DE" sz="1200" kern="1200" dirty="0" err="1">
-                <a:solidFill>
-                  <a:schemeClr val="tx1"/>
-                </a:solidFill>
-                <a:effectLst/>
-                <a:latin typeface="+mn-lt"/>
-                <a:ea typeface="+mn-ea"/>
-                <a:cs typeface="+mn-cs"/>
-              </a:rPr>
-              <a:t>müssen</a:t>
-            </a:r>
-            <a:r>
-              <a:rPr lang="de-DE" sz="1200" kern="1200" dirty="0">
-                <a:solidFill>
-                  <a:schemeClr val="tx1"/>
-                </a:solidFill>
-                <a:effectLst/>
-                <a:latin typeface="+mn-lt"/>
-                <a:ea typeface="+mn-ea"/>
-                <a:cs typeface="+mn-cs"/>
-              </a:rPr>
-              <a:t> einzeln, </a:t>
-            </a:r>
-            <a:r>
-              <a:rPr lang="de-DE" sz="1200" kern="1200" dirty="0" err="1">
-                <a:solidFill>
-                  <a:schemeClr val="tx1"/>
-                </a:solidFill>
-                <a:effectLst/>
-                <a:latin typeface="+mn-lt"/>
-                <a:ea typeface="+mn-ea"/>
-                <a:cs typeface="+mn-cs"/>
-              </a:rPr>
-              <a:t>vollständig</a:t>
-            </a:r>
-            <a:r>
-              <a:rPr lang="de-DE" sz="1200" kern="1200" dirty="0">
-                <a:solidFill>
-                  <a:schemeClr val="tx1"/>
-                </a:solidFill>
-                <a:effectLst/>
-                <a:latin typeface="+mn-lt"/>
-                <a:ea typeface="+mn-ea"/>
-                <a:cs typeface="+mn-cs"/>
-              </a:rPr>
-              <a:t>, richtig, zeitgerecht und geordnet aufgezeichnet werden. </a:t>
-            </a:r>
-            <a:endParaRPr lang="de-DE" dirty="0">
-              <a:effectLst/>
-            </a:endParaRPr>
-          </a:p>
-          <a:p>
-            <a:pPr lvl="1"/>
-            <a:r>
-              <a:rPr lang="de-DE" sz="1200" kern="1200" dirty="0">
-                <a:solidFill>
-                  <a:schemeClr val="tx1"/>
-                </a:solidFill>
-                <a:effectLst/>
-                <a:latin typeface="+mn-lt"/>
-                <a:ea typeface="+mn-ea"/>
-                <a:cs typeface="+mn-cs"/>
-              </a:rPr>
-              <a:t>●  </a:t>
-            </a:r>
-            <a:r>
-              <a:rPr lang="de-DE" sz="1200" b="1" kern="1200" dirty="0">
-                <a:solidFill>
-                  <a:schemeClr val="tx1"/>
-                </a:solidFill>
-                <a:effectLst/>
-                <a:latin typeface="+mn-lt"/>
-                <a:ea typeface="+mn-ea"/>
-                <a:cs typeface="+mn-cs"/>
-              </a:rPr>
-              <a:t>TSE-Pflicht: </a:t>
-            </a:r>
-            <a:r>
-              <a:rPr lang="de-DE" sz="1200" kern="1200" dirty="0">
-                <a:solidFill>
-                  <a:schemeClr val="tx1"/>
-                </a:solidFill>
-                <a:effectLst/>
-                <a:latin typeface="+mn-lt"/>
-                <a:ea typeface="+mn-ea"/>
-                <a:cs typeface="+mn-cs"/>
-              </a:rPr>
-              <a:t>Die digitalen Aufzeichnungen sind durch eine zertifizierte technische Sicherheitseinrichtung zu </a:t>
-            </a:r>
-            <a:r>
-              <a:rPr lang="de-DE" sz="1200" kern="1200" dirty="0" err="1">
-                <a:solidFill>
-                  <a:schemeClr val="tx1"/>
-                </a:solidFill>
-                <a:effectLst/>
-                <a:latin typeface="+mn-lt"/>
-                <a:ea typeface="+mn-ea"/>
-                <a:cs typeface="+mn-cs"/>
-              </a:rPr>
-              <a:t>schützen</a:t>
-            </a:r>
-            <a:r>
-              <a:rPr lang="de-DE" sz="1200" kern="1200" dirty="0">
-                <a:solidFill>
-                  <a:schemeClr val="tx1"/>
-                </a:solidFill>
-                <a:effectLst/>
-                <a:latin typeface="+mn-lt"/>
-                <a:ea typeface="+mn-ea"/>
-                <a:cs typeface="+mn-cs"/>
-              </a:rPr>
-              <a:t>. </a:t>
-            </a:r>
-            <a:endParaRPr lang="de-DE" dirty="0">
-              <a:effectLst/>
-            </a:endParaRPr>
-          </a:p>
-          <a:p>
-            <a:pPr lvl="1"/>
-            <a:r>
-              <a:rPr lang="de-DE" sz="1200" kern="1200" dirty="0">
-                <a:solidFill>
-                  <a:schemeClr val="tx1"/>
-                </a:solidFill>
-                <a:effectLst/>
-                <a:latin typeface="+mn-lt"/>
-                <a:ea typeface="+mn-ea"/>
-                <a:cs typeface="+mn-cs"/>
-              </a:rPr>
-              <a:t>●  </a:t>
-            </a:r>
-            <a:r>
-              <a:rPr lang="de-DE" sz="1200" b="1" kern="1200" dirty="0">
-                <a:solidFill>
-                  <a:schemeClr val="tx1"/>
-                </a:solidFill>
-                <a:effectLst/>
-                <a:latin typeface="+mn-lt"/>
-                <a:ea typeface="+mn-ea"/>
-                <a:cs typeface="+mn-cs"/>
-              </a:rPr>
-              <a:t>Datensicherung / Archivierung: </a:t>
-            </a:r>
-            <a:r>
-              <a:rPr lang="de-DE" sz="1200" kern="1200" dirty="0">
-                <a:solidFill>
-                  <a:schemeClr val="tx1"/>
-                </a:solidFill>
-                <a:effectLst/>
-                <a:latin typeface="+mn-lt"/>
-                <a:ea typeface="+mn-ea"/>
-                <a:cs typeface="+mn-cs"/>
-              </a:rPr>
-              <a:t>Die digitalen Aufzeichnungen sind zu sichern und </a:t>
-            </a:r>
-            <a:r>
-              <a:rPr lang="de-DE" sz="1200" kern="1200" dirty="0" err="1">
-                <a:solidFill>
-                  <a:schemeClr val="tx1"/>
-                </a:solidFill>
-                <a:effectLst/>
-                <a:latin typeface="+mn-lt"/>
-                <a:ea typeface="+mn-ea"/>
-                <a:cs typeface="+mn-cs"/>
-              </a:rPr>
-              <a:t>für</a:t>
-            </a:r>
-            <a:r>
-              <a:rPr lang="de-DE" sz="1200" kern="1200" dirty="0">
-                <a:solidFill>
-                  <a:schemeClr val="tx1"/>
-                </a:solidFill>
-                <a:effectLst/>
-                <a:latin typeface="+mn-lt"/>
-                <a:ea typeface="+mn-ea"/>
-                <a:cs typeface="+mn-cs"/>
-              </a:rPr>
-              <a:t> Kassen-Nachschauen sowie </a:t>
-            </a:r>
-            <a:r>
-              <a:rPr lang="de-DE" sz="1200" kern="1200" dirty="0" err="1">
-                <a:solidFill>
-                  <a:schemeClr val="tx1"/>
-                </a:solidFill>
-                <a:effectLst/>
-                <a:latin typeface="+mn-lt"/>
-                <a:ea typeface="+mn-ea"/>
-                <a:cs typeface="+mn-cs"/>
-              </a:rPr>
-              <a:t>Außenprüfungen</a:t>
-            </a:r>
-            <a:r>
-              <a:rPr lang="de-DE" sz="1200" kern="1200" dirty="0">
-                <a:solidFill>
-                  <a:schemeClr val="tx1"/>
-                </a:solidFill>
-                <a:effectLst/>
-                <a:latin typeface="+mn-lt"/>
-                <a:ea typeface="+mn-ea"/>
-                <a:cs typeface="+mn-cs"/>
-              </a:rPr>
-              <a:t> </a:t>
-            </a:r>
-            <a:r>
-              <a:rPr lang="de-DE" sz="1200" kern="1200" dirty="0" err="1">
-                <a:solidFill>
-                  <a:schemeClr val="tx1"/>
-                </a:solidFill>
-                <a:effectLst/>
-                <a:latin typeface="+mn-lt"/>
-                <a:ea typeface="+mn-ea"/>
-                <a:cs typeface="+mn-cs"/>
-              </a:rPr>
-              <a:t>verfügbar</a:t>
-            </a:r>
-            <a:r>
-              <a:rPr lang="de-DE" sz="1200" kern="1200" dirty="0">
-                <a:solidFill>
-                  <a:schemeClr val="tx1"/>
-                </a:solidFill>
-                <a:effectLst/>
-                <a:latin typeface="+mn-lt"/>
-                <a:ea typeface="+mn-ea"/>
-                <a:cs typeface="+mn-cs"/>
-              </a:rPr>
-              <a:t> zu halten. </a:t>
-            </a:r>
-            <a:endParaRPr lang="de-DE" dirty="0">
-              <a:effectLst/>
-            </a:endParaRPr>
-          </a:p>
-          <a:p>
-            <a:pPr lvl="1"/>
-            <a:r>
-              <a:rPr lang="de-DE" sz="1200" kern="1200" dirty="0">
-                <a:solidFill>
-                  <a:schemeClr val="tx1"/>
-                </a:solidFill>
-                <a:effectLst/>
-                <a:latin typeface="+mn-lt"/>
-                <a:ea typeface="+mn-ea"/>
-                <a:cs typeface="+mn-cs"/>
-              </a:rPr>
-              <a:t>●  </a:t>
-            </a:r>
-            <a:r>
-              <a:rPr lang="de-DE" sz="1200" b="1" kern="1200" dirty="0">
-                <a:solidFill>
-                  <a:schemeClr val="tx1"/>
-                </a:solidFill>
-                <a:effectLst/>
-                <a:latin typeface="+mn-lt"/>
-                <a:ea typeface="+mn-ea"/>
-                <a:cs typeface="+mn-cs"/>
-              </a:rPr>
-              <a:t>Belegausgabepflicht: </a:t>
-            </a:r>
-            <a:r>
-              <a:rPr lang="de-DE" sz="1200" kern="1200" dirty="0">
-                <a:solidFill>
-                  <a:schemeClr val="tx1"/>
-                </a:solidFill>
-                <a:effectLst/>
-                <a:latin typeface="+mn-lt"/>
-                <a:ea typeface="+mn-ea"/>
-                <a:cs typeface="+mn-cs"/>
-              </a:rPr>
-              <a:t>Den am </a:t>
-            </a:r>
-            <a:r>
-              <a:rPr lang="de-DE" sz="1200" kern="1200" dirty="0" err="1">
-                <a:solidFill>
-                  <a:schemeClr val="tx1"/>
-                </a:solidFill>
-                <a:effectLst/>
-                <a:latin typeface="+mn-lt"/>
-                <a:ea typeface="+mn-ea"/>
-                <a:cs typeface="+mn-cs"/>
-              </a:rPr>
-              <a:t>Geschäftsvorfall</a:t>
-            </a:r>
-            <a:r>
-              <a:rPr lang="de-DE" sz="1200" kern="1200" dirty="0">
-                <a:solidFill>
-                  <a:schemeClr val="tx1"/>
-                </a:solidFill>
-                <a:effectLst/>
-                <a:latin typeface="+mn-lt"/>
-                <a:ea typeface="+mn-ea"/>
-                <a:cs typeface="+mn-cs"/>
-              </a:rPr>
-              <a:t> Beteiligten ist ein Beleg </a:t>
-            </a:r>
-            <a:r>
-              <a:rPr lang="de-DE" sz="1200" kern="1200" dirty="0" err="1">
-                <a:solidFill>
-                  <a:schemeClr val="tx1"/>
-                </a:solidFill>
-                <a:effectLst/>
-                <a:latin typeface="+mn-lt"/>
-                <a:ea typeface="+mn-ea"/>
-                <a:cs typeface="+mn-cs"/>
-              </a:rPr>
-              <a:t>über</a:t>
-            </a:r>
-            <a:r>
-              <a:rPr lang="de-DE" sz="1200" kern="1200" dirty="0">
-                <a:solidFill>
-                  <a:schemeClr val="tx1"/>
-                </a:solidFill>
-                <a:effectLst/>
-                <a:latin typeface="+mn-lt"/>
-                <a:ea typeface="+mn-ea"/>
-                <a:cs typeface="+mn-cs"/>
-              </a:rPr>
-              <a:t> den </a:t>
-            </a:r>
-            <a:r>
-              <a:rPr lang="de-DE" sz="1200" kern="1200" dirty="0" err="1">
-                <a:solidFill>
-                  <a:schemeClr val="tx1"/>
-                </a:solidFill>
-                <a:effectLst/>
-                <a:latin typeface="+mn-lt"/>
-                <a:ea typeface="+mn-ea"/>
-                <a:cs typeface="+mn-cs"/>
-              </a:rPr>
-              <a:t>Geschäftsvorfall</a:t>
-            </a:r>
-            <a:r>
-              <a:rPr lang="de-DE" sz="1200" kern="1200" dirty="0">
-                <a:solidFill>
-                  <a:schemeClr val="tx1"/>
-                </a:solidFill>
-                <a:effectLst/>
-                <a:latin typeface="+mn-lt"/>
-                <a:ea typeface="+mn-ea"/>
-                <a:cs typeface="+mn-cs"/>
-              </a:rPr>
-              <a:t> auszustellen und zur </a:t>
-            </a:r>
-            <a:r>
-              <a:rPr lang="de-DE" sz="1200" kern="1200" dirty="0" err="1">
-                <a:solidFill>
-                  <a:schemeClr val="tx1"/>
-                </a:solidFill>
-                <a:effectLst/>
-                <a:latin typeface="+mn-lt"/>
-                <a:ea typeface="+mn-ea"/>
-                <a:cs typeface="+mn-cs"/>
-              </a:rPr>
-              <a:t>Verfügung</a:t>
-            </a:r>
-            <a:r>
-              <a:rPr lang="de-DE" sz="1200" kern="1200" dirty="0">
-                <a:solidFill>
-                  <a:schemeClr val="tx1"/>
-                </a:solidFill>
-                <a:effectLst/>
-                <a:latin typeface="+mn-lt"/>
-                <a:ea typeface="+mn-ea"/>
-                <a:cs typeface="+mn-cs"/>
-              </a:rPr>
-              <a:t> zu stellen. </a:t>
-            </a:r>
-            <a:endParaRPr lang="de-DE" dirty="0">
-              <a:effectLst/>
-            </a:endParaRPr>
-          </a:p>
-          <a:p>
-            <a:pPr lvl="1"/>
-            <a:r>
-              <a:rPr lang="de-DE" sz="1200" kern="1200" dirty="0">
-                <a:solidFill>
-                  <a:schemeClr val="tx1"/>
-                </a:solidFill>
-                <a:effectLst/>
-                <a:latin typeface="+mn-lt"/>
-                <a:ea typeface="+mn-ea"/>
-                <a:cs typeface="+mn-cs"/>
-              </a:rPr>
-              <a:t>●  </a:t>
-            </a:r>
-            <a:r>
-              <a:rPr lang="de-DE" sz="1200" b="1" kern="1200" dirty="0">
-                <a:solidFill>
-                  <a:schemeClr val="tx1"/>
-                </a:solidFill>
-                <a:effectLst/>
-                <a:latin typeface="+mn-lt"/>
-                <a:ea typeface="+mn-ea"/>
-                <a:cs typeface="+mn-cs"/>
-              </a:rPr>
-              <a:t>Meldepflicht: </a:t>
-            </a:r>
-            <a:r>
-              <a:rPr lang="de-DE" sz="1200" kern="1200" dirty="0">
-                <a:solidFill>
-                  <a:schemeClr val="tx1"/>
-                </a:solidFill>
-                <a:effectLst/>
-                <a:latin typeface="+mn-lt"/>
-                <a:ea typeface="+mn-ea"/>
-                <a:cs typeface="+mn-cs"/>
-              </a:rPr>
-              <a:t>Dem </a:t>
-            </a:r>
-            <a:r>
-              <a:rPr lang="de-DE" sz="1200" kern="1200" dirty="0" err="1">
-                <a:solidFill>
-                  <a:schemeClr val="tx1"/>
-                </a:solidFill>
-                <a:effectLst/>
-                <a:latin typeface="+mn-lt"/>
-                <a:ea typeface="+mn-ea"/>
-                <a:cs typeface="+mn-cs"/>
-              </a:rPr>
-              <a:t>zuständigen</a:t>
-            </a:r>
-            <a:r>
-              <a:rPr lang="de-DE" sz="1200" kern="1200" dirty="0">
-                <a:solidFill>
-                  <a:schemeClr val="tx1"/>
-                </a:solidFill>
-                <a:effectLst/>
-                <a:latin typeface="+mn-lt"/>
-                <a:ea typeface="+mn-ea"/>
-                <a:cs typeface="+mn-cs"/>
-              </a:rPr>
-              <a:t> Finanzamt muss die Anschaffung und Außerbetriebnahme eines elektronischen Aufzeichnungssystems innerhalb eines Monats </a:t>
-            </a:r>
-            <a:r>
-              <a:rPr lang="de-DE" sz="1200" kern="1200" dirty="0" err="1">
-                <a:solidFill>
-                  <a:schemeClr val="tx1"/>
-                </a:solidFill>
-                <a:effectLst/>
-                <a:latin typeface="+mn-lt"/>
-                <a:ea typeface="+mn-ea"/>
-                <a:cs typeface="+mn-cs"/>
-              </a:rPr>
-              <a:t>mitge</a:t>
-            </a:r>
-            <a:r>
-              <a:rPr lang="de-DE" sz="1200" kern="1200" dirty="0">
-                <a:solidFill>
-                  <a:schemeClr val="tx1"/>
-                </a:solidFill>
-                <a:effectLst/>
-                <a:latin typeface="+mn-lt"/>
-                <a:ea typeface="+mn-ea"/>
-                <a:cs typeface="+mn-cs"/>
-              </a:rPr>
-              <a:t>- teilt werden. </a:t>
-            </a:r>
-            <a:endParaRPr lang="de-DE" dirty="0">
-              <a:effectLst/>
-            </a:endParaRPr>
-          </a:p>
-          <a:p>
-            <a:endParaRPr lang="de-DE" noProof="0" dirty="0"/>
+            <a:endParaRPr lang="en-US" dirty="0"/>
           </a:p>
         </p:txBody>
       </p:sp>
@@ -1535,7 +541,7 @@
           <a:p>
             <a:fld id="{C3915442-2F4C-E043-BB4A-4206B63E6321}" type="slidenum">
               <a:rPr lang="en-US" smtClean="0"/>
-              <a:t>3</a:t>
+              <a:t>2</a:t>
             </a:fld>
             <a:endParaRPr lang="en-US"/>
           </a:p>
@@ -1544,7 +550,175 @@
     </p:spTree>
     <p:extLst>
       <p:ext uri="{BB962C8B-B14F-4D97-AF65-F5344CB8AC3E}">
-        <p14:creationId xmlns:p14="http://schemas.microsoft.com/office/powerpoint/2010/main" val="812767550"/>
+        <p14:creationId xmlns:p14="http://schemas.microsoft.com/office/powerpoint/2010/main" val="780216921"/>
+      </p:ext>
+    </p:extLst>
+  </p:cSld>
+  <p:clrMapOvr>
+    <a:masterClrMapping/>
+  </p:clrMapOvr>
+</p:notes>
+</file>
+
+<file path=ppt/notesSlides/notesSlide10.xml><?xml version="1.0" encoding="utf-8"?>
+<p:notes xmlns:a="http://schemas.openxmlformats.org/drawingml/2006/main" xmlns:r="http://schemas.openxmlformats.org/officeDocument/2006/relationships" xmlns:p="http://schemas.openxmlformats.org/presentationml/2006/main">
+  <p:cSld>
+    <p:spTree>
+      <p:nvGrpSpPr>
+        <p:cNvPr id="1" name=""/>
+        <p:cNvGrpSpPr/>
+        <p:nvPr/>
+      </p:nvGrpSpPr>
+      <p:grpSpPr>
+        <a:xfrm>
+          <a:off x="0" y="0"/>
+          <a:ext cx="0" cy="0"/>
+          <a:chOff x="0" y="0"/>
+          <a:chExt cx="0" cy="0"/>
+        </a:xfrm>
+      </p:grpSpPr>
+      <p:sp>
+        <p:nvSpPr>
+          <p:cNvPr id="2" name="Slide Image Placeholder 1"/>
+          <p:cNvSpPr>
+            <a:spLocks noGrp="1" noRot="1" noChangeAspect="1"/>
+          </p:cNvSpPr>
+          <p:nvPr>
+            <p:ph type="sldImg"/>
+          </p:nvPr>
+        </p:nvSpPr>
+        <p:spPr/>
+      </p:sp>
+      <p:sp>
+        <p:nvSpPr>
+          <p:cNvPr id="3" name="Notes Placeholder 2"/>
+          <p:cNvSpPr>
+            <a:spLocks noGrp="1"/>
+          </p:cNvSpPr>
+          <p:nvPr>
+            <p:ph type="body" idx="1"/>
+          </p:nvPr>
+        </p:nvSpPr>
+        <p:spPr/>
+        <p:txBody>
+          <a:bodyPr/>
+          <a:lstStyle/>
+          <a:p>
+            <a:endParaRPr lang="de-DE" noProof="0" dirty="0"/>
+          </a:p>
+        </p:txBody>
+      </p:sp>
+      <p:sp>
+        <p:nvSpPr>
+          <p:cNvPr id="4" name="Slide Number Placeholder 3"/>
+          <p:cNvSpPr>
+            <a:spLocks noGrp="1"/>
+          </p:cNvSpPr>
+          <p:nvPr>
+            <p:ph type="sldNum" sz="quarter" idx="5"/>
+          </p:nvPr>
+        </p:nvSpPr>
+        <p:spPr/>
+        <p:txBody>
+          <a:bodyPr/>
+          <a:lstStyle/>
+          <a:p>
+            <a:fld id="{C3915442-2F4C-E043-BB4A-4206B63E6321}" type="slidenum">
+              <a:rPr lang="en-US" smtClean="0"/>
+              <a:t>11</a:t>
+            </a:fld>
+            <a:endParaRPr lang="en-US"/>
+          </a:p>
+        </p:txBody>
+      </p:sp>
+    </p:spTree>
+    <p:extLst>
+      <p:ext uri="{BB962C8B-B14F-4D97-AF65-F5344CB8AC3E}">
+        <p14:creationId xmlns:p14="http://schemas.microsoft.com/office/powerpoint/2010/main" val="1606554141"/>
+      </p:ext>
+    </p:extLst>
+  </p:cSld>
+  <p:clrMapOvr>
+    <a:masterClrMapping/>
+  </p:clrMapOvr>
+</p:notes>
+</file>
+
+<file path=ppt/notesSlides/notesSlide11.xml><?xml version="1.0" encoding="utf-8"?>
+<p:notes xmlns:a="http://schemas.openxmlformats.org/drawingml/2006/main" xmlns:r="http://schemas.openxmlformats.org/officeDocument/2006/relationships" xmlns:p="http://schemas.openxmlformats.org/presentationml/2006/main">
+  <p:cSld>
+    <p:spTree>
+      <p:nvGrpSpPr>
+        <p:cNvPr id="1" name=""/>
+        <p:cNvGrpSpPr/>
+        <p:nvPr/>
+      </p:nvGrpSpPr>
+      <p:grpSpPr>
+        <a:xfrm>
+          <a:off x="0" y="0"/>
+          <a:ext cx="0" cy="0"/>
+          <a:chOff x="0" y="0"/>
+          <a:chExt cx="0" cy="0"/>
+        </a:xfrm>
+      </p:grpSpPr>
+      <p:sp>
+        <p:nvSpPr>
+          <p:cNvPr id="2" name="Slide Image Placeholder 1"/>
+          <p:cNvSpPr>
+            <a:spLocks noGrp="1" noRot="1" noChangeAspect="1"/>
+          </p:cNvSpPr>
+          <p:nvPr>
+            <p:ph type="sldImg"/>
+          </p:nvPr>
+        </p:nvSpPr>
+        <p:spPr/>
+      </p:sp>
+      <p:sp>
+        <p:nvSpPr>
+          <p:cNvPr id="3" name="Notes Placeholder 2"/>
+          <p:cNvSpPr>
+            <a:spLocks noGrp="1"/>
+          </p:cNvSpPr>
+          <p:nvPr>
+            <p:ph type="body" idx="1"/>
+          </p:nvPr>
+        </p:nvSpPr>
+        <p:spPr/>
+        <p:txBody>
+          <a:bodyPr/>
+          <a:lstStyle/>
+          <a:p>
+            <a:endParaRPr lang="de-DE" noProof="0" dirty="0"/>
+          </a:p>
+        </p:txBody>
+      </p:sp>
+      <p:sp>
+        <p:nvSpPr>
+          <p:cNvPr id="4" name="Slide Number Placeholder 3"/>
+          <p:cNvSpPr>
+            <a:spLocks noGrp="1"/>
+          </p:cNvSpPr>
+          <p:nvPr>
+            <p:ph type="sldNum" sz="quarter" idx="5"/>
+          </p:nvPr>
+        </p:nvSpPr>
+        <p:spPr/>
+        <p:txBody>
+          <a:bodyPr/>
+          <a:lstStyle/>
+          <a:p>
+            <a:fld id="{C3915442-2F4C-E043-BB4A-4206B63E6321}" type="slidenum">
+              <a:rPr lang="en-US" smtClean="0"/>
+              <a:t>12</a:t>
+            </a:fld>
+            <a:endParaRPr lang="en-US"/>
+          </a:p>
+        </p:txBody>
+      </p:sp>
+    </p:spTree>
+    <p:extLst>
+      <p:ext uri="{BB962C8B-B14F-4D97-AF65-F5344CB8AC3E}">
+        <p14:creationId xmlns:p14="http://schemas.microsoft.com/office/powerpoint/2010/main" val="999188407"/>
       </p:ext>
     </p:extLst>
   </p:cSld>
@@ -1600,6 +774,9 @@
           <a:p>
             <a:endParaRPr lang="de-DE" noProof="0" dirty="0"/>
           </a:p>
+          <a:p>
+            <a:endParaRPr lang="de-DE" noProof="0" dirty="0"/>
+          </a:p>
         </p:txBody>
       </p:sp>
       <p:sp>
@@ -1619,7 +796,7 @@
           <a:p>
             <a:fld id="{C3915442-2F4C-E043-BB4A-4206B63E6321}" type="slidenum">
               <a:rPr lang="en-US" smtClean="0"/>
-              <a:t>4</a:t>
+              <a:t>3</a:t>
             </a:fld>
             <a:endParaRPr lang="en-US"/>
           </a:p>
@@ -1628,7 +805,7 @@
     </p:spTree>
     <p:extLst>
       <p:ext uri="{BB962C8B-B14F-4D97-AF65-F5344CB8AC3E}">
-        <p14:creationId xmlns:p14="http://schemas.microsoft.com/office/powerpoint/2010/main" val="1091464301"/>
+        <p14:creationId xmlns:p14="http://schemas.microsoft.com/office/powerpoint/2010/main" val="812767550"/>
       </p:ext>
     </p:extLst>
   </p:cSld>
@@ -1682,6 +859,982 @@
           <a:bodyPr/>
           <a:lstStyle/>
           <a:p>
+            <a:pPr marL="0" marR="0" lvl="0" indent="0" algn="l" defTabSz="914400" rtl="0" eaLnBrk="1" fontAlgn="auto" latinLnBrk="0" hangingPunct="1">
+              <a:lnSpc>
+                <a:spcPct val="100000"/>
+              </a:lnSpc>
+              <a:spcBef>
+                <a:spcPts val="0"/>
+              </a:spcBef>
+              <a:spcAft>
+                <a:spcPts val="0"/>
+              </a:spcAft>
+              <a:buClrTx/>
+              <a:buSzTx/>
+              <a:buFontTx/>
+              <a:buNone/>
+              <a:tabLst/>
+              <a:defRPr/>
+            </a:pPr>
+            <a:r>
+              <a:rPr lang="de-DE" sz="1200" kern="1200" noProof="0" dirty="0">
+                <a:solidFill>
+                  <a:schemeClr val="tx1"/>
+                </a:solidFill>
+                <a:effectLst/>
+                <a:latin typeface="+mn-lt"/>
+                <a:ea typeface="+mn-ea"/>
+                <a:cs typeface="+mn-cs"/>
+              </a:rPr>
+              <a:t>Ab dem 1.1.2020 gelten neue Vorschriften </a:t>
+            </a:r>
+            <a:r>
+              <a:rPr lang="de-DE" sz="1200" kern="1200" noProof="0" dirty="0" err="1">
+                <a:solidFill>
+                  <a:schemeClr val="tx1"/>
+                </a:solidFill>
+                <a:effectLst/>
+                <a:latin typeface="+mn-lt"/>
+                <a:ea typeface="+mn-ea"/>
+                <a:cs typeface="+mn-cs"/>
+              </a:rPr>
+              <a:t>für</a:t>
+            </a:r>
+            <a:r>
+              <a:rPr lang="de-DE" sz="1200" kern="1200" noProof="0" dirty="0">
+                <a:solidFill>
+                  <a:schemeClr val="tx1"/>
+                </a:solidFill>
+                <a:effectLst/>
+                <a:latin typeface="+mn-lt"/>
+                <a:ea typeface="+mn-ea"/>
+                <a:cs typeface="+mn-cs"/>
+              </a:rPr>
+              <a:t> „elektronische Aufzeichnungssysteme, die </a:t>
+            </a:r>
+            <a:r>
+              <a:rPr lang="de-DE" sz="1200" i="1" kern="1200" noProof="0" dirty="0">
+                <a:solidFill>
+                  <a:schemeClr val="tx1"/>
+                </a:solidFill>
+                <a:effectLst/>
+                <a:latin typeface="+mn-lt"/>
+                <a:ea typeface="+mn-ea"/>
+                <a:cs typeface="+mn-cs"/>
+              </a:rPr>
+              <a:t>‚</a:t>
+            </a:r>
+            <a:r>
+              <a:rPr lang="de-DE" sz="1200" kern="1200" noProof="0" dirty="0">
+                <a:solidFill>
+                  <a:schemeClr val="tx1"/>
+                </a:solidFill>
+                <a:effectLst/>
+                <a:latin typeface="+mn-lt"/>
+                <a:ea typeface="+mn-ea"/>
+                <a:cs typeface="+mn-cs"/>
+              </a:rPr>
+              <a:t>Kassenfunktion’ haben”:</a:t>
+            </a:r>
+          </a:p>
+          <a:p>
+            <a:pPr marL="171450" marR="0" lvl="0" indent="-171450" algn="l" defTabSz="914400" rtl="0" eaLnBrk="1" fontAlgn="auto" latinLnBrk="0" hangingPunct="1">
+              <a:lnSpc>
+                <a:spcPct val="100000"/>
+              </a:lnSpc>
+              <a:spcBef>
+                <a:spcPts val="0"/>
+              </a:spcBef>
+              <a:spcAft>
+                <a:spcPts val="0"/>
+              </a:spcAft>
+              <a:buClrTx/>
+              <a:buSzTx/>
+              <a:buFontTx/>
+              <a:buChar char="-"/>
+              <a:tabLst/>
+              <a:defRPr/>
+            </a:pPr>
+            <a:r>
+              <a:rPr lang="de-DE" sz="1200" kern="1200" dirty="0">
+                <a:solidFill>
+                  <a:schemeClr val="tx1"/>
+                </a:solidFill>
+                <a:effectLst/>
+                <a:latin typeface="+mn-lt"/>
+                <a:ea typeface="+mn-ea"/>
+                <a:cs typeface="+mn-cs"/>
+              </a:rPr>
+              <a:t>Die mit diesen Systemen aufgezeichneten Daten </a:t>
+            </a:r>
+            <a:r>
+              <a:rPr lang="de-DE" sz="1200" kern="1200" dirty="0" err="1">
+                <a:solidFill>
+                  <a:schemeClr val="tx1"/>
+                </a:solidFill>
+                <a:effectLst/>
+                <a:latin typeface="+mn-lt"/>
+                <a:ea typeface="+mn-ea"/>
+                <a:cs typeface="+mn-cs"/>
+              </a:rPr>
+              <a:t>müssen</a:t>
+            </a:r>
+            <a:r>
+              <a:rPr lang="de-DE" sz="1200" kern="1200" dirty="0">
+                <a:solidFill>
+                  <a:schemeClr val="tx1"/>
+                </a:solidFill>
+                <a:effectLst/>
+                <a:latin typeface="+mn-lt"/>
+                <a:ea typeface="+mn-ea"/>
+                <a:cs typeface="+mn-cs"/>
+              </a:rPr>
+              <a:t> durch eine zertifizierte technische Sicherheitseinrichtung (TSE) gegen </a:t>
+            </a:r>
+            <a:r>
+              <a:rPr lang="de-DE" sz="1200" kern="1200" dirty="0" err="1">
+                <a:solidFill>
+                  <a:schemeClr val="tx1"/>
+                </a:solidFill>
+                <a:effectLst/>
+                <a:latin typeface="+mn-lt"/>
+                <a:ea typeface="+mn-ea"/>
+                <a:cs typeface="+mn-cs"/>
+              </a:rPr>
+              <a:t>nachträgliche</a:t>
+            </a:r>
+            <a:r>
+              <a:rPr lang="de-DE" sz="1200" kern="1200" dirty="0">
+                <a:solidFill>
+                  <a:schemeClr val="tx1"/>
+                </a:solidFill>
+                <a:effectLst/>
+                <a:latin typeface="+mn-lt"/>
+                <a:ea typeface="+mn-ea"/>
+                <a:cs typeface="+mn-cs"/>
+              </a:rPr>
+              <a:t> </a:t>
+            </a:r>
+            <a:r>
+              <a:rPr lang="de-DE" sz="1200" kern="1200" dirty="0" err="1">
+                <a:solidFill>
+                  <a:schemeClr val="tx1"/>
+                </a:solidFill>
+                <a:effectLst/>
+                <a:latin typeface="+mn-lt"/>
+                <a:ea typeface="+mn-ea"/>
+                <a:cs typeface="+mn-cs"/>
+              </a:rPr>
+              <a:t>Veränderungen</a:t>
+            </a:r>
+            <a:r>
+              <a:rPr lang="de-DE" sz="1200" kern="1200" dirty="0">
+                <a:solidFill>
+                  <a:schemeClr val="tx1"/>
+                </a:solidFill>
+                <a:effectLst/>
+                <a:latin typeface="+mn-lt"/>
+                <a:ea typeface="+mn-ea"/>
+                <a:cs typeface="+mn-cs"/>
+              </a:rPr>
+              <a:t> </a:t>
+            </a:r>
+            <a:r>
+              <a:rPr lang="de-DE" sz="1200" kern="1200" dirty="0" err="1">
+                <a:solidFill>
+                  <a:schemeClr val="tx1"/>
+                </a:solidFill>
+                <a:effectLst/>
+                <a:latin typeface="+mn-lt"/>
+                <a:ea typeface="+mn-ea"/>
+                <a:cs typeface="+mn-cs"/>
+              </a:rPr>
+              <a:t>geschützt</a:t>
+            </a:r>
+            <a:r>
+              <a:rPr lang="de-DE" sz="1200" kern="1200" dirty="0">
+                <a:solidFill>
+                  <a:schemeClr val="tx1"/>
+                </a:solidFill>
+                <a:effectLst/>
+                <a:latin typeface="+mn-lt"/>
+                <a:ea typeface="+mn-ea"/>
+                <a:cs typeface="+mn-cs"/>
+              </a:rPr>
+              <a:t> werden. </a:t>
+            </a:r>
+          </a:p>
+          <a:p>
+            <a:pPr marL="171450" marR="0" lvl="0" indent="-171450" algn="l" defTabSz="914400" rtl="0" eaLnBrk="1" fontAlgn="auto" latinLnBrk="0" hangingPunct="1">
+              <a:lnSpc>
+                <a:spcPct val="100000"/>
+              </a:lnSpc>
+              <a:spcBef>
+                <a:spcPts val="0"/>
+              </a:spcBef>
+              <a:spcAft>
+                <a:spcPts val="0"/>
+              </a:spcAft>
+              <a:buClrTx/>
+              <a:buSzTx/>
+              <a:buFontTx/>
+              <a:buChar char="-"/>
+              <a:tabLst/>
+              <a:defRPr/>
+            </a:pPr>
+            <a:r>
+              <a:rPr lang="de-DE" sz="1200" kern="1200" dirty="0">
+                <a:solidFill>
+                  <a:schemeClr val="tx1"/>
+                </a:solidFill>
+                <a:effectLst/>
+                <a:latin typeface="+mn-lt"/>
+                <a:ea typeface="+mn-ea"/>
+                <a:cs typeface="+mn-cs"/>
+              </a:rPr>
+              <a:t>Bei </a:t>
+            </a:r>
+            <a:r>
+              <a:rPr lang="de-DE" sz="1200" kern="1200" dirty="0" err="1">
+                <a:solidFill>
+                  <a:schemeClr val="tx1"/>
+                </a:solidFill>
+                <a:effectLst/>
+                <a:latin typeface="+mn-lt"/>
+                <a:ea typeface="+mn-ea"/>
+                <a:cs typeface="+mn-cs"/>
+              </a:rPr>
+              <a:t>Betriebsprüfungen</a:t>
+            </a:r>
+            <a:r>
+              <a:rPr lang="de-DE" sz="1200" kern="1200" dirty="0">
+                <a:solidFill>
+                  <a:schemeClr val="tx1"/>
+                </a:solidFill>
+                <a:effectLst/>
+                <a:latin typeface="+mn-lt"/>
+                <a:ea typeface="+mn-ea"/>
+                <a:cs typeface="+mn-cs"/>
+              </a:rPr>
+              <a:t> </a:t>
+            </a:r>
+            <a:r>
+              <a:rPr lang="de-DE" sz="1200" kern="1200" dirty="0" err="1">
+                <a:solidFill>
+                  <a:schemeClr val="tx1"/>
+                </a:solidFill>
+                <a:effectLst/>
+                <a:latin typeface="+mn-lt"/>
+                <a:ea typeface="+mn-ea"/>
+                <a:cs typeface="+mn-cs"/>
+              </a:rPr>
+              <a:t>müssen</a:t>
+            </a:r>
+            <a:r>
+              <a:rPr lang="de-DE" sz="1200" kern="1200" dirty="0">
+                <a:solidFill>
+                  <a:schemeClr val="tx1"/>
+                </a:solidFill>
+                <a:effectLst/>
+                <a:latin typeface="+mn-lt"/>
+                <a:ea typeface="+mn-ea"/>
+                <a:cs typeface="+mn-cs"/>
+              </a:rPr>
+              <a:t> die aufgezeichneten Daten in einem standardisierten Format – der „Digitalen Schnittstelle der Finanzverwaltung </a:t>
+            </a:r>
+            <a:r>
+              <a:rPr lang="de-DE" sz="1200" kern="1200" dirty="0" err="1">
+                <a:solidFill>
+                  <a:schemeClr val="tx1"/>
+                </a:solidFill>
+                <a:effectLst/>
+                <a:latin typeface="+mn-lt"/>
+                <a:ea typeface="+mn-ea"/>
+                <a:cs typeface="+mn-cs"/>
+              </a:rPr>
+              <a:t>für</a:t>
+            </a:r>
+            <a:r>
+              <a:rPr lang="de-DE" sz="1200" kern="1200" dirty="0">
+                <a:solidFill>
+                  <a:schemeClr val="tx1"/>
+                </a:solidFill>
+                <a:effectLst/>
+                <a:latin typeface="+mn-lt"/>
+                <a:ea typeface="+mn-ea"/>
+                <a:cs typeface="+mn-cs"/>
+              </a:rPr>
+              <a:t> Kassensysteme” (</a:t>
+            </a:r>
+            <a:r>
+              <a:rPr lang="de-DE" sz="1200" kern="1200" dirty="0" err="1">
+                <a:solidFill>
+                  <a:schemeClr val="tx1"/>
+                </a:solidFill>
+                <a:effectLst/>
+                <a:latin typeface="+mn-lt"/>
+                <a:ea typeface="+mn-ea"/>
+                <a:cs typeface="+mn-cs"/>
+              </a:rPr>
+              <a:t>DSFinV</a:t>
+            </a:r>
+            <a:r>
+              <a:rPr lang="de-DE" sz="1200" kern="1200" dirty="0">
+                <a:solidFill>
+                  <a:schemeClr val="tx1"/>
+                </a:solidFill>
+                <a:effectLst/>
+                <a:latin typeface="+mn-lt"/>
+                <a:ea typeface="+mn-ea"/>
+                <a:cs typeface="+mn-cs"/>
+              </a:rPr>
+              <a:t>-K) – vorgelegt werden. </a:t>
+            </a:r>
+            <a:endParaRPr lang="de-DE" dirty="0"/>
+          </a:p>
+          <a:p>
+            <a:pPr marL="171450" marR="0" lvl="0" indent="-171450" algn="l" defTabSz="914400" rtl="0" eaLnBrk="1" fontAlgn="auto" latinLnBrk="0" hangingPunct="1">
+              <a:lnSpc>
+                <a:spcPct val="100000"/>
+              </a:lnSpc>
+              <a:spcBef>
+                <a:spcPts val="0"/>
+              </a:spcBef>
+              <a:spcAft>
+                <a:spcPts val="0"/>
+              </a:spcAft>
+              <a:buClrTx/>
+              <a:buSzTx/>
+              <a:buFontTx/>
+              <a:buChar char="-"/>
+              <a:tabLst/>
+              <a:defRPr/>
+            </a:pPr>
+            <a:endParaRPr lang="de-DE" dirty="0"/>
+          </a:p>
+          <a:p>
+            <a:pPr marL="0" marR="0" lvl="0" indent="0" algn="l" defTabSz="914400" rtl="0" eaLnBrk="1" fontAlgn="auto" latinLnBrk="0" hangingPunct="1">
+              <a:lnSpc>
+                <a:spcPct val="100000"/>
+              </a:lnSpc>
+              <a:spcBef>
+                <a:spcPts val="0"/>
+              </a:spcBef>
+              <a:spcAft>
+                <a:spcPts val="0"/>
+              </a:spcAft>
+              <a:buClrTx/>
+              <a:buSzTx/>
+              <a:buFontTx/>
+              <a:buNone/>
+              <a:tabLst/>
+              <a:defRPr/>
+            </a:pPr>
+            <a:r>
+              <a:rPr lang="de-DE" sz="1200" kern="1200" dirty="0">
+                <a:solidFill>
+                  <a:schemeClr val="tx1"/>
+                </a:solidFill>
+                <a:effectLst/>
+                <a:latin typeface="+mn-lt"/>
+                <a:ea typeface="+mn-ea"/>
+                <a:cs typeface="+mn-cs"/>
+              </a:rPr>
+              <a:t>Die neuen Pflichten </a:t>
+            </a:r>
+            <a:endParaRPr lang="de-DE" dirty="0">
+              <a:effectLst/>
+            </a:endParaRPr>
+          </a:p>
+          <a:p>
+            <a:pPr marL="0" marR="0" lvl="0" indent="0" algn="l" defTabSz="914400" rtl="0" eaLnBrk="1" fontAlgn="auto" latinLnBrk="0" hangingPunct="1">
+              <a:lnSpc>
+                <a:spcPct val="100000"/>
+              </a:lnSpc>
+              <a:spcBef>
+                <a:spcPts val="0"/>
+              </a:spcBef>
+              <a:spcAft>
+                <a:spcPts val="0"/>
+              </a:spcAft>
+              <a:buClrTx/>
+              <a:buSzTx/>
+              <a:buFontTx/>
+              <a:buNone/>
+              <a:tabLst/>
+              <a:defRPr/>
+            </a:pPr>
+            <a:endParaRPr lang="de-DE" noProof="0" dirty="0"/>
+          </a:p>
+          <a:p>
+            <a:r>
+              <a:rPr lang="de-DE" sz="1200" kern="1200" dirty="0">
+                <a:solidFill>
+                  <a:schemeClr val="tx1"/>
+                </a:solidFill>
+                <a:effectLst/>
+                <a:latin typeface="+mn-lt"/>
+                <a:ea typeface="+mn-ea"/>
+                <a:cs typeface="+mn-cs"/>
+              </a:rPr>
+              <a:t>Die wesentlichen Anforderungen ergeben sich direkt aus dem Gesetz (§146a Abgabenord- </a:t>
+            </a:r>
+            <a:endParaRPr lang="de-DE" dirty="0">
+              <a:effectLst/>
+            </a:endParaRPr>
+          </a:p>
+          <a:p>
+            <a:r>
+              <a:rPr lang="de-DE" sz="1200" kern="1200" dirty="0" err="1">
+                <a:solidFill>
+                  <a:schemeClr val="tx1"/>
+                </a:solidFill>
+                <a:effectLst/>
+                <a:latin typeface="+mn-lt"/>
+                <a:ea typeface="+mn-ea"/>
+                <a:cs typeface="+mn-cs"/>
+              </a:rPr>
+              <a:t>nung</a:t>
+            </a:r>
+            <a:r>
+              <a:rPr lang="de-DE" sz="1200" kern="1200" dirty="0">
+                <a:solidFill>
+                  <a:schemeClr val="tx1"/>
+                </a:solidFill>
+                <a:effectLst/>
+                <a:latin typeface="+mn-lt"/>
+                <a:ea typeface="+mn-ea"/>
+                <a:cs typeface="+mn-cs"/>
+              </a:rPr>
+              <a:t>) und der Kassensicherungsverordnung (KassenSichV): </a:t>
+            </a:r>
+            <a:endParaRPr lang="de-DE" dirty="0">
+              <a:effectLst/>
+            </a:endParaRPr>
+          </a:p>
+          <a:p>
+            <a:pPr lvl="1"/>
+            <a:r>
+              <a:rPr lang="de-DE" sz="1200" kern="1200" dirty="0">
+                <a:solidFill>
+                  <a:schemeClr val="tx1"/>
+                </a:solidFill>
+                <a:effectLst/>
+                <a:latin typeface="+mn-lt"/>
+                <a:ea typeface="+mn-ea"/>
+                <a:cs typeface="+mn-cs"/>
+              </a:rPr>
+              <a:t>●  </a:t>
+            </a:r>
+            <a:r>
+              <a:rPr lang="de-DE" sz="1200" b="1" kern="1200" dirty="0">
+                <a:solidFill>
+                  <a:schemeClr val="tx1"/>
+                </a:solidFill>
+                <a:effectLst/>
+                <a:latin typeface="+mn-lt"/>
+                <a:ea typeface="+mn-ea"/>
+                <a:cs typeface="+mn-cs"/>
+              </a:rPr>
+              <a:t>Einzelaufzeichnung: </a:t>
+            </a:r>
+            <a:r>
+              <a:rPr lang="de-DE" sz="1200" kern="1200" dirty="0">
+                <a:solidFill>
+                  <a:schemeClr val="tx1"/>
+                </a:solidFill>
+                <a:effectLst/>
+                <a:latin typeface="+mn-lt"/>
+                <a:ea typeface="+mn-ea"/>
+                <a:cs typeface="+mn-cs"/>
+              </a:rPr>
+              <a:t>Die </a:t>
+            </a:r>
+            <a:r>
+              <a:rPr lang="de-DE" sz="1200" kern="1200" dirty="0" err="1">
+                <a:solidFill>
+                  <a:schemeClr val="tx1"/>
+                </a:solidFill>
+                <a:effectLst/>
+                <a:latin typeface="+mn-lt"/>
+                <a:ea typeface="+mn-ea"/>
+                <a:cs typeface="+mn-cs"/>
+              </a:rPr>
+              <a:t>Geschäftsvorfälle</a:t>
+            </a:r>
+            <a:r>
+              <a:rPr lang="de-DE" sz="1200" kern="1200" dirty="0">
+                <a:solidFill>
+                  <a:schemeClr val="tx1"/>
+                </a:solidFill>
+                <a:effectLst/>
+                <a:latin typeface="+mn-lt"/>
+                <a:ea typeface="+mn-ea"/>
+                <a:cs typeface="+mn-cs"/>
+              </a:rPr>
+              <a:t> und anderen </a:t>
+            </a:r>
+            <a:r>
+              <a:rPr lang="de-DE" sz="1200" kern="1200" dirty="0" err="1">
+                <a:solidFill>
+                  <a:schemeClr val="tx1"/>
+                </a:solidFill>
+                <a:effectLst/>
+                <a:latin typeface="+mn-lt"/>
+                <a:ea typeface="+mn-ea"/>
+                <a:cs typeface="+mn-cs"/>
+              </a:rPr>
+              <a:t>Vorgänge</a:t>
+            </a:r>
+            <a:r>
+              <a:rPr lang="de-DE" sz="1200" kern="1200" dirty="0">
+                <a:solidFill>
+                  <a:schemeClr val="tx1"/>
+                </a:solidFill>
+                <a:effectLst/>
+                <a:latin typeface="+mn-lt"/>
+                <a:ea typeface="+mn-ea"/>
+                <a:cs typeface="+mn-cs"/>
+              </a:rPr>
+              <a:t> </a:t>
+            </a:r>
+            <a:r>
+              <a:rPr lang="de-DE" sz="1200" kern="1200" dirty="0" err="1">
+                <a:solidFill>
+                  <a:schemeClr val="tx1"/>
+                </a:solidFill>
+                <a:effectLst/>
+                <a:latin typeface="+mn-lt"/>
+                <a:ea typeface="+mn-ea"/>
+                <a:cs typeface="+mn-cs"/>
+              </a:rPr>
+              <a:t>müssen</a:t>
+            </a:r>
+            <a:r>
+              <a:rPr lang="de-DE" sz="1200" kern="1200" dirty="0">
+                <a:solidFill>
+                  <a:schemeClr val="tx1"/>
+                </a:solidFill>
+                <a:effectLst/>
+                <a:latin typeface="+mn-lt"/>
+                <a:ea typeface="+mn-ea"/>
+                <a:cs typeface="+mn-cs"/>
+              </a:rPr>
+              <a:t> einzeln, </a:t>
+            </a:r>
+            <a:r>
+              <a:rPr lang="de-DE" sz="1200" kern="1200" dirty="0" err="1">
+                <a:solidFill>
+                  <a:schemeClr val="tx1"/>
+                </a:solidFill>
+                <a:effectLst/>
+                <a:latin typeface="+mn-lt"/>
+                <a:ea typeface="+mn-ea"/>
+                <a:cs typeface="+mn-cs"/>
+              </a:rPr>
+              <a:t>vollständig</a:t>
+            </a:r>
+            <a:r>
+              <a:rPr lang="de-DE" sz="1200" kern="1200" dirty="0">
+                <a:solidFill>
+                  <a:schemeClr val="tx1"/>
+                </a:solidFill>
+                <a:effectLst/>
+                <a:latin typeface="+mn-lt"/>
+                <a:ea typeface="+mn-ea"/>
+                <a:cs typeface="+mn-cs"/>
+              </a:rPr>
+              <a:t>, richtig, zeitgerecht und geordnet aufgezeichnet werden. </a:t>
+            </a:r>
+            <a:endParaRPr lang="de-DE" dirty="0">
+              <a:effectLst/>
+            </a:endParaRPr>
+          </a:p>
+          <a:p>
+            <a:pPr lvl="1"/>
+            <a:r>
+              <a:rPr lang="de-DE" sz="1200" kern="1200" dirty="0">
+                <a:solidFill>
+                  <a:schemeClr val="tx1"/>
+                </a:solidFill>
+                <a:effectLst/>
+                <a:latin typeface="+mn-lt"/>
+                <a:ea typeface="+mn-ea"/>
+                <a:cs typeface="+mn-cs"/>
+              </a:rPr>
+              <a:t>●  </a:t>
+            </a:r>
+            <a:r>
+              <a:rPr lang="de-DE" sz="1200" b="1" kern="1200" dirty="0">
+                <a:solidFill>
+                  <a:schemeClr val="tx1"/>
+                </a:solidFill>
+                <a:effectLst/>
+                <a:latin typeface="+mn-lt"/>
+                <a:ea typeface="+mn-ea"/>
+                <a:cs typeface="+mn-cs"/>
+              </a:rPr>
+              <a:t>TSE-Pflicht: </a:t>
+            </a:r>
+            <a:r>
+              <a:rPr lang="de-DE" sz="1200" kern="1200" dirty="0">
+                <a:solidFill>
+                  <a:schemeClr val="tx1"/>
+                </a:solidFill>
+                <a:effectLst/>
+                <a:latin typeface="+mn-lt"/>
+                <a:ea typeface="+mn-ea"/>
+                <a:cs typeface="+mn-cs"/>
+              </a:rPr>
+              <a:t>Die digitalen Aufzeichnungen sind durch eine zertifizierte technische Sicherheitseinrichtung zu </a:t>
+            </a:r>
+            <a:r>
+              <a:rPr lang="de-DE" sz="1200" kern="1200" dirty="0" err="1">
+                <a:solidFill>
+                  <a:schemeClr val="tx1"/>
+                </a:solidFill>
+                <a:effectLst/>
+                <a:latin typeface="+mn-lt"/>
+                <a:ea typeface="+mn-ea"/>
+                <a:cs typeface="+mn-cs"/>
+              </a:rPr>
+              <a:t>schützen</a:t>
+            </a:r>
+            <a:r>
+              <a:rPr lang="de-DE" sz="1200" kern="1200" dirty="0">
+                <a:solidFill>
+                  <a:schemeClr val="tx1"/>
+                </a:solidFill>
+                <a:effectLst/>
+                <a:latin typeface="+mn-lt"/>
+                <a:ea typeface="+mn-ea"/>
+                <a:cs typeface="+mn-cs"/>
+              </a:rPr>
+              <a:t>. </a:t>
+            </a:r>
+            <a:endParaRPr lang="de-DE" dirty="0">
+              <a:effectLst/>
+            </a:endParaRPr>
+          </a:p>
+          <a:p>
+            <a:pPr lvl="1"/>
+            <a:r>
+              <a:rPr lang="de-DE" sz="1200" kern="1200" dirty="0">
+                <a:solidFill>
+                  <a:schemeClr val="tx1"/>
+                </a:solidFill>
+                <a:effectLst/>
+                <a:latin typeface="+mn-lt"/>
+                <a:ea typeface="+mn-ea"/>
+                <a:cs typeface="+mn-cs"/>
+              </a:rPr>
+              <a:t>●  </a:t>
+            </a:r>
+            <a:r>
+              <a:rPr lang="de-DE" sz="1200" b="1" kern="1200" dirty="0">
+                <a:solidFill>
+                  <a:schemeClr val="tx1"/>
+                </a:solidFill>
+                <a:effectLst/>
+                <a:latin typeface="+mn-lt"/>
+                <a:ea typeface="+mn-ea"/>
+                <a:cs typeface="+mn-cs"/>
+              </a:rPr>
+              <a:t>Datensicherung / Archivierung: </a:t>
+            </a:r>
+            <a:r>
+              <a:rPr lang="de-DE" sz="1200" kern="1200" dirty="0">
+                <a:solidFill>
+                  <a:schemeClr val="tx1"/>
+                </a:solidFill>
+                <a:effectLst/>
+                <a:latin typeface="+mn-lt"/>
+                <a:ea typeface="+mn-ea"/>
+                <a:cs typeface="+mn-cs"/>
+              </a:rPr>
+              <a:t>Die digitalen Aufzeichnungen sind zu sichern und </a:t>
+            </a:r>
+            <a:r>
+              <a:rPr lang="de-DE" sz="1200" kern="1200" dirty="0" err="1">
+                <a:solidFill>
+                  <a:schemeClr val="tx1"/>
+                </a:solidFill>
+                <a:effectLst/>
+                <a:latin typeface="+mn-lt"/>
+                <a:ea typeface="+mn-ea"/>
+                <a:cs typeface="+mn-cs"/>
+              </a:rPr>
+              <a:t>für</a:t>
+            </a:r>
+            <a:r>
+              <a:rPr lang="de-DE" sz="1200" kern="1200" dirty="0">
+                <a:solidFill>
+                  <a:schemeClr val="tx1"/>
+                </a:solidFill>
+                <a:effectLst/>
+                <a:latin typeface="+mn-lt"/>
+                <a:ea typeface="+mn-ea"/>
+                <a:cs typeface="+mn-cs"/>
+              </a:rPr>
+              <a:t> Kassen-Nachschauen sowie </a:t>
+            </a:r>
+            <a:r>
+              <a:rPr lang="de-DE" sz="1200" kern="1200" dirty="0" err="1">
+                <a:solidFill>
+                  <a:schemeClr val="tx1"/>
+                </a:solidFill>
+                <a:effectLst/>
+                <a:latin typeface="+mn-lt"/>
+                <a:ea typeface="+mn-ea"/>
+                <a:cs typeface="+mn-cs"/>
+              </a:rPr>
+              <a:t>Außenprüfungen</a:t>
+            </a:r>
+            <a:r>
+              <a:rPr lang="de-DE" sz="1200" kern="1200" dirty="0">
+                <a:solidFill>
+                  <a:schemeClr val="tx1"/>
+                </a:solidFill>
+                <a:effectLst/>
+                <a:latin typeface="+mn-lt"/>
+                <a:ea typeface="+mn-ea"/>
+                <a:cs typeface="+mn-cs"/>
+              </a:rPr>
+              <a:t> </a:t>
+            </a:r>
+            <a:r>
+              <a:rPr lang="de-DE" sz="1200" kern="1200" dirty="0" err="1">
+                <a:solidFill>
+                  <a:schemeClr val="tx1"/>
+                </a:solidFill>
+                <a:effectLst/>
+                <a:latin typeface="+mn-lt"/>
+                <a:ea typeface="+mn-ea"/>
+                <a:cs typeface="+mn-cs"/>
+              </a:rPr>
+              <a:t>verfügbar</a:t>
+            </a:r>
+            <a:r>
+              <a:rPr lang="de-DE" sz="1200" kern="1200" dirty="0">
+                <a:solidFill>
+                  <a:schemeClr val="tx1"/>
+                </a:solidFill>
+                <a:effectLst/>
+                <a:latin typeface="+mn-lt"/>
+                <a:ea typeface="+mn-ea"/>
+                <a:cs typeface="+mn-cs"/>
+              </a:rPr>
+              <a:t> zu halten. </a:t>
+            </a:r>
+            <a:endParaRPr lang="de-DE" dirty="0">
+              <a:effectLst/>
+            </a:endParaRPr>
+          </a:p>
+          <a:p>
+            <a:pPr lvl="1"/>
+            <a:r>
+              <a:rPr lang="de-DE" sz="1200" kern="1200" dirty="0">
+                <a:solidFill>
+                  <a:schemeClr val="tx1"/>
+                </a:solidFill>
+                <a:effectLst/>
+                <a:latin typeface="+mn-lt"/>
+                <a:ea typeface="+mn-ea"/>
+                <a:cs typeface="+mn-cs"/>
+              </a:rPr>
+              <a:t>●  </a:t>
+            </a:r>
+            <a:r>
+              <a:rPr lang="de-DE" sz="1200" b="1" kern="1200" dirty="0">
+                <a:solidFill>
+                  <a:schemeClr val="tx1"/>
+                </a:solidFill>
+                <a:effectLst/>
+                <a:latin typeface="+mn-lt"/>
+                <a:ea typeface="+mn-ea"/>
+                <a:cs typeface="+mn-cs"/>
+              </a:rPr>
+              <a:t>Belegausgabepflicht: </a:t>
+            </a:r>
+            <a:r>
+              <a:rPr lang="de-DE" sz="1200" kern="1200" dirty="0">
+                <a:solidFill>
+                  <a:schemeClr val="tx1"/>
+                </a:solidFill>
+                <a:effectLst/>
+                <a:latin typeface="+mn-lt"/>
+                <a:ea typeface="+mn-ea"/>
+                <a:cs typeface="+mn-cs"/>
+              </a:rPr>
+              <a:t>Den am </a:t>
+            </a:r>
+            <a:r>
+              <a:rPr lang="de-DE" sz="1200" kern="1200" dirty="0" err="1">
+                <a:solidFill>
+                  <a:schemeClr val="tx1"/>
+                </a:solidFill>
+                <a:effectLst/>
+                <a:latin typeface="+mn-lt"/>
+                <a:ea typeface="+mn-ea"/>
+                <a:cs typeface="+mn-cs"/>
+              </a:rPr>
+              <a:t>Geschäftsvorfall</a:t>
+            </a:r>
+            <a:r>
+              <a:rPr lang="de-DE" sz="1200" kern="1200" dirty="0">
+                <a:solidFill>
+                  <a:schemeClr val="tx1"/>
+                </a:solidFill>
+                <a:effectLst/>
+                <a:latin typeface="+mn-lt"/>
+                <a:ea typeface="+mn-ea"/>
+                <a:cs typeface="+mn-cs"/>
+              </a:rPr>
+              <a:t> Beteiligten ist ein Beleg </a:t>
+            </a:r>
+            <a:r>
+              <a:rPr lang="de-DE" sz="1200" kern="1200" dirty="0" err="1">
+                <a:solidFill>
+                  <a:schemeClr val="tx1"/>
+                </a:solidFill>
+                <a:effectLst/>
+                <a:latin typeface="+mn-lt"/>
+                <a:ea typeface="+mn-ea"/>
+                <a:cs typeface="+mn-cs"/>
+              </a:rPr>
+              <a:t>über</a:t>
+            </a:r>
+            <a:r>
+              <a:rPr lang="de-DE" sz="1200" kern="1200" dirty="0">
+                <a:solidFill>
+                  <a:schemeClr val="tx1"/>
+                </a:solidFill>
+                <a:effectLst/>
+                <a:latin typeface="+mn-lt"/>
+                <a:ea typeface="+mn-ea"/>
+                <a:cs typeface="+mn-cs"/>
+              </a:rPr>
+              <a:t> den </a:t>
+            </a:r>
+            <a:r>
+              <a:rPr lang="de-DE" sz="1200" kern="1200" dirty="0" err="1">
+                <a:solidFill>
+                  <a:schemeClr val="tx1"/>
+                </a:solidFill>
+                <a:effectLst/>
+                <a:latin typeface="+mn-lt"/>
+                <a:ea typeface="+mn-ea"/>
+                <a:cs typeface="+mn-cs"/>
+              </a:rPr>
+              <a:t>Geschäftsvorfall</a:t>
+            </a:r>
+            <a:r>
+              <a:rPr lang="de-DE" sz="1200" kern="1200" dirty="0">
+                <a:solidFill>
+                  <a:schemeClr val="tx1"/>
+                </a:solidFill>
+                <a:effectLst/>
+                <a:latin typeface="+mn-lt"/>
+                <a:ea typeface="+mn-ea"/>
+                <a:cs typeface="+mn-cs"/>
+              </a:rPr>
+              <a:t> auszustellen und zur </a:t>
+            </a:r>
+            <a:r>
+              <a:rPr lang="de-DE" sz="1200" kern="1200" dirty="0" err="1">
+                <a:solidFill>
+                  <a:schemeClr val="tx1"/>
+                </a:solidFill>
+                <a:effectLst/>
+                <a:latin typeface="+mn-lt"/>
+                <a:ea typeface="+mn-ea"/>
+                <a:cs typeface="+mn-cs"/>
+              </a:rPr>
+              <a:t>Verfügung</a:t>
+            </a:r>
+            <a:r>
+              <a:rPr lang="de-DE" sz="1200" kern="1200" dirty="0">
+                <a:solidFill>
+                  <a:schemeClr val="tx1"/>
+                </a:solidFill>
+                <a:effectLst/>
+                <a:latin typeface="+mn-lt"/>
+                <a:ea typeface="+mn-ea"/>
+                <a:cs typeface="+mn-cs"/>
+              </a:rPr>
+              <a:t> zu stellen. </a:t>
+            </a:r>
+            <a:endParaRPr lang="de-DE" dirty="0">
+              <a:effectLst/>
+            </a:endParaRPr>
+          </a:p>
+          <a:p>
+            <a:pPr lvl="1"/>
+            <a:r>
+              <a:rPr lang="de-DE" sz="1200" kern="1200" dirty="0">
+                <a:solidFill>
+                  <a:schemeClr val="tx1"/>
+                </a:solidFill>
+                <a:effectLst/>
+                <a:latin typeface="+mn-lt"/>
+                <a:ea typeface="+mn-ea"/>
+                <a:cs typeface="+mn-cs"/>
+              </a:rPr>
+              <a:t>●  </a:t>
+            </a:r>
+            <a:r>
+              <a:rPr lang="de-DE" sz="1200" b="1" kern="1200" dirty="0">
+                <a:solidFill>
+                  <a:schemeClr val="tx1"/>
+                </a:solidFill>
+                <a:effectLst/>
+                <a:latin typeface="+mn-lt"/>
+                <a:ea typeface="+mn-ea"/>
+                <a:cs typeface="+mn-cs"/>
+              </a:rPr>
+              <a:t>Meldepflicht: </a:t>
+            </a:r>
+            <a:r>
+              <a:rPr lang="de-DE" sz="1200" kern="1200" dirty="0">
+                <a:solidFill>
+                  <a:schemeClr val="tx1"/>
+                </a:solidFill>
+                <a:effectLst/>
+                <a:latin typeface="+mn-lt"/>
+                <a:ea typeface="+mn-ea"/>
+                <a:cs typeface="+mn-cs"/>
+              </a:rPr>
+              <a:t>Dem </a:t>
+            </a:r>
+            <a:r>
+              <a:rPr lang="de-DE" sz="1200" kern="1200" dirty="0" err="1">
+                <a:solidFill>
+                  <a:schemeClr val="tx1"/>
+                </a:solidFill>
+                <a:effectLst/>
+                <a:latin typeface="+mn-lt"/>
+                <a:ea typeface="+mn-ea"/>
+                <a:cs typeface="+mn-cs"/>
+              </a:rPr>
+              <a:t>zuständigen</a:t>
+            </a:r>
+            <a:r>
+              <a:rPr lang="de-DE" sz="1200" kern="1200" dirty="0">
+                <a:solidFill>
+                  <a:schemeClr val="tx1"/>
+                </a:solidFill>
+                <a:effectLst/>
+                <a:latin typeface="+mn-lt"/>
+                <a:ea typeface="+mn-ea"/>
+                <a:cs typeface="+mn-cs"/>
+              </a:rPr>
+              <a:t> Finanzamt muss die Anschaffung und Außerbetriebnahme eines elektronischen Aufzeichnungssystems innerhalb eines Monats mitgeteilt werden. </a:t>
+            </a:r>
+            <a:endParaRPr lang="de-DE" dirty="0">
+              <a:effectLst/>
+            </a:endParaRPr>
+          </a:p>
+          <a:p>
             <a:endParaRPr lang="de-DE" noProof="0" dirty="0"/>
           </a:p>
         </p:txBody>
@@ -1703,7 +1856,7 @@
           <a:p>
             <a:fld id="{C3915442-2F4C-E043-BB4A-4206B63E6321}" type="slidenum">
               <a:rPr lang="en-US" smtClean="0"/>
-              <a:t>5</a:t>
+              <a:t>4</a:t>
             </a:fld>
             <a:endParaRPr lang="en-US"/>
           </a:p>
@@ -1712,7 +1865,7 @@
     </p:spTree>
     <p:extLst>
       <p:ext uri="{BB962C8B-B14F-4D97-AF65-F5344CB8AC3E}">
-        <p14:creationId xmlns:p14="http://schemas.microsoft.com/office/powerpoint/2010/main" val="2602928303"/>
+        <p14:creationId xmlns:p14="http://schemas.microsoft.com/office/powerpoint/2010/main" val="3519698093"/>
       </p:ext>
     </p:extLst>
   </p:cSld>
@@ -1787,7 +1940,7 @@
           <a:p>
             <a:fld id="{C3915442-2F4C-E043-BB4A-4206B63E6321}" type="slidenum">
               <a:rPr lang="en-US" smtClean="0"/>
-              <a:t>6</a:t>
+              <a:t>5</a:t>
             </a:fld>
             <a:endParaRPr lang="en-US"/>
           </a:p>
@@ -1796,7 +1949,7 @@
     </p:spTree>
     <p:extLst>
       <p:ext uri="{BB962C8B-B14F-4D97-AF65-F5344CB8AC3E}">
-        <p14:creationId xmlns:p14="http://schemas.microsoft.com/office/powerpoint/2010/main" val="192492271"/>
+        <p14:creationId xmlns:p14="http://schemas.microsoft.com/office/powerpoint/2010/main" val="1091464301"/>
       </p:ext>
     </p:extLst>
   </p:cSld>
@@ -1871,7 +2024,7 @@
           <a:p>
             <a:fld id="{C3915442-2F4C-E043-BB4A-4206B63E6321}" type="slidenum">
               <a:rPr lang="en-US" smtClean="0"/>
-              <a:t>7</a:t>
+              <a:t>6</a:t>
             </a:fld>
             <a:endParaRPr lang="en-US"/>
           </a:p>
@@ -1880,7 +2033,7 @@
     </p:spTree>
     <p:extLst>
       <p:ext uri="{BB962C8B-B14F-4D97-AF65-F5344CB8AC3E}">
-        <p14:creationId xmlns:p14="http://schemas.microsoft.com/office/powerpoint/2010/main" val="138340601"/>
+        <p14:creationId xmlns:p14="http://schemas.microsoft.com/office/powerpoint/2010/main" val="2602928303"/>
       </p:ext>
     </p:extLst>
   </p:cSld>
@@ -1934,7 +2087,82 @@
           <a:bodyPr/>
           <a:lstStyle/>
           <a:p>
-            <a:endParaRPr lang="de-DE" noProof="0" dirty="0"/>
+            <a:r>
+              <a:rPr lang="de-DE" noProof="0" dirty="0"/>
+              <a:t>Das Kassensystem kommuniziert mit der ft.Middleware über das </a:t>
+            </a:r>
+            <a:r>
+              <a:rPr lang="de-DE" noProof="0" dirty="0" err="1"/>
+              <a:t>iPOS</a:t>
+            </a:r>
+            <a:r>
+              <a:rPr lang="de-DE" noProof="0" dirty="0"/>
+              <a:t> Interface. </a:t>
+            </a:r>
+          </a:p>
+          <a:p>
+            <a:r>
+              <a:rPr lang="de-DE" noProof="0" dirty="0"/>
+              <a:t>Das </a:t>
+            </a:r>
+            <a:r>
+              <a:rPr lang="de-DE" noProof="0" dirty="0" err="1"/>
+              <a:t>iPOS</a:t>
+            </a:r>
+            <a:r>
+              <a:rPr lang="de-DE" noProof="0" dirty="0"/>
+              <a:t> Interface ist gleich für alle unterstützen Länder.</a:t>
+            </a:r>
+          </a:p>
+          <a:p>
+            <a:r>
+              <a:rPr lang="de-DE" noProof="0" dirty="0"/>
+              <a:t>Das </a:t>
+            </a:r>
+            <a:r>
+              <a:rPr lang="de-DE" noProof="0" dirty="0" err="1"/>
+              <a:t>iPOS</a:t>
+            </a:r>
+            <a:r>
+              <a:rPr lang="de-DE" noProof="0" dirty="0"/>
+              <a:t> Interface ist über REST, </a:t>
+            </a:r>
+            <a:r>
+              <a:rPr lang="de-DE" noProof="0" dirty="0" err="1"/>
+              <a:t>gRPC</a:t>
+            </a:r>
+            <a:r>
+              <a:rPr lang="de-DE" noProof="0" dirty="0"/>
+              <a:t>, WCF, TCP-Stream und Serial-Stream erreichbar.</a:t>
+            </a:r>
+          </a:p>
+          <a:p>
+            <a:r>
+              <a:rPr lang="de-DE" noProof="0" dirty="0"/>
+              <a:t>Das </a:t>
+            </a:r>
+            <a:r>
+              <a:rPr lang="de-DE" noProof="0" dirty="0" err="1"/>
+              <a:t>iPOS</a:t>
+            </a:r>
+            <a:r>
+              <a:rPr lang="de-DE" noProof="0" dirty="0"/>
+              <a:t> Interface bietet 3 Methoden: Echo (Verfügbarkeit prüfen), Sign (Signieren der Belegdaten, Absetzen von Sonderbelegen), Journal (Export von Daten)</a:t>
+            </a:r>
+          </a:p>
+          <a:p>
+            <a:r>
+              <a:rPr lang="de-DE" noProof="0" dirty="0"/>
+              <a:t>Die Request werden im </a:t>
+            </a:r>
+            <a:r>
+              <a:rPr lang="de-DE" noProof="0" dirty="0" err="1"/>
+              <a:t>ft.SecurityMechanism</a:t>
+            </a:r>
+            <a:r>
+              <a:rPr lang="de-DE" noProof="0" dirty="0"/>
+              <a:t> bearbeitet. Dieser kümmert sich um die Signierung und Persistenz der Daten.</a:t>
+            </a:r>
           </a:p>
         </p:txBody>
       </p:sp>
@@ -1955,7 +2183,7 @@
           <a:p>
             <a:fld id="{C3915442-2F4C-E043-BB4A-4206B63E6321}" type="slidenum">
               <a:rPr lang="en-US" smtClean="0"/>
-              <a:t>8</a:t>
+              <a:t>7</a:t>
             </a:fld>
             <a:endParaRPr lang="en-US"/>
           </a:p>
@@ -1964,7 +2192,7 @@
     </p:spTree>
     <p:extLst>
       <p:ext uri="{BB962C8B-B14F-4D97-AF65-F5344CB8AC3E}">
-        <p14:creationId xmlns:p14="http://schemas.microsoft.com/office/powerpoint/2010/main" val="3482200423"/>
+        <p14:creationId xmlns:p14="http://schemas.microsoft.com/office/powerpoint/2010/main" val="192492271"/>
       </p:ext>
     </p:extLst>
   </p:cSld>
@@ -2018,7 +2246,61 @@
           <a:bodyPr/>
           <a:lstStyle/>
           <a:p>
-            <a:endParaRPr lang="de-DE" noProof="0" dirty="0"/>
+            <a:r>
+              <a:rPr lang="de-DE" noProof="0" dirty="0"/>
+              <a:t>Erläuterung der Sign Methode des IPOS Interface. </a:t>
+            </a:r>
+          </a:p>
+          <a:p>
+            <a:r>
+              <a:rPr lang="de-DE" noProof="0" dirty="0"/>
+              <a:t>Kassensystem sendet mit XML oder JSON formatierte Daten über die Sign Methode an die Middleware</a:t>
+            </a:r>
+          </a:p>
+          <a:p>
+            <a:r>
+              <a:rPr lang="de-DE" noProof="0" dirty="0"/>
+              <a:t>Die Daten sind in 4 Blöcke aufgeteilt: Headerdaten, Charge-Items, Pay-Items, und </a:t>
+            </a:r>
+            <a:r>
+              <a:rPr lang="de-DE" noProof="0" dirty="0" err="1"/>
+              <a:t>Footerdaten</a:t>
+            </a:r>
+            <a:r>
+              <a:rPr lang="de-DE" noProof="0" dirty="0"/>
+              <a:t>.</a:t>
+            </a:r>
+          </a:p>
+          <a:p>
+            <a:r>
+              <a:rPr lang="de-DE" noProof="0" dirty="0"/>
+              <a:t>Die Middleware prozessiert die Daten und sendet </a:t>
+            </a:r>
+            <a:r>
+              <a:rPr lang="de-DE" b="1" noProof="0" dirty="0"/>
+              <a:t>nur zusätzliche Daten </a:t>
+            </a:r>
+            <a:r>
+              <a:rPr lang="de-DE" b="0" noProof="0" dirty="0"/>
+              <a:t>zurück an das Kassensystem zurück. Wichtigster Block ist hierbei der „</a:t>
+            </a:r>
+            <a:r>
+              <a:rPr lang="de-DE" b="0" noProof="0" dirty="0" err="1"/>
+              <a:t>Signatures</a:t>
+            </a:r>
+            <a:r>
+              <a:rPr lang="de-DE" b="0" noProof="0" dirty="0"/>
+              <a:t>“ Block. </a:t>
+            </a:r>
+            <a:r>
+              <a:rPr lang="de-DE" b="1" noProof="0" dirty="0"/>
+              <a:t>Die initial an die ft.Middleware gesendeten Daten werden nicht zurückgesendet</a:t>
+            </a:r>
+            <a:r>
+              <a:rPr lang="de-DE" b="0" noProof="0" dirty="0"/>
+              <a:t>.</a:t>
+            </a:r>
+            <a:endParaRPr lang="de-DE" b="1" noProof="0" dirty="0"/>
           </a:p>
         </p:txBody>
       </p:sp>
@@ -2039,7 +2321,7 @@
           <a:p>
             <a:fld id="{C3915442-2F4C-E043-BB4A-4206B63E6321}" type="slidenum">
               <a:rPr lang="en-US" smtClean="0"/>
-              <a:t>9</a:t>
+              <a:t>8</a:t>
             </a:fld>
             <a:endParaRPr lang="en-US"/>
           </a:p>
@@ -2048,7 +2330,7 @@
     </p:spTree>
     <p:extLst>
       <p:ext uri="{BB962C8B-B14F-4D97-AF65-F5344CB8AC3E}">
-        <p14:creationId xmlns:p14="http://schemas.microsoft.com/office/powerpoint/2010/main" val="2531106415"/>
+        <p14:creationId xmlns:p14="http://schemas.microsoft.com/office/powerpoint/2010/main" val="138340601"/>
       </p:ext>
     </p:extLst>
   </p:cSld>
@@ -2123,7 +2405,7 @@
           <a:p>
             <a:fld id="{C3915442-2F4C-E043-BB4A-4206B63E6321}" type="slidenum">
               <a:rPr lang="en-US" smtClean="0"/>
-              <a:t>10</a:t>
+              <a:t>9</a:t>
             </a:fld>
             <a:endParaRPr lang="en-US"/>
           </a:p>
@@ -2132,7 +2414,7 @@
     </p:spTree>
     <p:extLst>
       <p:ext uri="{BB962C8B-B14F-4D97-AF65-F5344CB8AC3E}">
-        <p14:creationId xmlns:p14="http://schemas.microsoft.com/office/powerpoint/2010/main" val="1606554141"/>
+        <p14:creationId xmlns:p14="http://schemas.microsoft.com/office/powerpoint/2010/main" val="3482200423"/>
       </p:ext>
     </p:extLst>
   </p:cSld>
@@ -2207,7 +2489,7 @@
           <a:p>
             <a:fld id="{C3915442-2F4C-E043-BB4A-4206B63E6321}" type="slidenum">
               <a:rPr lang="en-US" smtClean="0"/>
-              <a:t>11</a:t>
+              <a:t>10</a:t>
             </a:fld>
             <a:endParaRPr lang="en-US"/>
           </a:p>
@@ -2216,7 +2498,7 @@
     </p:spTree>
     <p:extLst>
       <p:ext uri="{BB962C8B-B14F-4D97-AF65-F5344CB8AC3E}">
-        <p14:creationId xmlns:p14="http://schemas.microsoft.com/office/powerpoint/2010/main" val="999188407"/>
+        <p14:creationId xmlns:p14="http://schemas.microsoft.com/office/powerpoint/2010/main" val="2531106415"/>
       </p:ext>
     </p:extLst>
   </p:cSld>
@@ -2375,7 +2657,7 @@
           <a:p>
             <a:fld id="{E822B9A2-E9F6-E646-ADD7-254B6AD8866B}" type="datetimeFigureOut">
               <a:rPr lang="en-US" smtClean="0"/>
-              <a:t>8/7/20</a:t>
+              <a:t>8/10/20</a:t>
             </a:fld>
             <a:endParaRPr lang="en-US"/>
           </a:p>
@@ -2575,7 +2857,7 @@
           <a:p>
             <a:fld id="{E822B9A2-E9F6-E646-ADD7-254B6AD8866B}" type="datetimeFigureOut">
               <a:rPr lang="en-US" smtClean="0"/>
-              <a:t>8/7/20</a:t>
+              <a:t>8/10/20</a:t>
             </a:fld>
             <a:endParaRPr lang="en-US"/>
           </a:p>
@@ -2785,7 +3067,7 @@
           <a:p>
             <a:fld id="{E822B9A2-E9F6-E646-ADD7-254B6AD8866B}" type="datetimeFigureOut">
               <a:rPr lang="en-US" smtClean="0"/>
-              <a:t>8/7/20</a:t>
+              <a:t>8/10/20</a:t>
             </a:fld>
             <a:endParaRPr lang="en-US"/>
           </a:p>
@@ -2985,7 +3267,7 @@
           <a:p>
             <a:fld id="{E822B9A2-E9F6-E646-ADD7-254B6AD8866B}" type="datetimeFigureOut">
               <a:rPr lang="en-US" smtClean="0"/>
-              <a:t>8/7/20</a:t>
+              <a:t>8/10/20</a:t>
             </a:fld>
             <a:endParaRPr lang="en-US"/>
           </a:p>
@@ -3261,7 +3543,7 @@
           <a:p>
             <a:fld id="{E822B9A2-E9F6-E646-ADD7-254B6AD8866B}" type="datetimeFigureOut">
               <a:rPr lang="en-US" smtClean="0"/>
-              <a:t>8/7/20</a:t>
+              <a:t>8/10/20</a:t>
             </a:fld>
             <a:endParaRPr lang="en-US"/>
           </a:p>
@@ -3529,7 +3811,7 @@
           <a:p>
             <a:fld id="{E822B9A2-E9F6-E646-ADD7-254B6AD8866B}" type="datetimeFigureOut">
               <a:rPr lang="en-US" smtClean="0"/>
-              <a:t>8/7/20</a:t>
+              <a:t>8/10/20</a:t>
             </a:fld>
             <a:endParaRPr lang="en-US"/>
           </a:p>
@@ -3944,7 +4226,7 @@
           <a:p>
             <a:fld id="{E822B9A2-E9F6-E646-ADD7-254B6AD8866B}" type="datetimeFigureOut">
               <a:rPr lang="en-US" smtClean="0"/>
-              <a:t>8/7/20</a:t>
+              <a:t>8/10/20</a:t>
             </a:fld>
             <a:endParaRPr lang="en-US"/>
           </a:p>
@@ -4086,7 +4368,7 @@
           <a:p>
             <a:fld id="{E822B9A2-E9F6-E646-ADD7-254B6AD8866B}" type="datetimeFigureOut">
               <a:rPr lang="en-US" smtClean="0"/>
-              <a:t>8/7/20</a:t>
+              <a:t>8/10/20</a:t>
             </a:fld>
             <a:endParaRPr lang="en-US"/>
           </a:p>
@@ -4199,7 +4481,7 @@
           <a:p>
             <a:fld id="{E822B9A2-E9F6-E646-ADD7-254B6AD8866B}" type="datetimeFigureOut">
               <a:rPr lang="en-US" smtClean="0"/>
-              <a:t>8/7/20</a:t>
+              <a:t>8/10/20</a:t>
             </a:fld>
             <a:endParaRPr lang="en-US"/>
           </a:p>
@@ -4512,7 +4794,7 @@
           <a:p>
             <a:fld id="{E822B9A2-E9F6-E646-ADD7-254B6AD8866B}" type="datetimeFigureOut">
               <a:rPr lang="en-US" smtClean="0"/>
-              <a:t>8/7/20</a:t>
+              <a:t>8/10/20</a:t>
             </a:fld>
             <a:endParaRPr lang="en-US"/>
           </a:p>
@@ -4801,7 +5083,7 @@
           <a:p>
             <a:fld id="{E822B9A2-E9F6-E646-ADD7-254B6AD8866B}" type="datetimeFigureOut">
               <a:rPr lang="en-US" smtClean="0"/>
-              <a:t>8/7/20</a:t>
+              <a:t>8/10/20</a:t>
             </a:fld>
             <a:endParaRPr lang="en-US"/>
           </a:p>
@@ -5044,7 +5326,7 @@
           <a:p>
             <a:fld id="{E822B9A2-E9F6-E646-ADD7-254B6AD8866B}" type="datetimeFigureOut">
               <a:rPr lang="en-US" smtClean="0"/>
-              <a:t>8/7/20</a:t>
+              <a:t>8/10/20</a:t>
             </a:fld>
             <a:endParaRPr lang="en-US"/>
           </a:p>
@@ -5572,6 +5854,121 @@
           <a:p>
             <a:r>
               <a:rPr lang="de-DE" sz="2800" dirty="0"/>
+              <a:t>Datenfluss der Sonderbelege </a:t>
+            </a:r>
+            <a:br>
+              <a:rPr lang="de-DE" sz="2800" dirty="0"/>
+            </a:br>
+            <a:r>
+              <a:rPr lang="de-DE" sz="2000" dirty="0"/>
+              <a:t>(aktivieren Funktionalität: initial-, zero-, </a:t>
+            </a:r>
+            <a:r>
+              <a:rPr lang="de-DE" sz="2000" dirty="0" err="1"/>
+              <a:t>daily</a:t>
+            </a:r>
+            <a:r>
+              <a:rPr lang="de-DE" sz="2000" dirty="0"/>
+              <a:t>-, </a:t>
+            </a:r>
+            <a:r>
+              <a:rPr lang="de-DE" sz="2000" dirty="0" err="1"/>
+              <a:t>monthly</a:t>
+            </a:r>
+            <a:r>
+              <a:rPr lang="de-DE" sz="2000" dirty="0"/>
+              <a:t>-, …)</a:t>
+            </a:r>
+            <a:br>
+              <a:rPr lang="de-DE" sz="2800" dirty="0"/>
+            </a:br>
+            <a:endParaRPr lang="de-DE" sz="2800" dirty="0"/>
+          </a:p>
+        </p:txBody>
+      </p:sp>
+      <p:pic>
+        <p:nvPicPr>
+          <p:cNvPr id="5" name="Content Placeholder 4">
+            <a:extLst>
+              <a:ext uri="{FF2B5EF4-FFF2-40B4-BE49-F238E27FC236}">
+                <a16:creationId xmlns:a16="http://schemas.microsoft.com/office/drawing/2014/main" id="{AAD9D593-4D41-3A4A-9513-9042BB107570}"/>
+              </a:ext>
+            </a:extLst>
+          </p:cNvPr>
+          <p:cNvPicPr>
+            <a:picLocks noGrp="1" noChangeAspect="1"/>
+          </p:cNvPicPr>
+          <p:nvPr>
+            <p:ph idx="1"/>
+          </p:nvPr>
+        </p:nvPicPr>
+        <p:blipFill>
+          <a:blip r:embed="rId3"/>
+          <a:srcRect/>
+          <a:stretch/>
+        </p:blipFill>
+        <p:spPr>
+          <a:xfrm>
+            <a:off x="975487" y="1690688"/>
+            <a:ext cx="8508238" cy="4613402"/>
+          </a:xfrm>
+        </p:spPr>
+      </p:pic>
+    </p:spTree>
+    <p:extLst>
+      <p:ext uri="{BB962C8B-B14F-4D97-AF65-F5344CB8AC3E}">
+        <p14:creationId xmlns:p14="http://schemas.microsoft.com/office/powerpoint/2010/main" val="918523332"/>
+      </p:ext>
+    </p:extLst>
+  </p:cSld>
+  <p:clrMapOvr>
+    <a:masterClrMapping/>
+  </p:clrMapOvr>
+</p:sld>
+</file>
+
+<file path=ppt/slides/slide11.xml><?xml version="1.0" encoding="utf-8"?>
+<p:sld xmlns:a="http://schemas.openxmlformats.org/drawingml/2006/main" xmlns:r="http://schemas.openxmlformats.org/officeDocument/2006/relationships" xmlns:p="http://schemas.openxmlformats.org/presentationml/2006/main">
+  <p:cSld>
+    <p:spTree>
+      <p:nvGrpSpPr>
+        <p:cNvPr id="1" name=""/>
+        <p:cNvGrpSpPr/>
+        <p:nvPr/>
+      </p:nvGrpSpPr>
+      <p:grpSpPr>
+        <a:xfrm>
+          <a:off x="0" y="0"/>
+          <a:ext cx="0" cy="0"/>
+          <a:chOff x="0" y="0"/>
+          <a:chExt cx="0" cy="0"/>
+        </a:xfrm>
+      </p:grpSpPr>
+      <p:sp>
+        <p:nvSpPr>
+          <p:cNvPr id="2" name="Title 1">
+            <a:extLst>
+              <a:ext uri="{FF2B5EF4-FFF2-40B4-BE49-F238E27FC236}">
+                <a16:creationId xmlns:a16="http://schemas.microsoft.com/office/drawing/2014/main" id="{49C250B6-F0EB-477C-AB99-C3DD2BE9A656}"/>
+              </a:ext>
+            </a:extLst>
+          </p:cNvPr>
+          <p:cNvSpPr>
+            <a:spLocks noGrp="1"/>
+          </p:cNvSpPr>
+          <p:nvPr>
+            <p:ph type="title"/>
+          </p:nvPr>
+        </p:nvSpPr>
+        <p:spPr/>
+        <p:txBody>
+          <a:bodyPr>
+            <a:normAutofit/>
+          </a:bodyPr>
+          <a:lstStyle/>
+          <a:p>
+            <a:r>
+              <a:rPr lang="de-DE" sz="2800" dirty="0"/>
               <a:t>Datenfluss im Fehlerfall</a:t>
             </a:r>
             <a:br>
@@ -5629,7 +6026,7 @@
 </p:sld>
 </file>
 
-<file path=ppt/slides/slide11.xml><?xml version="1.0" encoding="utf-8"?>
+<file path=ppt/slides/slide12.xml><?xml version="1.0" encoding="utf-8"?>
 <p:sld xmlns:a="http://schemas.openxmlformats.org/drawingml/2006/main" xmlns:r="http://schemas.openxmlformats.org/officeDocument/2006/relationships" xmlns:p="http://schemas.openxmlformats.org/presentationml/2006/main">
   <p:cSld>
     <p:spTree>
@@ -5838,7 +6235,10 @@
               <a:rPr lang="de-DE" dirty="0" err="1"/>
               <a:t>started</a:t>
             </a:r>
-            <a:endParaRPr lang="de-DE" dirty="0"/>
+            <a:r>
+              <a:rPr lang="de-DE" dirty="0"/>
+              <a:t> &amp; Dokumentation</a:t>
+            </a:r>
           </a:p>
         </p:txBody>
       </p:sp>
@@ -5895,8 +6295,13 @@
           <a:p>
             <a:r>
               <a:rPr lang="de-DE" dirty="0"/>
-              <a:t>Herausforderung</a:t>
-            </a:r>
+              <a:t>Herausforderung </a:t>
+            </a:r>
+            <a:r>
+              <a:rPr lang="de-DE" dirty="0" err="1"/>
+              <a:t>Fiskalisierung</a:t>
+            </a:r>
+            <a:endParaRPr lang="de-DE" dirty="0"/>
           </a:p>
         </p:txBody>
       </p:sp>
@@ -5923,67 +6328,12 @@
           </a:bodyPr>
           <a:lstStyle/>
           <a:p>
+            <a:pPr marL="0" indent="0">
+              <a:buNone/>
+            </a:pPr>
             <a:r>
               <a:rPr lang="de-DE" dirty="0"/>
-              <a:t>Neue Pflichten für Kassensysteme (01.01.2020)</a:t>
-            </a:r>
-          </a:p>
-          <a:p>
-            <a:pPr lvl="1"/>
-            <a:r>
-              <a:rPr lang="de-DE" dirty="0"/>
-              <a:t>Einzelaufzeichnung</a:t>
-            </a:r>
-          </a:p>
-          <a:p>
-            <a:pPr lvl="1"/>
-            <a:r>
-              <a:rPr lang="de-DE" dirty="0"/>
-              <a:t>TSE-Pflicht</a:t>
-            </a:r>
-          </a:p>
-          <a:p>
-            <a:pPr lvl="1"/>
-            <a:r>
-              <a:rPr lang="de-DE" dirty="0"/>
-              <a:t>Archivierung</a:t>
-            </a:r>
-          </a:p>
-          <a:p>
-            <a:pPr lvl="1"/>
-            <a:r>
-              <a:rPr lang="de-DE" dirty="0"/>
-              <a:t>Belegausgabepflicht</a:t>
-            </a:r>
-          </a:p>
-          <a:p>
-            <a:pPr lvl="1"/>
-            <a:r>
-              <a:rPr lang="de-DE" dirty="0"/>
-              <a:t>Meldepflicht </a:t>
-            </a:r>
-          </a:p>
-          <a:p>
-            <a:endParaRPr lang="de-DE" dirty="0"/>
-          </a:p>
-          <a:p>
-            <a:r>
-              <a:rPr lang="de-DE" dirty="0"/>
-              <a:t>Integration einer oder mehrerer TSE-Lösungen</a:t>
-            </a:r>
-          </a:p>
-          <a:p>
-            <a:r>
-              <a:rPr lang="de-DE" dirty="0"/>
-              <a:t>Anpassungen für </a:t>
-            </a:r>
-            <a:r>
-              <a:rPr lang="de-DE" dirty="0" err="1"/>
-              <a:t>DSFinV</a:t>
-            </a:r>
-            <a:r>
-              <a:rPr lang="de-DE" dirty="0"/>
-              <a:t>-K</a:t>
+              <a:t>=&gt; Konformität mit den nationalen Gesetzen implementieren</a:t>
             </a:r>
           </a:p>
         </p:txBody>
@@ -6041,7 +6391,7 @@
           <a:p>
             <a:r>
               <a:rPr lang="de-DE" dirty="0"/>
-              <a:t>ft.Middleware als Lösung</a:t>
+              <a:t>Herausforderung in Deutschland</a:t>
             </a:r>
           </a:p>
         </p:txBody>
@@ -6069,57 +6419,67 @@
           </a:bodyPr>
           <a:lstStyle/>
           <a:p>
-            <a:pPr marL="0" indent="0">
-              <a:buNone/>
-            </a:pPr>
             <a:r>
               <a:rPr lang="de-DE" dirty="0"/>
-              <a:t>Compliance-As-A-Service durch Integration ins Kassensystem.</a:t>
-            </a:r>
-          </a:p>
-          <a:p>
-            <a:pPr marL="0" indent="0">
-              <a:buNone/>
-            </a:pPr>
+              <a:t>Neue Pflichten für Kassensysteme (01.01.2020)</a:t>
+            </a:r>
+          </a:p>
+          <a:p>
+            <a:pPr lvl="1"/>
+            <a:r>
+              <a:rPr lang="de-DE" dirty="0"/>
+              <a:t>Einzelaufzeichnung</a:t>
+            </a:r>
+          </a:p>
+          <a:p>
+            <a:pPr lvl="1"/>
+            <a:r>
+              <a:rPr lang="de-DE" dirty="0"/>
+              <a:t>TSE-Pflicht</a:t>
+            </a:r>
+          </a:p>
+          <a:p>
+            <a:pPr lvl="1"/>
+            <a:r>
+              <a:rPr lang="de-DE" dirty="0"/>
+              <a:t>Archivierung</a:t>
+            </a:r>
+          </a:p>
+          <a:p>
+            <a:pPr lvl="1"/>
+            <a:r>
+              <a:rPr lang="de-DE" dirty="0"/>
+              <a:t>Belegausgabepflicht</a:t>
+            </a:r>
+          </a:p>
+          <a:p>
+            <a:pPr lvl="1"/>
+            <a:r>
+              <a:rPr lang="de-DE" dirty="0"/>
+              <a:t>Meldepflicht </a:t>
+            </a:r>
+          </a:p>
+          <a:p>
             <a:endParaRPr lang="de-DE" dirty="0"/>
           </a:p>
           <a:p>
-            <a:pPr marL="0" indent="0">
-              <a:buNone/>
-            </a:pPr>
-            <a:r>
-              <a:rPr lang="de-DE" u="sng" dirty="0"/>
-              <a:t>Vorteile:</a:t>
-            </a:r>
-          </a:p>
-          <a:p>
             <a:r>
               <a:rPr lang="de-DE" dirty="0"/>
-              <a:t>Internationale gleiche Schnittstelle (DE, AT, FR)</a:t>
+              <a:t>Integration einer oder mehrerer TSE-Lösungen</a:t>
             </a:r>
           </a:p>
           <a:p>
             <a:r>
               <a:rPr lang="de-DE" dirty="0"/>
-              <a:t>Anbindung aller TSE-Lösungen</a:t>
-            </a:r>
-          </a:p>
-          <a:p>
+              <a:t>Anpassungen für </a:t>
+            </a:r>
+            <a:r>
+              <a:rPr lang="de-DE" dirty="0" err="1"/>
+              <a:t>DSFinV</a:t>
+            </a:r>
             <a:r>
               <a:rPr lang="de-DE" dirty="0"/>
-              <a:t>Export der Daten in den gesetzlich vorgegebenen Formaten</a:t>
-            </a:r>
-          </a:p>
-          <a:p>
-            <a:r>
-              <a:rPr lang="de-DE" dirty="0"/>
-              <a:t>Kann lokal oder im Rechenzentrum betrieben werden</a:t>
-            </a:r>
-          </a:p>
-          <a:p>
-            <a:r>
-              <a:rPr lang="de-DE" dirty="0"/>
-              <a:t>Kostenlos</a:t>
+              <a:t>-K</a:t>
             </a:r>
           </a:p>
         </p:txBody>
@@ -6127,7 +6487,7 @@
     </p:spTree>
     <p:extLst>
       <p:ext uri="{BB962C8B-B14F-4D97-AF65-F5344CB8AC3E}">
-        <p14:creationId xmlns:p14="http://schemas.microsoft.com/office/powerpoint/2010/main" val="3117487976"/>
+        <p14:creationId xmlns:p14="http://schemas.microsoft.com/office/powerpoint/2010/main" val="418984514"/>
       </p:ext>
     </p:extLst>
   </p:cSld>
@@ -6210,7 +6570,7 @@
             </a:pPr>
             <a:r>
               <a:rPr lang="de-DE" dirty="0"/>
-              <a:t>Wieso ist die ft.Middleware kostenlos?</a:t>
+              <a:t>Compliance-As-A-Service durch Integration ins Kassensystem.</a:t>
             </a:r>
           </a:p>
           <a:p>
@@ -6220,68 +6580,42 @@
             <a:endParaRPr lang="de-DE" dirty="0"/>
           </a:p>
           <a:p>
+            <a:pPr marL="0" indent="0">
+              <a:buNone/>
+            </a:pPr>
+            <a:r>
+              <a:rPr lang="de-DE" u="sng" dirty="0"/>
+              <a:t>Vorteile:</a:t>
+            </a:r>
+          </a:p>
+          <a:p>
             <a:r>
               <a:rPr lang="de-DE" dirty="0"/>
-              <a:t>erleichtert die „</a:t>
-            </a:r>
-            <a:r>
-              <a:rPr lang="de-DE" dirty="0" err="1"/>
-              <a:t>make</a:t>
-            </a:r>
+              <a:t>International gleiche Schnittstelle (DE, AT, FR)</a:t>
+            </a:r>
+          </a:p>
+          <a:p>
             <a:r>
               <a:rPr lang="de-DE" dirty="0"/>
-              <a:t> </a:t>
-            </a:r>
-            <a:r>
-              <a:rPr lang="de-DE" dirty="0" err="1"/>
-              <a:t>or</a:t>
-            </a:r>
+              <a:t>Anbindung aller TSE-Lösungen</a:t>
+            </a:r>
+          </a:p>
+          <a:p>
             <a:r>
               <a:rPr lang="de-DE" dirty="0"/>
-              <a:t> </a:t>
-            </a:r>
-            <a:r>
-              <a:rPr lang="de-DE" dirty="0" err="1"/>
-              <a:t>buy</a:t>
-            </a:r>
+              <a:t>Export der Daten in den gesetzlich vorgegebenen Formaten</a:t>
+            </a:r>
+          </a:p>
+          <a:p>
             <a:r>
               <a:rPr lang="de-DE" dirty="0"/>
-              <a:t>“ Entscheidung</a:t>
+              <a:t>Kann lokal oder im Rechenzentrum betrieben werden</a:t>
             </a:r>
           </a:p>
           <a:p>
             <a:r>
               <a:rPr lang="de-DE" dirty="0"/>
-              <a:t>fiskaltrust bietet über Kassenhändler </a:t>
-            </a:r>
-            <a:r>
-              <a:rPr lang="de-DE" dirty="0" err="1"/>
-              <a:t>Fiskalisierungsprodukte</a:t>
-            </a:r>
-            <a:r>
-              <a:rPr lang="de-DE" dirty="0"/>
-              <a:t> für Kassenbetreiber an, z.B.:</a:t>
-            </a:r>
-          </a:p>
-          <a:p>
-            <a:pPr lvl="1"/>
-            <a:r>
-              <a:rPr lang="de-DE" dirty="0"/>
-              <a:t>Revisionssichere Archivierung der Daten</a:t>
-            </a:r>
-          </a:p>
-          <a:p>
-            <a:pPr lvl="1"/>
-            <a:r>
-              <a:rPr lang="de-DE" dirty="0"/>
-              <a:t>Automatisierte Meldungen ans Finanzamt</a:t>
-            </a:r>
-          </a:p>
-          <a:p>
-            <a:pPr lvl="1"/>
-            <a:r>
-              <a:rPr lang="de-DE" dirty="0"/>
-              <a:t>Sorglos-Pakete mit und ohne TSE As-A-Service</a:t>
+              <a:t>Kostenlos</a:t>
             </a:r>
           </a:p>
         </p:txBody>
@@ -6289,7 +6623,7 @@
     </p:spTree>
     <p:extLst>
       <p:ext uri="{BB962C8B-B14F-4D97-AF65-F5344CB8AC3E}">
-        <p14:creationId xmlns:p14="http://schemas.microsoft.com/office/powerpoint/2010/main" val="116970366"/>
+        <p14:creationId xmlns:p14="http://schemas.microsoft.com/office/powerpoint/2010/main" val="3117487976"/>
       </p:ext>
     </p:extLst>
   </p:cSld>
@@ -6334,6 +6668,168 @@
         </p:nvSpPr>
         <p:spPr/>
         <p:txBody>
+          <a:bodyPr/>
+          <a:lstStyle/>
+          <a:p>
+            <a:r>
+              <a:rPr lang="de-DE" dirty="0"/>
+              <a:t>ft.Middleware als Lösung</a:t>
+            </a:r>
+          </a:p>
+        </p:txBody>
+      </p:sp>
+      <p:sp>
+        <p:nvSpPr>
+          <p:cNvPr id="3" name="Content Placeholder 2">
+            <a:extLst>
+              <a:ext uri="{FF2B5EF4-FFF2-40B4-BE49-F238E27FC236}">
+                <a16:creationId xmlns:a16="http://schemas.microsoft.com/office/drawing/2014/main" id="{0D06D663-EFD2-4B90-B362-356A1BAE4CC8}"/>
+              </a:ext>
+            </a:extLst>
+          </p:cNvPr>
+          <p:cNvSpPr>
+            <a:spLocks noGrp="1"/>
+          </p:cNvSpPr>
+          <p:nvPr>
+            <p:ph idx="1"/>
+          </p:nvPr>
+        </p:nvSpPr>
+        <p:spPr/>
+        <p:txBody>
+          <a:bodyPr>
+            <a:normAutofit/>
+          </a:bodyPr>
+          <a:lstStyle/>
+          <a:p>
+            <a:pPr marL="0" indent="0">
+              <a:buNone/>
+            </a:pPr>
+            <a:r>
+              <a:rPr lang="de-DE" dirty="0"/>
+              <a:t>Wieso ist die ft.Middleware kostenlos?</a:t>
+            </a:r>
+          </a:p>
+          <a:p>
+            <a:pPr marL="0" indent="0">
+              <a:buNone/>
+            </a:pPr>
+            <a:endParaRPr lang="de-DE" dirty="0"/>
+          </a:p>
+          <a:p>
+            <a:r>
+              <a:rPr lang="de-DE" dirty="0"/>
+              <a:t>erleichtert die „</a:t>
+            </a:r>
+            <a:r>
+              <a:rPr lang="de-DE" dirty="0" err="1"/>
+              <a:t>make</a:t>
+            </a:r>
+            <a:r>
+              <a:rPr lang="de-DE" dirty="0"/>
+              <a:t> </a:t>
+            </a:r>
+            <a:r>
+              <a:rPr lang="de-DE" dirty="0" err="1"/>
+              <a:t>or</a:t>
+            </a:r>
+            <a:r>
+              <a:rPr lang="de-DE" dirty="0"/>
+              <a:t> </a:t>
+            </a:r>
+            <a:r>
+              <a:rPr lang="de-DE" dirty="0" err="1"/>
+              <a:t>buy</a:t>
+            </a:r>
+            <a:r>
+              <a:rPr lang="de-DE" dirty="0"/>
+              <a:t>“ Entscheidung</a:t>
+            </a:r>
+          </a:p>
+          <a:p>
+            <a:r>
+              <a:rPr lang="de-DE" dirty="0"/>
+              <a:t>fiskaltrust bietet über Kassenhändler </a:t>
+            </a:r>
+            <a:r>
+              <a:rPr lang="de-DE" dirty="0" err="1"/>
+              <a:t>Fiskalisierungsprodukte</a:t>
+            </a:r>
+            <a:r>
+              <a:rPr lang="de-DE" dirty="0"/>
+              <a:t> für Kassenbetreiber an, z.B.:</a:t>
+            </a:r>
+          </a:p>
+          <a:p>
+            <a:pPr lvl="1"/>
+            <a:r>
+              <a:rPr lang="de-DE" dirty="0"/>
+              <a:t>Revisionssichere Archivierung der Daten</a:t>
+            </a:r>
+          </a:p>
+          <a:p>
+            <a:pPr lvl="1"/>
+            <a:r>
+              <a:rPr lang="de-DE" dirty="0"/>
+              <a:t>Automatisierte Meldungen ans Finanzamt</a:t>
+            </a:r>
+          </a:p>
+          <a:p>
+            <a:pPr lvl="1"/>
+            <a:r>
+              <a:rPr lang="de-DE" dirty="0"/>
+              <a:t>Sorglos-Pakete mit und ohne TSE As-A-Service</a:t>
+            </a:r>
+          </a:p>
+        </p:txBody>
+      </p:sp>
+    </p:spTree>
+    <p:extLst>
+      <p:ext uri="{BB962C8B-B14F-4D97-AF65-F5344CB8AC3E}">
+        <p14:creationId xmlns:p14="http://schemas.microsoft.com/office/powerpoint/2010/main" val="116970366"/>
+      </p:ext>
+    </p:extLst>
+  </p:cSld>
+  <p:clrMapOvr>
+    <a:masterClrMapping/>
+  </p:clrMapOvr>
+</p:sld>
+</file>
+
+<file path=ppt/slides/slide7.xml><?xml version="1.0" encoding="utf-8"?>
+<p:sld xmlns:a="http://schemas.openxmlformats.org/drawingml/2006/main" xmlns:r="http://schemas.openxmlformats.org/officeDocument/2006/relationships" xmlns:p="http://schemas.openxmlformats.org/presentationml/2006/main">
+  <p:cSld>
+    <p:spTree>
+      <p:nvGrpSpPr>
+        <p:cNvPr id="1" name=""/>
+        <p:cNvGrpSpPr/>
+        <p:nvPr/>
+      </p:nvGrpSpPr>
+      <p:grpSpPr>
+        <a:xfrm>
+          <a:off x="0" y="0"/>
+          <a:ext cx="0" cy="0"/>
+          <a:chOff x="0" y="0"/>
+          <a:chExt cx="0" cy="0"/>
+        </a:xfrm>
+      </p:grpSpPr>
+      <p:sp>
+        <p:nvSpPr>
+          <p:cNvPr id="2" name="Title 1">
+            <a:extLst>
+              <a:ext uri="{FF2B5EF4-FFF2-40B4-BE49-F238E27FC236}">
+                <a16:creationId xmlns:a16="http://schemas.microsoft.com/office/drawing/2014/main" id="{49C250B6-F0EB-477C-AB99-C3DD2BE9A656}"/>
+              </a:ext>
+            </a:extLst>
+          </p:cNvPr>
+          <p:cNvSpPr>
+            <a:spLocks noGrp="1"/>
+          </p:cNvSpPr>
+          <p:nvPr>
+            <p:ph type="title"/>
+          </p:nvPr>
+        </p:nvSpPr>
+        <p:spPr/>
+        <p:txBody>
           <a:bodyPr>
             <a:normAutofit/>
           </a:bodyPr>
@@ -6387,7 +6883,7 @@
 </p:sld>
 </file>
 
-<file path=ppt/slides/slide7.xml><?xml version="1.0" encoding="utf-8"?>
+<file path=ppt/slides/slide8.xml><?xml version="1.0" encoding="utf-8"?>
 <p:sld xmlns:a="http://schemas.openxmlformats.org/drawingml/2006/main" xmlns:r="http://schemas.openxmlformats.org/officeDocument/2006/relationships" xmlns:p="http://schemas.openxmlformats.org/presentationml/2006/main">
   <p:cSld>
     <p:spTree>
@@ -6475,7 +6971,7 @@
 </p:sld>
 </file>
 
-<file path=ppt/slides/slide8.xml><?xml version="1.0" encoding="utf-8"?>
+<file path=ppt/slides/slide9.xml><?xml version="1.0" encoding="utf-8"?>
 <p:sld xmlns:a="http://schemas.openxmlformats.org/drawingml/2006/main" xmlns:r="http://schemas.openxmlformats.org/officeDocument/2006/relationships" xmlns:p="http://schemas.openxmlformats.org/presentationml/2006/main">
   <p:cSld>
     <p:spTree>
@@ -6554,121 +7050,6 @@
     <p:extLst>
       <p:ext uri="{BB962C8B-B14F-4D97-AF65-F5344CB8AC3E}">
         <p14:creationId xmlns:p14="http://schemas.microsoft.com/office/powerpoint/2010/main" val="3779086997"/>
-      </p:ext>
-    </p:extLst>
-  </p:cSld>
-  <p:clrMapOvr>
-    <a:masterClrMapping/>
-  </p:clrMapOvr>
-</p:sld>
-</file>
-
-<file path=ppt/slides/slide9.xml><?xml version="1.0" encoding="utf-8"?>
-<p:sld xmlns:a="http://schemas.openxmlformats.org/drawingml/2006/main" xmlns:r="http://schemas.openxmlformats.org/officeDocument/2006/relationships" xmlns:p="http://schemas.openxmlformats.org/presentationml/2006/main">
-  <p:cSld>
-    <p:spTree>
-      <p:nvGrpSpPr>
-        <p:cNvPr id="1" name=""/>
-        <p:cNvGrpSpPr/>
-        <p:nvPr/>
-      </p:nvGrpSpPr>
-      <p:grpSpPr>
-        <a:xfrm>
-          <a:off x="0" y="0"/>
-          <a:ext cx="0" cy="0"/>
-          <a:chOff x="0" y="0"/>
-          <a:chExt cx="0" cy="0"/>
-        </a:xfrm>
-      </p:grpSpPr>
-      <p:sp>
-        <p:nvSpPr>
-          <p:cNvPr id="2" name="Title 1">
-            <a:extLst>
-              <a:ext uri="{FF2B5EF4-FFF2-40B4-BE49-F238E27FC236}">
-                <a16:creationId xmlns:a16="http://schemas.microsoft.com/office/drawing/2014/main" id="{49C250B6-F0EB-477C-AB99-C3DD2BE9A656}"/>
-              </a:ext>
-            </a:extLst>
-          </p:cNvPr>
-          <p:cNvSpPr>
-            <a:spLocks noGrp="1"/>
-          </p:cNvSpPr>
-          <p:nvPr>
-            <p:ph type="title"/>
-          </p:nvPr>
-        </p:nvSpPr>
-        <p:spPr/>
-        <p:txBody>
-          <a:bodyPr>
-            <a:normAutofit/>
-          </a:bodyPr>
-          <a:lstStyle/>
-          <a:p>
-            <a:r>
-              <a:rPr lang="de-DE" sz="2800" dirty="0"/>
-              <a:t>Datenfluss der Sonderbelege </a:t>
-            </a:r>
-            <a:br>
-              <a:rPr lang="de-DE" sz="2800" dirty="0"/>
-            </a:br>
-            <a:r>
-              <a:rPr lang="de-DE" sz="2000" dirty="0"/>
-              <a:t>(aktivieren Funktionalität: initial-, zero-, </a:t>
-            </a:r>
-            <a:r>
-              <a:rPr lang="de-DE" sz="2000" dirty="0" err="1"/>
-              <a:t>daily</a:t>
-            </a:r>
-            <a:r>
-              <a:rPr lang="de-DE" sz="2000" dirty="0"/>
-              <a:t>-, </a:t>
-            </a:r>
-            <a:r>
-              <a:rPr lang="de-DE" sz="2000" dirty="0" err="1"/>
-              <a:t>monthly</a:t>
-            </a:r>
-            <a:r>
-              <a:rPr lang="de-DE" sz="2000" dirty="0"/>
-              <a:t>-, …)</a:t>
-            </a:r>
-            <a:br>
-              <a:rPr lang="de-DE" sz="2800" dirty="0"/>
-            </a:br>
-            <a:endParaRPr lang="de-DE" sz="2800" dirty="0"/>
-          </a:p>
-        </p:txBody>
-      </p:sp>
-      <p:pic>
-        <p:nvPicPr>
-          <p:cNvPr id="5" name="Content Placeholder 4">
-            <a:extLst>
-              <a:ext uri="{FF2B5EF4-FFF2-40B4-BE49-F238E27FC236}">
-                <a16:creationId xmlns:a16="http://schemas.microsoft.com/office/drawing/2014/main" id="{AAD9D593-4D41-3A4A-9513-9042BB107570}"/>
-              </a:ext>
-            </a:extLst>
-          </p:cNvPr>
-          <p:cNvPicPr>
-            <a:picLocks noGrp="1" noChangeAspect="1"/>
-          </p:cNvPicPr>
-          <p:nvPr>
-            <p:ph idx="1"/>
-          </p:nvPr>
-        </p:nvPicPr>
-        <p:blipFill>
-          <a:blip r:embed="rId3"/>
-          <a:srcRect/>
-          <a:stretch/>
-        </p:blipFill>
-        <p:spPr>
-          <a:xfrm>
-            <a:off x="975487" y="1690688"/>
-            <a:ext cx="8508238" cy="4613402"/>
-          </a:xfrm>
-        </p:spPr>
-      </p:pic>
-    </p:spTree>
-    <p:extLst>
-      <p:ext uri="{BB962C8B-B14F-4D97-AF65-F5344CB8AC3E}">
-        <p14:creationId xmlns:p14="http://schemas.microsoft.com/office/powerpoint/2010/main" val="918523332"/>
       </p:ext>
     </p:extLst>
   </p:cSld>

</xml_diff>

<commit_message>
work on pos-creator presentation
</commit_message>
<xml_diff>
--- a/for-poscreators/presentation/onboarding_de.pptx
+++ b/for-poscreators/presentation/onboarding_de.pptx
@@ -208,7 +208,7 @@
           <a:p>
             <a:fld id="{F2594EC8-14C7-C244-BB5F-14DF0BFDF1DB}" type="datetimeFigureOut">
               <a:rPr lang="en-US" smtClean="0"/>
-              <a:t>8/10/20</a:t>
+              <a:t>8/17/20</a:t>
             </a:fld>
             <a:endParaRPr lang="en-US"/>
           </a:p>
@@ -2254,13 +2254,13 @@
           <a:p>
             <a:r>
               <a:rPr lang="de-DE" noProof="0" dirty="0"/>
-              <a:t>Kassensystem sendet mit XML oder JSON formatierte Daten über die Sign Methode an die Middleware</a:t>
+              <a:t>Kassensystem sendet mit XML oder JSON formatierte Daten über die Sign Methode des IPOS Interface an die ft.Middleware</a:t>
             </a:r>
           </a:p>
           <a:p>
             <a:r>
               <a:rPr lang="de-DE" noProof="0" dirty="0"/>
-              <a:t>Die Daten sind in 4 Blöcke aufgeteilt: Headerdaten, Charge-Items, Pay-Items, und </a:t>
+              <a:t>Die Request-Daten sind in 4 Blöcke aufgeteilt: Request-Headerdaten, Charge-Items, Pay-Items, und Request-</a:t>
             </a:r>
             <a:r>
               <a:rPr lang="de-DE" noProof="0" dirty="0" err="1"/>
@@ -2274,15 +2274,247 @@
           <a:p>
             <a:r>
               <a:rPr lang="de-DE" noProof="0" dirty="0"/>
-              <a:t>Die Middleware prozessiert die Daten und sendet </a:t>
-            </a:r>
-            <a:r>
-              <a:rPr lang="de-DE" b="1" noProof="0" dirty="0"/>
-              <a:t>nur zusätzliche Daten </a:t>
+              <a:t>Bsp. - Request-Headerdaten: </a:t>
+            </a:r>
+            <a:r>
+              <a:rPr lang="de-DE" noProof="0" dirty="0" err="1"/>
+              <a:t>possystem-id</a:t>
+            </a:r>
+            <a:r>
+              <a:rPr lang="de-DE" noProof="0" dirty="0"/>
+              <a:t>, </a:t>
+            </a:r>
+            <a:r>
+              <a:rPr lang="de-DE" noProof="0" dirty="0" err="1"/>
+              <a:t>cashbox-id</a:t>
+            </a:r>
+            <a:r>
+              <a:rPr lang="de-DE" noProof="0" dirty="0"/>
+              <a:t>, terminal-</a:t>
+            </a:r>
+            <a:r>
+              <a:rPr lang="de-DE" noProof="0" dirty="0" err="1"/>
+              <a:t>id</a:t>
+            </a:r>
+            <a:r>
+              <a:rPr lang="de-DE" noProof="0" dirty="0"/>
+              <a:t>, receipt-moment, receipt-</a:t>
+            </a:r>
+            <a:r>
+              <a:rPr lang="de-DE" noProof="0" dirty="0" err="1"/>
+              <a:t>reference</a:t>
+            </a:r>
+            <a:r>
+              <a:rPr lang="de-DE" noProof="0" dirty="0"/>
+              <a:t>, </a:t>
+            </a:r>
+            <a:r>
+              <a:rPr lang="de-DE" noProof="0" dirty="0" err="1"/>
+              <a:t>etc</a:t>
+            </a:r>
+            <a:endParaRPr lang="de-DE" noProof="0" dirty="0"/>
+          </a:p>
+          <a:p>
+            <a:r>
+              <a:rPr lang="de-DE" noProof="0" dirty="0"/>
+              <a:t>Bsp. - Charge-Item: 1 Bier, 19% </a:t>
+            </a:r>
+            <a:r>
+              <a:rPr lang="de-DE" noProof="0" dirty="0" err="1"/>
+              <a:t>MwSt</a:t>
+            </a:r>
+            <a:r>
+              <a:rPr lang="de-DE" noProof="0" dirty="0"/>
+              <a:t> – </a:t>
+            </a:r>
+            <a:r>
+              <a:rPr lang="de-DE" noProof="0" dirty="0" err="1"/>
+              <a:t>quantity</a:t>
+            </a:r>
+            <a:r>
+              <a:rPr lang="de-DE" noProof="0" dirty="0"/>
+              <a:t>, </a:t>
+            </a:r>
+            <a:r>
+              <a:rPr lang="de-DE" noProof="0" dirty="0" err="1"/>
+              <a:t>amount</a:t>
+            </a:r>
+            <a:r>
+              <a:rPr lang="de-DE" noProof="0" dirty="0"/>
+              <a:t>, </a:t>
+            </a:r>
+            <a:r>
+              <a:rPr lang="de-DE" noProof="0" dirty="0" err="1"/>
+              <a:t>vat</a:t>
+            </a:r>
+            <a:r>
+              <a:rPr lang="de-DE" noProof="0" dirty="0"/>
+              <a:t>-rate, </a:t>
+            </a:r>
+            <a:r>
+              <a:rPr lang="de-DE" noProof="0" dirty="0" err="1"/>
+              <a:t>chargeitemcase</a:t>
+            </a:r>
+            <a:r>
+              <a:rPr lang="de-DE" noProof="0" dirty="0"/>
+              <a:t> (</a:t>
+            </a:r>
+            <a:r>
+              <a:rPr lang="de-DE" noProof="0" dirty="0" err="1"/>
+              <a:t>delivery</a:t>
+            </a:r>
+            <a:r>
+              <a:rPr lang="de-DE" noProof="0" dirty="0"/>
+              <a:t> normal, 19%), </a:t>
+            </a:r>
+            <a:r>
+              <a:rPr lang="de-DE" noProof="0" dirty="0" err="1"/>
+              <a:t>charge</a:t>
+            </a:r>
+            <a:r>
+              <a:rPr lang="de-DE" noProof="0" dirty="0"/>
+              <a:t> item </a:t>
+            </a:r>
+            <a:r>
+              <a:rPr lang="de-DE" noProof="0" dirty="0" err="1"/>
+              <a:t>moment</a:t>
+            </a:r>
+            <a:r>
+              <a:rPr lang="de-DE" noProof="0" dirty="0"/>
+              <a:t>, </a:t>
+            </a:r>
+            <a:r>
+              <a:rPr lang="de-DE" noProof="0" dirty="0" err="1"/>
+              <a:t>etc</a:t>
+            </a:r>
+            <a:endParaRPr lang="de-DE" noProof="0" dirty="0"/>
+          </a:p>
+          <a:p>
+            <a:r>
+              <a:rPr lang="de-DE" noProof="0" dirty="0"/>
+              <a:t>Bsp. - Pay-Item: Barzahlung - </a:t>
+            </a:r>
+            <a:r>
+              <a:rPr lang="de-DE" noProof="0" dirty="0" err="1"/>
+              <a:t>quantity</a:t>
+            </a:r>
+            <a:r>
+              <a:rPr lang="de-DE" noProof="0" dirty="0"/>
+              <a:t>, </a:t>
+            </a:r>
+            <a:r>
+              <a:rPr lang="de-DE" noProof="0" dirty="0" err="1"/>
+              <a:t>amount</a:t>
+            </a:r>
+            <a:r>
+              <a:rPr lang="de-DE" noProof="0" dirty="0"/>
+              <a:t>, </a:t>
+            </a:r>
+            <a:r>
+              <a:rPr lang="de-DE" noProof="0" dirty="0" err="1"/>
+              <a:t>payitemcase</a:t>
+            </a:r>
+            <a:r>
+              <a:rPr lang="de-DE" noProof="0" dirty="0"/>
+              <a:t> (bar), </a:t>
+            </a:r>
+            <a:r>
+              <a:rPr lang="de-DE" noProof="0" dirty="0" err="1"/>
+              <a:t>pay</a:t>
+            </a:r>
+            <a:r>
+              <a:rPr lang="de-DE" noProof="0" dirty="0"/>
+              <a:t> item </a:t>
+            </a:r>
+            <a:r>
+              <a:rPr lang="de-DE" noProof="0" dirty="0" err="1"/>
+              <a:t>moment</a:t>
+            </a:r>
+            <a:r>
+              <a:rPr lang="de-DE" noProof="0" dirty="0"/>
+              <a:t>, </a:t>
+            </a:r>
+            <a:r>
+              <a:rPr lang="de-DE" noProof="0" dirty="0" err="1"/>
+              <a:t>etc</a:t>
+            </a:r>
+            <a:endParaRPr lang="de-DE" noProof="0" dirty="0"/>
+          </a:p>
+          <a:p>
+            <a:r>
+              <a:rPr lang="de-DE" noProof="0" dirty="0"/>
+              <a:t>Bsp. - Request-</a:t>
+            </a:r>
+            <a:r>
+              <a:rPr lang="de-DE" noProof="0" dirty="0" err="1"/>
+              <a:t>Footerdaten</a:t>
+            </a:r>
+            <a:r>
+              <a:rPr lang="de-DE" noProof="0" dirty="0"/>
+              <a:t>: </a:t>
+            </a:r>
+            <a:r>
+              <a:rPr lang="de-DE" noProof="0" dirty="0" err="1"/>
+              <a:t>receiptcase</a:t>
+            </a:r>
+            <a:r>
+              <a:rPr lang="de-DE" noProof="0" dirty="0"/>
+              <a:t> (</a:t>
+            </a:r>
+            <a:r>
+              <a:rPr lang="de-DE" noProof="0" dirty="0" err="1"/>
+              <a:t>z.b.</a:t>
+            </a:r>
+            <a:r>
+              <a:rPr lang="de-DE" noProof="0" dirty="0"/>
+              <a:t> </a:t>
+            </a:r>
+            <a:r>
+              <a:rPr lang="de-DE" noProof="0" dirty="0" err="1"/>
+              <a:t>pos</a:t>
+            </a:r>
+            <a:r>
+              <a:rPr lang="de-DE" noProof="0" dirty="0"/>
+              <a:t>-receipt, zero-receipt), </a:t>
+            </a:r>
+            <a:r>
+              <a:rPr lang="de-DE" noProof="0" dirty="0" err="1"/>
+              <a:t>previous</a:t>
+            </a:r>
+            <a:r>
+              <a:rPr lang="de-DE" noProof="0" dirty="0"/>
+              <a:t> receipt </a:t>
+            </a:r>
+            <a:r>
+              <a:rPr lang="de-DE" noProof="0" dirty="0" err="1"/>
+              <a:t>reference</a:t>
+            </a:r>
+            <a:r>
+              <a:rPr lang="de-DE" noProof="0" dirty="0"/>
+              <a:t>, </a:t>
+            </a:r>
+            <a:r>
+              <a:rPr lang="de-DE" noProof="0" dirty="0" err="1"/>
+              <a:t>user</a:t>
+            </a:r>
+            <a:r>
+              <a:rPr lang="de-DE" noProof="0" dirty="0"/>
+              <a:t>, </a:t>
+            </a:r>
+            <a:r>
+              <a:rPr lang="de-DE" noProof="0" dirty="0" err="1"/>
+              <a:t>etc</a:t>
+            </a:r>
+            <a:endParaRPr lang="de-DE" noProof="0" dirty="0"/>
+          </a:p>
+          <a:p>
+            <a:r>
+              <a:rPr lang="de-DE" noProof="0" dirty="0"/>
+              <a:t>Die Middleware prozessiert die Daten und sendet die Response-Daten </a:t>
             </a:r>
             <a:r>
               <a:rPr lang="de-DE" b="0" noProof="0" dirty="0"/>
-              <a:t>zurück an das Kassensystem zurück. Wichtigster Block ist hierbei der „</a:t>
+              <a:t>an das Kassensystem zurück. Wichtigster Block ist hierbei der „</a:t>
             </a:r>
             <a:r>
               <a:rPr lang="de-DE" b="0" noProof="0" dirty="0" err="1"/>
@@ -2290,16 +2522,222 @@
             </a:r>
             <a:r>
               <a:rPr lang="de-DE" b="0" noProof="0" dirty="0"/>
-              <a:t>“ Block. </a:t>
-            </a:r>
+              <a:t>“ Block. Die hier enthaltenen Daten müssen auf den Beleg gedruckt werden um </a:t>
+            </a:r>
+            <a:r>
+              <a:rPr lang="de-DE" b="0" noProof="0" dirty="0" err="1"/>
+              <a:t>Complience</a:t>
+            </a:r>
+            <a:r>
+              <a:rPr lang="de-DE" b="0" noProof="0" dirty="0"/>
+              <a:t> zu erhalten. </a:t>
+            </a:r>
+          </a:p>
+          <a:p>
             <a:r>
               <a:rPr lang="de-DE" b="1" noProof="0" dirty="0"/>
-              <a:t>Die initial an die ft.Middleware gesendeten Daten werden nicht zurückgesendet</a:t>
+              <a:t>Die initial an die ft.Middleware gesendeten </a:t>
+            </a:r>
+            <a:r>
+              <a:rPr lang="de-DE" b="1" noProof="0" dirty="0" err="1"/>
+              <a:t>charge</a:t>
+            </a:r>
+            <a:r>
+              <a:rPr lang="de-DE" b="1" noProof="0" dirty="0"/>
+              <a:t> und </a:t>
+            </a:r>
+            <a:r>
+              <a:rPr lang="de-DE" b="1" noProof="0" dirty="0" err="1"/>
+              <a:t>pay</a:t>
+            </a:r>
+            <a:r>
+              <a:rPr lang="de-DE" b="1" noProof="0" dirty="0"/>
+              <a:t> </a:t>
+            </a:r>
+            <a:r>
+              <a:rPr lang="de-DE" b="1" noProof="0" dirty="0" err="1"/>
+              <a:t>items</a:t>
+            </a:r>
+            <a:r>
+              <a:rPr lang="de-DE" b="1" noProof="0" dirty="0"/>
+              <a:t> werden nicht zurückgesendet</a:t>
             </a:r>
             <a:r>
               <a:rPr lang="de-DE" b="0" noProof="0" dirty="0"/>
-              <a:t>.</a:t>
-            </a:r>
+              <a:t>! Es werden optional nur zusätzliche </a:t>
+            </a:r>
+            <a:r>
+              <a:rPr lang="de-DE" b="0" noProof="0" dirty="0" err="1"/>
+              <a:t>charge</a:t>
+            </a:r>
+            <a:r>
+              <a:rPr lang="de-DE" b="0" noProof="0" dirty="0"/>
+              <a:t>- und </a:t>
+            </a:r>
+            <a:r>
+              <a:rPr lang="de-DE" b="0" noProof="0" dirty="0" err="1"/>
+              <a:t>pay</a:t>
+            </a:r>
+            <a:r>
+              <a:rPr lang="de-DE" b="0" noProof="0" dirty="0"/>
+              <a:t>-item Blöcke zurückgesendet. (diese Funktionalität wird momentan nicht genutzt)</a:t>
+            </a:r>
+          </a:p>
+          <a:p>
+            <a:r>
+              <a:rPr lang="de-DE" b="0" noProof="0" dirty="0"/>
+              <a:t>Bsp. Response-Headerdaten: </a:t>
+            </a:r>
+            <a:r>
+              <a:rPr lang="de-DE" b="0" noProof="0" dirty="0" err="1"/>
+              <a:t>cashbox-id</a:t>
+            </a:r>
+            <a:r>
+              <a:rPr lang="de-DE" b="0" noProof="0" dirty="0"/>
+              <a:t>, queue-</a:t>
+            </a:r>
+            <a:r>
+              <a:rPr lang="de-DE" b="0" noProof="0" dirty="0" err="1"/>
+              <a:t>id</a:t>
+            </a:r>
+            <a:r>
+              <a:rPr lang="de-DE" b="0" noProof="0" dirty="0"/>
+              <a:t>, terminal-</a:t>
+            </a:r>
+            <a:r>
+              <a:rPr lang="de-DE" b="0" noProof="0" dirty="0" err="1"/>
+              <a:t>id</a:t>
+            </a:r>
+            <a:r>
+              <a:rPr lang="de-DE" b="0" noProof="0" dirty="0"/>
+              <a:t>, receipt-</a:t>
+            </a:r>
+            <a:r>
+              <a:rPr lang="de-DE" b="0" noProof="0" dirty="0" err="1"/>
+              <a:t>reference</a:t>
+            </a:r>
+            <a:r>
+              <a:rPr lang="de-DE" b="0" noProof="0" dirty="0"/>
+              <a:t>, receipt-moment</a:t>
+            </a:r>
+          </a:p>
+          <a:p>
+            <a:r>
+              <a:rPr lang="de-DE" b="0" noProof="0" dirty="0"/>
+              <a:t>Bsp. Signaturen: QR-Code, </a:t>
+            </a:r>
+            <a:r>
+              <a:rPr lang="de-DE" b="0" noProof="0" dirty="0" err="1"/>
+              <a:t>tse</a:t>
+            </a:r>
+            <a:r>
+              <a:rPr lang="de-DE" b="0" noProof="0" dirty="0"/>
+              <a:t>-</a:t>
+            </a:r>
+            <a:r>
+              <a:rPr lang="de-DE" b="0" noProof="0" dirty="0" err="1"/>
+              <a:t>process</a:t>
+            </a:r>
+            <a:r>
+              <a:rPr lang="de-DE" b="0" noProof="0" dirty="0"/>
+              <a:t>-type, </a:t>
+            </a:r>
+            <a:r>
+              <a:rPr lang="de-DE" b="0" noProof="0" dirty="0" err="1"/>
+              <a:t>tse-process-data</a:t>
+            </a:r>
+            <a:r>
+              <a:rPr lang="de-DE" b="0" noProof="0" dirty="0"/>
+              <a:t>, </a:t>
+            </a:r>
+            <a:r>
+              <a:rPr lang="de-DE" b="0" noProof="0" dirty="0" err="1"/>
+              <a:t>transaktionsnummer</a:t>
+            </a:r>
+            <a:r>
+              <a:rPr lang="de-DE" b="0" noProof="0" dirty="0"/>
+              <a:t>, </a:t>
+            </a:r>
+            <a:r>
+              <a:rPr lang="de-DE" b="0" noProof="0" dirty="0" err="1"/>
+              <a:t>signaturzähler</a:t>
+            </a:r>
+            <a:r>
+              <a:rPr lang="de-DE" b="0" noProof="0" dirty="0"/>
+              <a:t>, </a:t>
+            </a:r>
+            <a:r>
+              <a:rPr lang="de-DE" b="0" noProof="0" dirty="0" err="1"/>
+              <a:t>kassenseriennummer</a:t>
+            </a:r>
+            <a:r>
+              <a:rPr lang="de-DE" b="0" noProof="0" dirty="0"/>
+              <a:t> etc. (diese Daten müssen auf den Beleg gedruckt werden)</a:t>
+            </a:r>
+          </a:p>
+          <a:p>
+            <a:r>
+              <a:rPr lang="de-DE" b="0" noProof="0" dirty="0"/>
+              <a:t>Bsp. Response-</a:t>
+            </a:r>
+            <a:r>
+              <a:rPr lang="de-DE" b="0" noProof="0" dirty="0" err="1"/>
+              <a:t>Footerdaten</a:t>
+            </a:r>
+            <a:r>
+              <a:rPr lang="de-DE" b="0" noProof="0" dirty="0"/>
+              <a:t>: </a:t>
+            </a:r>
+            <a:r>
+              <a:rPr lang="de-DE" b="0" noProof="0" dirty="0" err="1"/>
+              <a:t>state</a:t>
+            </a:r>
+            <a:r>
+              <a:rPr lang="de-DE" b="0" noProof="0" dirty="0"/>
+              <a:t>, </a:t>
+            </a:r>
+            <a:r>
+              <a:rPr lang="de-DE" b="0" noProof="0" dirty="0" err="1"/>
+              <a:t>state-data</a:t>
+            </a:r>
+            <a:r>
+              <a:rPr lang="de-DE" b="0" noProof="0" dirty="0"/>
+              <a:t> (</a:t>
+            </a:r>
+            <a:r>
+              <a:rPr lang="de-DE" b="0" noProof="0" dirty="0" err="1"/>
+              <a:t>status</a:t>
+            </a:r>
+            <a:r>
+              <a:rPr lang="de-DE" b="0" noProof="0" dirty="0"/>
+              <a:t>, </a:t>
+            </a:r>
+            <a:r>
+              <a:rPr lang="de-DE" b="0" noProof="0" dirty="0" err="1"/>
+              <a:t>z.b.</a:t>
+            </a:r>
+            <a:r>
+              <a:rPr lang="de-DE" b="0" noProof="0" dirty="0"/>
+              <a:t> ok oder </a:t>
+            </a:r>
+            <a:r>
+              <a:rPr lang="de-DE" b="0" noProof="0" dirty="0" err="1"/>
+              <a:t>tse</a:t>
+            </a:r>
+            <a:r>
+              <a:rPr lang="de-DE" b="0" noProof="0" dirty="0"/>
+              <a:t> nicht erreichbar, </a:t>
+            </a:r>
+            <a:r>
+              <a:rPr lang="de-DE" b="0" noProof="0" dirty="0" err="1"/>
+              <a:t>etc</a:t>
+            </a:r>
+            <a:r>
+              <a:rPr lang="de-DE" b="0" noProof="0" dirty="0"/>
+              <a:t>)</a:t>
+            </a:r>
+          </a:p>
+          <a:p>
             <a:endParaRPr lang="de-DE" b="1" noProof="0" dirty="0"/>
           </a:p>
         </p:txBody>
@@ -2384,7 +2822,158 @@
           <a:bodyPr/>
           <a:lstStyle/>
           <a:p>
-            <a:endParaRPr lang="de-DE" noProof="0" dirty="0"/>
+            <a:pPr marL="228600" indent="-228600">
+              <a:buAutoNum type="arabicPeriod"/>
+            </a:pPr>
+            <a:r>
+              <a:rPr lang="de-DE" noProof="0" dirty="0"/>
+              <a:t>Das POS-System sammelt die </a:t>
+            </a:r>
+            <a:r>
+              <a:rPr lang="de-DE" noProof="0" dirty="0" err="1"/>
+              <a:t>charge</a:t>
+            </a:r>
+            <a:r>
+              <a:rPr lang="de-DE" noProof="0" dirty="0"/>
+              <a:t> und </a:t>
+            </a:r>
+            <a:r>
+              <a:rPr lang="de-DE" noProof="0" dirty="0" err="1"/>
+              <a:t>pay</a:t>
+            </a:r>
+            <a:r>
+              <a:rPr lang="de-DE" noProof="0" dirty="0"/>
+              <a:t> </a:t>
+            </a:r>
+            <a:r>
+              <a:rPr lang="de-DE" noProof="0" dirty="0" err="1"/>
+              <a:t>items</a:t>
+            </a:r>
+            <a:r>
+              <a:rPr lang="de-DE" noProof="0" dirty="0"/>
+              <a:t> für den </a:t>
+            </a:r>
+            <a:r>
+              <a:rPr lang="de-DE" noProof="0" dirty="0" err="1"/>
+              <a:t>request</a:t>
+            </a:r>
+            <a:r>
+              <a:rPr lang="de-DE" noProof="0" dirty="0"/>
+              <a:t>. </a:t>
+            </a:r>
+          </a:p>
+          <a:p>
+            <a:pPr marL="228600" indent="-228600">
+              <a:buAutoNum type="arabicPeriod"/>
+            </a:pPr>
+            <a:r>
+              <a:rPr lang="de-DE" noProof="0" dirty="0"/>
+              <a:t>Das POS-System sollte die Daten lokal persistieren. Die </a:t>
+            </a:r>
+            <a:r>
+              <a:rPr lang="de-DE" noProof="0" dirty="0" err="1"/>
+              <a:t>Persistierung</a:t>
+            </a:r>
+            <a:r>
+              <a:rPr lang="de-DE" noProof="0" dirty="0"/>
+              <a:t> der Daten ist wichtig, weil die Request Daten nicht von der Middleware zurückgesendet werden. Zudem ist die lokale Archivierung wichtig für den Fall, dass die </a:t>
+            </a:r>
+            <a:r>
+              <a:rPr lang="de-DE" noProof="0" dirty="0" err="1"/>
+              <a:t>fisklatrust</a:t>
+            </a:r>
+            <a:r>
+              <a:rPr lang="de-DE" noProof="0" dirty="0"/>
+              <a:t> Archivierung nicht verfügbar ist.</a:t>
+            </a:r>
+          </a:p>
+          <a:p>
+            <a:pPr marL="228600" indent="-228600">
+              <a:buAutoNum type="arabicPeriod"/>
+            </a:pPr>
+            <a:r>
+              <a:rPr lang="de-DE" noProof="0" dirty="0"/>
+              <a:t>Das POS-System baut den Request zusammen und sendet die Daten an die Sign-Methode der ft.Middleware.</a:t>
+            </a:r>
+          </a:p>
+          <a:p>
+            <a:pPr marL="228600" indent="-228600">
+              <a:buAutoNum type="arabicPeriod"/>
+            </a:pPr>
+            <a:r>
+              <a:rPr lang="de-DE" noProof="0" dirty="0"/>
+              <a:t>Die fiskaltrust Middleware prozessiert die Daten, verkettet diese mit Hilfe des internen Security Mechanismus und entscheidet wie sie weiter behandelt werden sollen</a:t>
+            </a:r>
+          </a:p>
+          <a:p>
+            <a:pPr marL="228600" indent="-228600">
+              <a:buAutoNum type="arabicPeriod"/>
+            </a:pPr>
+            <a:r>
+              <a:rPr lang="de-DE" noProof="0" dirty="0"/>
+              <a:t>Im Falle eines Request, der signiert werden muss, werden die relevanten Daten an die angeschossenen TSE </a:t>
+            </a:r>
+            <a:r>
+              <a:rPr lang="de-DE" noProof="0" dirty="0" err="1"/>
+              <a:t>gesendent</a:t>
+            </a:r>
+            <a:r>
+              <a:rPr lang="de-DE" noProof="0" dirty="0"/>
+              <a:t> und von dieser signiert. (Im Falle eines Sonderbelegs werden die Daten nicht signiert - siehe dazu nächste Folie)</a:t>
+            </a:r>
+          </a:p>
+          <a:p>
+            <a:pPr marL="228600" indent="-228600">
+              <a:buAutoNum type="arabicPeriod"/>
+            </a:pPr>
+            <a:r>
+              <a:rPr lang="de-DE" noProof="0" dirty="0"/>
+              <a:t>Die Daten werden von der Middleware persistiert und alle 5 Sekunden an den fiskaltrust </a:t>
+            </a:r>
+            <a:r>
+              <a:rPr lang="de-DE" noProof="0" dirty="0" err="1"/>
+              <a:t>Helipad</a:t>
+            </a:r>
+            <a:r>
+              <a:rPr lang="de-DE" noProof="0" dirty="0"/>
+              <a:t> Server zur Archivierung gesendet.</a:t>
+            </a:r>
+          </a:p>
+          <a:p>
+            <a:pPr marL="228600" indent="-228600">
+              <a:buAutoNum type="arabicPeriod"/>
+            </a:pPr>
+            <a:r>
+              <a:rPr lang="de-DE" noProof="0" dirty="0"/>
+              <a:t>Der Response wird zusammengebaut und zurück an das POS-System gesendet (der Response beinhaltet wichtige Daten, die auf den Beleg gedruckt werden müssen)</a:t>
+            </a:r>
+          </a:p>
+          <a:p>
+            <a:pPr marL="228600" indent="-228600">
+              <a:buAutoNum type="arabicPeriod"/>
+            </a:pPr>
+            <a:r>
+              <a:rPr lang="de-DE" noProof="0" dirty="0"/>
+              <a:t>Das Pos-System erhält den Response und prozessiert die darin enthaltenen Daten</a:t>
+            </a:r>
+          </a:p>
+          <a:p>
+            <a:pPr marL="228600" indent="-228600">
+              <a:buAutoNum type="arabicPeriod"/>
+            </a:pPr>
+            <a:r>
+              <a:rPr lang="de-DE" noProof="0" dirty="0"/>
+              <a:t>Die erhaltenen Daten werden lokal vom POS-System persistiert (siehe dazu auch Pkt. 2)</a:t>
+            </a:r>
+          </a:p>
+          <a:p>
+            <a:pPr marL="228600" indent="-228600">
+              <a:buAutoNum type="arabicPeriod"/>
+            </a:pPr>
+            <a:r>
+              <a:rPr lang="de-DE" noProof="0" dirty="0"/>
+              <a:t>Der Beleg wird erstellt und gedruckt (er enthält die Daten aus dem Signatur-Block des Response)</a:t>
+            </a:r>
           </a:p>
         </p:txBody>
       </p:sp>
@@ -2467,6 +3056,188 @@
         <p:txBody>
           <a:bodyPr/>
           <a:lstStyle/>
+          <a:p>
+            <a:r>
+              <a:rPr lang="de-DE" noProof="0" dirty="0"/>
+              <a:t>Sonderbelege führen Funktionalität aus. Z.B. Initialisierung der TSE, </a:t>
+            </a:r>
+            <a:r>
+              <a:rPr lang="de-DE" noProof="0" dirty="0" err="1"/>
+              <a:t>Tagesabschuß</a:t>
+            </a:r>
+            <a:r>
+              <a:rPr lang="de-DE" noProof="0" dirty="0"/>
+              <a:t>, </a:t>
+            </a:r>
+            <a:r>
+              <a:rPr lang="de-DE" noProof="0" dirty="0" err="1"/>
+              <a:t>Monatsabschluß</a:t>
+            </a:r>
+            <a:r>
+              <a:rPr lang="de-DE" noProof="0" dirty="0"/>
+              <a:t>, etc. Sie werden immer über einen </a:t>
+            </a:r>
+            <a:r>
+              <a:rPr lang="de-DE" noProof="0" dirty="0" err="1"/>
+              <a:t>request</a:t>
+            </a:r>
+            <a:r>
+              <a:rPr lang="de-DE" noProof="0" dirty="0"/>
+              <a:t> mit dem receipt-</a:t>
+            </a:r>
+            <a:r>
+              <a:rPr lang="de-DE" noProof="0" dirty="0" err="1"/>
+              <a:t>request</a:t>
+            </a:r>
+            <a:r>
+              <a:rPr lang="de-DE" noProof="0" dirty="0"/>
+              <a:t>-</a:t>
+            </a:r>
+            <a:r>
+              <a:rPr lang="de-DE" noProof="0" dirty="0" err="1"/>
+              <a:t>case</a:t>
+            </a:r>
+            <a:r>
+              <a:rPr lang="de-DE" noProof="0" dirty="0"/>
+              <a:t> „</a:t>
+            </a:r>
+            <a:r>
+              <a:rPr lang="de-DE" noProof="0" dirty="0" err="1"/>
+              <a:t>zero</a:t>
+            </a:r>
+            <a:r>
+              <a:rPr lang="de-DE" noProof="0" dirty="0"/>
+              <a:t> receipt“ also Nullbeleg an die </a:t>
+            </a:r>
+            <a:r>
+              <a:rPr lang="de-DE" noProof="0" dirty="0" err="1"/>
+              <a:t>fisklatrust</a:t>
+            </a:r>
+            <a:r>
+              <a:rPr lang="de-DE" noProof="0" dirty="0"/>
+              <a:t> Middleware gesendet.</a:t>
+            </a:r>
+          </a:p>
+          <a:p>
+            <a:endParaRPr lang="de-DE" noProof="0" dirty="0"/>
+          </a:p>
+          <a:p>
+            <a:pPr marL="228600" indent="-228600">
+              <a:buAutoNum type="arabicPeriod"/>
+            </a:pPr>
+            <a:r>
+              <a:rPr lang="de-DE" noProof="0" dirty="0"/>
+              <a:t>Das POS-System bereitet den Nullbeleg vor (je nach Funktionalität die ausgeführt werden soll)</a:t>
+            </a:r>
+          </a:p>
+          <a:p>
+            <a:pPr marL="228600" indent="-228600">
+              <a:buAutoNum type="arabicPeriod"/>
+            </a:pPr>
+            <a:r>
+              <a:rPr lang="de-DE" noProof="0" dirty="0"/>
+              <a:t>Das POS-System sollte die Daten lokal persistieren. Die </a:t>
+            </a:r>
+            <a:r>
+              <a:rPr lang="de-DE" noProof="0" dirty="0" err="1"/>
+              <a:t>Persistierung</a:t>
+            </a:r>
+            <a:r>
+              <a:rPr lang="de-DE" noProof="0" dirty="0"/>
+              <a:t> der Daten ist wichtig, weil die Request Daten nicht von der Middleware zurückgesendet werden. Zudem ist die lokale Archivierung wichtig für den Fall, dass die </a:t>
+            </a:r>
+            <a:r>
+              <a:rPr lang="de-DE" noProof="0" dirty="0" err="1"/>
+              <a:t>fisklatrust</a:t>
+            </a:r>
+            <a:r>
+              <a:rPr lang="de-DE" noProof="0" dirty="0"/>
+              <a:t> Archivierung nicht verfügbar ist.</a:t>
+            </a:r>
+          </a:p>
+          <a:p>
+            <a:pPr marL="228600" indent="-228600">
+              <a:buAutoNum type="arabicPeriod"/>
+            </a:pPr>
+            <a:r>
+              <a:rPr lang="de-DE" noProof="0" dirty="0"/>
+              <a:t>Das POS-System baut den Request zusammen und sendet die Daten an die Sign-Methode der ft.Middleware.</a:t>
+            </a:r>
+          </a:p>
+          <a:p>
+            <a:pPr marL="228600" indent="-228600">
+              <a:buAutoNum type="arabicPeriod"/>
+            </a:pPr>
+            <a:r>
+              <a:rPr lang="de-DE" noProof="0" dirty="0"/>
+              <a:t>Die fiskaltrust Middleware prozessiert die Daten, verkettet diese mit Hilfe des internen Security Mechanismus und entscheidet wie sie weiter behandelt werden sollen</a:t>
+            </a:r>
+          </a:p>
+          <a:p>
+            <a:pPr marL="228600" indent="-228600">
+              <a:buAutoNum type="arabicPeriod"/>
+            </a:pPr>
+            <a:r>
+              <a:rPr lang="de-DE" noProof="0" dirty="0"/>
+              <a:t>Im Falle eines Sonderbelegs werden die Daten nicht signiert – die angeforderte Funktionalität wird ausgeführt.</a:t>
+            </a:r>
+          </a:p>
+          <a:p>
+            <a:pPr marL="228600" indent="-228600">
+              <a:buAutoNum type="arabicPeriod"/>
+            </a:pPr>
+            <a:r>
+              <a:rPr lang="de-DE" noProof="0" dirty="0"/>
+              <a:t>Das Ergebnis der </a:t>
+            </a:r>
+            <a:r>
+              <a:rPr lang="de-DE" noProof="0" dirty="0" err="1"/>
+              <a:t>getriggerten</a:t>
+            </a:r>
+            <a:r>
+              <a:rPr lang="de-DE" noProof="0" dirty="0"/>
+              <a:t> Funktionalität wird von der Middleware in den Signaturblock gepackt</a:t>
+            </a:r>
+          </a:p>
+          <a:p>
+            <a:pPr marL="228600" indent="-228600">
+              <a:buAutoNum type="arabicPeriod"/>
+            </a:pPr>
+            <a:r>
+              <a:rPr lang="de-DE" noProof="0" dirty="0"/>
+              <a:t>Der Response wird zusammengebaut und zurück an das POS-System gesendet</a:t>
+            </a:r>
+          </a:p>
+          <a:p>
+            <a:pPr marL="228600" indent="-228600">
+              <a:buAutoNum type="arabicPeriod"/>
+            </a:pPr>
+            <a:r>
+              <a:rPr lang="de-DE" noProof="0" dirty="0"/>
+              <a:t>Das Pos-System erhält den Response und prozessiert die darin enthaltenen Daten</a:t>
+            </a:r>
+          </a:p>
+          <a:p>
+            <a:pPr marL="228600" indent="-228600">
+              <a:buAutoNum type="arabicPeriod"/>
+            </a:pPr>
+            <a:r>
+              <a:rPr lang="de-DE" noProof="0" dirty="0"/>
+              <a:t>Die erhaltenen Daten werden lokal vom POS-System persistiert (siehe dazu auch Pkt. 2)</a:t>
+            </a:r>
+          </a:p>
+          <a:p>
+            <a:pPr marL="228600" indent="-228600">
+              <a:buAutoNum type="arabicPeriod"/>
+            </a:pPr>
+            <a:r>
+              <a:rPr lang="de-DE" noProof="0" dirty="0"/>
+              <a:t>Der Beleg wird erstellt und gedruckt (er enthält Daten aus dem Signatur-Block des Response)</a:t>
+            </a:r>
+          </a:p>
+          <a:p>
+            <a:endParaRPr lang="de-DE" noProof="0" dirty="0"/>
+          </a:p>
           <a:p>
             <a:endParaRPr lang="de-DE" noProof="0" dirty="0"/>
           </a:p>
@@ -2657,7 +3428,7 @@
           <a:p>
             <a:fld id="{E822B9A2-E9F6-E646-ADD7-254B6AD8866B}" type="datetimeFigureOut">
               <a:rPr lang="en-US" smtClean="0"/>
-              <a:t>8/10/20</a:t>
+              <a:t>8/17/20</a:t>
             </a:fld>
             <a:endParaRPr lang="en-US"/>
           </a:p>
@@ -2857,7 +3628,7 @@
           <a:p>
             <a:fld id="{E822B9A2-E9F6-E646-ADD7-254B6AD8866B}" type="datetimeFigureOut">
               <a:rPr lang="en-US" smtClean="0"/>
-              <a:t>8/10/20</a:t>
+              <a:t>8/17/20</a:t>
             </a:fld>
             <a:endParaRPr lang="en-US"/>
           </a:p>
@@ -3067,7 +3838,7 @@
           <a:p>
             <a:fld id="{E822B9A2-E9F6-E646-ADD7-254B6AD8866B}" type="datetimeFigureOut">
               <a:rPr lang="en-US" smtClean="0"/>
-              <a:t>8/10/20</a:t>
+              <a:t>8/17/20</a:t>
             </a:fld>
             <a:endParaRPr lang="en-US"/>
           </a:p>
@@ -3267,7 +4038,7 @@
           <a:p>
             <a:fld id="{E822B9A2-E9F6-E646-ADD7-254B6AD8866B}" type="datetimeFigureOut">
               <a:rPr lang="en-US" smtClean="0"/>
-              <a:t>8/10/20</a:t>
+              <a:t>8/17/20</a:t>
             </a:fld>
             <a:endParaRPr lang="en-US"/>
           </a:p>
@@ -3543,7 +4314,7 @@
           <a:p>
             <a:fld id="{E822B9A2-E9F6-E646-ADD7-254B6AD8866B}" type="datetimeFigureOut">
               <a:rPr lang="en-US" smtClean="0"/>
-              <a:t>8/10/20</a:t>
+              <a:t>8/17/20</a:t>
             </a:fld>
             <a:endParaRPr lang="en-US"/>
           </a:p>
@@ -3811,7 +4582,7 @@
           <a:p>
             <a:fld id="{E822B9A2-E9F6-E646-ADD7-254B6AD8866B}" type="datetimeFigureOut">
               <a:rPr lang="en-US" smtClean="0"/>
-              <a:t>8/10/20</a:t>
+              <a:t>8/17/20</a:t>
             </a:fld>
             <a:endParaRPr lang="en-US"/>
           </a:p>
@@ -4226,7 +4997,7 @@
           <a:p>
             <a:fld id="{E822B9A2-E9F6-E646-ADD7-254B6AD8866B}" type="datetimeFigureOut">
               <a:rPr lang="en-US" smtClean="0"/>
-              <a:t>8/10/20</a:t>
+              <a:t>8/17/20</a:t>
             </a:fld>
             <a:endParaRPr lang="en-US"/>
           </a:p>
@@ -4368,7 +5139,7 @@
           <a:p>
             <a:fld id="{E822B9A2-E9F6-E646-ADD7-254B6AD8866B}" type="datetimeFigureOut">
               <a:rPr lang="en-US" smtClean="0"/>
-              <a:t>8/10/20</a:t>
+              <a:t>8/17/20</a:t>
             </a:fld>
             <a:endParaRPr lang="en-US"/>
           </a:p>
@@ -4481,7 +5252,7 @@
           <a:p>
             <a:fld id="{E822B9A2-E9F6-E646-ADD7-254B6AD8866B}" type="datetimeFigureOut">
               <a:rPr lang="en-US" smtClean="0"/>
-              <a:t>8/10/20</a:t>
+              <a:t>8/17/20</a:t>
             </a:fld>
             <a:endParaRPr lang="en-US"/>
           </a:p>
@@ -4794,7 +5565,7 @@
           <a:p>
             <a:fld id="{E822B9A2-E9F6-E646-ADD7-254B6AD8866B}" type="datetimeFigureOut">
               <a:rPr lang="en-US" smtClean="0"/>
-              <a:t>8/10/20</a:t>
+              <a:t>8/17/20</a:t>
             </a:fld>
             <a:endParaRPr lang="en-US"/>
           </a:p>
@@ -5083,7 +5854,7 @@
           <a:p>
             <a:fld id="{E822B9A2-E9F6-E646-ADD7-254B6AD8866B}" type="datetimeFigureOut">
               <a:rPr lang="en-US" smtClean="0"/>
-              <a:t>8/10/20</a:t>
+              <a:t>8/17/20</a:t>
             </a:fld>
             <a:endParaRPr lang="en-US"/>
           </a:p>
@@ -5326,7 +6097,7 @@
           <a:p>
             <a:fld id="{E822B9A2-E9F6-E646-ADD7-254B6AD8866B}" type="datetimeFigureOut">
               <a:rPr lang="en-US" smtClean="0"/>
-              <a:t>8/10/20</a:t>
+              <a:t>8/17/20</a:t>
             </a:fld>
             <a:endParaRPr lang="en-US"/>
           </a:p>
@@ -6954,7 +7725,7 @@
         <p:spPr>
           <a:xfrm>
             <a:off x="1606210" y="1684563"/>
-            <a:ext cx="8979579" cy="4037115"/>
+            <a:ext cx="8979578" cy="4037115"/>
           </a:xfrm>
         </p:spPr>
       </p:pic>

</xml_diff>

<commit_message>
work on pos-creator onboarding presentation
</commit_message>
<xml_diff>
--- a/for-poscreators/presentation/onboarding_de.pptx
+++ b/for-poscreators/presentation/onboarding_de.pptx
@@ -5,7 +5,7 @@
     <p:sldMasterId id="2147483648" r:id="rId1"/>
   </p:sldMasterIdLst>
   <p:notesMasterIdLst>
-    <p:notesMasterId r:id="rId14"/>
+    <p:notesMasterId r:id="rId15"/>
   </p:notesMasterIdLst>
   <p:sldIdLst>
     <p:sldId id="256" r:id="rId2"/>
@@ -20,6 +20,7 @@
     <p:sldId id="295" r:id="rId11"/>
     <p:sldId id="296" r:id="rId12"/>
     <p:sldId id="297" r:id="rId13"/>
+    <p:sldId id="299" r:id="rId14"/>
   </p:sldIdLst>
   <p:sldSz cx="12192000" cy="6858000"/>
   <p:notesSz cx="6858000" cy="9144000"/>
@@ -604,6 +605,162 @@
           <a:bodyPr/>
           <a:lstStyle/>
           <a:p>
+            <a:r>
+              <a:rPr lang="de-DE" noProof="0" dirty="0"/>
+              <a:t>Fällt die TSE aus, so kann das POS-System weiter betrieben werden bis die TSE wieder angebunden wird. Die Requests werden in diesem Fall weiter an die </a:t>
+            </a:r>
+            <a:r>
+              <a:rPr lang="de-DE" noProof="0" dirty="0" err="1"/>
+              <a:t>fiskaltrust.Middleware</a:t>
+            </a:r>
+            <a:r>
+              <a:rPr lang="de-DE" noProof="0" dirty="0"/>
+              <a:t> gesendet.</a:t>
+            </a:r>
+          </a:p>
+          <a:p>
+            <a:endParaRPr lang="de-DE" noProof="0" dirty="0"/>
+          </a:p>
+          <a:p>
+            <a:pPr marL="228600" indent="-228600">
+              <a:buAutoNum type="arabicPeriod"/>
+            </a:pPr>
+            <a:r>
+              <a:rPr lang="de-DE" noProof="0" dirty="0"/>
+              <a:t>Das POS-System sammelt die </a:t>
+            </a:r>
+            <a:r>
+              <a:rPr lang="de-DE" noProof="0" dirty="0" err="1"/>
+              <a:t>charge</a:t>
+            </a:r>
+            <a:r>
+              <a:rPr lang="de-DE" noProof="0" dirty="0"/>
+              <a:t> und </a:t>
+            </a:r>
+            <a:r>
+              <a:rPr lang="de-DE" noProof="0" dirty="0" err="1"/>
+              <a:t>pay</a:t>
+            </a:r>
+            <a:r>
+              <a:rPr lang="de-DE" noProof="0" dirty="0"/>
+              <a:t> </a:t>
+            </a:r>
+            <a:r>
+              <a:rPr lang="de-DE" noProof="0" dirty="0" err="1"/>
+              <a:t>items</a:t>
+            </a:r>
+            <a:r>
+              <a:rPr lang="de-DE" noProof="0" dirty="0"/>
+              <a:t> für den Request. </a:t>
+            </a:r>
+          </a:p>
+          <a:p>
+            <a:pPr marL="228600" indent="-228600">
+              <a:buAutoNum type="arabicPeriod"/>
+            </a:pPr>
+            <a:r>
+              <a:rPr lang="de-DE" noProof="0" dirty="0"/>
+              <a:t>Das POS-System sollte die Daten lokal persistieren. Das Persistieren der Daten ist wichtig, weil die Request Daten nicht von der Middleware zurückgesendet werden. Zudem ist die lokale Archivierung wichtig für den Fall, dass die fiskaltrust Archivierung nicht verfügbar ist.</a:t>
+            </a:r>
+          </a:p>
+          <a:p>
+            <a:pPr marL="228600" indent="-228600">
+              <a:buAutoNum type="arabicPeriod"/>
+            </a:pPr>
+            <a:r>
+              <a:rPr lang="de-DE" noProof="0" dirty="0"/>
+              <a:t>Das POS-System baut den Request auf und sendet die Daten an die Sign-Methode der ft.Middleware.</a:t>
+            </a:r>
+          </a:p>
+          <a:p>
+            <a:pPr marL="228600" indent="-228600">
+              <a:buAutoNum type="arabicPeriod"/>
+            </a:pPr>
+            <a:r>
+              <a:rPr lang="de-DE" noProof="0" dirty="0"/>
+              <a:t>Die fiskaltrust Middleware prozessiert die Daten, verkettet diese mit Hilfe des internen Security Mechanismus und entscheidet wie sie weiter behandelt werden sollen</a:t>
+            </a:r>
+          </a:p>
+          <a:p>
+            <a:pPr marL="228600" indent="-228600">
+              <a:buAutoNum type="arabicPeriod"/>
+            </a:pPr>
+            <a:r>
+              <a:rPr lang="de-DE" noProof="0" dirty="0"/>
+              <a:t>Im Falle eines Request, der signiert werden muss, werden die relevanten Daten an die angeschossenen TSE gesendet und von dieser signiert. In diesem Fall ist die TSE jedoch nicht erreichbar.</a:t>
+            </a:r>
+          </a:p>
+          <a:p>
+            <a:pPr marL="228600" indent="-228600">
+              <a:buAutoNum type="arabicPeriod"/>
+            </a:pPr>
+            <a:r>
+              <a:rPr lang="de-DE" noProof="0" dirty="0"/>
+              <a:t>Der Signaturblock wird für die Rückgabe mit der Notiz “TSE Kommunikation ausgefallen“ vorbereitet.</a:t>
+            </a:r>
+          </a:p>
+          <a:p>
+            <a:pPr marL="228600" indent="-228600">
+              <a:buAutoNum type="arabicPeriod"/>
+            </a:pPr>
+            <a:r>
+              <a:rPr lang="de-DE" noProof="0" dirty="0"/>
+              <a:t>Die Daten werden von der Middleware persistiert und alle 5 Sekunden an den fiskaltrust „</a:t>
+            </a:r>
+            <a:r>
+              <a:rPr lang="de-DE" noProof="0" dirty="0" err="1"/>
+              <a:t>Helipad</a:t>
+            </a:r>
+            <a:r>
+              <a:rPr lang="de-DE" noProof="0" dirty="0"/>
+              <a:t>“ Server zur Archivierung gesendet.</a:t>
+            </a:r>
+          </a:p>
+          <a:p>
+            <a:pPr marL="228600" indent="-228600">
+              <a:buAutoNum type="arabicPeriod"/>
+            </a:pPr>
+            <a:r>
+              <a:rPr lang="de-DE" noProof="0" dirty="0"/>
+              <a:t>Der Response mit Fehlercode wird aufgebaut und zurück an das POS-System gesendet (der Response gibt im Feld </a:t>
+            </a:r>
+            <a:r>
+              <a:rPr lang="de-DE" noProof="0" dirty="0" err="1"/>
+              <a:t>ftState</a:t>
+            </a:r>
+            <a:r>
+              <a:rPr lang="de-DE" noProof="0" dirty="0"/>
+              <a:t> den Fehlercode an.)</a:t>
+            </a:r>
+          </a:p>
+          <a:p>
+            <a:pPr marL="228600" indent="-228600">
+              <a:buAutoNum type="arabicPeriod"/>
+            </a:pPr>
+            <a:r>
+              <a:rPr lang="de-DE" noProof="0" dirty="0"/>
+              <a:t>Das Pos-System erhält den Response und prozessiert die darin enthaltenen Daten</a:t>
+            </a:r>
+          </a:p>
+          <a:p>
+            <a:pPr marL="228600" indent="-228600">
+              <a:buAutoNum type="arabicPeriod"/>
+            </a:pPr>
+            <a:r>
+              <a:rPr lang="de-DE" noProof="0" dirty="0"/>
+              <a:t>Die erhaltenen Daten werden lokal vom POS-System persistiert (siehe dazu auch Pkt. 2)</a:t>
+            </a:r>
+          </a:p>
+          <a:p>
+            <a:pPr marL="228600" indent="-228600">
+              <a:buAutoNum type="arabicPeriod"/>
+            </a:pPr>
+            <a:r>
+              <a:rPr lang="de-DE" noProof="0" dirty="0"/>
+              <a:t>Der Beleg wird erstellt und gedruckt (er enthält die Daten aus dem Signatur-Block des Response inkl. Der Notiz, dass die TSE ausgefallen ist)</a:t>
+            </a:r>
+          </a:p>
+          <a:p>
             <a:endParaRPr lang="de-DE" noProof="0" dirty="0"/>
           </a:p>
         </p:txBody>
@@ -688,7 +845,10 @@
           <a:bodyPr/>
           <a:lstStyle/>
           <a:p>
-            <a:endParaRPr lang="de-DE" noProof="0" dirty="0"/>
+            <a:r>
+              <a:rPr lang="de-DE" noProof="0" dirty="0"/>
+              <a:t>In diesem Fall kann die Middleware von dem POS-System nicht erreicht werden. Die Daten müssen markiert werden um später wieder an die Middleware gesendet zu werden. Auf den Beleg muss der Hinweis gedruckt werden, dass der Sicherheitsmechanismus ausgefallen ist. </a:t>
+            </a:r>
           </a:p>
         </p:txBody>
       </p:sp>
@@ -719,6 +879,166 @@
     <p:extLst>
       <p:ext uri="{BB962C8B-B14F-4D97-AF65-F5344CB8AC3E}">
         <p14:creationId xmlns:p14="http://schemas.microsoft.com/office/powerpoint/2010/main" val="999188407"/>
+      </p:ext>
+    </p:extLst>
+  </p:cSld>
+  <p:clrMapOvr>
+    <a:masterClrMapping/>
+  </p:clrMapOvr>
+</p:notes>
+</file>
+
+<file path=ppt/notesSlides/notesSlide12.xml><?xml version="1.0" encoding="utf-8"?>
+<p:notes xmlns:a="http://schemas.openxmlformats.org/drawingml/2006/main" xmlns:r="http://schemas.openxmlformats.org/officeDocument/2006/relationships" xmlns:p="http://schemas.openxmlformats.org/presentationml/2006/main">
+  <p:cSld>
+    <p:spTree>
+      <p:nvGrpSpPr>
+        <p:cNvPr id="1" name=""/>
+        <p:cNvGrpSpPr/>
+        <p:nvPr/>
+      </p:nvGrpSpPr>
+      <p:grpSpPr>
+        <a:xfrm>
+          <a:off x="0" y="0"/>
+          <a:ext cx="0" cy="0"/>
+          <a:chOff x="0" y="0"/>
+          <a:chExt cx="0" cy="0"/>
+        </a:xfrm>
+      </p:grpSpPr>
+      <p:sp>
+        <p:nvSpPr>
+          <p:cNvPr id="2" name="Slide Image Placeholder 1"/>
+          <p:cNvSpPr>
+            <a:spLocks noGrp="1" noRot="1" noChangeAspect="1"/>
+          </p:cNvSpPr>
+          <p:nvPr>
+            <p:ph type="sldImg"/>
+          </p:nvPr>
+        </p:nvSpPr>
+        <p:spPr/>
+      </p:sp>
+      <p:sp>
+        <p:nvSpPr>
+          <p:cNvPr id="3" name="Notes Placeholder 2"/>
+          <p:cNvSpPr>
+            <a:spLocks noGrp="1"/>
+          </p:cNvSpPr>
+          <p:nvPr>
+            <p:ph type="body" idx="1"/>
+          </p:nvPr>
+        </p:nvSpPr>
+        <p:spPr/>
+        <p:txBody>
+          <a:bodyPr/>
+          <a:lstStyle/>
+          <a:p>
+            <a:r>
+              <a:rPr lang="de-DE" noProof="0" dirty="0"/>
+              <a:t>Zum späteren Zeitpunkt werden im sogenannten „</a:t>
+            </a:r>
+            <a:r>
+              <a:rPr lang="de-DE" noProof="0" dirty="0" err="1"/>
+              <a:t>Late</a:t>
+            </a:r>
+            <a:r>
+              <a:rPr lang="de-DE" noProof="0" dirty="0"/>
+              <a:t> </a:t>
+            </a:r>
+            <a:r>
+              <a:rPr lang="de-DE" noProof="0" dirty="0" err="1"/>
+              <a:t>Signing</a:t>
+            </a:r>
+            <a:r>
+              <a:rPr lang="de-DE" noProof="0" dirty="0"/>
+              <a:t> Mode“ die zuvor zum Wiederholen markierten Requests an die Middleware gesendet. Jeder Request wird dabei über ein Flag markiert (</a:t>
+            </a:r>
+            <a:r>
+              <a:rPr lang="de-DE" noProof="0" dirty="0" err="1"/>
+              <a:t>ftReceiptCase</a:t>
+            </a:r>
+            <a:r>
+              <a:rPr lang="de-DE" noProof="0" dirty="0"/>
+              <a:t> + „receipt </a:t>
+            </a:r>
+            <a:r>
+              <a:rPr lang="de-DE" noProof="0" dirty="0" err="1"/>
+              <a:t>failed</a:t>
+            </a:r>
+            <a:r>
+              <a:rPr lang="de-DE" noProof="0" dirty="0"/>
+              <a:t>“ Flag).</a:t>
+            </a:r>
+          </a:p>
+          <a:p>
+            <a:endParaRPr lang="de-DE" noProof="0" dirty="0"/>
+          </a:p>
+          <a:p>
+            <a:r>
+              <a:rPr lang="de-DE" noProof="0" dirty="0"/>
+              <a:t>Sobald die Middleware den ersten markierten Request erhält wechselt sie in den „</a:t>
+            </a:r>
+            <a:r>
+              <a:rPr lang="de-DE" noProof="0" dirty="0" err="1"/>
+              <a:t>Late</a:t>
+            </a:r>
+            <a:r>
+              <a:rPr lang="de-DE" noProof="0" dirty="0"/>
+              <a:t> </a:t>
+            </a:r>
+            <a:r>
+              <a:rPr lang="de-DE" noProof="0" dirty="0" err="1"/>
+              <a:t>Signing</a:t>
+            </a:r>
+            <a:r>
+              <a:rPr lang="de-DE" noProof="0" dirty="0"/>
+              <a:t> Mode“. Es können nun vom POS-System weitere Requests in diesem Modus gesendet werden. Um den „</a:t>
+            </a:r>
+            <a:r>
+              <a:rPr lang="de-DE" noProof="0" dirty="0" err="1"/>
+              <a:t>Late</a:t>
+            </a:r>
+            <a:r>
+              <a:rPr lang="de-DE" noProof="0" dirty="0"/>
+              <a:t> </a:t>
+            </a:r>
+            <a:r>
+              <a:rPr lang="de-DE" noProof="0" dirty="0" err="1"/>
+              <a:t>Signing</a:t>
+            </a:r>
+            <a:r>
+              <a:rPr lang="de-DE" noProof="0" dirty="0"/>
+              <a:t> Mode“ zu verlassen muss das POS-System einen Nullbeleg an die Middleware senden. </a:t>
+            </a:r>
+          </a:p>
+        </p:txBody>
+      </p:sp>
+      <p:sp>
+        <p:nvSpPr>
+          <p:cNvPr id="4" name="Slide Number Placeholder 3"/>
+          <p:cNvSpPr>
+            <a:spLocks noGrp="1"/>
+          </p:cNvSpPr>
+          <p:nvPr>
+            <p:ph type="sldNum" sz="quarter" idx="5"/>
+          </p:nvPr>
+        </p:nvSpPr>
+        <p:spPr/>
+        <p:txBody>
+          <a:bodyPr/>
+          <a:lstStyle/>
+          <a:p>
+            <a:fld id="{C3915442-2F4C-E043-BB4A-4206B63E6321}" type="slidenum">
+              <a:rPr lang="en-US" smtClean="0"/>
+              <a:t>13</a:t>
+            </a:fld>
+            <a:endParaRPr lang="en-US"/>
+          </a:p>
+        </p:txBody>
+      </p:sp>
+    </p:spTree>
+    <p:extLst>
+      <p:ext uri="{BB962C8B-B14F-4D97-AF65-F5344CB8AC3E}">
+        <p14:creationId xmlns:p14="http://schemas.microsoft.com/office/powerpoint/2010/main" val="2257919477"/>
       </p:ext>
     </p:extLst>
   </p:cSld>
@@ -886,55 +1206,7 @@
                 <a:ea typeface="+mn-ea"/>
                 <a:cs typeface="+mn-cs"/>
               </a:rPr>
-              <a:t>Ab dem 1.1.2020 gelten neue Vorschriften </a:t>
-            </a:r>
-            <a:r>
-              <a:rPr lang="de-DE" sz="1200" kern="1200" noProof="0" dirty="0" err="1">
-                <a:solidFill>
-                  <a:schemeClr val="tx1"/>
-                </a:solidFill>
-                <a:effectLst/>
-                <a:latin typeface="+mn-lt"/>
-                <a:ea typeface="+mn-ea"/>
-                <a:cs typeface="+mn-cs"/>
-              </a:rPr>
-              <a:t>für</a:t>
-            </a:r>
-            <a:r>
-              <a:rPr lang="de-DE" sz="1200" kern="1200" noProof="0" dirty="0">
-                <a:solidFill>
-                  <a:schemeClr val="tx1"/>
-                </a:solidFill>
-                <a:effectLst/>
-                <a:latin typeface="+mn-lt"/>
-                <a:ea typeface="+mn-ea"/>
-                <a:cs typeface="+mn-cs"/>
-              </a:rPr>
-              <a:t> „elektronische Aufzeichnungssysteme, die </a:t>
-            </a:r>
-            <a:r>
-              <a:rPr lang="de-DE" sz="1200" i="1" kern="1200" noProof="0" dirty="0">
-                <a:solidFill>
-                  <a:schemeClr val="tx1"/>
-                </a:solidFill>
-                <a:effectLst/>
-                <a:latin typeface="+mn-lt"/>
-                <a:ea typeface="+mn-ea"/>
-                <a:cs typeface="+mn-cs"/>
-              </a:rPr>
-              <a:t>‚</a:t>
-            </a:r>
-            <a:r>
-              <a:rPr lang="de-DE" sz="1200" kern="1200" noProof="0" dirty="0">
-                <a:solidFill>
-                  <a:schemeClr val="tx1"/>
-                </a:solidFill>
-                <a:effectLst/>
-                <a:latin typeface="+mn-lt"/>
-                <a:ea typeface="+mn-ea"/>
-                <a:cs typeface="+mn-cs"/>
-              </a:rPr>
-              <a:t>Kassenfunktion’ haben”:</a:t>
+              <a:t>Ab dem 1.1.2020 gelten neue Vorschriften für elektronische Aufzeichnungssysteme, die Kassenfunktion haben:</a:t>
             </a:r>
           </a:p>
           <a:p>
@@ -965,103 +1237,7 @@
                 <a:ea typeface="+mn-ea"/>
                 <a:cs typeface="+mn-cs"/>
               </a:rPr>
-              <a:t>Die mit diesen Systemen aufgezeichneten Daten </a:t>
-            </a:r>
-            <a:r>
-              <a:rPr lang="de-DE" sz="1200" kern="1200" dirty="0" err="1">
-                <a:solidFill>
-                  <a:schemeClr val="tx1"/>
-                </a:solidFill>
-                <a:effectLst/>
-                <a:latin typeface="+mn-lt"/>
-                <a:ea typeface="+mn-ea"/>
-                <a:cs typeface="+mn-cs"/>
-              </a:rPr>
-              <a:t>müssen</a:t>
-            </a:r>
-            <a:r>
-              <a:rPr lang="de-DE" sz="1200" kern="1200" dirty="0">
-                <a:solidFill>
-                  <a:schemeClr val="tx1"/>
-                </a:solidFill>
-                <a:effectLst/>
-                <a:latin typeface="+mn-lt"/>
-                <a:ea typeface="+mn-ea"/>
-                <a:cs typeface="+mn-cs"/>
-              </a:rPr>
-              <a:t> durch eine zertifizierte technische Sicherheitseinrichtung (TSE) gegen </a:t>
-            </a:r>
-            <a:r>
-              <a:rPr lang="de-DE" sz="1200" kern="1200" dirty="0" err="1">
-                <a:solidFill>
-                  <a:schemeClr val="tx1"/>
-                </a:solidFill>
-                <a:effectLst/>
-                <a:latin typeface="+mn-lt"/>
-                <a:ea typeface="+mn-ea"/>
-                <a:cs typeface="+mn-cs"/>
-              </a:rPr>
-              <a:t>nachträgliche</a:t>
-            </a:r>
-            <a:r>
-              <a:rPr lang="de-DE" sz="1200" kern="1200" dirty="0">
-                <a:solidFill>
-                  <a:schemeClr val="tx1"/>
-                </a:solidFill>
-                <a:effectLst/>
-                <a:latin typeface="+mn-lt"/>
-                <a:ea typeface="+mn-ea"/>
-                <a:cs typeface="+mn-cs"/>
-              </a:rPr>
-              <a:t> </a:t>
-            </a:r>
-            <a:r>
-              <a:rPr lang="de-DE" sz="1200" kern="1200" dirty="0" err="1">
-                <a:solidFill>
-                  <a:schemeClr val="tx1"/>
-                </a:solidFill>
-                <a:effectLst/>
-                <a:latin typeface="+mn-lt"/>
-                <a:ea typeface="+mn-ea"/>
-                <a:cs typeface="+mn-cs"/>
-              </a:rPr>
-              <a:t>Veränderungen</a:t>
-            </a:r>
-            <a:r>
-              <a:rPr lang="de-DE" sz="1200" kern="1200" dirty="0">
-                <a:solidFill>
-                  <a:schemeClr val="tx1"/>
-                </a:solidFill>
-                <a:effectLst/>
-                <a:latin typeface="+mn-lt"/>
-                <a:ea typeface="+mn-ea"/>
-                <a:cs typeface="+mn-cs"/>
-              </a:rPr>
-              <a:t> </a:t>
-            </a:r>
-            <a:r>
-              <a:rPr lang="de-DE" sz="1200" kern="1200" dirty="0" err="1">
-                <a:solidFill>
-                  <a:schemeClr val="tx1"/>
-                </a:solidFill>
-                <a:effectLst/>
-                <a:latin typeface="+mn-lt"/>
-                <a:ea typeface="+mn-ea"/>
-                <a:cs typeface="+mn-cs"/>
-              </a:rPr>
-              <a:t>geschützt</a:t>
-            </a:r>
-            <a:r>
-              <a:rPr lang="de-DE" sz="1200" kern="1200" dirty="0">
-                <a:solidFill>
-                  <a:schemeClr val="tx1"/>
-                </a:solidFill>
-                <a:effectLst/>
-                <a:latin typeface="+mn-lt"/>
-                <a:ea typeface="+mn-ea"/>
-                <a:cs typeface="+mn-cs"/>
-              </a:rPr>
-              <a:t> werden. </a:t>
+              <a:t>Die mit diesen Systemen aufgezeichneten Daten müssen durch eine zertifizierte technische Sicherheitseinrichtung (TSE) gegen nachträgliche Veränderungen geschützt werden. </a:t>
             </a:r>
           </a:p>
           <a:p>
@@ -1092,79 +1268,7 @@
                 <a:ea typeface="+mn-ea"/>
                 <a:cs typeface="+mn-cs"/>
               </a:rPr>
-              <a:t>Bei </a:t>
-            </a:r>
-            <a:r>
-              <a:rPr lang="de-DE" sz="1200" kern="1200" dirty="0" err="1">
-                <a:solidFill>
-                  <a:schemeClr val="tx1"/>
-                </a:solidFill>
-                <a:effectLst/>
-                <a:latin typeface="+mn-lt"/>
-                <a:ea typeface="+mn-ea"/>
-                <a:cs typeface="+mn-cs"/>
-              </a:rPr>
-              <a:t>Betriebsprüfungen</a:t>
-            </a:r>
-            <a:r>
-              <a:rPr lang="de-DE" sz="1200" kern="1200" dirty="0">
-                <a:solidFill>
-                  <a:schemeClr val="tx1"/>
-                </a:solidFill>
-                <a:effectLst/>
-                <a:latin typeface="+mn-lt"/>
-                <a:ea typeface="+mn-ea"/>
-                <a:cs typeface="+mn-cs"/>
-              </a:rPr>
-              <a:t> </a:t>
-            </a:r>
-            <a:r>
-              <a:rPr lang="de-DE" sz="1200" kern="1200" dirty="0" err="1">
-                <a:solidFill>
-                  <a:schemeClr val="tx1"/>
-                </a:solidFill>
-                <a:effectLst/>
-                <a:latin typeface="+mn-lt"/>
-                <a:ea typeface="+mn-ea"/>
-                <a:cs typeface="+mn-cs"/>
-              </a:rPr>
-              <a:t>müssen</a:t>
-            </a:r>
-            <a:r>
-              <a:rPr lang="de-DE" sz="1200" kern="1200" dirty="0">
-                <a:solidFill>
-                  <a:schemeClr val="tx1"/>
-                </a:solidFill>
-                <a:effectLst/>
-                <a:latin typeface="+mn-lt"/>
-                <a:ea typeface="+mn-ea"/>
-                <a:cs typeface="+mn-cs"/>
-              </a:rPr>
-              <a:t> die aufgezeichneten Daten in einem standardisierten Format – der „Digitalen Schnittstelle der Finanzverwaltung </a:t>
-            </a:r>
-            <a:r>
-              <a:rPr lang="de-DE" sz="1200" kern="1200" dirty="0" err="1">
-                <a:solidFill>
-                  <a:schemeClr val="tx1"/>
-                </a:solidFill>
-                <a:effectLst/>
-                <a:latin typeface="+mn-lt"/>
-                <a:ea typeface="+mn-ea"/>
-                <a:cs typeface="+mn-cs"/>
-              </a:rPr>
-              <a:t>für</a:t>
-            </a:r>
-            <a:r>
-              <a:rPr lang="de-DE" sz="1200" kern="1200" dirty="0">
-                <a:solidFill>
-                  <a:schemeClr val="tx1"/>
-                </a:solidFill>
-                <a:effectLst/>
-                <a:latin typeface="+mn-lt"/>
-                <a:ea typeface="+mn-ea"/>
-                <a:cs typeface="+mn-cs"/>
-              </a:rPr>
-              <a:t> Kassensysteme” (</a:t>
+              <a:t>Bei Betriebsprüfungen müssen die aufgezeichneten Daten in einem standardisierten Format – der „Digitalen Schnittstelle der Finanzverwaltung für Kassensysteme” (</a:t>
             </a:r>
             <a:r>
               <a:rPr lang="de-DE" sz="1200" kern="1200" dirty="0" err="1">
@@ -1277,36 +1381,7 @@
                 <a:ea typeface="+mn-ea"/>
                 <a:cs typeface="+mn-cs"/>
               </a:rPr>
-              <a:t>Die wesentlichen Anforderungen ergeben sich direkt aus dem Gesetz (§146a Abgabenord- </a:t>
-            </a:r>
-            <a:endParaRPr lang="de-DE" dirty="0">
-              <a:effectLst/>
-            </a:endParaRPr>
-          </a:p>
-          <a:p>
-            <a:r>
-              <a:rPr lang="de-DE" sz="1200" kern="1200" dirty="0" err="1">
-                <a:solidFill>
-                  <a:schemeClr val="tx1"/>
-                </a:solidFill>
-                <a:effectLst/>
-                <a:latin typeface="+mn-lt"/>
-                <a:ea typeface="+mn-ea"/>
-                <a:cs typeface="+mn-cs"/>
-              </a:rPr>
-              <a:t>nung</a:t>
-            </a:r>
-            <a:r>
-              <a:rPr lang="de-DE" sz="1200" kern="1200" dirty="0">
-                <a:solidFill>
-                  <a:schemeClr val="tx1"/>
-                </a:solidFill>
-                <a:effectLst/>
-                <a:latin typeface="+mn-lt"/>
-                <a:ea typeface="+mn-ea"/>
-                <a:cs typeface="+mn-cs"/>
-              </a:rPr>
-              <a:t>) und der Kassensicherungsverordnung (KassenSichV): </a:t>
+              <a:t>Die wesentlichen Anforderungen ergeben sich direkt aus dem Gesetz (§146a Abgabenordnung) und der Kassensicherungsverordnung (KassenSichV): </a:t>
             </a:r>
             <a:endParaRPr lang="de-DE" dirty="0">
               <a:effectLst/>
@@ -1348,103 +1423,7 @@
                 <a:ea typeface="+mn-ea"/>
                 <a:cs typeface="+mn-cs"/>
               </a:rPr>
-              <a:t>Die </a:t>
-            </a:r>
-            <a:r>
-              <a:rPr lang="de-DE" sz="1200" kern="1200" dirty="0" err="1">
-                <a:solidFill>
-                  <a:schemeClr val="tx1"/>
-                </a:solidFill>
-                <a:effectLst/>
-                <a:latin typeface="+mn-lt"/>
-                <a:ea typeface="+mn-ea"/>
-                <a:cs typeface="+mn-cs"/>
-              </a:rPr>
-              <a:t>Geschäftsvorfälle</a:t>
-            </a:r>
-            <a:r>
-              <a:rPr lang="de-DE" sz="1200" kern="1200" dirty="0">
-                <a:solidFill>
-                  <a:schemeClr val="tx1"/>
-                </a:solidFill>
-                <a:effectLst/>
-                <a:latin typeface="+mn-lt"/>
-                <a:ea typeface="+mn-ea"/>
-                <a:cs typeface="+mn-cs"/>
-              </a:rPr>
-              <a:t> und anderen </a:t>
-            </a:r>
-            <a:r>
-              <a:rPr lang="de-DE" sz="1200" kern="1200" dirty="0" err="1">
-                <a:solidFill>
-                  <a:schemeClr val="tx1"/>
-                </a:solidFill>
-                <a:effectLst/>
-                <a:latin typeface="+mn-lt"/>
-                <a:ea typeface="+mn-ea"/>
-                <a:cs typeface="+mn-cs"/>
-              </a:rPr>
-              <a:t>Vorgänge</a:t>
-            </a:r>
-            <a:r>
-              <a:rPr lang="de-DE" sz="1200" kern="1200" dirty="0">
-                <a:solidFill>
-                  <a:schemeClr val="tx1"/>
-                </a:solidFill>
-                <a:effectLst/>
-                <a:latin typeface="+mn-lt"/>
-                <a:ea typeface="+mn-ea"/>
-                <a:cs typeface="+mn-cs"/>
-              </a:rPr>
-              <a:t> </a:t>
-            </a:r>
-            <a:r>
-              <a:rPr lang="de-DE" sz="1200" kern="1200" dirty="0" err="1">
-                <a:solidFill>
-                  <a:schemeClr val="tx1"/>
-                </a:solidFill>
-                <a:effectLst/>
-                <a:latin typeface="+mn-lt"/>
-                <a:ea typeface="+mn-ea"/>
-                <a:cs typeface="+mn-cs"/>
-              </a:rPr>
-              <a:t>müssen</a:t>
-            </a:r>
-            <a:r>
-              <a:rPr lang="de-DE" sz="1200" kern="1200" dirty="0">
-                <a:solidFill>
-                  <a:schemeClr val="tx1"/>
-                </a:solidFill>
-                <a:effectLst/>
-                <a:latin typeface="+mn-lt"/>
-                <a:ea typeface="+mn-ea"/>
-                <a:cs typeface="+mn-cs"/>
-              </a:rPr>
-              <a:t> einzeln, </a:t>
-            </a:r>
-            <a:r>
-              <a:rPr lang="de-DE" sz="1200" kern="1200" dirty="0" err="1">
-                <a:solidFill>
-                  <a:schemeClr val="tx1"/>
-                </a:solidFill>
-                <a:effectLst/>
-                <a:latin typeface="+mn-lt"/>
-                <a:ea typeface="+mn-ea"/>
-                <a:cs typeface="+mn-cs"/>
-              </a:rPr>
-              <a:t>vollständig</a:t>
-            </a:r>
-            <a:r>
-              <a:rPr lang="de-DE" sz="1200" kern="1200" dirty="0">
-                <a:solidFill>
-                  <a:schemeClr val="tx1"/>
-                </a:solidFill>
-                <a:effectLst/>
-                <a:latin typeface="+mn-lt"/>
-                <a:ea typeface="+mn-ea"/>
-                <a:cs typeface="+mn-cs"/>
-              </a:rPr>
-              <a:t>, richtig, zeitgerecht und geordnet aufgezeichnet werden. </a:t>
+              <a:t>Die Geschäftsvorfälle und anderen Vorgänge müssen einzeln, vollständig, richtig, zeitgerecht und geordnet aufgezeichnet werden. </a:t>
             </a:r>
             <a:endParaRPr lang="de-DE" dirty="0">
               <a:effectLst/>
@@ -1486,31 +1465,7 @@
                 <a:ea typeface="+mn-ea"/>
                 <a:cs typeface="+mn-cs"/>
               </a:rPr>
-              <a:t>Die digitalen Aufzeichnungen sind durch eine zertifizierte technische Sicherheitseinrichtung zu </a:t>
-            </a:r>
-            <a:r>
-              <a:rPr lang="de-DE" sz="1200" kern="1200" dirty="0" err="1">
-                <a:solidFill>
-                  <a:schemeClr val="tx1"/>
-                </a:solidFill>
-                <a:effectLst/>
-                <a:latin typeface="+mn-lt"/>
-                <a:ea typeface="+mn-ea"/>
-                <a:cs typeface="+mn-cs"/>
-              </a:rPr>
-              <a:t>schützen</a:t>
-            </a:r>
-            <a:r>
-              <a:rPr lang="de-DE" sz="1200" kern="1200" dirty="0">
-                <a:solidFill>
-                  <a:schemeClr val="tx1"/>
-                </a:solidFill>
-                <a:effectLst/>
-                <a:latin typeface="+mn-lt"/>
-                <a:ea typeface="+mn-ea"/>
-                <a:cs typeface="+mn-cs"/>
-              </a:rPr>
-              <a:t>. </a:t>
+              <a:t>Die digitalen Aufzeichnungen sind durch eine zertifizierte technische Sicherheitseinrichtung zu schützen. </a:t>
             </a:r>
             <a:endParaRPr lang="de-DE" dirty="0">
               <a:effectLst/>
@@ -1552,79 +1507,7 @@
                 <a:ea typeface="+mn-ea"/>
                 <a:cs typeface="+mn-cs"/>
               </a:rPr>
-              <a:t>Die digitalen Aufzeichnungen sind zu sichern und </a:t>
-            </a:r>
-            <a:r>
-              <a:rPr lang="de-DE" sz="1200" kern="1200" dirty="0" err="1">
-                <a:solidFill>
-                  <a:schemeClr val="tx1"/>
-                </a:solidFill>
-                <a:effectLst/>
-                <a:latin typeface="+mn-lt"/>
-                <a:ea typeface="+mn-ea"/>
-                <a:cs typeface="+mn-cs"/>
-              </a:rPr>
-              <a:t>für</a:t>
-            </a:r>
-            <a:r>
-              <a:rPr lang="de-DE" sz="1200" kern="1200" dirty="0">
-                <a:solidFill>
-                  <a:schemeClr val="tx1"/>
-                </a:solidFill>
-                <a:effectLst/>
-                <a:latin typeface="+mn-lt"/>
-                <a:ea typeface="+mn-ea"/>
-                <a:cs typeface="+mn-cs"/>
-              </a:rPr>
-              <a:t> Kassen-Nachschauen sowie </a:t>
-            </a:r>
-            <a:r>
-              <a:rPr lang="de-DE" sz="1200" kern="1200" dirty="0" err="1">
-                <a:solidFill>
-                  <a:schemeClr val="tx1"/>
-                </a:solidFill>
-                <a:effectLst/>
-                <a:latin typeface="+mn-lt"/>
-                <a:ea typeface="+mn-ea"/>
-                <a:cs typeface="+mn-cs"/>
-              </a:rPr>
-              <a:t>Außenprüfungen</a:t>
-            </a:r>
-            <a:r>
-              <a:rPr lang="de-DE" sz="1200" kern="1200" dirty="0">
-                <a:solidFill>
-                  <a:schemeClr val="tx1"/>
-                </a:solidFill>
-                <a:effectLst/>
-                <a:latin typeface="+mn-lt"/>
-                <a:ea typeface="+mn-ea"/>
-                <a:cs typeface="+mn-cs"/>
-              </a:rPr>
-              <a:t> </a:t>
-            </a:r>
-            <a:r>
-              <a:rPr lang="de-DE" sz="1200" kern="1200" dirty="0" err="1">
-                <a:solidFill>
-                  <a:schemeClr val="tx1"/>
-                </a:solidFill>
-                <a:effectLst/>
-                <a:latin typeface="+mn-lt"/>
-                <a:ea typeface="+mn-ea"/>
-                <a:cs typeface="+mn-cs"/>
-              </a:rPr>
-              <a:t>verfügbar</a:t>
-            </a:r>
-            <a:r>
-              <a:rPr lang="de-DE" sz="1200" kern="1200" dirty="0">
-                <a:solidFill>
-                  <a:schemeClr val="tx1"/>
-                </a:solidFill>
-                <a:effectLst/>
-                <a:latin typeface="+mn-lt"/>
-                <a:ea typeface="+mn-ea"/>
-                <a:cs typeface="+mn-cs"/>
-              </a:rPr>
-              <a:t> zu halten. </a:t>
+              <a:t>Die digitalen Aufzeichnungen sind zu sichern und für Kassen-Nachschauen sowie Außenprüfungen verfügbar zu halten. </a:t>
             </a:r>
             <a:endParaRPr lang="de-DE" dirty="0">
               <a:effectLst/>
@@ -1666,103 +1549,7 @@
                 <a:ea typeface="+mn-ea"/>
                 <a:cs typeface="+mn-cs"/>
               </a:rPr>
-              <a:t>Den am </a:t>
-            </a:r>
-            <a:r>
-              <a:rPr lang="de-DE" sz="1200" kern="1200" dirty="0" err="1">
-                <a:solidFill>
-                  <a:schemeClr val="tx1"/>
-                </a:solidFill>
-                <a:effectLst/>
-                <a:latin typeface="+mn-lt"/>
-                <a:ea typeface="+mn-ea"/>
-                <a:cs typeface="+mn-cs"/>
-              </a:rPr>
-              <a:t>Geschäftsvorfall</a:t>
-            </a:r>
-            <a:r>
-              <a:rPr lang="de-DE" sz="1200" kern="1200" dirty="0">
-                <a:solidFill>
-                  <a:schemeClr val="tx1"/>
-                </a:solidFill>
-                <a:effectLst/>
-                <a:latin typeface="+mn-lt"/>
-                <a:ea typeface="+mn-ea"/>
-                <a:cs typeface="+mn-cs"/>
-              </a:rPr>
-              <a:t> Beteiligten ist ein Beleg </a:t>
-            </a:r>
-            <a:r>
-              <a:rPr lang="de-DE" sz="1200" kern="1200" dirty="0" err="1">
-                <a:solidFill>
-                  <a:schemeClr val="tx1"/>
-                </a:solidFill>
-                <a:effectLst/>
-                <a:latin typeface="+mn-lt"/>
-                <a:ea typeface="+mn-ea"/>
-                <a:cs typeface="+mn-cs"/>
-              </a:rPr>
-              <a:t>über</a:t>
-            </a:r>
-            <a:r>
-              <a:rPr lang="de-DE" sz="1200" kern="1200" dirty="0">
-                <a:solidFill>
-                  <a:schemeClr val="tx1"/>
-                </a:solidFill>
-                <a:effectLst/>
-                <a:latin typeface="+mn-lt"/>
-                <a:ea typeface="+mn-ea"/>
-                <a:cs typeface="+mn-cs"/>
-              </a:rPr>
-              <a:t> den </a:t>
-            </a:r>
-            <a:r>
-              <a:rPr lang="de-DE" sz="1200" kern="1200" dirty="0" err="1">
-                <a:solidFill>
-                  <a:schemeClr val="tx1"/>
-                </a:solidFill>
-                <a:effectLst/>
-                <a:latin typeface="+mn-lt"/>
-                <a:ea typeface="+mn-ea"/>
-                <a:cs typeface="+mn-cs"/>
-              </a:rPr>
-              <a:t>Geschäftsvorfall</a:t>
-            </a:r>
-            <a:r>
-              <a:rPr lang="de-DE" sz="1200" kern="1200" dirty="0">
-                <a:solidFill>
-                  <a:schemeClr val="tx1"/>
-                </a:solidFill>
-                <a:effectLst/>
-                <a:latin typeface="+mn-lt"/>
-                <a:ea typeface="+mn-ea"/>
-                <a:cs typeface="+mn-cs"/>
-              </a:rPr>
-              <a:t> auszustellen und zur </a:t>
-            </a:r>
-            <a:r>
-              <a:rPr lang="de-DE" sz="1200" kern="1200" dirty="0" err="1">
-                <a:solidFill>
-                  <a:schemeClr val="tx1"/>
-                </a:solidFill>
-                <a:effectLst/>
-                <a:latin typeface="+mn-lt"/>
-                <a:ea typeface="+mn-ea"/>
-                <a:cs typeface="+mn-cs"/>
-              </a:rPr>
-              <a:t>Verfügung</a:t>
-            </a:r>
-            <a:r>
-              <a:rPr lang="de-DE" sz="1200" kern="1200" dirty="0">
-                <a:solidFill>
-                  <a:schemeClr val="tx1"/>
-                </a:solidFill>
-                <a:effectLst/>
-                <a:latin typeface="+mn-lt"/>
-                <a:ea typeface="+mn-ea"/>
-                <a:cs typeface="+mn-cs"/>
-              </a:rPr>
-              <a:t> zu stellen. </a:t>
+              <a:t>Den am Geschäftsvorfall Beteiligten ist ein Beleg über den Geschäftsvorfall auszustellen und zur Verfügung zu stellen. </a:t>
             </a:r>
             <a:endParaRPr lang="de-DE" dirty="0">
               <a:effectLst/>
@@ -1804,31 +1591,7 @@
                 <a:ea typeface="+mn-ea"/>
                 <a:cs typeface="+mn-cs"/>
               </a:rPr>
-              <a:t>Dem </a:t>
-            </a:r>
-            <a:r>
-              <a:rPr lang="de-DE" sz="1200" kern="1200" dirty="0" err="1">
-                <a:solidFill>
-                  <a:schemeClr val="tx1"/>
-                </a:solidFill>
-                <a:effectLst/>
-                <a:latin typeface="+mn-lt"/>
-                <a:ea typeface="+mn-ea"/>
-                <a:cs typeface="+mn-cs"/>
-              </a:rPr>
-              <a:t>zuständigen</a:t>
-            </a:r>
-            <a:r>
-              <a:rPr lang="de-DE" sz="1200" kern="1200" dirty="0">
-                <a:solidFill>
-                  <a:schemeClr val="tx1"/>
-                </a:solidFill>
-                <a:effectLst/>
-                <a:latin typeface="+mn-lt"/>
-                <a:ea typeface="+mn-ea"/>
-                <a:cs typeface="+mn-cs"/>
-              </a:rPr>
-              <a:t> Finanzamt muss die Anschaffung und Außerbetriebnahme eines elektronischen Aufzeichnungssystems innerhalb eines Monats mitgeteilt werden. </a:t>
+              <a:t>Dem zuständigen Finanzamt muss die Anschaffung und Außerbetriebnahme eines elektronischen Aufzeichnungssystems innerhalb eines Monats mitgeteilt werden. </a:t>
             </a:r>
             <a:endParaRPr lang="de-DE" dirty="0">
               <a:effectLst/>
@@ -2111,7 +1874,7 @@
             </a:r>
             <a:r>
               <a:rPr lang="de-DE" noProof="0" dirty="0"/>
-              <a:t> Interface ist gleich für alle unterstützen Länder.</a:t>
+              <a:t> Interface ist identisch für alle unterstützen Länder.</a:t>
             </a:r>
           </a:p>
           <a:p>
@@ -2147,13 +1910,13 @@
             </a:r>
             <a:r>
               <a:rPr lang="de-DE" noProof="0" dirty="0"/>
-              <a:t> Interface bietet 3 Methoden: Echo (Verfügbarkeit prüfen), Sign (Signieren der Belegdaten, Absetzen von Sonderbelegen), Journal (Export von Daten)</a:t>
-            </a:r>
-          </a:p>
-          <a:p>
-            <a:r>
-              <a:rPr lang="de-DE" noProof="0" dirty="0"/>
-              <a:t>Die Request werden im </a:t>
+              <a:t> Interface bietet 3 Schnittstellen-Methoden: Echo (Verfügbarkeit prüfen), Sign (Signieren der Belegdaten, Absetzen von Sonderbelegen), Journal (Export von Daten)</a:t>
+            </a:r>
+          </a:p>
+          <a:p>
+            <a:r>
+              <a:rPr lang="de-DE" noProof="0" dirty="0"/>
+              <a:t>Die Requests werden im </a:t>
             </a:r>
             <a:r>
               <a:rPr lang="de-DE" noProof="0" dirty="0" err="1"/>
@@ -2254,27 +2017,19 @@
           <a:p>
             <a:r>
               <a:rPr lang="de-DE" noProof="0" dirty="0"/>
-              <a:t>Kassensystem sendet mit XML oder JSON formatierte Daten über die Sign Methode des IPOS Interface an die ft.Middleware</a:t>
-            </a:r>
-          </a:p>
-          <a:p>
-            <a:r>
-              <a:rPr lang="de-DE" noProof="0" dirty="0"/>
-              <a:t>Die Request-Daten sind in 4 Blöcke aufgeteilt: Request-Headerdaten, Charge-Items, Pay-Items, und Request-</a:t>
-            </a:r>
-            <a:r>
-              <a:rPr lang="de-DE" noProof="0" dirty="0" err="1"/>
-              <a:t>Footerdaten</a:t>
-            </a:r>
-            <a:r>
-              <a:rPr lang="de-DE" noProof="0" dirty="0"/>
-              <a:t>.</a:t>
-            </a:r>
-          </a:p>
-          <a:p>
-            <a:r>
-              <a:rPr lang="de-DE" noProof="0" dirty="0"/>
-              <a:t>Bsp. - Request-Headerdaten: </a:t>
+              <a:t>Das Kassensystem sendet mit XML oder JSON formatierte Daten über die Sign Methode des IPOS Interface an die ft.Middleware</a:t>
+            </a:r>
+          </a:p>
+          <a:p>
+            <a:r>
+              <a:rPr lang="de-DE" noProof="0" dirty="0"/>
+              <a:t>Die Request-Daten sind in 4 Blöcke aufgeteilt: Request-Headerdaten, Charge-Items, Pay-Items, und Request - Footerdaten.</a:t>
+            </a:r>
+          </a:p>
+          <a:p>
+            <a:r>
+              <a:rPr lang="de-DE" noProof="0" dirty="0"/>
+              <a:t>Bsp. – Request - Headerdaten: </a:t>
             </a:r>
             <a:r>
               <a:rPr lang="de-DE" noProof="0" dirty="0" err="1"/>
@@ -2306,18 +2061,13 @@
             </a:r>
             <a:r>
               <a:rPr lang="de-DE" noProof="0" dirty="0"/>
-              <a:t>, </a:t>
-            </a:r>
-            <a:r>
-              <a:rPr lang="de-DE" noProof="0" dirty="0" err="1"/>
-              <a:t>etc</a:t>
-            </a:r>
-            <a:endParaRPr lang="de-DE" noProof="0" dirty="0"/>
-          </a:p>
-          <a:p>
-            <a:r>
-              <a:rPr lang="de-DE" noProof="0" dirty="0"/>
-              <a:t>Bsp. - Charge-Item: 1 Bier, 19% </a:t>
+              <a:t>, etc.</a:t>
+            </a:r>
+          </a:p>
+          <a:p>
+            <a:r>
+              <a:rPr lang="de-DE" noProof="0" dirty="0"/>
+              <a:t>Bsp. – Charge - Item: 1 Bier, 19% </a:t>
             </a:r>
             <a:r>
               <a:rPr lang="de-DE" noProof="0" dirty="0" err="1"/>
@@ -2381,18 +2131,13 @@
             </a:r>
             <a:r>
               <a:rPr lang="de-DE" noProof="0" dirty="0"/>
-              <a:t>, </a:t>
-            </a:r>
-            <a:r>
-              <a:rPr lang="de-DE" noProof="0" dirty="0" err="1"/>
-              <a:t>etc</a:t>
-            </a:r>
-            <a:endParaRPr lang="de-DE" noProof="0" dirty="0"/>
-          </a:p>
-          <a:p>
-            <a:r>
-              <a:rPr lang="de-DE" noProof="0" dirty="0"/>
-              <a:t>Bsp. - Pay-Item: Barzahlung - </a:t>
+              <a:t>, etc.</a:t>
+            </a:r>
+          </a:p>
+          <a:p>
+            <a:r>
+              <a:rPr lang="de-DE" noProof="0" dirty="0"/>
+              <a:t>Bsp. – Pay - Item: Barzahlung - </a:t>
             </a:r>
             <a:r>
               <a:rPr lang="de-DE" noProof="0" dirty="0" err="1"/>
@@ -2416,7 +2161,7 @@
             </a:r>
             <a:r>
               <a:rPr lang="de-DE" noProof="0" dirty="0"/>
-              <a:t> (bar), </a:t>
+              <a:t> (Barzahlung), </a:t>
             </a:r>
             <a:r>
               <a:rPr lang="de-DE" noProof="0" dirty="0" err="1"/>
@@ -2432,26 +2177,13 @@
             </a:r>
             <a:r>
               <a:rPr lang="de-DE" noProof="0" dirty="0"/>
-              <a:t>, </a:t>
-            </a:r>
-            <a:r>
-              <a:rPr lang="de-DE" noProof="0" dirty="0" err="1"/>
-              <a:t>etc</a:t>
-            </a:r>
-            <a:endParaRPr lang="de-DE" noProof="0" dirty="0"/>
-          </a:p>
-          <a:p>
-            <a:r>
-              <a:rPr lang="de-DE" noProof="0" dirty="0"/>
-              <a:t>Bsp. - Request-</a:t>
-            </a:r>
-            <a:r>
-              <a:rPr lang="de-DE" noProof="0" dirty="0" err="1"/>
-              <a:t>Footerdaten</a:t>
-            </a:r>
-            <a:r>
-              <a:rPr lang="de-DE" noProof="0" dirty="0"/>
-              <a:t>: </a:t>
+              <a:t>, etc.</a:t>
+            </a:r>
+          </a:p>
+          <a:p>
+            <a:r>
+              <a:rPr lang="de-DE" noProof="0" dirty="0"/>
+              <a:t>Bsp. – Request - Footerdaten: </a:t>
             </a:r>
             <a:r>
               <a:rPr lang="de-DE" noProof="0" dirty="0" err="1"/>
@@ -2475,7 +2207,7 @@
             </a:r>
             <a:r>
               <a:rPr lang="de-DE" noProof="0" dirty="0"/>
-              <a:t>-receipt, zero-receipt), </a:t>
+              <a:t>-receipt oder zero-receipt), </a:t>
             </a:r>
             <a:r>
               <a:rPr lang="de-DE" noProof="0" dirty="0" err="1"/>
@@ -2499,18 +2231,13 @@
             </a:r>
             <a:r>
               <a:rPr lang="de-DE" noProof="0" dirty="0"/>
-              <a:t>, </a:t>
-            </a:r>
-            <a:r>
-              <a:rPr lang="de-DE" noProof="0" dirty="0" err="1"/>
-              <a:t>etc</a:t>
-            </a:r>
-            <a:endParaRPr lang="de-DE" noProof="0" dirty="0"/>
-          </a:p>
-          <a:p>
-            <a:r>
-              <a:rPr lang="de-DE" noProof="0" dirty="0"/>
-              <a:t>Die Middleware prozessiert die Daten und sendet die Response-Daten </a:t>
+              <a:t>, etc.</a:t>
+            </a:r>
+          </a:p>
+          <a:p>
+            <a:r>
+              <a:rPr lang="de-DE" noProof="0" dirty="0"/>
+              <a:t>Die Middleware prozessiert die Daten und sendet Response-Daten </a:t>
             </a:r>
             <a:r>
               <a:rPr lang="de-DE" b="0" noProof="0" dirty="0"/>
@@ -2522,15 +2249,7 @@
             </a:r>
             <a:r>
               <a:rPr lang="de-DE" b="0" noProof="0" dirty="0"/>
-              <a:t>“ Block. Die hier enthaltenen Daten müssen auf den Beleg gedruckt werden um </a:t>
-            </a:r>
-            <a:r>
-              <a:rPr lang="de-DE" b="0" noProof="0" dirty="0" err="1"/>
-              <a:t>Complience</a:t>
-            </a:r>
-            <a:r>
-              <a:rPr lang="de-DE" b="0" noProof="0" dirty="0"/>
-              <a:t> zu erhalten. </a:t>
+              <a:t>“ Block. Die hier enthaltenen Daten müssen auf den Beleg gedruckt werden um Compliance zu erhalten. </a:t>
             </a:r>
           </a:p>
           <a:p>
@@ -2648,11 +2367,25 @@
             </a:r>
             <a:r>
               <a:rPr lang="de-DE" b="0" noProof="0" dirty="0"/>
-              <a:t>, </a:t>
+              <a:t>, Transaktionsnummer, Signaturzähler, Kassenseriennummer etc. (diese Daten müssen auf den Beleg gedruckt werden)</a:t>
+            </a:r>
+          </a:p>
+          <a:p>
+            <a:r>
+              <a:rPr lang="de-DE" b="0" noProof="0" dirty="0"/>
+              <a:t>Bsp. Response-</a:t>
             </a:r>
             <a:r>
               <a:rPr lang="de-DE" b="0" noProof="0" dirty="0" err="1"/>
-              <a:t>transaktionsnummer</a:t>
+              <a:t>Footerdaten</a:t>
+            </a:r>
+            <a:r>
+              <a:rPr lang="de-DE" b="0" noProof="0" dirty="0"/>
+              <a:t>: </a:t>
+            </a:r>
+            <a:r>
+              <a:rPr lang="de-DE" b="0" noProof="0" dirty="0" err="1"/>
+              <a:t>state</a:t>
             </a:r>
             <a:r>
               <a:rPr lang="de-DE" b="0" noProof="0" dirty="0"/>
@@ -2660,44 +2393,6 @@
             </a:r>
             <a:r>
               <a:rPr lang="de-DE" b="0" noProof="0" dirty="0" err="1"/>
-              <a:t>signaturzähler</a:t>
-            </a:r>
-            <a:r>
-              <a:rPr lang="de-DE" b="0" noProof="0" dirty="0"/>
-              <a:t>, </a:t>
-            </a:r>
-            <a:r>
-              <a:rPr lang="de-DE" b="0" noProof="0" dirty="0" err="1"/>
-              <a:t>kassenseriennummer</a:t>
-            </a:r>
-            <a:r>
-              <a:rPr lang="de-DE" b="0" noProof="0" dirty="0"/>
-              <a:t> etc. (diese Daten müssen auf den Beleg gedruckt werden)</a:t>
-            </a:r>
-          </a:p>
-          <a:p>
-            <a:r>
-              <a:rPr lang="de-DE" b="0" noProof="0" dirty="0"/>
-              <a:t>Bsp. Response-</a:t>
-            </a:r>
-            <a:r>
-              <a:rPr lang="de-DE" b="0" noProof="0" dirty="0" err="1"/>
-              <a:t>Footerdaten</a:t>
-            </a:r>
-            <a:r>
-              <a:rPr lang="de-DE" b="0" noProof="0" dirty="0"/>
-              <a:t>: </a:t>
-            </a:r>
-            <a:r>
-              <a:rPr lang="de-DE" b="0" noProof="0" dirty="0" err="1"/>
-              <a:t>state</a:t>
-            </a:r>
-            <a:r>
-              <a:rPr lang="de-DE" b="0" noProof="0" dirty="0"/>
-              <a:t>, </a:t>
-            </a:r>
-            <a:r>
-              <a:rPr lang="de-DE" b="0" noProof="0" dirty="0" err="1"/>
               <a:t>state-data</a:t>
             </a:r>
             <a:r>
@@ -2710,31 +2405,7 @@
             </a:r>
             <a:r>
               <a:rPr lang="de-DE" b="0" noProof="0" dirty="0"/>
-              <a:t>, </a:t>
-            </a:r>
-            <a:r>
-              <a:rPr lang="de-DE" b="0" noProof="0" dirty="0" err="1"/>
-              <a:t>z.b.</a:t>
-            </a:r>
-            <a:r>
-              <a:rPr lang="de-DE" b="0" noProof="0" dirty="0"/>
-              <a:t> ok oder </a:t>
-            </a:r>
-            <a:r>
-              <a:rPr lang="de-DE" b="0" noProof="0" dirty="0" err="1"/>
-              <a:t>tse</a:t>
-            </a:r>
-            <a:r>
-              <a:rPr lang="de-DE" b="0" noProof="0" dirty="0"/>
-              <a:t> nicht erreichbar, </a:t>
-            </a:r>
-            <a:r>
-              <a:rPr lang="de-DE" b="0" noProof="0" dirty="0" err="1"/>
-              <a:t>etc</a:t>
-            </a:r>
-            <a:r>
-              <a:rPr lang="de-DE" b="0" noProof="0" dirty="0"/>
-              <a:t>)</a:t>
+              <a:t>, z.B. ok oder TSE nicht erreichbar, etc.)</a:t>
             </a:r>
           </a:p>
           <a:p>
@@ -2851,15 +2522,7 @@
             </a:r>
             <a:r>
               <a:rPr lang="de-DE" noProof="0" dirty="0"/>
-              <a:t> für den </a:t>
-            </a:r>
-            <a:r>
-              <a:rPr lang="de-DE" noProof="0" dirty="0" err="1"/>
-              <a:t>request</a:t>
-            </a:r>
-            <a:r>
-              <a:rPr lang="de-DE" noProof="0" dirty="0"/>
-              <a:t>. </a:t>
+              <a:t> für den Request. </a:t>
             </a:r>
           </a:p>
           <a:p>
@@ -2868,23 +2531,7 @@
             </a:pPr>
             <a:r>
               <a:rPr lang="de-DE" noProof="0" dirty="0"/>
-              <a:t>Das POS-System sollte die Daten lokal persistieren. Die </a:t>
-            </a:r>
-            <a:r>
-              <a:rPr lang="de-DE" noProof="0" dirty="0" err="1"/>
-              <a:t>Persistierung</a:t>
-            </a:r>
-            <a:r>
-              <a:rPr lang="de-DE" noProof="0" dirty="0"/>
-              <a:t> der Daten ist wichtig, weil die Request Daten nicht von der Middleware zurückgesendet werden. Zudem ist die lokale Archivierung wichtig für den Fall, dass die </a:t>
-            </a:r>
-            <a:r>
-              <a:rPr lang="de-DE" noProof="0" dirty="0" err="1"/>
-              <a:t>fisklatrust</a:t>
-            </a:r>
-            <a:r>
-              <a:rPr lang="de-DE" noProof="0" dirty="0"/>
-              <a:t> Archivierung nicht verfügbar ist.</a:t>
+              <a:t>Das POS-System sollte die Daten lokal persistieren. Das Persistieren der Daten ist wichtig, weil die Request Daten nicht von der Middleware zurückgesendet werden. Zudem ist die lokale Archivierung wichtig für den Fall, dass die fiskaltrust Archivierung nicht verfügbar ist.</a:t>
             </a:r>
           </a:p>
           <a:p>
@@ -2893,7 +2540,7 @@
             </a:pPr>
             <a:r>
               <a:rPr lang="de-DE" noProof="0" dirty="0"/>
-              <a:t>Das POS-System baut den Request zusammen und sendet die Daten an die Sign-Methode der ft.Middleware.</a:t>
+              <a:t>Das POS-System baut den Request auf und sendet die Daten an die Sign-Methode der ft.Middleware.</a:t>
             </a:r>
           </a:p>
           <a:p>
@@ -2911,15 +2558,7 @@
             </a:pPr>
             <a:r>
               <a:rPr lang="de-DE" noProof="0" dirty="0"/>
-              <a:t>Im Falle eines Request, der signiert werden muss, werden die relevanten Daten an die angeschossenen TSE </a:t>
-            </a:r>
-            <a:r>
-              <a:rPr lang="de-DE" noProof="0" dirty="0" err="1"/>
-              <a:t>gesendent</a:t>
-            </a:r>
-            <a:r>
-              <a:rPr lang="de-DE" noProof="0" dirty="0"/>
-              <a:t> und von dieser signiert. (Im Falle eines Sonderbelegs werden die Daten nicht signiert - siehe dazu nächste Folie)</a:t>
+              <a:t>Im Falle eines Request, der signiert werden muss, werden die relevanten Daten an die angeschossenen TSE gesendet und von dieser signiert. (Im Falle eines Sonderbelegs werden die Daten nicht von der TSE signiert - siehe dazu nächste Folie)</a:t>
             </a:r>
           </a:p>
           <a:p>
@@ -2928,7 +2567,7 @@
             </a:pPr>
             <a:r>
               <a:rPr lang="de-DE" noProof="0" dirty="0"/>
-              <a:t>Die Daten werden von der Middleware persistiert und alle 5 Sekunden an den fiskaltrust </a:t>
+              <a:t>Die Daten werden von der Middleware persistiert und alle 5 Sekunden an den fiskaltrust „</a:t>
             </a:r>
             <a:r>
               <a:rPr lang="de-DE" noProof="0" dirty="0" err="1"/>
@@ -2936,7 +2575,7 @@
             </a:r>
             <a:r>
               <a:rPr lang="de-DE" noProof="0" dirty="0"/>
-              <a:t> Server zur Archivierung gesendet.</a:t>
+              <a:t>“ Server zur Archivierung gesendet.</a:t>
             </a:r>
           </a:p>
           <a:p>
@@ -2945,7 +2584,7 @@
             </a:pPr>
             <a:r>
               <a:rPr lang="de-DE" noProof="0" dirty="0"/>
-              <a:t>Der Response wird zusammengebaut und zurück an das POS-System gesendet (der Response beinhaltet wichtige Daten, die auf den Beleg gedruckt werden müssen)</a:t>
+              <a:t>Der Response wird aufgebaut und zurück an das POS-System gesendet (der Response beinhaltet wichtige Daten, die auf den Beleg gedruckt werden müssen)</a:t>
             </a:r>
           </a:p>
           <a:p>
@@ -3059,23 +2698,15 @@
           <a:p>
             <a:r>
               <a:rPr lang="de-DE" noProof="0" dirty="0"/>
-              <a:t>Sonderbelege führen Funktionalität aus. Z.B. Initialisierung der TSE, </a:t>
+              <a:t>Sonderbelege führen Funktionalität aus. Z.B. Initialisierung der TSE, Tagesabschuss, </a:t>
             </a:r>
             <a:r>
               <a:rPr lang="de-DE" noProof="0" dirty="0" err="1"/>
-              <a:t>Tagesabschuß</a:t>
-            </a:r>
-            <a:r>
-              <a:rPr lang="de-DE" noProof="0" dirty="0"/>
-              <a:t>, </a:t>
-            </a:r>
-            <a:r>
-              <a:rPr lang="de-DE" noProof="0" dirty="0" err="1"/>
-              <a:t>Monatsabschluß</a:t>
-            </a:r>
-            <a:r>
-              <a:rPr lang="de-DE" noProof="0" dirty="0"/>
-              <a:t>, etc. Sie werden immer über einen </a:t>
+              <a:t>Monatsabschlss</a:t>
+            </a:r>
+            <a:r>
+              <a:rPr lang="de-DE" noProof="0" dirty="0"/>
+              <a:t>, etc. Sie werden immer über einen Request mit dem receipt-</a:t>
             </a:r>
             <a:r>
               <a:rPr lang="de-DE" noProof="0" dirty="0" err="1"/>
@@ -3083,14 +2714,6 @@
             </a:r>
             <a:r>
               <a:rPr lang="de-DE" noProof="0" dirty="0"/>
-              <a:t> mit dem receipt-</a:t>
-            </a:r>
-            <a:r>
-              <a:rPr lang="de-DE" noProof="0" dirty="0" err="1"/>
-              <a:t>request</a:t>
-            </a:r>
-            <a:r>
-              <a:rPr lang="de-DE" noProof="0" dirty="0"/>
               <a:t>-</a:t>
             </a:r>
             <a:r>
@@ -3107,15 +2730,7 @@
             </a:r>
             <a:r>
               <a:rPr lang="de-DE" noProof="0" dirty="0"/>
-              <a:t> receipt“ also Nullbeleg an die </a:t>
-            </a:r>
-            <a:r>
-              <a:rPr lang="de-DE" noProof="0" dirty="0" err="1"/>
-              <a:t>fisklatrust</a:t>
-            </a:r>
-            <a:r>
-              <a:rPr lang="de-DE" noProof="0" dirty="0"/>
-              <a:t> Middleware gesendet.</a:t>
+              <a:t> receipt“ also Nullbeleg an die fiskaltrust Middleware gesendet.</a:t>
             </a:r>
           </a:p>
           <a:p>
@@ -3136,23 +2751,7 @@
             </a:pPr>
             <a:r>
               <a:rPr lang="de-DE" noProof="0" dirty="0"/>
-              <a:t>Das POS-System sollte die Daten lokal persistieren. Die </a:t>
-            </a:r>
-            <a:r>
-              <a:rPr lang="de-DE" noProof="0" dirty="0" err="1"/>
-              <a:t>Persistierung</a:t>
-            </a:r>
-            <a:r>
-              <a:rPr lang="de-DE" noProof="0" dirty="0"/>
-              <a:t> der Daten ist wichtig, weil die Request Daten nicht von der Middleware zurückgesendet werden. Zudem ist die lokale Archivierung wichtig für den Fall, dass die </a:t>
-            </a:r>
-            <a:r>
-              <a:rPr lang="de-DE" noProof="0" dirty="0" err="1"/>
-              <a:t>fisklatrust</a:t>
-            </a:r>
-            <a:r>
-              <a:rPr lang="de-DE" noProof="0" dirty="0"/>
-              <a:t> Archivierung nicht verfügbar ist.</a:t>
+              <a:t>Das POS-System sollte die Daten lokal persistieren. Das Persistieren der Daten ist wichtig, weil die Request Daten nicht von der Middleware zurückgesendet werden. Zudem ist die lokale Archivierung wichtig für den Fall, dass die fiskaltrust Archivierung nicht verfügbar ist.</a:t>
             </a:r>
           </a:p>
           <a:p>
@@ -3179,7 +2778,7 @@
             </a:pPr>
             <a:r>
               <a:rPr lang="de-DE" noProof="0" dirty="0"/>
-              <a:t>Im Falle eines Sonderbelegs werden die Daten nicht signiert – die angeforderte Funktionalität wird ausgeführt.</a:t>
+              <a:t>Im Falle eines Sonderbelegs werden die Daten nicht signiert – die angeforderte Funktionalität wird stattdessen ausgeführt.</a:t>
             </a:r>
           </a:p>
           <a:p>
@@ -3188,15 +2787,15 @@
             </a:pPr>
             <a:r>
               <a:rPr lang="de-DE" noProof="0" dirty="0"/>
-              <a:t>Das Ergebnis der </a:t>
+              <a:t>Das Ergebnis der ausgeführten Funktionalität wird von der Middleware in den „</a:t>
             </a:r>
             <a:r>
               <a:rPr lang="de-DE" noProof="0" dirty="0" err="1"/>
-              <a:t>getriggerten</a:t>
-            </a:r>
-            <a:r>
-              <a:rPr lang="de-DE" noProof="0" dirty="0"/>
-              <a:t> Funktionalität wird von der Middleware in den Signaturblock gepackt</a:t>
+              <a:t>Signatures</a:t>
+            </a:r>
+            <a:r>
+              <a:rPr lang="de-DE" noProof="0" dirty="0"/>
+              <a:t>“ Block gepackt</a:t>
             </a:r>
           </a:p>
           <a:p>
@@ -3205,7 +2804,7 @@
             </a:pPr>
             <a:r>
               <a:rPr lang="de-DE" noProof="0" dirty="0"/>
-              <a:t>Der Response wird zusammengebaut und zurück an das POS-System gesendet</a:t>
+              <a:t>Der Response wird erstellt und zurück an das POS-System gesendet</a:t>
             </a:r>
           </a:p>
           <a:p>
@@ -3214,7 +2813,7 @@
             </a:pPr>
             <a:r>
               <a:rPr lang="de-DE" noProof="0" dirty="0"/>
-              <a:t>Das Pos-System erhält den Response und prozessiert die darin enthaltenen Daten</a:t>
+              <a:t>Das POS-System erhält den Response und prozessiert die darin enthaltenen Daten</a:t>
             </a:r>
           </a:p>
           <a:p>
@@ -6758,10 +6357,10 @@
       </p:sp>
       <p:pic>
         <p:nvPicPr>
-          <p:cNvPr id="5" name="Content Placeholder 4">
-            <a:extLst>
-              <a:ext uri="{FF2B5EF4-FFF2-40B4-BE49-F238E27FC236}">
-                <a16:creationId xmlns:a16="http://schemas.microsoft.com/office/drawing/2014/main" id="{AAD9D593-4D41-3A4A-9513-9042BB107570}"/>
+          <p:cNvPr id="7" name="Content Placeholder 6">
+            <a:extLst>
+              <a:ext uri="{FF2B5EF4-FFF2-40B4-BE49-F238E27FC236}">
+                <a16:creationId xmlns:a16="http://schemas.microsoft.com/office/drawing/2014/main" id="{A614244B-EB3D-0B4C-A340-EAB66BCB9128}"/>
               </a:ext>
             </a:extLst>
           </p:cNvPr>
@@ -6779,8 +6378,8 @@
         </p:blipFill>
         <p:spPr>
           <a:xfrm>
-            <a:off x="975487" y="1690688"/>
-            <a:ext cx="8508238" cy="4613402"/>
+            <a:off x="838200" y="1506162"/>
+            <a:ext cx="9129600" cy="4618966"/>
           </a:xfrm>
         </p:spPr>
       </p:pic>
@@ -6878,8 +6477,8 @@
         </p:blipFill>
         <p:spPr>
           <a:xfrm>
-            <a:off x="975487" y="1690688"/>
-            <a:ext cx="8508238" cy="4613402"/>
+            <a:off x="1757259" y="1690688"/>
+            <a:ext cx="6944694" cy="4613402"/>
           </a:xfrm>
         </p:spPr>
       </p:pic>
@@ -6887,6 +6486,105 @@
     <p:extLst>
       <p:ext uri="{BB962C8B-B14F-4D97-AF65-F5344CB8AC3E}">
         <p14:creationId xmlns:p14="http://schemas.microsoft.com/office/powerpoint/2010/main" val="3352848026"/>
+      </p:ext>
+    </p:extLst>
+  </p:cSld>
+  <p:clrMapOvr>
+    <a:masterClrMapping/>
+  </p:clrMapOvr>
+</p:sld>
+</file>
+
+<file path=ppt/slides/slide13.xml><?xml version="1.0" encoding="utf-8"?>
+<p:sld xmlns:a="http://schemas.openxmlformats.org/drawingml/2006/main" xmlns:r="http://schemas.openxmlformats.org/officeDocument/2006/relationships" xmlns:p="http://schemas.openxmlformats.org/presentationml/2006/main">
+  <p:cSld>
+    <p:spTree>
+      <p:nvGrpSpPr>
+        <p:cNvPr id="1" name=""/>
+        <p:cNvGrpSpPr/>
+        <p:nvPr/>
+      </p:nvGrpSpPr>
+      <p:grpSpPr>
+        <a:xfrm>
+          <a:off x="0" y="0"/>
+          <a:ext cx="0" cy="0"/>
+          <a:chOff x="0" y="0"/>
+          <a:chExt cx="0" cy="0"/>
+        </a:xfrm>
+      </p:grpSpPr>
+      <p:sp>
+        <p:nvSpPr>
+          <p:cNvPr id="2" name="Title 1">
+            <a:extLst>
+              <a:ext uri="{FF2B5EF4-FFF2-40B4-BE49-F238E27FC236}">
+                <a16:creationId xmlns:a16="http://schemas.microsoft.com/office/drawing/2014/main" id="{49C250B6-F0EB-477C-AB99-C3DD2BE9A656}"/>
+              </a:ext>
+            </a:extLst>
+          </p:cNvPr>
+          <p:cNvSpPr>
+            <a:spLocks noGrp="1"/>
+          </p:cNvSpPr>
+          <p:nvPr>
+            <p:ph type="title"/>
+          </p:nvPr>
+        </p:nvSpPr>
+        <p:spPr/>
+        <p:txBody>
+          <a:bodyPr>
+            <a:normAutofit/>
+          </a:bodyPr>
+          <a:lstStyle/>
+          <a:p>
+            <a:r>
+              <a:rPr lang="de-DE" sz="2800" dirty="0"/>
+              <a:t>Datenfluss im Fehlerfall</a:t>
+            </a:r>
+            <a:br>
+              <a:rPr lang="de-DE" sz="2800" dirty="0"/>
+            </a:br>
+            <a:r>
+              <a:rPr lang="de-DE" sz="2000" dirty="0"/>
+              <a:t>(ft.Middleware fällt aus)</a:t>
+            </a:r>
+            <a:br>
+              <a:rPr lang="de-DE" sz="2800" dirty="0"/>
+            </a:br>
+            <a:endParaRPr lang="de-DE" sz="2800" dirty="0"/>
+          </a:p>
+        </p:txBody>
+      </p:sp>
+      <p:pic>
+        <p:nvPicPr>
+          <p:cNvPr id="5" name="Content Placeholder 4">
+            <a:extLst>
+              <a:ext uri="{FF2B5EF4-FFF2-40B4-BE49-F238E27FC236}">
+                <a16:creationId xmlns:a16="http://schemas.microsoft.com/office/drawing/2014/main" id="{AAD9D593-4D41-3A4A-9513-9042BB107570}"/>
+              </a:ext>
+            </a:extLst>
+          </p:cNvPr>
+          <p:cNvPicPr>
+            <a:picLocks noGrp="1" noChangeAspect="1"/>
+          </p:cNvPicPr>
+          <p:nvPr>
+            <p:ph idx="1"/>
+          </p:nvPr>
+        </p:nvPicPr>
+        <p:blipFill>
+          <a:blip r:embed="rId3"/>
+          <a:srcRect/>
+          <a:stretch/>
+        </p:blipFill>
+        <p:spPr>
+          <a:xfrm>
+            <a:off x="1757259" y="1690688"/>
+            <a:ext cx="6944694" cy="4613402"/>
+          </a:xfrm>
+        </p:spPr>
+      </p:pic>
+    </p:spTree>
+    <p:extLst>
+      <p:ext uri="{BB962C8B-B14F-4D97-AF65-F5344CB8AC3E}">
+        <p14:creationId xmlns:p14="http://schemas.microsoft.com/office/powerpoint/2010/main" val="1244143160"/>
       </p:ext>
     </p:extLst>
   </p:cSld>
@@ -7368,7 +7066,7 @@
           <a:p>
             <a:r>
               <a:rPr lang="de-DE" dirty="0"/>
-              <a:t>Anbindung aller TSE-Lösungen</a:t>
+              <a:t>In Deutschland: Anbindung aller TSE-Lösungen</a:t>
             </a:r>
           </a:p>
           <a:p>
@@ -7489,45 +7187,13 @@
           <a:p>
             <a:r>
               <a:rPr lang="de-DE" dirty="0"/>
-              <a:t>erleichtert die „</a:t>
-            </a:r>
-            <a:r>
-              <a:rPr lang="de-DE" dirty="0" err="1"/>
-              <a:t>make</a:t>
-            </a:r>
+              <a:t>erleichtert die „make or buy“ Entscheidung</a:t>
+            </a:r>
+          </a:p>
+          <a:p>
             <a:r>
               <a:rPr lang="de-DE" dirty="0"/>
-              <a:t> </a:t>
-            </a:r>
-            <a:r>
-              <a:rPr lang="de-DE" dirty="0" err="1"/>
-              <a:t>or</a:t>
-            </a:r>
-            <a:r>
-              <a:rPr lang="de-DE" dirty="0"/>
-              <a:t> </a:t>
-            </a:r>
-            <a:r>
-              <a:rPr lang="de-DE" dirty="0" err="1"/>
-              <a:t>buy</a:t>
-            </a:r>
-            <a:r>
-              <a:rPr lang="de-DE" dirty="0"/>
-              <a:t>“ Entscheidung</a:t>
-            </a:r>
-          </a:p>
-          <a:p>
-            <a:r>
-              <a:rPr lang="de-DE" dirty="0"/>
-              <a:t>fiskaltrust bietet über Kassenhändler </a:t>
-            </a:r>
-            <a:r>
-              <a:rPr lang="de-DE" dirty="0" err="1"/>
-              <a:t>Fiskalisierungsprodukte</a:t>
-            </a:r>
-            <a:r>
-              <a:rPr lang="de-DE" dirty="0"/>
-              <a:t> für Kassenbetreiber an, z.B.:</a:t>
+              <a:t>fiskaltrust bietet dafür über Kassenhändler Fiskalisierungsprodukte für Kassenbetreiber an, z.B.:</a:t>
             </a:r>
           </a:p>
           <a:p>

</xml_diff>

<commit_message>
work on pos-creator onboarding
</commit_message>
<xml_diff>
--- a/for-poscreators/presentation/onboarding_de.pptx
+++ b/for-poscreators/presentation/onboarding_de.pptx
@@ -5,7 +5,7 @@
     <p:sldMasterId id="2147483648" r:id="rId1"/>
   </p:sldMasterIdLst>
   <p:notesMasterIdLst>
-    <p:notesMasterId r:id="rId15"/>
+    <p:notesMasterId r:id="rId17"/>
   </p:notesMasterIdLst>
   <p:sldIdLst>
     <p:sldId id="256" r:id="rId2"/>
@@ -19,8 +19,10 @@
     <p:sldId id="293" r:id="rId10"/>
     <p:sldId id="295" r:id="rId11"/>
     <p:sldId id="296" r:id="rId12"/>
-    <p:sldId id="297" r:id="rId13"/>
-    <p:sldId id="299" r:id="rId14"/>
+    <p:sldId id="301" r:id="rId13"/>
+    <p:sldId id="297" r:id="rId14"/>
+    <p:sldId id="299" r:id="rId15"/>
+    <p:sldId id="300" r:id="rId16"/>
   </p:sldIdLst>
   <p:sldSz cx="12192000" cy="6858000"/>
   <p:notesSz cx="6858000" cy="9144000"/>
@@ -209,7 +211,7 @@
           <a:p>
             <a:fld id="{F2594EC8-14C7-C244-BB5F-14DF0BFDF1DB}" type="datetimeFigureOut">
               <a:rPr lang="en-US" smtClean="0"/>
-              <a:t>8/17/20</a:t>
+              <a:t>8/18/20</a:t>
             </a:fld>
             <a:endParaRPr lang="en-US"/>
           </a:p>
@@ -607,15 +609,7 @@
           <a:p>
             <a:r>
               <a:rPr lang="de-DE" noProof="0" dirty="0"/>
-              <a:t>Fällt die TSE aus, so kann das POS-System weiter betrieben werden bis die TSE wieder angebunden wird. Die Requests werden in diesem Fall weiter an die </a:t>
-            </a:r>
-            <a:r>
-              <a:rPr lang="de-DE" noProof="0" dirty="0" err="1"/>
-              <a:t>fiskaltrust.Middleware</a:t>
-            </a:r>
-            <a:r>
-              <a:rPr lang="de-DE" noProof="0" dirty="0"/>
-              <a:t> gesendet.</a:t>
+              <a:t>Fällt die Kommunikation mit der TSE aus, so kann das POS-System weiter betrieben werden bis die TSE wieder erreichbar ist. Die Requests werden in diesem Fall weiter an die ft.Middleware gesendet.</a:t>
             </a:r>
           </a:p>
           <a:p>
@@ -627,31 +621,7 @@
             </a:pPr>
             <a:r>
               <a:rPr lang="de-DE" noProof="0" dirty="0"/>
-              <a:t>Das POS-System sammelt die </a:t>
-            </a:r>
-            <a:r>
-              <a:rPr lang="de-DE" noProof="0" dirty="0" err="1"/>
-              <a:t>charge</a:t>
-            </a:r>
-            <a:r>
-              <a:rPr lang="de-DE" noProof="0" dirty="0"/>
-              <a:t> und </a:t>
-            </a:r>
-            <a:r>
-              <a:rPr lang="de-DE" noProof="0" dirty="0" err="1"/>
-              <a:t>pay</a:t>
-            </a:r>
-            <a:r>
-              <a:rPr lang="de-DE" noProof="0" dirty="0"/>
-              <a:t> </a:t>
-            </a:r>
-            <a:r>
-              <a:rPr lang="de-DE" noProof="0" dirty="0" err="1"/>
-              <a:t>items</a:t>
-            </a:r>
-            <a:r>
-              <a:rPr lang="de-DE" noProof="0" dirty="0"/>
-              <a:t> für den Request. </a:t>
+              <a:t>Das POS-System sammelt die Charge- und PayItems für den Request. </a:t>
             </a:r>
           </a:p>
           <a:p>
@@ -660,7 +630,7 @@
             </a:pPr>
             <a:r>
               <a:rPr lang="de-DE" noProof="0" dirty="0"/>
-              <a:t>Das POS-System sollte die Daten lokal persistieren. Das Persistieren der Daten ist wichtig, weil die Request Daten nicht von der Middleware zurückgesendet werden. Zudem ist die lokale Archivierung wichtig für den Fall, dass die fiskaltrust Archivierung nicht verfügbar ist.</a:t>
+              <a:t>Das POS-System persistiert lokal die Daten.</a:t>
             </a:r>
           </a:p>
           <a:p>
@@ -678,7 +648,7 @@
             </a:pPr>
             <a:r>
               <a:rPr lang="de-DE" noProof="0" dirty="0"/>
-              <a:t>Die fiskaltrust Middleware prozessiert die Daten, verkettet diese mit Hilfe des internen Security Mechanismus und entscheidet wie sie weiter behandelt werden sollen</a:t>
+              <a:t>Die ft.Middleware prozessiert die Daten, verkettet diese mit Hilfe des internen Security Mechanismus und entscheidet wie sie weiter behandelt werden sollen</a:t>
             </a:r>
           </a:p>
           <a:p>
@@ -739,7 +709,7 @@
             </a:pPr>
             <a:r>
               <a:rPr lang="de-DE" noProof="0" dirty="0"/>
-              <a:t>Das Pos-System erhält den Response und prozessiert die darin enthaltenen Daten</a:t>
+              <a:t>Das POS-System erhält den Response und prozessiert die darin enthaltenen Daten</a:t>
             </a:r>
           </a:p>
           <a:p>
@@ -748,7 +718,7 @@
             </a:pPr>
             <a:r>
               <a:rPr lang="de-DE" noProof="0" dirty="0"/>
-              <a:t>Die erhaltenen Daten werden lokal vom POS-System persistiert (siehe dazu auch Pkt. 2)</a:t>
+              <a:t>Die erhaltenen Daten werden lokal vom POS-System persistiert.</a:t>
             </a:r>
           </a:p>
           <a:p>
@@ -757,11 +727,23 @@
             </a:pPr>
             <a:r>
               <a:rPr lang="de-DE" noProof="0" dirty="0"/>
-              <a:t>Der Beleg wird erstellt und gedruckt (er enthält die Daten aus dem Signatur-Block des Response inkl. Der Notiz, dass die TSE ausgefallen ist)</a:t>
+              <a:t>Der Beleg wird erstellt und gedruckt (er enthält die Daten aus dem Signatur-Block des Response inkl. Der Notiz, dass die TSE Kommunikation ausgefallen ist)</a:t>
             </a:r>
           </a:p>
           <a:p>
             <a:endParaRPr lang="de-DE" noProof="0" dirty="0"/>
+          </a:p>
+          <a:p>
+            <a:r>
+              <a:rPr lang="de-DE" noProof="0" dirty="0"/>
+              <a:t>Wichtig: </a:t>
+            </a:r>
+          </a:p>
+          <a:p>
+            <a:r>
+              <a:rPr lang="de-DE" noProof="0" dirty="0"/>
+              <a:t>Kann die Kommunikation mit der TSE nicht wieder hergestellt werden, da zum Beispiel die TSE defekt ist oder entwendet wurde, so muss der Vorfall dokumentiert werden, und ein neues Setup mit einer neuen TSE aufgebaut werden. Dabei muss die ft.Middleware über das Portal neu konfiguriert und ausgerollt werden. Eine entsprechende Meldung an das Finanzamt ist vorzunehmen.</a:t>
+            </a:r>
           </a:p>
         </p:txBody>
       </p:sp>
@@ -847,7 +829,23 @@
           <a:p>
             <a:r>
               <a:rPr lang="de-DE" noProof="0" dirty="0"/>
-              <a:t>In diesem Fall kann die Middleware von dem POS-System nicht erreicht werden. Die Daten müssen markiert werden um später wieder an die Middleware gesendet zu werden. Auf den Beleg muss der Hinweis gedruckt werden, dass der Sicherheitsmechanismus ausgefallen ist. </a:t>
+              <a:t>Sobald die TSE wieder erreichbar ist, muss das POS-System einen Nullbeleg an die ft.Middleware senden. Diese versucht daraufhin die Kommunikation mit der TSE wiederherzustellen. Klappt die Kommunikation weiterhin nicht, so wird weiterhin der </a:t>
+            </a:r>
+            <a:r>
+              <a:rPr lang="de-DE" noProof="0" dirty="0" err="1"/>
+              <a:t>ftState</a:t>
+            </a:r>
+            <a:r>
+              <a:rPr lang="de-DE" noProof="0" dirty="0"/>
+              <a:t> =  0x02 (TSE Kommunikation ausgefallen) im Response zurückgegeben. Klappt die Kommunikation nun wieder, so wird an das POS-System der </a:t>
+            </a:r>
+            <a:r>
+              <a:rPr lang="de-DE" noProof="0" dirty="0" err="1"/>
+              <a:t>ftState</a:t>
+            </a:r>
+            <a:r>
+              <a:rPr lang="de-DE" noProof="0" dirty="0"/>
+              <a:t> = 0x00 (ok) über den Response zurückgegeben und die ft.Middleware ist wieder bereit für den Normalbetrieb. Des Weiteren beinhaltet der Response ein Listing der Requests, die nicht von der TSE signiert wurden.</a:t>
             </a:r>
           </a:p>
         </p:txBody>
@@ -878,7 +876,7 @@
     </p:spTree>
     <p:extLst>
       <p:ext uri="{BB962C8B-B14F-4D97-AF65-F5344CB8AC3E}">
-        <p14:creationId xmlns:p14="http://schemas.microsoft.com/office/powerpoint/2010/main" val="999188407"/>
+        <p14:creationId xmlns:p14="http://schemas.microsoft.com/office/powerpoint/2010/main" val="2918381763"/>
       </p:ext>
     </p:extLst>
   </p:cSld>
@@ -934,80 +932,19 @@
           <a:p>
             <a:r>
               <a:rPr lang="de-DE" noProof="0" dirty="0"/>
-              <a:t>Zum späteren Zeitpunkt werden im sogenannten „</a:t>
-            </a:r>
-            <a:r>
-              <a:rPr lang="de-DE" noProof="0" dirty="0" err="1"/>
-              <a:t>Late</a:t>
-            </a:r>
+              <a:t>In diesem Fall kann die ft.Middleware von dem POS-System nicht erreicht werden:</a:t>
+            </a:r>
+          </a:p>
+          <a:p>
             <a:r>
               <a:rPr lang="de-DE" noProof="0" dirty="0"/>
-              <a:t> </a:t>
-            </a:r>
-            <a:r>
-              <a:rPr lang="de-DE" noProof="0" dirty="0" err="1"/>
-              <a:t>Signing</a:t>
-            </a:r>
+              <a:t>4. Die Requests müssen markiert werden um später wieder an die ft.Middleware gesendet zu werden. </a:t>
+            </a:r>
+          </a:p>
+          <a:p>
             <a:r>
               <a:rPr lang="de-DE" noProof="0" dirty="0"/>
-              <a:t> Mode“ die zuvor zum Wiederholen markierten Requests an die Middleware gesendet. Jeder Request wird dabei über ein Flag markiert (</a:t>
-            </a:r>
-            <a:r>
-              <a:rPr lang="de-DE" noProof="0" dirty="0" err="1"/>
-              <a:t>ftReceiptCase</a:t>
-            </a:r>
-            <a:r>
-              <a:rPr lang="de-DE" noProof="0" dirty="0"/>
-              <a:t> + „receipt </a:t>
-            </a:r>
-            <a:r>
-              <a:rPr lang="de-DE" noProof="0" dirty="0" err="1"/>
-              <a:t>failed</a:t>
-            </a:r>
-            <a:r>
-              <a:rPr lang="de-DE" noProof="0" dirty="0"/>
-              <a:t>“ Flag).</a:t>
-            </a:r>
-          </a:p>
-          <a:p>
-            <a:endParaRPr lang="de-DE" noProof="0" dirty="0"/>
-          </a:p>
-          <a:p>
-            <a:r>
-              <a:rPr lang="de-DE" noProof="0" dirty="0"/>
-              <a:t>Sobald die Middleware den ersten markierten Request erhält wechselt sie in den „</a:t>
-            </a:r>
-            <a:r>
-              <a:rPr lang="de-DE" noProof="0" dirty="0" err="1"/>
-              <a:t>Late</a:t>
-            </a:r>
-            <a:r>
-              <a:rPr lang="de-DE" noProof="0" dirty="0"/>
-              <a:t> </a:t>
-            </a:r>
-            <a:r>
-              <a:rPr lang="de-DE" noProof="0" dirty="0" err="1"/>
-              <a:t>Signing</a:t>
-            </a:r>
-            <a:r>
-              <a:rPr lang="de-DE" noProof="0" dirty="0"/>
-              <a:t> Mode“. Es können nun vom POS-System weitere Requests in diesem Modus gesendet werden. Um den „</a:t>
-            </a:r>
-            <a:r>
-              <a:rPr lang="de-DE" noProof="0" dirty="0" err="1"/>
-              <a:t>Late</a:t>
-            </a:r>
-            <a:r>
-              <a:rPr lang="de-DE" noProof="0" dirty="0"/>
-              <a:t> </a:t>
-            </a:r>
-            <a:r>
-              <a:rPr lang="de-DE" noProof="0" dirty="0" err="1"/>
-              <a:t>Signing</a:t>
-            </a:r>
-            <a:r>
-              <a:rPr lang="de-DE" noProof="0" dirty="0"/>
-              <a:t> Mode“ zu verlassen muss das POS-System einen Nullbeleg an die Middleware senden. </a:t>
+              <a:t>6. Auf den Beleg muss der Hinweis gedruckt werden, dass der Sicherheitsmechanismus ausgefallen ist. </a:t>
             </a:r>
           </a:p>
         </p:txBody>
@@ -1038,7 +975,222 @@
     </p:spTree>
     <p:extLst>
       <p:ext uri="{BB962C8B-B14F-4D97-AF65-F5344CB8AC3E}">
+        <p14:creationId xmlns:p14="http://schemas.microsoft.com/office/powerpoint/2010/main" val="999188407"/>
+      </p:ext>
+    </p:extLst>
+  </p:cSld>
+  <p:clrMapOvr>
+    <a:masterClrMapping/>
+  </p:clrMapOvr>
+</p:notes>
+</file>
+
+<file path=ppt/notesSlides/notesSlide13.xml><?xml version="1.0" encoding="utf-8"?>
+<p:notes xmlns:a="http://schemas.openxmlformats.org/drawingml/2006/main" xmlns:r="http://schemas.openxmlformats.org/officeDocument/2006/relationships" xmlns:p="http://schemas.openxmlformats.org/presentationml/2006/main">
+  <p:cSld>
+    <p:spTree>
+      <p:nvGrpSpPr>
+        <p:cNvPr id="1" name=""/>
+        <p:cNvGrpSpPr/>
+        <p:nvPr/>
+      </p:nvGrpSpPr>
+      <p:grpSpPr>
+        <a:xfrm>
+          <a:off x="0" y="0"/>
+          <a:ext cx="0" cy="0"/>
+          <a:chOff x="0" y="0"/>
+          <a:chExt cx="0" cy="0"/>
+        </a:xfrm>
+      </p:grpSpPr>
+      <p:sp>
+        <p:nvSpPr>
+          <p:cNvPr id="2" name="Slide Image Placeholder 1"/>
+          <p:cNvSpPr>
+            <a:spLocks noGrp="1" noRot="1" noChangeAspect="1"/>
+          </p:cNvSpPr>
+          <p:nvPr>
+            <p:ph type="sldImg"/>
+          </p:nvPr>
+        </p:nvSpPr>
+        <p:spPr/>
+      </p:sp>
+      <p:sp>
+        <p:nvSpPr>
+          <p:cNvPr id="3" name="Notes Placeholder 2"/>
+          <p:cNvSpPr>
+            <a:spLocks noGrp="1"/>
+          </p:cNvSpPr>
+          <p:nvPr>
+            <p:ph type="body" idx="1"/>
+          </p:nvPr>
+        </p:nvSpPr>
+        <p:spPr/>
+        <p:txBody>
+          <a:bodyPr/>
+          <a:lstStyle/>
+          <a:p>
+            <a:r>
+              <a:rPr lang="de-DE" noProof="0" dirty="0"/>
+              <a:t>Zum späteren Zeitpunkt, wenn die ft.Middleware wieder erreichbar ist, werden vom POS-System im sogenannten „Late Signing Mode“ die zuvor zum Wiederholen markierten Requests an die Middleware gesendet. Jeder Request wird dabei über ein Flag markiert (</a:t>
+            </a:r>
+            <a:r>
+              <a:rPr lang="de-DE" noProof="0" dirty="0" err="1"/>
+              <a:t>ftReceiptCase</a:t>
+            </a:r>
+            <a:r>
+              <a:rPr lang="de-DE" noProof="0" dirty="0"/>
+              <a:t> + „</a:t>
+            </a:r>
+            <a:r>
+              <a:rPr lang="de-DE" noProof="0" dirty="0" err="1"/>
+              <a:t>failed</a:t>
+            </a:r>
+            <a:r>
+              <a:rPr lang="de-DE" noProof="0" dirty="0"/>
+              <a:t> receipt“ Flag - 0x0000000000010000).</a:t>
+            </a:r>
+          </a:p>
+          <a:p>
+            <a:endParaRPr lang="de-DE" noProof="0" dirty="0"/>
+          </a:p>
+          <a:p>
+            <a:r>
+              <a:rPr lang="de-DE" noProof="0" dirty="0"/>
+              <a:t>Sobald die Middleware den ersten markierten Request erhält wechselt sie in den „Late Signing Mode“. Es können nun vom POS-System weitere Requests in diesem Modus gesendet werden. Die Middleware antwortet mit den </a:t>
+            </a:r>
+            <a:r>
+              <a:rPr lang="de-DE" noProof="0" dirty="0" err="1"/>
+              <a:t>ftState</a:t>
+            </a:r>
+            <a:r>
+              <a:rPr lang="de-DE" noProof="0" dirty="0"/>
+              <a:t> 0x08 was soviel bedeutet, dass sie sich im „Late Signing Mode“ befindet. Um den „Late Signing Mode“ zu verlassen muss das POS-System einen Nullbeleg an die Middleware senden (siehe nächste Folie)</a:t>
+            </a:r>
+          </a:p>
+        </p:txBody>
+      </p:sp>
+      <p:sp>
+        <p:nvSpPr>
+          <p:cNvPr id="4" name="Slide Number Placeholder 3"/>
+          <p:cNvSpPr>
+            <a:spLocks noGrp="1"/>
+          </p:cNvSpPr>
+          <p:nvPr>
+            <p:ph type="sldNum" sz="quarter" idx="5"/>
+          </p:nvPr>
+        </p:nvSpPr>
+        <p:spPr/>
+        <p:txBody>
+          <a:bodyPr/>
+          <a:lstStyle/>
+          <a:p>
+            <a:fld id="{C3915442-2F4C-E043-BB4A-4206B63E6321}" type="slidenum">
+              <a:rPr lang="en-US" smtClean="0"/>
+              <a:t>14</a:t>
+            </a:fld>
+            <a:endParaRPr lang="en-US"/>
+          </a:p>
+        </p:txBody>
+      </p:sp>
+    </p:spTree>
+    <p:extLst>
+      <p:ext uri="{BB962C8B-B14F-4D97-AF65-F5344CB8AC3E}">
         <p14:creationId xmlns:p14="http://schemas.microsoft.com/office/powerpoint/2010/main" val="2257919477"/>
+      </p:ext>
+    </p:extLst>
+  </p:cSld>
+  <p:clrMapOvr>
+    <a:masterClrMapping/>
+  </p:clrMapOvr>
+</p:notes>
+</file>
+
+<file path=ppt/notesSlides/notesSlide14.xml><?xml version="1.0" encoding="utf-8"?>
+<p:notes xmlns:a="http://schemas.openxmlformats.org/drawingml/2006/main" xmlns:r="http://schemas.openxmlformats.org/officeDocument/2006/relationships" xmlns:p="http://schemas.openxmlformats.org/presentationml/2006/main">
+  <p:cSld>
+    <p:spTree>
+      <p:nvGrpSpPr>
+        <p:cNvPr id="1" name=""/>
+        <p:cNvGrpSpPr/>
+        <p:nvPr/>
+      </p:nvGrpSpPr>
+      <p:grpSpPr>
+        <a:xfrm>
+          <a:off x="0" y="0"/>
+          <a:ext cx="0" cy="0"/>
+          <a:chOff x="0" y="0"/>
+          <a:chExt cx="0" cy="0"/>
+        </a:xfrm>
+      </p:grpSpPr>
+      <p:sp>
+        <p:nvSpPr>
+          <p:cNvPr id="2" name="Slide Image Placeholder 1"/>
+          <p:cNvSpPr>
+            <a:spLocks noGrp="1" noRot="1" noChangeAspect="1"/>
+          </p:cNvSpPr>
+          <p:nvPr>
+            <p:ph type="sldImg"/>
+          </p:nvPr>
+        </p:nvSpPr>
+        <p:spPr/>
+      </p:sp>
+      <p:sp>
+        <p:nvSpPr>
+          <p:cNvPr id="3" name="Notes Placeholder 2"/>
+          <p:cNvSpPr>
+            <a:spLocks noGrp="1"/>
+          </p:cNvSpPr>
+          <p:nvPr>
+            <p:ph type="body" idx="1"/>
+          </p:nvPr>
+        </p:nvSpPr>
+        <p:spPr/>
+        <p:txBody>
+          <a:bodyPr/>
+          <a:lstStyle/>
+          <a:p>
+            <a:r>
+              <a:rPr lang="de-DE" noProof="0" dirty="0"/>
+              <a:t>Um den „Late Signing Mode“ zu beenden muss das POS-System einen Nullbeleg an die Middleware senden. Die Middleware antwortet mit dem </a:t>
+            </a:r>
+            <a:r>
+              <a:rPr lang="de-DE" noProof="0" dirty="0" err="1"/>
+              <a:t>ftState</a:t>
+            </a:r>
+            <a:r>
+              <a:rPr lang="de-DE" noProof="0" dirty="0"/>
+              <a:t> = 0x00, das bedeutet, dass sie den “Late Signing Mode“ verlassen hat und für den Normalbetrieb zur Verfügung steht. </a:t>
+            </a:r>
+          </a:p>
+        </p:txBody>
+      </p:sp>
+      <p:sp>
+        <p:nvSpPr>
+          <p:cNvPr id="4" name="Slide Number Placeholder 3"/>
+          <p:cNvSpPr>
+            <a:spLocks noGrp="1"/>
+          </p:cNvSpPr>
+          <p:nvPr>
+            <p:ph type="sldNum" sz="quarter" idx="5"/>
+          </p:nvPr>
+        </p:nvSpPr>
+        <p:spPr/>
+        <p:txBody>
+          <a:bodyPr/>
+          <a:lstStyle/>
+          <a:p>
+            <a:fld id="{C3915442-2F4C-E043-BB4A-4206B63E6321}" type="slidenum">
+              <a:rPr lang="en-US" smtClean="0"/>
+              <a:t>15</a:t>
+            </a:fld>
+            <a:endParaRPr lang="en-US"/>
+          </a:p>
+        </p:txBody>
+      </p:sp>
+    </p:spTree>
+    <p:extLst>
+      <p:ext uri="{BB962C8B-B14F-4D97-AF65-F5344CB8AC3E}">
+        <p14:creationId xmlns:p14="http://schemas.microsoft.com/office/powerpoint/2010/main" val="2840793451"/>
       </p:ext>
     </p:extLst>
   </p:cSld>
@@ -1924,7 +2076,15 @@
             </a:r>
             <a:r>
               <a:rPr lang="de-DE" noProof="0" dirty="0"/>
-              <a:t> bearbeitet. Dieser kümmert sich um die Signierung und Persistenz der Daten.</a:t>
+              <a:t> bearbeitet. Dieser kümmert sich um die </a:t>
+            </a:r>
+            <a:r>
+              <a:rPr lang="de-DE" noProof="0" dirty="0" err="1"/>
+              <a:t>Erstellug</a:t>
+            </a:r>
+            <a:r>
+              <a:rPr lang="de-DE" noProof="0" dirty="0"/>
+              <a:t> der eindeutigen, fortlaufenden Belegnummer, um die Verkettung, Signierung und die Persistenz der Daten.</a:t>
             </a:r>
           </a:p>
         </p:txBody>
@@ -2011,13 +2171,24 @@
           <a:p>
             <a:r>
               <a:rPr lang="de-DE" noProof="0" dirty="0"/>
-              <a:t>Erläuterung der Sign Methode des IPOS Interface. </a:t>
-            </a:r>
-          </a:p>
-          <a:p>
+              <a:t>Erläuterung der </a:t>
+            </a:r>
+            <a:r>
+              <a:rPr lang="de-DE" b="1" noProof="0" dirty="0"/>
+              <a:t>Sign</a:t>
+            </a:r>
             <a:r>
               <a:rPr lang="de-DE" noProof="0" dirty="0"/>
-              <a:t>Das Kassensystem sendet mit XML oder JSON formatierte Daten über die Sign Methode des IPOS Interface an die ft.Middleware</a:t>
+              <a:t> Methode des IPOS Interface. </a:t>
+            </a:r>
+          </a:p>
+          <a:p>
+            <a:endParaRPr lang="de-DE" noProof="0" dirty="0"/>
+          </a:p>
+          <a:p>
+            <a:r>
+              <a:rPr lang="de-DE" noProof="0" dirty="0"/>
+              <a:t>Das Kassensystem sendet mit XML oder JSON formatierte Daten über die Sign Methode des IPOS Interface an die ft.Middleware.</a:t>
             </a:r>
           </a:p>
           <a:p>
@@ -2029,85 +2200,21 @@
           <a:p>
             <a:r>
               <a:rPr lang="de-DE" noProof="0" dirty="0"/>
-              <a:t>Bsp. – Request - Headerdaten: </a:t>
+              <a:t>Bsp. – Request - Headerdaten: Identifikationsnummer des POS-System, Identifikationsnummer des verwendeten Terminal, Referenznummer des Request, etc.</a:t>
+            </a:r>
+          </a:p>
+          <a:p>
+            <a:r>
+              <a:rPr lang="de-DE" noProof="0" dirty="0"/>
+              <a:t>Bsp. – Charge - Item: 1 Bier, 19% MwSt. – Menge, Betrag, </a:t>
             </a:r>
             <a:r>
               <a:rPr lang="de-DE" noProof="0" dirty="0" err="1"/>
-              <a:t>possystem-id</a:t>
+              <a:t>ChargeItem</a:t>
             </a:r>
             <a:r>
               <a:rPr lang="de-DE" noProof="0" dirty="0"/>
-              <a:t>, </a:t>
-            </a:r>
-            <a:r>
-              <a:rPr lang="de-DE" noProof="0" dirty="0" err="1"/>
-              <a:t>cashbox-id</a:t>
-            </a:r>
-            <a:r>
-              <a:rPr lang="de-DE" noProof="0" dirty="0"/>
-              <a:t>, terminal-</a:t>
-            </a:r>
-            <a:r>
-              <a:rPr lang="de-DE" noProof="0" dirty="0" err="1"/>
-              <a:t>id</a:t>
-            </a:r>
-            <a:r>
-              <a:rPr lang="de-DE" noProof="0" dirty="0"/>
-              <a:t>, receipt-moment, receipt-</a:t>
-            </a:r>
-            <a:r>
-              <a:rPr lang="de-DE" noProof="0" dirty="0" err="1"/>
-              <a:t>reference</a:t>
-            </a:r>
-            <a:r>
-              <a:rPr lang="de-DE" noProof="0" dirty="0"/>
-              <a:t>, etc.</a:t>
-            </a:r>
-          </a:p>
-          <a:p>
-            <a:r>
-              <a:rPr lang="de-DE" noProof="0" dirty="0"/>
-              <a:t>Bsp. – Charge - Item: 1 Bier, 19% </a:t>
-            </a:r>
-            <a:r>
-              <a:rPr lang="de-DE" noProof="0" dirty="0" err="1"/>
-              <a:t>MwSt</a:t>
-            </a:r>
-            <a:r>
-              <a:rPr lang="de-DE" noProof="0" dirty="0"/>
-              <a:t> – </a:t>
-            </a:r>
-            <a:r>
-              <a:rPr lang="de-DE" noProof="0" dirty="0" err="1"/>
-              <a:t>quantity</a:t>
-            </a:r>
-            <a:r>
-              <a:rPr lang="de-DE" noProof="0" dirty="0"/>
-              <a:t>, </a:t>
-            </a:r>
-            <a:r>
-              <a:rPr lang="de-DE" noProof="0" dirty="0" err="1"/>
-              <a:t>amount</a:t>
-            </a:r>
-            <a:r>
-              <a:rPr lang="de-DE" noProof="0" dirty="0"/>
-              <a:t>, </a:t>
-            </a:r>
-            <a:r>
-              <a:rPr lang="de-DE" noProof="0" dirty="0" err="1"/>
-              <a:t>vat</a:t>
-            </a:r>
-            <a:r>
-              <a:rPr lang="de-DE" noProof="0" dirty="0"/>
-              <a:t>-rate, </a:t>
-            </a:r>
-            <a:r>
-              <a:rPr lang="de-DE" noProof="0" dirty="0" err="1"/>
-              <a:t>chargeitemcase</a:t>
-            </a:r>
-            <a:r>
-              <a:rPr lang="de-DE" noProof="0" dirty="0"/>
-              <a:t> (</a:t>
+              <a:t>-Case (</a:t>
             </a:r>
             <a:r>
               <a:rPr lang="de-DE" noProof="0" dirty="0" err="1"/>
@@ -2115,83 +2222,27 @@
             </a:r>
             <a:r>
               <a:rPr lang="de-DE" noProof="0" dirty="0"/>
-              <a:t> normal, 19%), </a:t>
+              <a:t> normal, 19%), Zeitpunkt der Bestellung, etc.</a:t>
+            </a:r>
+          </a:p>
+          <a:p>
+            <a:r>
+              <a:rPr lang="de-DE" noProof="0" dirty="0"/>
+              <a:t>Bsp. – Pay - Item: Barzahlung - Betrag, </a:t>
             </a:r>
             <a:r>
               <a:rPr lang="de-DE" noProof="0" dirty="0" err="1"/>
-              <a:t>charge</a:t>
+              <a:t>PayItem</a:t>
             </a:r>
             <a:r>
               <a:rPr lang="de-DE" noProof="0" dirty="0"/>
-              <a:t> item </a:t>
-            </a:r>
-            <a:r>
-              <a:rPr lang="de-DE" noProof="0" dirty="0" err="1"/>
-              <a:t>moment</a:t>
-            </a:r>
+              <a:t>-Case (Barzahlung), Zeitpunkt der Bezahlung etc.</a:t>
+            </a:r>
+          </a:p>
+          <a:p>
             <a:r>
               <a:rPr lang="de-DE" noProof="0" dirty="0"/>
-              <a:t>, etc.</a:t>
-            </a:r>
-          </a:p>
-          <a:p>
-            <a:r>
-              <a:rPr lang="de-DE" noProof="0" dirty="0"/>
-              <a:t>Bsp. – Pay - Item: Barzahlung - </a:t>
-            </a:r>
-            <a:r>
-              <a:rPr lang="de-DE" noProof="0" dirty="0" err="1"/>
-              <a:t>quantity</a:t>
-            </a:r>
-            <a:r>
-              <a:rPr lang="de-DE" noProof="0" dirty="0"/>
-              <a:t>, </a:t>
-            </a:r>
-            <a:r>
-              <a:rPr lang="de-DE" noProof="0" dirty="0" err="1"/>
-              <a:t>amount</a:t>
-            </a:r>
-            <a:r>
-              <a:rPr lang="de-DE" noProof="0" dirty="0"/>
-              <a:t>, </a:t>
-            </a:r>
-            <a:r>
-              <a:rPr lang="de-DE" noProof="0" dirty="0" err="1"/>
-              <a:t>payitemcase</a:t>
-            </a:r>
-            <a:r>
-              <a:rPr lang="de-DE" noProof="0" dirty="0"/>
-              <a:t> (Barzahlung), </a:t>
-            </a:r>
-            <a:r>
-              <a:rPr lang="de-DE" noProof="0" dirty="0" err="1"/>
-              <a:t>pay</a:t>
-            </a:r>
-            <a:r>
-              <a:rPr lang="de-DE" noProof="0" dirty="0"/>
-              <a:t> item </a:t>
-            </a:r>
-            <a:r>
-              <a:rPr lang="de-DE" noProof="0" dirty="0" err="1"/>
-              <a:t>moment</a:t>
-            </a:r>
-            <a:r>
-              <a:rPr lang="de-DE" noProof="0" dirty="0"/>
-              <a:t>, etc.</a:t>
-            </a:r>
-          </a:p>
-          <a:p>
-            <a:r>
-              <a:rPr lang="de-DE" noProof="0" dirty="0"/>
-              <a:t>Bsp. – Request - Footerdaten: </a:t>
-            </a:r>
-            <a:r>
-              <a:rPr lang="de-DE" noProof="0" dirty="0" err="1"/>
-              <a:t>receiptcase</a:t>
-            </a:r>
-            <a:r>
-              <a:rPr lang="de-DE" noProof="0" dirty="0"/>
-              <a:t> (</a:t>
+              <a:t>Bsp. – Request - Footerdaten: Bedienername, Beleg-Case (</a:t>
             </a:r>
             <a:r>
               <a:rPr lang="de-DE" noProof="0" dirty="0" err="1"/>
@@ -2199,7 +2250,7 @@
             </a:r>
             <a:r>
               <a:rPr lang="de-DE" noProof="0" dirty="0"/>
-              <a:t> </a:t>
+              <a:t> „</a:t>
             </a:r>
             <a:r>
               <a:rPr lang="de-DE" noProof="0" dirty="0" err="1"/>
@@ -2207,31 +2258,7 @@
             </a:r>
             <a:r>
               <a:rPr lang="de-DE" noProof="0" dirty="0"/>
-              <a:t>-receipt oder zero-receipt), </a:t>
-            </a:r>
-            <a:r>
-              <a:rPr lang="de-DE" noProof="0" dirty="0" err="1"/>
-              <a:t>previous</a:t>
-            </a:r>
-            <a:r>
-              <a:rPr lang="de-DE" noProof="0" dirty="0"/>
-              <a:t> receipt </a:t>
-            </a:r>
-            <a:r>
-              <a:rPr lang="de-DE" noProof="0" dirty="0" err="1"/>
-              <a:t>reference</a:t>
-            </a:r>
-            <a:r>
-              <a:rPr lang="de-DE" noProof="0" dirty="0"/>
-              <a:t>, </a:t>
-            </a:r>
-            <a:r>
-              <a:rPr lang="de-DE" noProof="0" dirty="0" err="1"/>
-              <a:t>user</a:t>
-            </a:r>
-            <a:r>
-              <a:rPr lang="de-DE" noProof="0" dirty="0"/>
-              <a:t>, etc.</a:t>
+              <a:t>-receipt“ oder „zero-receipt“ - Nullbeleg), Referenz zum vorherigen - damit zusammenhängenden Beleg (z.B. bei Storno), Individuelle Daten, etc.</a:t>
             </a:r>
           </a:p>
           <a:p>
@@ -2249,109 +2276,53 @@
             </a:r>
             <a:r>
               <a:rPr lang="de-DE" b="0" noProof="0" dirty="0"/>
-              <a:t>“ Block. Die hier enthaltenen Daten müssen auf den Beleg gedruckt werden um Compliance zu erhalten. </a:t>
+              <a:t>“ Block. Die hier enthaltenen Daten müssen auf den Beleg gedruckt werden um Compliance sicher zu stellen. </a:t>
             </a:r>
           </a:p>
           <a:p>
             <a:r>
               <a:rPr lang="de-DE" b="1" noProof="0" dirty="0"/>
-              <a:t>Die initial an die ft.Middleware gesendeten </a:t>
+              <a:t>Die initial an die ft.Middleware gesendeten Charge- und </a:t>
             </a:r>
             <a:r>
               <a:rPr lang="de-DE" b="1" noProof="0" dirty="0" err="1"/>
-              <a:t>charge</a:t>
+              <a:t>PayItem</a:t>
             </a:r>
             <a:r>
               <a:rPr lang="de-DE" b="1" noProof="0" dirty="0"/>
-              <a:t> und </a:t>
-            </a:r>
-            <a:r>
-              <a:rPr lang="de-DE" b="1" noProof="0" dirty="0" err="1"/>
-              <a:t>pay</a:t>
-            </a:r>
-            <a:r>
-              <a:rPr lang="de-DE" b="1" noProof="0" dirty="0"/>
-              <a:t> </a:t>
-            </a:r>
-            <a:r>
-              <a:rPr lang="de-DE" b="1" noProof="0" dirty="0" err="1"/>
-              <a:t>items</a:t>
-            </a:r>
-            <a:r>
-              <a:rPr lang="de-DE" b="1" noProof="0" dirty="0"/>
-              <a:t> werden nicht zurückgesendet</a:t>
+              <a:t> Blöcke werden nicht zurückgesendet</a:t>
             </a:r>
             <a:r>
               <a:rPr lang="de-DE" b="0" noProof="0" dirty="0"/>
-              <a:t>! Es werden optional nur zusätzliche </a:t>
+              <a:t>! Es werden optional nur zusätzliche Charge- und </a:t>
             </a:r>
             <a:r>
               <a:rPr lang="de-DE" b="0" noProof="0" dirty="0" err="1"/>
-              <a:t>charge</a:t>
+              <a:t>PayItem</a:t>
             </a:r>
             <a:r>
               <a:rPr lang="de-DE" b="0" noProof="0" dirty="0"/>
-              <a:t>- und </a:t>
-            </a:r>
-            <a:r>
-              <a:rPr lang="de-DE" b="0" noProof="0" dirty="0" err="1"/>
-              <a:t>pay</a:t>
-            </a:r>
+              <a:t> Blöcke zurückgesendet. (diese Funktionalität wird jedoch momentan nicht genutzt)</a:t>
+            </a:r>
+          </a:p>
+          <a:p>
             <a:r>
               <a:rPr lang="de-DE" b="0" noProof="0" dirty="0"/>
-              <a:t>-item Blöcke zurückgesendet. (diese Funktionalität wird momentan nicht genutzt)</a:t>
-            </a:r>
-          </a:p>
-          <a:p>
+              <a:t>Bsp. Response-Headerdaten: Identifikation der Verarbeitungskette (Queue), </a:t>
+            </a:r>
+            <a:r>
+              <a:rPr lang="de-DE" noProof="0" dirty="0"/>
+              <a:t>Identifikationsnummer des verwendeten Terminal, </a:t>
+            </a:r>
             <a:r>
               <a:rPr lang="de-DE" b="0" noProof="0" dirty="0"/>
-              <a:t>Bsp. Response-Headerdaten: </a:t>
-            </a:r>
-            <a:r>
-              <a:rPr lang="de-DE" b="0" noProof="0" dirty="0" err="1"/>
-              <a:t>cashbox-id</a:t>
-            </a:r>
+              <a:t>Referenznummer des Request, Zeitpunkt der Verarbeitung durch die Middleware, etc.</a:t>
+            </a:r>
+          </a:p>
+          <a:p>
             <a:r>
               <a:rPr lang="de-DE" b="0" noProof="0" dirty="0"/>
-              <a:t>, queue-</a:t>
-            </a:r>
-            <a:r>
-              <a:rPr lang="de-DE" b="0" noProof="0" dirty="0" err="1"/>
-              <a:t>id</a:t>
-            </a:r>
-            <a:r>
-              <a:rPr lang="de-DE" b="0" noProof="0" dirty="0"/>
-              <a:t>, terminal-</a:t>
-            </a:r>
-            <a:r>
-              <a:rPr lang="de-DE" b="0" noProof="0" dirty="0" err="1"/>
-              <a:t>id</a:t>
-            </a:r>
-            <a:r>
-              <a:rPr lang="de-DE" b="0" noProof="0" dirty="0"/>
-              <a:t>, receipt-</a:t>
-            </a:r>
-            <a:r>
-              <a:rPr lang="de-DE" b="0" noProof="0" dirty="0" err="1"/>
-              <a:t>reference</a:t>
-            </a:r>
-            <a:r>
-              <a:rPr lang="de-DE" b="0" noProof="0" dirty="0"/>
-              <a:t>, receipt-moment</a:t>
-            </a:r>
-          </a:p>
-          <a:p>
-            <a:r>
-              <a:rPr lang="de-DE" b="0" noProof="0" dirty="0"/>
-              <a:t>Bsp. Signaturen: QR-Code, </a:t>
-            </a:r>
-            <a:r>
-              <a:rPr lang="de-DE" b="0" noProof="0" dirty="0" err="1"/>
-              <a:t>tse</a:t>
-            </a:r>
-            <a:r>
-              <a:rPr lang="de-DE" b="0" noProof="0" dirty="0"/>
-              <a:t>-</a:t>
+              <a:t>Bsp. Signaturen: QR-Code, TSE </a:t>
             </a:r>
             <a:r>
               <a:rPr lang="de-DE" b="0" noProof="0" dirty="0" err="1"/>
@@ -2359,11 +2330,11 @@
             </a:r>
             <a:r>
               <a:rPr lang="de-DE" b="0" noProof="0" dirty="0"/>
-              <a:t>-type, </a:t>
+              <a:t>-type, TSE </a:t>
             </a:r>
             <a:r>
               <a:rPr lang="de-DE" b="0" noProof="0" dirty="0" err="1"/>
-              <a:t>tse-process-data</a:t>
+              <a:t>process-data</a:t>
             </a:r>
             <a:r>
               <a:rPr lang="de-DE" b="0" noProof="0" dirty="0"/>
@@ -2373,39 +2344,7 @@
           <a:p>
             <a:r>
               <a:rPr lang="de-DE" b="0" noProof="0" dirty="0"/>
-              <a:t>Bsp. Response-</a:t>
-            </a:r>
-            <a:r>
-              <a:rPr lang="de-DE" b="0" noProof="0" dirty="0" err="1"/>
-              <a:t>Footerdaten</a:t>
-            </a:r>
-            <a:r>
-              <a:rPr lang="de-DE" b="0" noProof="0" dirty="0"/>
-              <a:t>: </a:t>
-            </a:r>
-            <a:r>
-              <a:rPr lang="de-DE" b="0" noProof="0" dirty="0" err="1"/>
-              <a:t>state</a:t>
-            </a:r>
-            <a:r>
-              <a:rPr lang="de-DE" b="0" noProof="0" dirty="0"/>
-              <a:t>, </a:t>
-            </a:r>
-            <a:r>
-              <a:rPr lang="de-DE" b="0" noProof="0" dirty="0" err="1"/>
-              <a:t>state-data</a:t>
-            </a:r>
-            <a:r>
-              <a:rPr lang="de-DE" b="0" noProof="0" dirty="0"/>
-              <a:t> (</a:t>
-            </a:r>
-            <a:r>
-              <a:rPr lang="de-DE" b="0" noProof="0" dirty="0" err="1"/>
-              <a:t>status</a:t>
-            </a:r>
-            <a:r>
-              <a:rPr lang="de-DE" b="0" noProof="0" dirty="0"/>
-              <a:t>, z.B. ok oder TSE nicht erreichbar, etc.)</a:t>
+              <a:t>Bsp. Response-Footerdaten: Status, (Status, z.B. ok oder TSE nicht erreichbar, etc.), Detaildaten zum Status (Fehlermeldung, Info, etc.)</a:t>
             </a:r>
           </a:p>
           <a:p>
@@ -2498,31 +2437,7 @@
             </a:pPr>
             <a:r>
               <a:rPr lang="de-DE" noProof="0" dirty="0"/>
-              <a:t>Das POS-System sammelt die </a:t>
-            </a:r>
-            <a:r>
-              <a:rPr lang="de-DE" noProof="0" dirty="0" err="1"/>
-              <a:t>charge</a:t>
-            </a:r>
-            <a:r>
-              <a:rPr lang="de-DE" noProof="0" dirty="0"/>
-              <a:t> und </a:t>
-            </a:r>
-            <a:r>
-              <a:rPr lang="de-DE" noProof="0" dirty="0" err="1"/>
-              <a:t>pay</a:t>
-            </a:r>
-            <a:r>
-              <a:rPr lang="de-DE" noProof="0" dirty="0"/>
-              <a:t> </a:t>
-            </a:r>
-            <a:r>
-              <a:rPr lang="de-DE" noProof="0" dirty="0" err="1"/>
-              <a:t>items</a:t>
-            </a:r>
-            <a:r>
-              <a:rPr lang="de-DE" noProof="0" dirty="0"/>
-              <a:t> für den Request. </a:t>
+              <a:t>Das POS-System sammelt die Charge- und PayItems für den Request. </a:t>
             </a:r>
           </a:p>
           <a:p>
@@ -2531,7 +2446,15 @@
             </a:pPr>
             <a:r>
               <a:rPr lang="de-DE" noProof="0" dirty="0"/>
-              <a:t>Das POS-System sollte die Daten lokal persistieren. Das Persistieren der Daten ist wichtig, weil die Request Daten nicht von der Middleware zurückgesendet werden. Zudem ist die lokale Archivierung wichtig für den Fall, dass die fiskaltrust Archivierung nicht verfügbar ist.</a:t>
+              <a:t>Das POS-System sollte die Daten lokal persistieren. Das Persistieren der Daten ist wichtig, weil die Request-Daten nicht von der Middleware zurückgesendet werden. Zudem ist die lokale Archivierung </a:t>
+            </a:r>
+            <a:r>
+              <a:rPr lang="de-DE" noProof="0" dirty="0" err="1"/>
+              <a:t>esentiell</a:t>
+            </a:r>
+            <a:r>
+              <a:rPr lang="de-DE" noProof="0" dirty="0"/>
+              <a:t> für den Fall, dass die fiskaltrust Archivierung nicht verfügbar ist.</a:t>
             </a:r>
           </a:p>
           <a:p>
@@ -2549,7 +2472,7 @@
             </a:pPr>
             <a:r>
               <a:rPr lang="de-DE" noProof="0" dirty="0"/>
-              <a:t>Die fiskaltrust Middleware prozessiert die Daten, verkettet diese mit Hilfe des internen Security Mechanismus und entscheidet wie sie weiter behandelt werden sollen</a:t>
+              <a:t>Die ft.Middleware prozessiert die Daten, verkettet diese mit Hilfe des internen ft.SecurityMechanism und entscheidet wie sie weiter verarbeitet werden sollen</a:t>
             </a:r>
           </a:p>
           <a:p>
@@ -2558,7 +2481,7 @@
             </a:pPr>
             <a:r>
               <a:rPr lang="de-DE" noProof="0" dirty="0"/>
-              <a:t>Im Falle eines Request, der signiert werden muss, werden die relevanten Daten an die angeschossenen TSE gesendet und von dieser signiert. (Im Falle eines Sonderbelegs werden die Daten nicht von der TSE signiert - siehe dazu nächste Folie)</a:t>
+              <a:t>Im Falle eines Request, der signiert werden muss, werden die relevanten Daten an die angeschossene TSE übertragen und von dieser signiert. (Im Falle eines Sonderbelegs werden die Daten nicht von der TSE signiert - siehe dazu nächste Folie)</a:t>
             </a:r>
           </a:p>
           <a:p>
@@ -2584,7 +2507,7 @@
             </a:pPr>
             <a:r>
               <a:rPr lang="de-DE" noProof="0" dirty="0"/>
-              <a:t>Der Response wird aufgebaut und zurück an das POS-System gesendet (der Response beinhaltet wichtige Daten, die auf den Beleg gedruckt werden müssen)</a:t>
+              <a:t>Der Response wird erstellt und zurück an das POS-System gesendet (der Response beinhaltet wichtige Daten, die auf den Beleg gedruckt werden müssen)</a:t>
             </a:r>
           </a:p>
           <a:p>
@@ -2593,7 +2516,7 @@
             </a:pPr>
             <a:r>
               <a:rPr lang="de-DE" noProof="0" dirty="0"/>
-              <a:t>Das Pos-System erhält den Response und prozessiert die darin enthaltenen Daten</a:t>
+              <a:t>Das POS-System erhält den Response und prozessiert die darin enthaltenen Daten</a:t>
             </a:r>
           </a:p>
           <a:p>
@@ -2698,31 +2621,7 @@
           <a:p>
             <a:r>
               <a:rPr lang="de-DE" noProof="0" dirty="0"/>
-              <a:t>Sonderbelege führen Funktionalität aus. Z.B. Initialisierung der TSE, Tagesabschuss, </a:t>
-            </a:r>
-            <a:r>
-              <a:rPr lang="de-DE" noProof="0" dirty="0" err="1"/>
-              <a:t>Monatsabschlss</a:t>
-            </a:r>
-            <a:r>
-              <a:rPr lang="de-DE" noProof="0" dirty="0"/>
-              <a:t>, etc. Sie werden immer über einen Request mit dem receipt-</a:t>
-            </a:r>
-            <a:r>
-              <a:rPr lang="de-DE" noProof="0" dirty="0" err="1"/>
-              <a:t>request</a:t>
-            </a:r>
-            <a:r>
-              <a:rPr lang="de-DE" noProof="0" dirty="0"/>
-              <a:t>-</a:t>
-            </a:r>
-            <a:r>
-              <a:rPr lang="de-DE" noProof="0" dirty="0" err="1"/>
-              <a:t>case</a:t>
-            </a:r>
-            <a:r>
-              <a:rPr lang="de-DE" noProof="0" dirty="0"/>
-              <a:t> „</a:t>
+              <a:t>Sonderbelege führen Funktionalität aus. Z.B. Initialisierung der TSE, Tagesabschuss, Monatsabschluss, etc. Sie werden immer über einen Request mit dem Beleg-Case „</a:t>
             </a:r>
             <a:r>
               <a:rPr lang="de-DE" noProof="0" dirty="0" err="1"/>
@@ -2730,7 +2629,7 @@
             </a:r>
             <a:r>
               <a:rPr lang="de-DE" noProof="0" dirty="0"/>
-              <a:t> receipt“ also Nullbeleg an die fiskaltrust Middleware gesendet.</a:t>
+              <a:t> receipt“ also Nullbeleg an die ft.Middleware gesendet.</a:t>
             </a:r>
           </a:p>
           <a:p>
@@ -2751,7 +2650,7 @@
             </a:pPr>
             <a:r>
               <a:rPr lang="de-DE" noProof="0" dirty="0"/>
-              <a:t>Das POS-System sollte die Daten lokal persistieren. Das Persistieren der Daten ist wichtig, weil die Request Daten nicht von der Middleware zurückgesendet werden. Zudem ist die lokale Archivierung wichtig für den Fall, dass die fiskaltrust Archivierung nicht verfügbar ist.</a:t>
+              <a:t>Das POS-System persistiert lokal die Daten.</a:t>
             </a:r>
           </a:p>
           <a:p>
@@ -2769,7 +2668,7 @@
             </a:pPr>
             <a:r>
               <a:rPr lang="de-DE" noProof="0" dirty="0"/>
-              <a:t>Die fiskaltrust Middleware prozessiert die Daten, verkettet diese mit Hilfe des internen Security Mechanismus und entscheidet wie sie weiter behandelt werden sollen</a:t>
+              <a:t>Die ft.Middleware prozessiert die Daten, verkettet diese mit Hilfe des internen ft.SecurityMechanism und entscheidet wie sie weiter verarbeitet werden sollen</a:t>
             </a:r>
           </a:p>
           <a:p>
@@ -2778,7 +2677,7 @@
             </a:pPr>
             <a:r>
               <a:rPr lang="de-DE" noProof="0" dirty="0"/>
-              <a:t>Im Falle eines Sonderbelegs werden die Daten nicht signiert – die angeforderte Funktionalität wird stattdessen ausgeführt.</a:t>
+              <a:t>Im Falle eines Sonderbelegs werden die Daten nicht signiert – stattdessen wird die angeforderte Funktionalität ausgeführt.</a:t>
             </a:r>
           </a:p>
           <a:p>
@@ -2787,15 +2686,7 @@
             </a:pPr>
             <a:r>
               <a:rPr lang="de-DE" noProof="0" dirty="0"/>
-              <a:t>Das Ergebnis der ausgeführten Funktionalität wird von der Middleware in den „</a:t>
-            </a:r>
-            <a:r>
-              <a:rPr lang="de-DE" noProof="0" dirty="0" err="1"/>
-              <a:t>Signatures</a:t>
-            </a:r>
-            <a:r>
-              <a:rPr lang="de-DE" noProof="0" dirty="0"/>
-              <a:t>“ Block gepackt</a:t>
+              <a:t>Das Ergebnis wird von der ft.Middleware in den Signatur-Block gepackt</a:t>
             </a:r>
           </a:p>
           <a:p>
@@ -2822,7 +2713,7 @@
             </a:pPr>
             <a:r>
               <a:rPr lang="de-DE" noProof="0" dirty="0"/>
-              <a:t>Die erhaltenen Daten werden lokal vom POS-System persistiert (siehe dazu auch Pkt. 2)</a:t>
+              <a:t>Die erhaltenen Daten werden lokal vom POS-System persistiert</a:t>
             </a:r>
           </a:p>
           <a:p>
@@ -3027,7 +2918,7 @@
           <a:p>
             <a:fld id="{E822B9A2-E9F6-E646-ADD7-254B6AD8866B}" type="datetimeFigureOut">
               <a:rPr lang="en-US" smtClean="0"/>
-              <a:t>8/17/20</a:t>
+              <a:t>8/18/20</a:t>
             </a:fld>
             <a:endParaRPr lang="en-US"/>
           </a:p>
@@ -3227,7 +3118,7 @@
           <a:p>
             <a:fld id="{E822B9A2-E9F6-E646-ADD7-254B6AD8866B}" type="datetimeFigureOut">
               <a:rPr lang="en-US" smtClean="0"/>
-              <a:t>8/17/20</a:t>
+              <a:t>8/18/20</a:t>
             </a:fld>
             <a:endParaRPr lang="en-US"/>
           </a:p>
@@ -3437,7 +3328,7 @@
           <a:p>
             <a:fld id="{E822B9A2-E9F6-E646-ADD7-254B6AD8866B}" type="datetimeFigureOut">
               <a:rPr lang="en-US" smtClean="0"/>
-              <a:t>8/17/20</a:t>
+              <a:t>8/18/20</a:t>
             </a:fld>
             <a:endParaRPr lang="en-US"/>
           </a:p>
@@ -3637,7 +3528,7 @@
           <a:p>
             <a:fld id="{E822B9A2-E9F6-E646-ADD7-254B6AD8866B}" type="datetimeFigureOut">
               <a:rPr lang="en-US" smtClean="0"/>
-              <a:t>8/17/20</a:t>
+              <a:t>8/18/20</a:t>
             </a:fld>
             <a:endParaRPr lang="en-US"/>
           </a:p>
@@ -3913,7 +3804,7 @@
           <a:p>
             <a:fld id="{E822B9A2-E9F6-E646-ADD7-254B6AD8866B}" type="datetimeFigureOut">
               <a:rPr lang="en-US" smtClean="0"/>
-              <a:t>8/17/20</a:t>
+              <a:t>8/18/20</a:t>
             </a:fld>
             <a:endParaRPr lang="en-US"/>
           </a:p>
@@ -4181,7 +4072,7 @@
           <a:p>
             <a:fld id="{E822B9A2-E9F6-E646-ADD7-254B6AD8866B}" type="datetimeFigureOut">
               <a:rPr lang="en-US" smtClean="0"/>
-              <a:t>8/17/20</a:t>
+              <a:t>8/18/20</a:t>
             </a:fld>
             <a:endParaRPr lang="en-US"/>
           </a:p>
@@ -4596,7 +4487,7 @@
           <a:p>
             <a:fld id="{E822B9A2-E9F6-E646-ADD7-254B6AD8866B}" type="datetimeFigureOut">
               <a:rPr lang="en-US" smtClean="0"/>
-              <a:t>8/17/20</a:t>
+              <a:t>8/18/20</a:t>
             </a:fld>
             <a:endParaRPr lang="en-US"/>
           </a:p>
@@ -4738,7 +4629,7 @@
           <a:p>
             <a:fld id="{E822B9A2-E9F6-E646-ADD7-254B6AD8866B}" type="datetimeFigureOut">
               <a:rPr lang="en-US" smtClean="0"/>
-              <a:t>8/17/20</a:t>
+              <a:t>8/18/20</a:t>
             </a:fld>
             <a:endParaRPr lang="en-US"/>
           </a:p>
@@ -4851,7 +4742,7 @@
           <a:p>
             <a:fld id="{E822B9A2-E9F6-E646-ADD7-254B6AD8866B}" type="datetimeFigureOut">
               <a:rPr lang="en-US" smtClean="0"/>
-              <a:t>8/17/20</a:t>
+              <a:t>8/18/20</a:t>
             </a:fld>
             <a:endParaRPr lang="en-US"/>
           </a:p>
@@ -5164,7 +5055,7 @@
           <a:p>
             <a:fld id="{E822B9A2-E9F6-E646-ADD7-254B6AD8866B}" type="datetimeFigureOut">
               <a:rPr lang="en-US" smtClean="0"/>
-              <a:t>8/17/20</a:t>
+              <a:t>8/18/20</a:t>
             </a:fld>
             <a:endParaRPr lang="en-US"/>
           </a:p>
@@ -5453,7 +5344,7 @@
           <a:p>
             <a:fld id="{E822B9A2-E9F6-E646-ADD7-254B6AD8866B}" type="datetimeFigureOut">
               <a:rPr lang="en-US" smtClean="0"/>
-              <a:t>8/17/20</a:t>
+              <a:t>8/18/20</a:t>
             </a:fld>
             <a:endParaRPr lang="en-US"/>
           </a:p>
@@ -5696,7 +5587,7 @@
           <a:p>
             <a:fld id="{E822B9A2-E9F6-E646-ADD7-254B6AD8866B}" type="datetimeFigureOut">
               <a:rPr lang="en-US" smtClean="0"/>
-              <a:t>8/17/20</a:t>
+              <a:t>8/18/20</a:t>
             </a:fld>
             <a:endParaRPr lang="en-US"/>
           </a:p>
@@ -6445,7 +6336,7 @@
             </a:br>
             <a:r>
               <a:rPr lang="de-DE" sz="2000" dirty="0"/>
-              <a:t>(ft.Middleware fällt aus)</a:t>
+              <a:t>(TSE ist wieder erreichbar)</a:t>
             </a:r>
             <a:br>
               <a:rPr lang="de-DE" sz="2800" dirty="0"/>
@@ -6456,10 +6347,10 @@
       </p:sp>
       <p:pic>
         <p:nvPicPr>
-          <p:cNvPr id="5" name="Content Placeholder 4">
-            <a:extLst>
-              <a:ext uri="{FF2B5EF4-FFF2-40B4-BE49-F238E27FC236}">
-                <a16:creationId xmlns:a16="http://schemas.microsoft.com/office/drawing/2014/main" id="{AAD9D593-4D41-3A4A-9513-9042BB107570}"/>
+          <p:cNvPr id="7" name="Content Placeholder 6">
+            <a:extLst>
+              <a:ext uri="{FF2B5EF4-FFF2-40B4-BE49-F238E27FC236}">
+                <a16:creationId xmlns:a16="http://schemas.microsoft.com/office/drawing/2014/main" id="{A614244B-EB3D-0B4C-A340-EAB66BCB9128}"/>
               </a:ext>
             </a:extLst>
           </p:cNvPr>
@@ -6477,15 +6368,15 @@
         </p:blipFill>
         <p:spPr>
           <a:xfrm>
-            <a:off x="1757259" y="1690688"/>
-            <a:ext cx="6944694" cy="4613402"/>
+            <a:off x="838200" y="1627864"/>
+            <a:ext cx="9129600" cy="4375561"/>
           </a:xfrm>
         </p:spPr>
       </p:pic>
     </p:spTree>
     <p:extLst>
       <p:ext uri="{BB962C8B-B14F-4D97-AF65-F5344CB8AC3E}">
-        <p14:creationId xmlns:p14="http://schemas.microsoft.com/office/powerpoint/2010/main" val="3352848026"/>
+        <p14:creationId xmlns:p14="http://schemas.microsoft.com/office/powerpoint/2010/main" val="3149246966"/>
       </p:ext>
     </p:extLst>
   </p:cSld>
@@ -6544,7 +6435,7 @@
             </a:br>
             <a:r>
               <a:rPr lang="de-DE" sz="2000" dirty="0"/>
-              <a:t>(ft.Middleware fällt aus)</a:t>
+              <a:t>(ft.Middleware fällt aus -  nicht erreichbar)</a:t>
             </a:r>
             <a:br>
               <a:rPr lang="de-DE" sz="2800" dirty="0"/>
@@ -6576,7 +6467,7 @@
         </p:blipFill>
         <p:spPr>
           <a:xfrm>
-            <a:off x="1757259" y="1690688"/>
+            <a:off x="942251" y="1442209"/>
             <a:ext cx="6944694" cy="4613402"/>
           </a:xfrm>
         </p:spPr>
@@ -6584,7 +6475,205 @@
     </p:spTree>
     <p:extLst>
       <p:ext uri="{BB962C8B-B14F-4D97-AF65-F5344CB8AC3E}">
+        <p14:creationId xmlns:p14="http://schemas.microsoft.com/office/powerpoint/2010/main" val="3352848026"/>
+      </p:ext>
+    </p:extLst>
+  </p:cSld>
+  <p:clrMapOvr>
+    <a:masterClrMapping/>
+  </p:clrMapOvr>
+</p:sld>
+</file>
+
+<file path=ppt/slides/slide14.xml><?xml version="1.0" encoding="utf-8"?>
+<p:sld xmlns:a="http://schemas.openxmlformats.org/drawingml/2006/main" xmlns:r="http://schemas.openxmlformats.org/officeDocument/2006/relationships" xmlns:p="http://schemas.openxmlformats.org/presentationml/2006/main">
+  <p:cSld>
+    <p:spTree>
+      <p:nvGrpSpPr>
+        <p:cNvPr id="1" name=""/>
+        <p:cNvGrpSpPr/>
+        <p:nvPr/>
+      </p:nvGrpSpPr>
+      <p:grpSpPr>
+        <a:xfrm>
+          <a:off x="0" y="0"/>
+          <a:ext cx="0" cy="0"/>
+          <a:chOff x="0" y="0"/>
+          <a:chExt cx="0" cy="0"/>
+        </a:xfrm>
+      </p:grpSpPr>
+      <p:sp>
+        <p:nvSpPr>
+          <p:cNvPr id="2" name="Title 1">
+            <a:extLst>
+              <a:ext uri="{FF2B5EF4-FFF2-40B4-BE49-F238E27FC236}">
+                <a16:creationId xmlns:a16="http://schemas.microsoft.com/office/drawing/2014/main" id="{49C250B6-F0EB-477C-AB99-C3DD2BE9A656}"/>
+              </a:ext>
+            </a:extLst>
+          </p:cNvPr>
+          <p:cNvSpPr>
+            <a:spLocks noGrp="1"/>
+          </p:cNvSpPr>
+          <p:nvPr>
+            <p:ph type="title"/>
+          </p:nvPr>
+        </p:nvSpPr>
+        <p:spPr/>
+        <p:txBody>
+          <a:bodyPr>
+            <a:normAutofit/>
+          </a:bodyPr>
+          <a:lstStyle/>
+          <a:p>
+            <a:r>
+              <a:rPr lang="de-DE" sz="2800" dirty="0"/>
+              <a:t>Datenfluss im Fehlerfall</a:t>
+            </a:r>
+            <a:br>
+              <a:rPr lang="de-DE" sz="2800" dirty="0"/>
+            </a:br>
+            <a:r>
+              <a:rPr lang="de-DE" sz="2000" dirty="0"/>
+              <a:t>(ft.Middleware fällt aus – wieder erreichbar)</a:t>
+            </a:r>
+            <a:br>
+              <a:rPr lang="de-DE" sz="2800" dirty="0"/>
+            </a:br>
+            <a:endParaRPr lang="de-DE" sz="2800" dirty="0"/>
+          </a:p>
+        </p:txBody>
+      </p:sp>
+      <p:pic>
+        <p:nvPicPr>
+          <p:cNvPr id="5" name="Content Placeholder 4">
+            <a:extLst>
+              <a:ext uri="{FF2B5EF4-FFF2-40B4-BE49-F238E27FC236}">
+                <a16:creationId xmlns:a16="http://schemas.microsoft.com/office/drawing/2014/main" id="{AAD9D593-4D41-3A4A-9513-9042BB107570}"/>
+              </a:ext>
+            </a:extLst>
+          </p:cNvPr>
+          <p:cNvPicPr>
+            <a:picLocks noGrp="1" noChangeAspect="1"/>
+          </p:cNvPicPr>
+          <p:nvPr>
+            <p:ph idx="1"/>
+          </p:nvPr>
+        </p:nvPicPr>
+        <p:blipFill>
+          <a:blip r:embed="rId3"/>
+          <a:srcRect/>
+          <a:stretch/>
+        </p:blipFill>
+        <p:spPr>
+          <a:xfrm>
+            <a:off x="982007" y="1564249"/>
+            <a:ext cx="10600196" cy="4230263"/>
+          </a:xfrm>
+        </p:spPr>
+      </p:pic>
+    </p:spTree>
+    <p:extLst>
+      <p:ext uri="{BB962C8B-B14F-4D97-AF65-F5344CB8AC3E}">
         <p14:creationId xmlns:p14="http://schemas.microsoft.com/office/powerpoint/2010/main" val="1244143160"/>
+      </p:ext>
+    </p:extLst>
+  </p:cSld>
+  <p:clrMapOvr>
+    <a:masterClrMapping/>
+  </p:clrMapOvr>
+</p:sld>
+</file>
+
+<file path=ppt/slides/slide15.xml><?xml version="1.0" encoding="utf-8"?>
+<p:sld xmlns:a="http://schemas.openxmlformats.org/drawingml/2006/main" xmlns:r="http://schemas.openxmlformats.org/officeDocument/2006/relationships" xmlns:p="http://schemas.openxmlformats.org/presentationml/2006/main">
+  <p:cSld>
+    <p:spTree>
+      <p:nvGrpSpPr>
+        <p:cNvPr id="1" name=""/>
+        <p:cNvGrpSpPr/>
+        <p:nvPr/>
+      </p:nvGrpSpPr>
+      <p:grpSpPr>
+        <a:xfrm>
+          <a:off x="0" y="0"/>
+          <a:ext cx="0" cy="0"/>
+          <a:chOff x="0" y="0"/>
+          <a:chExt cx="0" cy="0"/>
+        </a:xfrm>
+      </p:grpSpPr>
+      <p:sp>
+        <p:nvSpPr>
+          <p:cNvPr id="2" name="Title 1">
+            <a:extLst>
+              <a:ext uri="{FF2B5EF4-FFF2-40B4-BE49-F238E27FC236}">
+                <a16:creationId xmlns:a16="http://schemas.microsoft.com/office/drawing/2014/main" id="{49C250B6-F0EB-477C-AB99-C3DD2BE9A656}"/>
+              </a:ext>
+            </a:extLst>
+          </p:cNvPr>
+          <p:cNvSpPr>
+            <a:spLocks noGrp="1"/>
+          </p:cNvSpPr>
+          <p:nvPr>
+            <p:ph type="title"/>
+          </p:nvPr>
+        </p:nvSpPr>
+        <p:spPr/>
+        <p:txBody>
+          <a:bodyPr>
+            <a:normAutofit/>
+          </a:bodyPr>
+          <a:lstStyle/>
+          <a:p>
+            <a:r>
+              <a:rPr lang="de-DE" sz="2800" dirty="0"/>
+              <a:t>Datenfluss im Fehlerfall</a:t>
+            </a:r>
+            <a:br>
+              <a:rPr lang="de-DE" sz="2800" dirty="0"/>
+            </a:br>
+            <a:r>
+              <a:rPr lang="de-DE" sz="2000" dirty="0"/>
+              <a:t>(ft.Middleware fällt aus – Late Signing Mode beenden)</a:t>
+            </a:r>
+            <a:br>
+              <a:rPr lang="de-DE" sz="2800" dirty="0"/>
+            </a:br>
+            <a:endParaRPr lang="de-DE" sz="2800" dirty="0"/>
+          </a:p>
+        </p:txBody>
+      </p:sp>
+      <p:pic>
+        <p:nvPicPr>
+          <p:cNvPr id="5" name="Content Placeholder 4">
+            <a:extLst>
+              <a:ext uri="{FF2B5EF4-FFF2-40B4-BE49-F238E27FC236}">
+                <a16:creationId xmlns:a16="http://schemas.microsoft.com/office/drawing/2014/main" id="{AAD9D593-4D41-3A4A-9513-9042BB107570}"/>
+              </a:ext>
+            </a:extLst>
+          </p:cNvPr>
+          <p:cNvPicPr>
+            <a:picLocks noGrp="1" noChangeAspect="1"/>
+          </p:cNvPicPr>
+          <p:nvPr>
+            <p:ph idx="1"/>
+          </p:nvPr>
+        </p:nvPicPr>
+        <p:blipFill>
+          <a:blip r:embed="rId3"/>
+          <a:srcRect/>
+          <a:stretch/>
+        </p:blipFill>
+        <p:spPr>
+          <a:xfrm>
+            <a:off x="838200" y="1474797"/>
+            <a:ext cx="9717157" cy="4568734"/>
+          </a:xfrm>
+        </p:spPr>
+      </p:pic>
+    </p:spTree>
+    <p:extLst>
+      <p:ext uri="{BB962C8B-B14F-4D97-AF65-F5344CB8AC3E}">
+        <p14:creationId xmlns:p14="http://schemas.microsoft.com/office/powerpoint/2010/main" val="3604923076"/>
       </p:ext>
     </p:extLst>
   </p:cSld>

</xml_diff>

<commit_message>
add feedback from AED
</commit_message>
<xml_diff>
--- a/for-poscreators/presentation/onboarding_de.pptx
+++ b/for-poscreators/presentation/onboarding_de.pptx
@@ -638,7 +638,7 @@
             </a:pPr>
             <a:r>
               <a:rPr lang="de-DE" noProof="0" dirty="0"/>
-              <a:t>Das POS-System bereitet den Nullbeleg vor (je nach Funktionalität die ausgeführt werden soll)</a:t>
+              <a:t>Das POS-System bereitet den Sonderbeleg vor (je nach Funktionalität die ausgeführt werden soll)</a:t>
             </a:r>
           </a:p>
           <a:p>
@@ -1032,7 +1032,7 @@
           <a:p>
             <a:r>
               <a:rPr lang="de-DE" noProof="0" dirty="0"/>
-              <a:t>Sobald die TSE wieder erreichbar ist, muss das POS-System einen Nullbeleg an die ft.Middleware senden. Diese versucht daraufhin die Kommunikation mit der TSE wiederherzustellen. Klappt die Kommunikation weiterhin nicht, so wird weiterhin der </a:t>
+              <a:t>Sobald die TSE wieder erreichbar ist, muss das POS-System einen Nullbeleg an die ft.Middleware senden. Dies ist deshalb wichtig, weil die ft.Middleware aus Performancegründen nicht selbst versucht herauszufinden, ob die TSE wieder erreichbar ist. Wird nun ein Nullbeleg an die ft.Middleware gesendet, so versucht diese die Kommunikation mit der TSE wiederherzustellen. Klappt die Kommunikation weiterhin nicht, so wird weiterhin der </a:t>
             </a:r>
             <a:r>
               <a:rPr lang="de-DE" noProof="0" dirty="0" err="1"/>
@@ -1040,7 +1040,7 @@
             </a:r>
             <a:r>
               <a:rPr lang="de-DE" noProof="0" dirty="0"/>
-              <a:t> =  0x02 (TSE Kommunikation ausgefallen) im Response zurückgegeben. Klappt die Kommunikation nun wieder, so wird an das POS-System der </a:t>
+              <a:t> =  0x02 (TSE Kommunikation ausgefallen) im Response zurückgegeben. Klappt die Kommunikation wieder, so wird an das POS-System der </a:t>
             </a:r>
             <a:r>
               <a:rPr lang="de-DE" noProof="0" dirty="0" err="1"/>
@@ -1775,6 +1775,61 @@
             </a:endParaRPr>
           </a:p>
           <a:p>
+            <a:pPr marL="0" marR="0" lvl="0" indent="0" algn="l" defTabSz="914400" rtl="0" eaLnBrk="1" fontAlgn="auto" latinLnBrk="0" hangingPunct="1">
+              <a:lnSpc>
+                <a:spcPct val="100000"/>
+              </a:lnSpc>
+              <a:spcBef>
+                <a:spcPts val="0"/>
+              </a:spcBef>
+              <a:spcAft>
+                <a:spcPts val="0"/>
+              </a:spcAft>
+              <a:buClrTx/>
+              <a:buSzTx/>
+              <a:buFontTx/>
+              <a:buNone/>
+              <a:tabLst/>
+              <a:defRPr/>
+            </a:pPr>
+            <a:r>
+              <a:rPr lang="de-DE" sz="1200" b="0" i="0" kern="1200" dirty="0">
+                <a:solidFill>
+                  <a:schemeClr val="tx1"/>
+                </a:solidFill>
+                <a:effectLst/>
+                <a:latin typeface="+mn-lt"/>
+                <a:ea typeface="+mn-ea"/>
+                <a:cs typeface="+mn-cs"/>
+              </a:rPr>
+              <a:t>Die Queue ist eine Komponente der </a:t>
+            </a:r>
+            <a:r>
+              <a:rPr lang="de-DE" sz="1200" b="0" i="0" kern="1200" dirty="0" err="1">
+                <a:solidFill>
+                  <a:schemeClr val="tx1"/>
+                </a:solidFill>
+                <a:effectLst/>
+                <a:latin typeface="+mn-lt"/>
+                <a:ea typeface="+mn-ea"/>
+                <a:cs typeface="+mn-cs"/>
+              </a:rPr>
+              <a:t>fiskaltrust.Middleware</a:t>
+            </a:r>
+            <a:r>
+              <a:rPr lang="de-DE" sz="1200" b="0" i="0" kern="1200" dirty="0">
+                <a:solidFill>
+                  <a:schemeClr val="tx1"/>
+                </a:solidFill>
+                <a:effectLst/>
+                <a:latin typeface="+mn-lt"/>
+                <a:ea typeface="+mn-ea"/>
+                <a:cs typeface="+mn-cs"/>
+              </a:rPr>
+              <a:t>, sammelt die Belege und ist für das Erzeugen und Persistieren der Belegkette verantwortlich. Des Weiteren ist die Queue die Komponente der ft.Middleware mit der Ihr POS-System kommuniziert. An sie senden Sie Ihre Belegdaten und erhalten Signaturen und andere Daten zurück.</a:t>
+            </a:r>
+          </a:p>
+          <a:p>
             <a:endParaRPr lang="de-DE" sz="1200" b="0" i="0" kern="1200" noProof="0" dirty="0">
               <a:solidFill>
                 <a:schemeClr val="tx1"/>
@@ -1787,7 +1842,7 @@
           </a:p>
           <a:p>
             <a:r>
-              <a:rPr lang="en-GB" sz="1200" b="0" i="0" kern="1200" dirty="0">
+              <a:rPr lang="de-DE" sz="1200" b="0" i="0" kern="1200" dirty="0">
                 <a:solidFill>
                   <a:schemeClr val="tx1"/>
                 </a:solidFill>
@@ -1796,10 +1851,10 @@
                 <a:ea typeface="+mn-ea"/>
                 <a:cs typeface="+mn-cs"/>
               </a:rPr>
-              <a:t>Die SCU (Security Creation Unit, </a:t>
-            </a:r>
-            <a:r>
-              <a:rPr lang="en-GB" sz="1200" b="0" i="0" kern="1200" dirty="0" err="1">
+              <a:t>Die SCU (Security </a:t>
+            </a:r>
+            <a:r>
+              <a:rPr lang="de-DE" sz="1200" b="0" i="0" kern="1200" dirty="0" err="1">
                 <a:solidFill>
                   <a:schemeClr val="tx1"/>
                 </a:solidFill>
@@ -1808,10 +1863,10 @@
                 <a:ea typeface="+mn-ea"/>
                 <a:cs typeface="+mn-cs"/>
               </a:rPr>
-              <a:t>deutsch</a:t>
-            </a:r>
-            <a:r>
-              <a:rPr lang="en-GB" sz="1200" b="0" i="0" kern="1200" dirty="0">
+              <a:t>Creation</a:t>
+            </a:r>
+            <a:r>
+              <a:rPr lang="de-DE" sz="1200" b="0" i="0" kern="1200" dirty="0">
                 <a:solidFill>
                   <a:schemeClr val="tx1"/>
                 </a:solidFill>
@@ -1820,130 +1875,10 @@
                 <a:ea typeface="+mn-ea"/>
                 <a:cs typeface="+mn-cs"/>
               </a:rPr>
-              <a:t>: </a:t>
-            </a:r>
-            <a:r>
-              <a:rPr lang="en-GB" sz="1200" b="0" i="0" kern="1200" dirty="0" err="1">
-                <a:solidFill>
-                  <a:schemeClr val="tx1"/>
-                </a:solidFill>
-                <a:effectLst/>
-                <a:latin typeface="+mn-lt"/>
-                <a:ea typeface="+mn-ea"/>
-                <a:cs typeface="+mn-cs"/>
-              </a:rPr>
-              <a:t>Signatur</a:t>
-            </a:r>
-            <a:r>
-              <a:rPr lang="en-GB" sz="1200" b="0" i="0" kern="1200" dirty="0">
-                <a:solidFill>
-                  <a:schemeClr val="tx1"/>
-                </a:solidFill>
-                <a:effectLst/>
-                <a:latin typeface="+mn-lt"/>
-                <a:ea typeface="+mn-ea"/>
-                <a:cs typeface="+mn-cs"/>
-              </a:rPr>
-              <a:t>-</a:t>
-            </a:r>
-            <a:r>
-              <a:rPr lang="en-GB" sz="1200" b="0" i="0" kern="1200" dirty="0" err="1">
-                <a:solidFill>
-                  <a:schemeClr val="tx1"/>
-                </a:solidFill>
-                <a:effectLst/>
-                <a:latin typeface="+mn-lt"/>
-                <a:ea typeface="+mn-ea"/>
-                <a:cs typeface="+mn-cs"/>
-              </a:rPr>
-              <a:t>Erstellungs</a:t>
-            </a:r>
-            <a:r>
-              <a:rPr lang="en-GB" sz="1200" b="0" i="0" kern="1200" dirty="0">
-                <a:solidFill>
-                  <a:schemeClr val="tx1"/>
-                </a:solidFill>
-                <a:effectLst/>
-                <a:latin typeface="+mn-lt"/>
-                <a:ea typeface="+mn-ea"/>
-                <a:cs typeface="+mn-cs"/>
-              </a:rPr>
-              <a:t>-Einheit) </a:t>
-            </a:r>
-            <a:r>
-              <a:rPr lang="en-GB" sz="1200" b="0" i="0" kern="1200" dirty="0" err="1">
-                <a:solidFill>
-                  <a:schemeClr val="tx1"/>
-                </a:solidFill>
-                <a:effectLst/>
-                <a:latin typeface="+mn-lt"/>
-                <a:ea typeface="+mn-ea"/>
-                <a:cs typeface="+mn-cs"/>
-              </a:rPr>
-              <a:t>ist</a:t>
-            </a:r>
-            <a:r>
-              <a:rPr lang="en-GB" sz="1200" b="0" i="0" kern="1200" dirty="0">
-                <a:solidFill>
-                  <a:schemeClr val="tx1"/>
-                </a:solidFill>
-                <a:effectLst/>
-                <a:latin typeface="+mn-lt"/>
-                <a:ea typeface="+mn-ea"/>
-                <a:cs typeface="+mn-cs"/>
-              </a:rPr>
-              <a:t> </a:t>
-            </a:r>
-            <a:r>
-              <a:rPr lang="en-GB" sz="1200" b="0" i="0" kern="1200" dirty="0" err="1">
-                <a:solidFill>
-                  <a:schemeClr val="tx1"/>
-                </a:solidFill>
-                <a:effectLst/>
-                <a:latin typeface="+mn-lt"/>
-                <a:ea typeface="+mn-ea"/>
-                <a:cs typeface="+mn-cs"/>
-              </a:rPr>
-              <a:t>eine</a:t>
-            </a:r>
-            <a:r>
-              <a:rPr lang="en-GB" sz="1200" b="0" i="0" kern="1200" dirty="0">
-                <a:solidFill>
-                  <a:schemeClr val="tx1"/>
-                </a:solidFill>
-                <a:effectLst/>
-                <a:latin typeface="+mn-lt"/>
-                <a:ea typeface="+mn-ea"/>
-                <a:cs typeface="+mn-cs"/>
-              </a:rPr>
-              <a:t> </a:t>
-            </a:r>
-            <a:r>
-              <a:rPr lang="en-GB" sz="1200" b="0" i="0" kern="1200" dirty="0" err="1">
-                <a:solidFill>
-                  <a:schemeClr val="tx1"/>
-                </a:solidFill>
-                <a:effectLst/>
-                <a:latin typeface="+mn-lt"/>
-                <a:ea typeface="+mn-ea"/>
-                <a:cs typeface="+mn-cs"/>
-              </a:rPr>
-              <a:t>Komponente</a:t>
-            </a:r>
-            <a:r>
-              <a:rPr lang="en-GB" sz="1200" b="0" i="0" kern="1200" dirty="0">
-                <a:solidFill>
-                  <a:schemeClr val="tx1"/>
-                </a:solidFill>
-                <a:effectLst/>
-                <a:latin typeface="+mn-lt"/>
-                <a:ea typeface="+mn-ea"/>
-                <a:cs typeface="+mn-cs"/>
-              </a:rPr>
-              <a:t> der </a:t>
-            </a:r>
-            <a:r>
-              <a:rPr lang="en-GB" sz="1200" b="0" i="0" kern="1200" dirty="0" err="1">
+              <a:t> Unit, deutsch: Signatur-Erstellungs-Einheit) ist eine Komponente der </a:t>
+            </a:r>
+            <a:r>
+              <a:rPr lang="de-DE" sz="1200" b="0" i="0" kern="1200" dirty="0" err="1">
                 <a:solidFill>
                   <a:schemeClr val="tx1"/>
                 </a:solidFill>
@@ -1955,7 +1890,7 @@
               <a:t>ft.Middelware</a:t>
             </a:r>
             <a:r>
-              <a:rPr lang="en-GB" sz="1200" b="0" i="0" kern="1200" dirty="0">
+              <a:rPr lang="de-DE" sz="1200" b="0" i="0" kern="1200" dirty="0">
                 <a:solidFill>
                   <a:schemeClr val="tx1"/>
                 </a:solidFill>
@@ -1964,10 +1899,23 @@
                 <a:ea typeface="+mn-ea"/>
                 <a:cs typeface="+mn-cs"/>
               </a:rPr>
-              <a:t>, die </a:t>
-            </a:r>
-            <a:r>
-              <a:rPr lang="en-GB" sz="1200" b="0" i="0" kern="1200" dirty="0" err="1">
+              <a:t>, die für die Signierung zuständig ist. In Deutschland übernimmt sie die Kommunikation mit der TSE, die schlussendlich die Signierung vornimmt. Je nachdem welche TSE Sie benutzen möchten, benötigt die SCU eine entsprechende Konfiguration um auf diese zugreifen zu können.</a:t>
+            </a:r>
+          </a:p>
+          <a:p>
+            <a:endParaRPr lang="de-DE" sz="1200" b="0" i="0" kern="1200" noProof="0" dirty="0">
+              <a:solidFill>
+                <a:schemeClr val="tx1"/>
+              </a:solidFill>
+              <a:effectLst/>
+              <a:latin typeface="+mn-lt"/>
+              <a:ea typeface="+mn-ea"/>
+              <a:cs typeface="+mn-cs"/>
+            </a:endParaRPr>
+          </a:p>
+          <a:p>
+            <a:r>
+              <a:rPr lang="de-DE" sz="1200" b="0" i="0" kern="1200" noProof="0" dirty="0">
                 <a:solidFill>
                   <a:schemeClr val="tx1"/>
                 </a:solidFill>
@@ -1976,1629 +1924,7 @@
                 <a:ea typeface="+mn-ea"/>
                 <a:cs typeface="+mn-cs"/>
               </a:rPr>
-              <a:t>für</a:t>
-            </a:r>
-            <a:r>
-              <a:rPr lang="en-GB" sz="1200" b="0" i="0" kern="1200" dirty="0">
-                <a:solidFill>
-                  <a:schemeClr val="tx1"/>
-                </a:solidFill>
-                <a:effectLst/>
-                <a:latin typeface="+mn-lt"/>
-                <a:ea typeface="+mn-ea"/>
-                <a:cs typeface="+mn-cs"/>
-              </a:rPr>
-              <a:t> die </a:t>
-            </a:r>
-            <a:r>
-              <a:rPr lang="en-GB" sz="1200" b="0" i="0" kern="1200" dirty="0" err="1">
-                <a:solidFill>
-                  <a:schemeClr val="tx1"/>
-                </a:solidFill>
-                <a:effectLst/>
-                <a:latin typeface="+mn-lt"/>
-                <a:ea typeface="+mn-ea"/>
-                <a:cs typeface="+mn-cs"/>
-              </a:rPr>
-              <a:t>Signierung</a:t>
-            </a:r>
-            <a:r>
-              <a:rPr lang="en-GB" sz="1200" b="0" i="0" kern="1200" dirty="0">
-                <a:solidFill>
-                  <a:schemeClr val="tx1"/>
-                </a:solidFill>
-                <a:effectLst/>
-                <a:latin typeface="+mn-lt"/>
-                <a:ea typeface="+mn-ea"/>
-                <a:cs typeface="+mn-cs"/>
-              </a:rPr>
-              <a:t> </a:t>
-            </a:r>
-            <a:r>
-              <a:rPr lang="en-GB" sz="1200" b="0" i="0" kern="1200" dirty="0" err="1">
-                <a:solidFill>
-                  <a:schemeClr val="tx1"/>
-                </a:solidFill>
-                <a:effectLst/>
-                <a:latin typeface="+mn-lt"/>
-                <a:ea typeface="+mn-ea"/>
-                <a:cs typeface="+mn-cs"/>
-              </a:rPr>
-              <a:t>zuständig</a:t>
-            </a:r>
-            <a:r>
-              <a:rPr lang="en-GB" sz="1200" b="0" i="0" kern="1200" dirty="0">
-                <a:solidFill>
-                  <a:schemeClr val="tx1"/>
-                </a:solidFill>
-                <a:effectLst/>
-                <a:latin typeface="+mn-lt"/>
-                <a:ea typeface="+mn-ea"/>
-                <a:cs typeface="+mn-cs"/>
-              </a:rPr>
-              <a:t> </a:t>
-            </a:r>
-            <a:r>
-              <a:rPr lang="en-GB" sz="1200" b="0" i="0" kern="1200" dirty="0" err="1">
-                <a:solidFill>
-                  <a:schemeClr val="tx1"/>
-                </a:solidFill>
-                <a:effectLst/>
-                <a:latin typeface="+mn-lt"/>
-                <a:ea typeface="+mn-ea"/>
-                <a:cs typeface="+mn-cs"/>
-              </a:rPr>
-              <a:t>ist</a:t>
-            </a:r>
-            <a:r>
-              <a:rPr lang="en-GB" sz="1200" b="0" i="0" kern="1200" dirty="0">
-                <a:solidFill>
-                  <a:schemeClr val="tx1"/>
-                </a:solidFill>
-                <a:effectLst/>
-                <a:latin typeface="+mn-lt"/>
-                <a:ea typeface="+mn-ea"/>
-                <a:cs typeface="+mn-cs"/>
-              </a:rPr>
-              <a:t>. In </a:t>
-            </a:r>
-            <a:r>
-              <a:rPr lang="en-GB" sz="1200" b="0" i="0" kern="1200" dirty="0" err="1">
-                <a:solidFill>
-                  <a:schemeClr val="tx1"/>
-                </a:solidFill>
-                <a:effectLst/>
-                <a:latin typeface="+mn-lt"/>
-                <a:ea typeface="+mn-ea"/>
-                <a:cs typeface="+mn-cs"/>
-              </a:rPr>
-              <a:t>Deuchland</a:t>
-            </a:r>
-            <a:r>
-              <a:rPr lang="en-GB" sz="1200" b="0" i="0" kern="1200" dirty="0">
-                <a:solidFill>
-                  <a:schemeClr val="tx1"/>
-                </a:solidFill>
-                <a:effectLst/>
-                <a:latin typeface="+mn-lt"/>
-                <a:ea typeface="+mn-ea"/>
-                <a:cs typeface="+mn-cs"/>
-              </a:rPr>
-              <a:t> </a:t>
-            </a:r>
-            <a:r>
-              <a:rPr lang="en-GB" sz="1200" b="0" i="0" kern="1200" dirty="0" err="1">
-                <a:solidFill>
-                  <a:schemeClr val="tx1"/>
-                </a:solidFill>
-                <a:effectLst/>
-                <a:latin typeface="+mn-lt"/>
-                <a:ea typeface="+mn-ea"/>
-                <a:cs typeface="+mn-cs"/>
-              </a:rPr>
-              <a:t>übernimmt</a:t>
-            </a:r>
-            <a:r>
-              <a:rPr lang="en-GB" sz="1200" b="0" i="0" kern="1200" dirty="0">
-                <a:solidFill>
-                  <a:schemeClr val="tx1"/>
-                </a:solidFill>
-                <a:effectLst/>
-                <a:latin typeface="+mn-lt"/>
-                <a:ea typeface="+mn-ea"/>
-                <a:cs typeface="+mn-cs"/>
-              </a:rPr>
-              <a:t> </a:t>
-            </a:r>
-            <a:r>
-              <a:rPr lang="en-GB" sz="1200" b="0" i="0" kern="1200" dirty="0" err="1">
-                <a:solidFill>
-                  <a:schemeClr val="tx1"/>
-                </a:solidFill>
-                <a:effectLst/>
-                <a:latin typeface="+mn-lt"/>
-                <a:ea typeface="+mn-ea"/>
-                <a:cs typeface="+mn-cs"/>
-              </a:rPr>
-              <a:t>sie</a:t>
-            </a:r>
-            <a:r>
-              <a:rPr lang="en-GB" sz="1200" b="0" i="0" kern="1200" dirty="0">
-                <a:solidFill>
-                  <a:schemeClr val="tx1"/>
-                </a:solidFill>
-                <a:effectLst/>
-                <a:latin typeface="+mn-lt"/>
-                <a:ea typeface="+mn-ea"/>
-                <a:cs typeface="+mn-cs"/>
-              </a:rPr>
-              <a:t> die </a:t>
-            </a:r>
-            <a:r>
-              <a:rPr lang="en-GB" sz="1200" b="0" i="0" kern="1200" dirty="0" err="1">
-                <a:solidFill>
-                  <a:schemeClr val="tx1"/>
-                </a:solidFill>
-                <a:effectLst/>
-                <a:latin typeface="+mn-lt"/>
-                <a:ea typeface="+mn-ea"/>
-                <a:cs typeface="+mn-cs"/>
-              </a:rPr>
-              <a:t>Kommunikation</a:t>
-            </a:r>
-            <a:r>
-              <a:rPr lang="en-GB" sz="1200" b="0" i="0" kern="1200" dirty="0">
-                <a:solidFill>
-                  <a:schemeClr val="tx1"/>
-                </a:solidFill>
-                <a:effectLst/>
-                <a:latin typeface="+mn-lt"/>
-                <a:ea typeface="+mn-ea"/>
-                <a:cs typeface="+mn-cs"/>
-              </a:rPr>
-              <a:t> </a:t>
-            </a:r>
-            <a:r>
-              <a:rPr lang="en-GB" sz="1200" b="0" i="0" kern="1200" dirty="0" err="1">
-                <a:solidFill>
-                  <a:schemeClr val="tx1"/>
-                </a:solidFill>
-                <a:effectLst/>
-                <a:latin typeface="+mn-lt"/>
-                <a:ea typeface="+mn-ea"/>
-                <a:cs typeface="+mn-cs"/>
-              </a:rPr>
-              <a:t>mit</a:t>
-            </a:r>
-            <a:r>
-              <a:rPr lang="en-GB" sz="1200" b="0" i="0" kern="1200" dirty="0">
-                <a:solidFill>
-                  <a:schemeClr val="tx1"/>
-                </a:solidFill>
-                <a:effectLst/>
-                <a:latin typeface="+mn-lt"/>
-                <a:ea typeface="+mn-ea"/>
-                <a:cs typeface="+mn-cs"/>
-              </a:rPr>
-              <a:t> der TSE, die </a:t>
-            </a:r>
-            <a:r>
-              <a:rPr lang="en-GB" sz="1200" b="0" i="0" kern="1200" dirty="0" err="1">
-                <a:solidFill>
-                  <a:schemeClr val="tx1"/>
-                </a:solidFill>
-                <a:effectLst/>
-                <a:latin typeface="+mn-lt"/>
-                <a:ea typeface="+mn-ea"/>
-                <a:cs typeface="+mn-cs"/>
-              </a:rPr>
-              <a:t>schlußendlich</a:t>
-            </a:r>
-            <a:r>
-              <a:rPr lang="en-GB" sz="1200" b="0" i="0" kern="1200" dirty="0">
-                <a:solidFill>
-                  <a:schemeClr val="tx1"/>
-                </a:solidFill>
-                <a:effectLst/>
-                <a:latin typeface="+mn-lt"/>
-                <a:ea typeface="+mn-ea"/>
-                <a:cs typeface="+mn-cs"/>
-              </a:rPr>
-              <a:t> die </a:t>
-            </a:r>
-            <a:r>
-              <a:rPr lang="en-GB" sz="1200" b="0" i="0" kern="1200" dirty="0" err="1">
-                <a:solidFill>
-                  <a:schemeClr val="tx1"/>
-                </a:solidFill>
-                <a:effectLst/>
-                <a:latin typeface="+mn-lt"/>
-                <a:ea typeface="+mn-ea"/>
-                <a:cs typeface="+mn-cs"/>
-              </a:rPr>
-              <a:t>Signierungen</a:t>
-            </a:r>
-            <a:r>
-              <a:rPr lang="en-GB" sz="1200" b="0" i="0" kern="1200" dirty="0">
-                <a:solidFill>
-                  <a:schemeClr val="tx1"/>
-                </a:solidFill>
-                <a:effectLst/>
-                <a:latin typeface="+mn-lt"/>
-                <a:ea typeface="+mn-ea"/>
-                <a:cs typeface="+mn-cs"/>
-              </a:rPr>
-              <a:t> </a:t>
-            </a:r>
-            <a:r>
-              <a:rPr lang="en-GB" sz="1200" b="0" i="0" kern="1200" dirty="0" err="1">
-                <a:solidFill>
-                  <a:schemeClr val="tx1"/>
-                </a:solidFill>
-                <a:effectLst/>
-                <a:latin typeface="+mn-lt"/>
-                <a:ea typeface="+mn-ea"/>
-                <a:cs typeface="+mn-cs"/>
-              </a:rPr>
-              <a:t>vornimmt</a:t>
-            </a:r>
-            <a:r>
-              <a:rPr lang="en-GB" sz="1200" b="0" i="0" kern="1200" dirty="0">
-                <a:solidFill>
-                  <a:schemeClr val="tx1"/>
-                </a:solidFill>
-                <a:effectLst/>
-                <a:latin typeface="+mn-lt"/>
-                <a:ea typeface="+mn-ea"/>
-                <a:cs typeface="+mn-cs"/>
-              </a:rPr>
-              <a:t>. Je </a:t>
-            </a:r>
-            <a:r>
-              <a:rPr lang="en-GB" sz="1200" b="0" i="0" kern="1200" dirty="0" err="1">
-                <a:solidFill>
-                  <a:schemeClr val="tx1"/>
-                </a:solidFill>
-                <a:effectLst/>
-                <a:latin typeface="+mn-lt"/>
-                <a:ea typeface="+mn-ea"/>
-                <a:cs typeface="+mn-cs"/>
-              </a:rPr>
-              <a:t>nachdem</a:t>
-            </a:r>
-            <a:r>
-              <a:rPr lang="en-GB" sz="1200" b="0" i="0" kern="1200" dirty="0">
-                <a:solidFill>
-                  <a:schemeClr val="tx1"/>
-                </a:solidFill>
-                <a:effectLst/>
-                <a:latin typeface="+mn-lt"/>
-                <a:ea typeface="+mn-ea"/>
-                <a:cs typeface="+mn-cs"/>
-              </a:rPr>
-              <a:t> </a:t>
-            </a:r>
-            <a:r>
-              <a:rPr lang="en-GB" sz="1200" b="0" i="0" kern="1200" dirty="0" err="1">
-                <a:solidFill>
-                  <a:schemeClr val="tx1"/>
-                </a:solidFill>
-                <a:effectLst/>
-                <a:latin typeface="+mn-lt"/>
-                <a:ea typeface="+mn-ea"/>
-                <a:cs typeface="+mn-cs"/>
-              </a:rPr>
-              <a:t>welche</a:t>
-            </a:r>
-            <a:r>
-              <a:rPr lang="en-GB" sz="1200" b="0" i="0" kern="1200" dirty="0">
-                <a:solidFill>
-                  <a:schemeClr val="tx1"/>
-                </a:solidFill>
-                <a:effectLst/>
-                <a:latin typeface="+mn-lt"/>
-                <a:ea typeface="+mn-ea"/>
-                <a:cs typeface="+mn-cs"/>
-              </a:rPr>
-              <a:t> TSE </a:t>
-            </a:r>
-            <a:r>
-              <a:rPr lang="en-GB" sz="1200" b="0" i="0" kern="1200" dirty="0" err="1">
-                <a:solidFill>
-                  <a:schemeClr val="tx1"/>
-                </a:solidFill>
-                <a:effectLst/>
-                <a:latin typeface="+mn-lt"/>
-                <a:ea typeface="+mn-ea"/>
-                <a:cs typeface="+mn-cs"/>
-              </a:rPr>
-              <a:t>sie</a:t>
-            </a:r>
-            <a:r>
-              <a:rPr lang="en-GB" sz="1200" b="0" i="0" kern="1200" dirty="0">
-                <a:solidFill>
-                  <a:schemeClr val="tx1"/>
-                </a:solidFill>
-                <a:effectLst/>
-                <a:latin typeface="+mn-lt"/>
-                <a:ea typeface="+mn-ea"/>
-                <a:cs typeface="+mn-cs"/>
-              </a:rPr>
-              <a:t> </a:t>
-            </a:r>
-            <a:r>
-              <a:rPr lang="en-GB" sz="1200" b="0" i="0" kern="1200" dirty="0" err="1">
-                <a:solidFill>
-                  <a:schemeClr val="tx1"/>
-                </a:solidFill>
-                <a:effectLst/>
-                <a:latin typeface="+mn-lt"/>
-                <a:ea typeface="+mn-ea"/>
-                <a:cs typeface="+mn-cs"/>
-              </a:rPr>
-              <a:t>benutzen</a:t>
-            </a:r>
-            <a:r>
-              <a:rPr lang="en-GB" sz="1200" b="0" i="0" kern="1200" dirty="0">
-                <a:solidFill>
-                  <a:schemeClr val="tx1"/>
-                </a:solidFill>
-                <a:effectLst/>
-                <a:latin typeface="+mn-lt"/>
-                <a:ea typeface="+mn-ea"/>
-                <a:cs typeface="+mn-cs"/>
-              </a:rPr>
-              <a:t> </a:t>
-            </a:r>
-            <a:r>
-              <a:rPr lang="en-GB" sz="1200" b="0" i="0" kern="1200" dirty="0" err="1">
-                <a:solidFill>
-                  <a:schemeClr val="tx1"/>
-                </a:solidFill>
-                <a:effectLst/>
-                <a:latin typeface="+mn-lt"/>
-                <a:ea typeface="+mn-ea"/>
-                <a:cs typeface="+mn-cs"/>
-              </a:rPr>
-              <a:t>möchten</a:t>
-            </a:r>
-            <a:r>
-              <a:rPr lang="en-GB" sz="1200" b="0" i="0" kern="1200" dirty="0">
-                <a:solidFill>
-                  <a:schemeClr val="tx1"/>
-                </a:solidFill>
-                <a:effectLst/>
-                <a:latin typeface="+mn-lt"/>
-                <a:ea typeface="+mn-ea"/>
-                <a:cs typeface="+mn-cs"/>
-              </a:rPr>
-              <a:t> </a:t>
-            </a:r>
-            <a:r>
-              <a:rPr lang="en-GB" sz="1200" b="0" i="0" kern="1200" dirty="0" err="1">
-                <a:solidFill>
-                  <a:schemeClr val="tx1"/>
-                </a:solidFill>
-                <a:effectLst/>
-                <a:latin typeface="+mn-lt"/>
-                <a:ea typeface="+mn-ea"/>
-                <a:cs typeface="+mn-cs"/>
-              </a:rPr>
-              <a:t>benötigt</a:t>
-            </a:r>
-            <a:r>
-              <a:rPr lang="en-GB" sz="1200" b="0" i="0" kern="1200" dirty="0">
-                <a:solidFill>
-                  <a:schemeClr val="tx1"/>
-                </a:solidFill>
-                <a:effectLst/>
-                <a:latin typeface="+mn-lt"/>
-                <a:ea typeface="+mn-ea"/>
-                <a:cs typeface="+mn-cs"/>
-              </a:rPr>
-              <a:t> die SCU </a:t>
-            </a:r>
-            <a:r>
-              <a:rPr lang="en-GB" sz="1200" b="0" i="0" kern="1200" dirty="0" err="1">
-                <a:solidFill>
-                  <a:schemeClr val="tx1"/>
-                </a:solidFill>
-                <a:effectLst/>
-                <a:latin typeface="+mn-lt"/>
-                <a:ea typeface="+mn-ea"/>
-                <a:cs typeface="+mn-cs"/>
-              </a:rPr>
-              <a:t>eine</a:t>
-            </a:r>
-            <a:r>
-              <a:rPr lang="en-GB" sz="1200" b="0" i="0" kern="1200" dirty="0">
-                <a:solidFill>
-                  <a:schemeClr val="tx1"/>
-                </a:solidFill>
-                <a:effectLst/>
-                <a:latin typeface="+mn-lt"/>
-                <a:ea typeface="+mn-ea"/>
-                <a:cs typeface="+mn-cs"/>
-              </a:rPr>
-              <a:t> </a:t>
-            </a:r>
-            <a:r>
-              <a:rPr lang="en-GB" sz="1200" b="0" i="0" kern="1200" dirty="0" err="1">
-                <a:solidFill>
-                  <a:schemeClr val="tx1"/>
-                </a:solidFill>
-                <a:effectLst/>
-                <a:latin typeface="+mn-lt"/>
-                <a:ea typeface="+mn-ea"/>
-                <a:cs typeface="+mn-cs"/>
-              </a:rPr>
-              <a:t>entsprechende</a:t>
-            </a:r>
-            <a:r>
-              <a:rPr lang="en-GB" sz="1200" b="0" i="0" kern="1200" dirty="0">
-                <a:solidFill>
-                  <a:schemeClr val="tx1"/>
-                </a:solidFill>
-                <a:effectLst/>
-                <a:latin typeface="+mn-lt"/>
-                <a:ea typeface="+mn-ea"/>
-                <a:cs typeface="+mn-cs"/>
-              </a:rPr>
-              <a:t> </a:t>
-            </a:r>
-            <a:r>
-              <a:rPr lang="en-GB" sz="1200" b="0" i="0" kern="1200" dirty="0" err="1">
-                <a:solidFill>
-                  <a:schemeClr val="tx1"/>
-                </a:solidFill>
-                <a:effectLst/>
-                <a:latin typeface="+mn-lt"/>
-                <a:ea typeface="+mn-ea"/>
-                <a:cs typeface="+mn-cs"/>
-              </a:rPr>
-              <a:t>Konfiguration</a:t>
-            </a:r>
-            <a:r>
-              <a:rPr lang="en-GB" sz="1200" b="0" i="0" kern="1200" dirty="0">
-                <a:solidFill>
-                  <a:schemeClr val="tx1"/>
-                </a:solidFill>
-                <a:effectLst/>
-                <a:latin typeface="+mn-lt"/>
-                <a:ea typeface="+mn-ea"/>
-                <a:cs typeface="+mn-cs"/>
-              </a:rPr>
-              <a:t> um auf </a:t>
-            </a:r>
-            <a:r>
-              <a:rPr lang="en-GB" sz="1200" b="0" i="0" kern="1200" dirty="0" err="1">
-                <a:solidFill>
-                  <a:schemeClr val="tx1"/>
-                </a:solidFill>
-                <a:effectLst/>
-                <a:latin typeface="+mn-lt"/>
-                <a:ea typeface="+mn-ea"/>
-                <a:cs typeface="+mn-cs"/>
-              </a:rPr>
-              <a:t>diese</a:t>
-            </a:r>
-            <a:r>
-              <a:rPr lang="en-GB" sz="1200" b="0" i="0" kern="1200" dirty="0">
-                <a:solidFill>
-                  <a:schemeClr val="tx1"/>
-                </a:solidFill>
-                <a:effectLst/>
-                <a:latin typeface="+mn-lt"/>
-                <a:ea typeface="+mn-ea"/>
-                <a:cs typeface="+mn-cs"/>
-              </a:rPr>
-              <a:t> </a:t>
-            </a:r>
-            <a:r>
-              <a:rPr lang="en-GB" sz="1200" b="0" i="0" kern="1200" dirty="0" err="1">
-                <a:solidFill>
-                  <a:schemeClr val="tx1"/>
-                </a:solidFill>
-                <a:effectLst/>
-                <a:latin typeface="+mn-lt"/>
-                <a:ea typeface="+mn-ea"/>
-                <a:cs typeface="+mn-cs"/>
-              </a:rPr>
-              <a:t>zugreifen</a:t>
-            </a:r>
-            <a:r>
-              <a:rPr lang="en-GB" sz="1200" b="0" i="0" kern="1200" dirty="0">
-                <a:solidFill>
-                  <a:schemeClr val="tx1"/>
-                </a:solidFill>
-                <a:effectLst/>
-                <a:latin typeface="+mn-lt"/>
-                <a:ea typeface="+mn-ea"/>
-                <a:cs typeface="+mn-cs"/>
-              </a:rPr>
-              <a:t> </a:t>
-            </a:r>
-            <a:r>
-              <a:rPr lang="en-GB" sz="1200" b="0" i="0" kern="1200" dirty="0" err="1">
-                <a:solidFill>
-                  <a:schemeClr val="tx1"/>
-                </a:solidFill>
-                <a:effectLst/>
-                <a:latin typeface="+mn-lt"/>
-                <a:ea typeface="+mn-ea"/>
-                <a:cs typeface="+mn-cs"/>
-              </a:rPr>
-              <a:t>zu</a:t>
-            </a:r>
-            <a:r>
-              <a:rPr lang="en-GB" sz="1200" b="0" i="0" kern="1200" dirty="0">
-                <a:solidFill>
-                  <a:schemeClr val="tx1"/>
-                </a:solidFill>
-                <a:effectLst/>
-                <a:latin typeface="+mn-lt"/>
-                <a:ea typeface="+mn-ea"/>
-                <a:cs typeface="+mn-cs"/>
-              </a:rPr>
-              <a:t> </a:t>
-            </a:r>
-            <a:r>
-              <a:rPr lang="en-GB" sz="1200" b="0" i="0" kern="1200" dirty="0" err="1">
-                <a:solidFill>
-                  <a:schemeClr val="tx1"/>
-                </a:solidFill>
-                <a:effectLst/>
-                <a:latin typeface="+mn-lt"/>
-                <a:ea typeface="+mn-ea"/>
-                <a:cs typeface="+mn-cs"/>
-              </a:rPr>
-              <a:t>können</a:t>
-            </a:r>
-            <a:r>
-              <a:rPr lang="en-GB" sz="1200" b="0" i="0" kern="1200" dirty="0">
-                <a:solidFill>
-                  <a:schemeClr val="tx1"/>
-                </a:solidFill>
-                <a:effectLst/>
-                <a:latin typeface="+mn-lt"/>
-                <a:ea typeface="+mn-ea"/>
-                <a:cs typeface="+mn-cs"/>
-              </a:rPr>
-              <a:t>.</a:t>
-            </a:r>
-          </a:p>
-          <a:p>
-            <a:endParaRPr lang="en-GB" sz="1200" b="0" i="0" kern="1200" noProof="0" dirty="0">
-              <a:solidFill>
-                <a:schemeClr val="tx1"/>
-              </a:solidFill>
-              <a:effectLst/>
-              <a:latin typeface="+mn-lt"/>
-              <a:ea typeface="+mn-ea"/>
-              <a:cs typeface="+mn-cs"/>
-            </a:endParaRPr>
-          </a:p>
-          <a:p>
-            <a:r>
-              <a:rPr lang="en-GB" sz="1200" b="0" i="0" kern="1200" dirty="0">
-                <a:solidFill>
-                  <a:schemeClr val="tx1"/>
-                </a:solidFill>
-                <a:effectLst/>
-                <a:latin typeface="+mn-lt"/>
-                <a:ea typeface="+mn-ea"/>
-                <a:cs typeface="+mn-cs"/>
-              </a:rPr>
-              <a:t>Die Queue </a:t>
-            </a:r>
-            <a:r>
-              <a:rPr lang="en-GB" sz="1200" b="0" i="0" kern="1200" dirty="0" err="1">
-                <a:solidFill>
-                  <a:schemeClr val="tx1"/>
-                </a:solidFill>
-                <a:effectLst/>
-                <a:latin typeface="+mn-lt"/>
-                <a:ea typeface="+mn-ea"/>
-                <a:cs typeface="+mn-cs"/>
-              </a:rPr>
-              <a:t>ist</a:t>
-            </a:r>
-            <a:r>
-              <a:rPr lang="en-GB" sz="1200" b="0" i="0" kern="1200" dirty="0">
-                <a:solidFill>
-                  <a:schemeClr val="tx1"/>
-                </a:solidFill>
-                <a:effectLst/>
-                <a:latin typeface="+mn-lt"/>
-                <a:ea typeface="+mn-ea"/>
-                <a:cs typeface="+mn-cs"/>
-              </a:rPr>
-              <a:t> </a:t>
-            </a:r>
-            <a:r>
-              <a:rPr lang="en-GB" sz="1200" b="0" i="0" kern="1200" dirty="0" err="1">
-                <a:solidFill>
-                  <a:schemeClr val="tx1"/>
-                </a:solidFill>
-                <a:effectLst/>
-                <a:latin typeface="+mn-lt"/>
-                <a:ea typeface="+mn-ea"/>
-                <a:cs typeface="+mn-cs"/>
-              </a:rPr>
-              <a:t>eine</a:t>
-            </a:r>
-            <a:r>
-              <a:rPr lang="en-GB" sz="1200" b="0" i="0" kern="1200" dirty="0">
-                <a:solidFill>
-                  <a:schemeClr val="tx1"/>
-                </a:solidFill>
-                <a:effectLst/>
-                <a:latin typeface="+mn-lt"/>
-                <a:ea typeface="+mn-ea"/>
-                <a:cs typeface="+mn-cs"/>
-              </a:rPr>
-              <a:t> </a:t>
-            </a:r>
-            <a:r>
-              <a:rPr lang="en-GB" sz="1200" b="0" i="0" kern="1200" dirty="0" err="1">
-                <a:solidFill>
-                  <a:schemeClr val="tx1"/>
-                </a:solidFill>
-                <a:effectLst/>
-                <a:latin typeface="+mn-lt"/>
-                <a:ea typeface="+mn-ea"/>
-                <a:cs typeface="+mn-cs"/>
-              </a:rPr>
-              <a:t>Komponente</a:t>
-            </a:r>
-            <a:r>
-              <a:rPr lang="en-GB" sz="1200" b="0" i="0" kern="1200" dirty="0">
-                <a:solidFill>
-                  <a:schemeClr val="tx1"/>
-                </a:solidFill>
-                <a:effectLst/>
-                <a:latin typeface="+mn-lt"/>
-                <a:ea typeface="+mn-ea"/>
-                <a:cs typeface="+mn-cs"/>
-              </a:rPr>
-              <a:t> der </a:t>
-            </a:r>
-            <a:r>
-              <a:rPr lang="en-GB" sz="1200" b="0" i="0" kern="1200" dirty="0" err="1">
-                <a:solidFill>
-                  <a:schemeClr val="tx1"/>
-                </a:solidFill>
-                <a:effectLst/>
-                <a:latin typeface="+mn-lt"/>
-                <a:ea typeface="+mn-ea"/>
-                <a:cs typeface="+mn-cs"/>
-              </a:rPr>
-              <a:t>fiskaltrust.Middleware</a:t>
-            </a:r>
-            <a:r>
-              <a:rPr lang="en-GB" sz="1200" b="0" i="0" kern="1200" dirty="0">
-                <a:solidFill>
-                  <a:schemeClr val="tx1"/>
-                </a:solidFill>
-                <a:effectLst/>
-                <a:latin typeface="+mn-lt"/>
-                <a:ea typeface="+mn-ea"/>
-                <a:cs typeface="+mn-cs"/>
-              </a:rPr>
-              <a:t>, </a:t>
-            </a:r>
-            <a:r>
-              <a:rPr lang="en-GB" sz="1200" b="0" i="0" kern="1200" dirty="0" err="1">
-                <a:solidFill>
-                  <a:schemeClr val="tx1"/>
-                </a:solidFill>
-                <a:effectLst/>
-                <a:latin typeface="+mn-lt"/>
-                <a:ea typeface="+mn-ea"/>
-                <a:cs typeface="+mn-cs"/>
-              </a:rPr>
-              <a:t>sammelt</a:t>
-            </a:r>
-            <a:r>
-              <a:rPr lang="en-GB" sz="1200" b="0" i="0" kern="1200" dirty="0">
-                <a:solidFill>
-                  <a:schemeClr val="tx1"/>
-                </a:solidFill>
-                <a:effectLst/>
-                <a:latin typeface="+mn-lt"/>
-                <a:ea typeface="+mn-ea"/>
-                <a:cs typeface="+mn-cs"/>
-              </a:rPr>
-              <a:t> die </a:t>
-            </a:r>
-            <a:r>
-              <a:rPr lang="en-GB" sz="1200" b="0" i="0" kern="1200" dirty="0" err="1">
-                <a:solidFill>
-                  <a:schemeClr val="tx1"/>
-                </a:solidFill>
-                <a:effectLst/>
-                <a:latin typeface="+mn-lt"/>
-                <a:ea typeface="+mn-ea"/>
-                <a:cs typeface="+mn-cs"/>
-              </a:rPr>
-              <a:t>Belege</a:t>
-            </a:r>
-            <a:r>
-              <a:rPr lang="en-GB" sz="1200" b="0" i="0" kern="1200" dirty="0">
-                <a:solidFill>
-                  <a:schemeClr val="tx1"/>
-                </a:solidFill>
-                <a:effectLst/>
-                <a:latin typeface="+mn-lt"/>
-                <a:ea typeface="+mn-ea"/>
-                <a:cs typeface="+mn-cs"/>
-              </a:rPr>
-              <a:t> und </a:t>
-            </a:r>
-            <a:r>
-              <a:rPr lang="en-GB" sz="1200" b="0" i="0" kern="1200" dirty="0" err="1">
-                <a:solidFill>
-                  <a:schemeClr val="tx1"/>
-                </a:solidFill>
-                <a:effectLst/>
-                <a:latin typeface="+mn-lt"/>
-                <a:ea typeface="+mn-ea"/>
-                <a:cs typeface="+mn-cs"/>
-              </a:rPr>
-              <a:t>ist</a:t>
-            </a:r>
-            <a:r>
-              <a:rPr lang="en-GB" sz="1200" b="0" i="0" kern="1200" dirty="0">
-                <a:solidFill>
-                  <a:schemeClr val="tx1"/>
-                </a:solidFill>
-                <a:effectLst/>
-                <a:latin typeface="+mn-lt"/>
-                <a:ea typeface="+mn-ea"/>
-                <a:cs typeface="+mn-cs"/>
-              </a:rPr>
-              <a:t> </a:t>
-            </a:r>
-            <a:r>
-              <a:rPr lang="en-GB" sz="1200" b="0" i="0" kern="1200" dirty="0" err="1">
-                <a:solidFill>
-                  <a:schemeClr val="tx1"/>
-                </a:solidFill>
-                <a:effectLst/>
-                <a:latin typeface="+mn-lt"/>
-                <a:ea typeface="+mn-ea"/>
-                <a:cs typeface="+mn-cs"/>
-              </a:rPr>
-              <a:t>für</a:t>
-            </a:r>
-            <a:r>
-              <a:rPr lang="en-GB" sz="1200" b="0" i="0" kern="1200" dirty="0">
-                <a:solidFill>
-                  <a:schemeClr val="tx1"/>
-                </a:solidFill>
-                <a:effectLst/>
-                <a:latin typeface="+mn-lt"/>
-                <a:ea typeface="+mn-ea"/>
-                <a:cs typeface="+mn-cs"/>
-              </a:rPr>
-              <a:t> das </a:t>
-            </a:r>
-            <a:r>
-              <a:rPr lang="en-GB" sz="1200" b="0" i="0" kern="1200" dirty="0" err="1">
-                <a:solidFill>
-                  <a:schemeClr val="tx1"/>
-                </a:solidFill>
-                <a:effectLst/>
-                <a:latin typeface="+mn-lt"/>
-                <a:ea typeface="+mn-ea"/>
-                <a:cs typeface="+mn-cs"/>
-              </a:rPr>
-              <a:t>Erzeugen</a:t>
-            </a:r>
-            <a:r>
-              <a:rPr lang="en-GB" sz="1200" b="0" i="0" kern="1200" dirty="0">
-                <a:solidFill>
-                  <a:schemeClr val="tx1"/>
-                </a:solidFill>
-                <a:effectLst/>
-                <a:latin typeface="+mn-lt"/>
-                <a:ea typeface="+mn-ea"/>
-                <a:cs typeface="+mn-cs"/>
-              </a:rPr>
-              <a:t> und </a:t>
-            </a:r>
-            <a:r>
-              <a:rPr lang="en-GB" sz="1200" b="0" i="0" kern="1200" dirty="0" err="1">
-                <a:solidFill>
-                  <a:schemeClr val="tx1"/>
-                </a:solidFill>
-                <a:effectLst/>
-                <a:latin typeface="+mn-lt"/>
-                <a:ea typeface="+mn-ea"/>
-                <a:cs typeface="+mn-cs"/>
-              </a:rPr>
-              <a:t>Persistieren</a:t>
-            </a:r>
-            <a:r>
-              <a:rPr lang="en-GB" sz="1200" b="0" i="0" kern="1200" dirty="0">
-                <a:solidFill>
-                  <a:schemeClr val="tx1"/>
-                </a:solidFill>
-                <a:effectLst/>
-                <a:latin typeface="+mn-lt"/>
-                <a:ea typeface="+mn-ea"/>
-                <a:cs typeface="+mn-cs"/>
-              </a:rPr>
-              <a:t> der </a:t>
-            </a:r>
-            <a:r>
-              <a:rPr lang="en-GB" sz="1200" b="0" i="0" kern="1200" dirty="0" err="1">
-                <a:solidFill>
-                  <a:schemeClr val="tx1"/>
-                </a:solidFill>
-                <a:effectLst/>
-                <a:latin typeface="+mn-lt"/>
-                <a:ea typeface="+mn-ea"/>
-                <a:cs typeface="+mn-cs"/>
-              </a:rPr>
-              <a:t>Belegkette</a:t>
-            </a:r>
-            <a:r>
-              <a:rPr lang="en-GB" sz="1200" b="0" i="0" kern="1200" dirty="0">
-                <a:solidFill>
-                  <a:schemeClr val="tx1"/>
-                </a:solidFill>
-                <a:effectLst/>
-                <a:latin typeface="+mn-lt"/>
-                <a:ea typeface="+mn-ea"/>
-                <a:cs typeface="+mn-cs"/>
-              </a:rPr>
-              <a:t> </a:t>
-            </a:r>
-            <a:r>
-              <a:rPr lang="en-GB" sz="1200" b="0" i="0" kern="1200" dirty="0" err="1">
-                <a:solidFill>
-                  <a:schemeClr val="tx1"/>
-                </a:solidFill>
-                <a:effectLst/>
-                <a:latin typeface="+mn-lt"/>
-                <a:ea typeface="+mn-ea"/>
-                <a:cs typeface="+mn-cs"/>
-              </a:rPr>
-              <a:t>verantwortlich</a:t>
-            </a:r>
-            <a:r>
-              <a:rPr lang="en-GB" sz="1200" b="0" i="0" kern="1200" dirty="0">
-                <a:solidFill>
-                  <a:schemeClr val="tx1"/>
-                </a:solidFill>
-                <a:effectLst/>
-                <a:latin typeface="+mn-lt"/>
-                <a:ea typeface="+mn-ea"/>
-                <a:cs typeface="+mn-cs"/>
-              </a:rPr>
-              <a:t>. Des </a:t>
-            </a:r>
-            <a:r>
-              <a:rPr lang="en-GB" sz="1200" b="0" i="0" kern="1200" dirty="0" err="1">
-                <a:solidFill>
-                  <a:schemeClr val="tx1"/>
-                </a:solidFill>
-                <a:effectLst/>
-                <a:latin typeface="+mn-lt"/>
-                <a:ea typeface="+mn-ea"/>
-                <a:cs typeface="+mn-cs"/>
-              </a:rPr>
-              <a:t>Weiteren</a:t>
-            </a:r>
-            <a:r>
-              <a:rPr lang="en-GB" sz="1200" b="0" i="0" kern="1200" dirty="0">
-                <a:solidFill>
-                  <a:schemeClr val="tx1"/>
-                </a:solidFill>
-                <a:effectLst/>
-                <a:latin typeface="+mn-lt"/>
-                <a:ea typeface="+mn-ea"/>
-                <a:cs typeface="+mn-cs"/>
-              </a:rPr>
-              <a:t> </a:t>
-            </a:r>
-            <a:r>
-              <a:rPr lang="en-GB" sz="1200" b="0" i="0" kern="1200" dirty="0" err="1">
-                <a:solidFill>
-                  <a:schemeClr val="tx1"/>
-                </a:solidFill>
-                <a:effectLst/>
-                <a:latin typeface="+mn-lt"/>
-                <a:ea typeface="+mn-ea"/>
-                <a:cs typeface="+mn-cs"/>
-              </a:rPr>
-              <a:t>ist</a:t>
-            </a:r>
-            <a:r>
-              <a:rPr lang="en-GB" sz="1200" b="0" i="0" kern="1200" dirty="0">
-                <a:solidFill>
-                  <a:schemeClr val="tx1"/>
-                </a:solidFill>
-                <a:effectLst/>
-                <a:latin typeface="+mn-lt"/>
-                <a:ea typeface="+mn-ea"/>
-                <a:cs typeface="+mn-cs"/>
-              </a:rPr>
-              <a:t> die Queue die </a:t>
-            </a:r>
-            <a:r>
-              <a:rPr lang="en-GB" sz="1200" b="0" i="0" kern="1200" dirty="0" err="1">
-                <a:solidFill>
-                  <a:schemeClr val="tx1"/>
-                </a:solidFill>
-                <a:effectLst/>
-                <a:latin typeface="+mn-lt"/>
-                <a:ea typeface="+mn-ea"/>
-                <a:cs typeface="+mn-cs"/>
-              </a:rPr>
-              <a:t>Komponente</a:t>
-            </a:r>
-            <a:r>
-              <a:rPr lang="en-GB" sz="1200" b="0" i="0" kern="1200" dirty="0">
-                <a:solidFill>
-                  <a:schemeClr val="tx1"/>
-                </a:solidFill>
-                <a:effectLst/>
-                <a:latin typeface="+mn-lt"/>
-                <a:ea typeface="+mn-ea"/>
-                <a:cs typeface="+mn-cs"/>
-              </a:rPr>
-              <a:t> der ft.Middleware </a:t>
-            </a:r>
-            <a:r>
-              <a:rPr lang="en-GB" sz="1200" b="0" i="0" kern="1200" dirty="0" err="1">
-                <a:solidFill>
-                  <a:schemeClr val="tx1"/>
-                </a:solidFill>
-                <a:effectLst/>
-                <a:latin typeface="+mn-lt"/>
-                <a:ea typeface="+mn-ea"/>
-                <a:cs typeface="+mn-cs"/>
-              </a:rPr>
-              <a:t>mit</a:t>
-            </a:r>
-            <a:r>
-              <a:rPr lang="en-GB" sz="1200" b="0" i="0" kern="1200" dirty="0">
-                <a:solidFill>
-                  <a:schemeClr val="tx1"/>
-                </a:solidFill>
-                <a:effectLst/>
-                <a:latin typeface="+mn-lt"/>
-                <a:ea typeface="+mn-ea"/>
-                <a:cs typeface="+mn-cs"/>
-              </a:rPr>
-              <a:t> der </a:t>
-            </a:r>
-            <a:r>
-              <a:rPr lang="en-GB" sz="1200" b="0" i="0" kern="1200" dirty="0" err="1">
-                <a:solidFill>
-                  <a:schemeClr val="tx1"/>
-                </a:solidFill>
-                <a:effectLst/>
-                <a:latin typeface="+mn-lt"/>
-                <a:ea typeface="+mn-ea"/>
-                <a:cs typeface="+mn-cs"/>
-              </a:rPr>
-              <a:t>Ihr</a:t>
-            </a:r>
-            <a:r>
-              <a:rPr lang="en-GB" sz="1200" b="0" i="0" kern="1200" dirty="0">
-                <a:solidFill>
-                  <a:schemeClr val="tx1"/>
-                </a:solidFill>
-                <a:effectLst/>
-                <a:latin typeface="+mn-lt"/>
-                <a:ea typeface="+mn-ea"/>
-                <a:cs typeface="+mn-cs"/>
-              </a:rPr>
-              <a:t> POS-System </a:t>
-            </a:r>
-            <a:r>
-              <a:rPr lang="en-GB" sz="1200" b="0" i="0" kern="1200" dirty="0" err="1">
-                <a:solidFill>
-                  <a:schemeClr val="tx1"/>
-                </a:solidFill>
-                <a:effectLst/>
-                <a:latin typeface="+mn-lt"/>
-                <a:ea typeface="+mn-ea"/>
-                <a:cs typeface="+mn-cs"/>
-              </a:rPr>
-              <a:t>kommuniziert</a:t>
-            </a:r>
-            <a:r>
-              <a:rPr lang="en-GB" sz="1200" b="0" i="0" kern="1200" dirty="0">
-                <a:solidFill>
-                  <a:schemeClr val="tx1"/>
-                </a:solidFill>
-                <a:effectLst/>
-                <a:latin typeface="+mn-lt"/>
-                <a:ea typeface="+mn-ea"/>
-                <a:cs typeface="+mn-cs"/>
-              </a:rPr>
-              <a:t>. An </a:t>
-            </a:r>
-            <a:r>
-              <a:rPr lang="en-GB" sz="1200" b="0" i="0" kern="1200" dirty="0" err="1">
-                <a:solidFill>
-                  <a:schemeClr val="tx1"/>
-                </a:solidFill>
-                <a:effectLst/>
-                <a:latin typeface="+mn-lt"/>
-                <a:ea typeface="+mn-ea"/>
-                <a:cs typeface="+mn-cs"/>
-              </a:rPr>
-              <a:t>sie</a:t>
-            </a:r>
-            <a:r>
-              <a:rPr lang="en-GB" sz="1200" b="0" i="0" kern="1200" dirty="0">
-                <a:solidFill>
-                  <a:schemeClr val="tx1"/>
-                </a:solidFill>
-                <a:effectLst/>
-                <a:latin typeface="+mn-lt"/>
-                <a:ea typeface="+mn-ea"/>
-                <a:cs typeface="+mn-cs"/>
-              </a:rPr>
-              <a:t> </a:t>
-            </a:r>
-            <a:r>
-              <a:rPr lang="en-GB" sz="1200" b="0" i="0" kern="1200" dirty="0" err="1">
-                <a:solidFill>
-                  <a:schemeClr val="tx1"/>
-                </a:solidFill>
-                <a:effectLst/>
-                <a:latin typeface="+mn-lt"/>
-                <a:ea typeface="+mn-ea"/>
-                <a:cs typeface="+mn-cs"/>
-              </a:rPr>
-              <a:t>senden</a:t>
-            </a:r>
-            <a:r>
-              <a:rPr lang="en-GB" sz="1200" b="0" i="0" kern="1200" dirty="0">
-                <a:solidFill>
-                  <a:schemeClr val="tx1"/>
-                </a:solidFill>
-                <a:effectLst/>
-                <a:latin typeface="+mn-lt"/>
-                <a:ea typeface="+mn-ea"/>
-                <a:cs typeface="+mn-cs"/>
-              </a:rPr>
-              <a:t> Sie </a:t>
-            </a:r>
-            <a:r>
-              <a:rPr lang="en-GB" sz="1200" b="0" i="0" kern="1200" dirty="0" err="1">
-                <a:solidFill>
-                  <a:schemeClr val="tx1"/>
-                </a:solidFill>
-                <a:effectLst/>
-                <a:latin typeface="+mn-lt"/>
-                <a:ea typeface="+mn-ea"/>
-                <a:cs typeface="+mn-cs"/>
-              </a:rPr>
-              <a:t>Ihre</a:t>
-            </a:r>
-            <a:r>
-              <a:rPr lang="en-GB" sz="1200" b="0" i="0" kern="1200" dirty="0">
-                <a:solidFill>
-                  <a:schemeClr val="tx1"/>
-                </a:solidFill>
-                <a:effectLst/>
-                <a:latin typeface="+mn-lt"/>
-                <a:ea typeface="+mn-ea"/>
-                <a:cs typeface="+mn-cs"/>
-              </a:rPr>
-              <a:t> </a:t>
-            </a:r>
-            <a:r>
-              <a:rPr lang="en-GB" sz="1200" b="0" i="0" kern="1200" dirty="0" err="1">
-                <a:solidFill>
-                  <a:schemeClr val="tx1"/>
-                </a:solidFill>
-                <a:effectLst/>
-                <a:latin typeface="+mn-lt"/>
-                <a:ea typeface="+mn-ea"/>
-                <a:cs typeface="+mn-cs"/>
-              </a:rPr>
-              <a:t>Belegdaten</a:t>
-            </a:r>
-            <a:r>
-              <a:rPr lang="en-GB" sz="1200" b="0" i="0" kern="1200" dirty="0">
-                <a:solidFill>
-                  <a:schemeClr val="tx1"/>
-                </a:solidFill>
-                <a:effectLst/>
-                <a:latin typeface="+mn-lt"/>
-                <a:ea typeface="+mn-ea"/>
-                <a:cs typeface="+mn-cs"/>
-              </a:rPr>
-              <a:t> und </a:t>
-            </a:r>
-            <a:r>
-              <a:rPr lang="en-GB" sz="1200" b="0" i="0" kern="1200" dirty="0" err="1">
-                <a:solidFill>
-                  <a:schemeClr val="tx1"/>
-                </a:solidFill>
-                <a:effectLst/>
-                <a:latin typeface="+mn-lt"/>
-                <a:ea typeface="+mn-ea"/>
-                <a:cs typeface="+mn-cs"/>
-              </a:rPr>
-              <a:t>erhalten</a:t>
-            </a:r>
-            <a:r>
-              <a:rPr lang="en-GB" sz="1200" b="0" i="0" kern="1200" dirty="0">
-                <a:solidFill>
-                  <a:schemeClr val="tx1"/>
-                </a:solidFill>
-                <a:effectLst/>
-                <a:latin typeface="+mn-lt"/>
-                <a:ea typeface="+mn-ea"/>
-                <a:cs typeface="+mn-cs"/>
-              </a:rPr>
-              <a:t> </a:t>
-            </a:r>
-            <a:r>
-              <a:rPr lang="en-GB" sz="1200" b="0" i="0" kern="1200" dirty="0" err="1">
-                <a:solidFill>
-                  <a:schemeClr val="tx1"/>
-                </a:solidFill>
-                <a:effectLst/>
-                <a:latin typeface="+mn-lt"/>
-                <a:ea typeface="+mn-ea"/>
-                <a:cs typeface="+mn-cs"/>
-              </a:rPr>
-              <a:t>Signaturen</a:t>
-            </a:r>
-            <a:r>
-              <a:rPr lang="en-GB" sz="1200" b="0" i="0" kern="1200" dirty="0">
-                <a:solidFill>
-                  <a:schemeClr val="tx1"/>
-                </a:solidFill>
-                <a:effectLst/>
-                <a:latin typeface="+mn-lt"/>
-                <a:ea typeface="+mn-ea"/>
-                <a:cs typeface="+mn-cs"/>
-              </a:rPr>
-              <a:t> und </a:t>
-            </a:r>
-            <a:r>
-              <a:rPr lang="en-GB" sz="1200" b="0" i="0" kern="1200" dirty="0" err="1">
-                <a:solidFill>
-                  <a:schemeClr val="tx1"/>
-                </a:solidFill>
-                <a:effectLst/>
-                <a:latin typeface="+mn-lt"/>
-                <a:ea typeface="+mn-ea"/>
-                <a:cs typeface="+mn-cs"/>
-              </a:rPr>
-              <a:t>andere</a:t>
-            </a:r>
-            <a:r>
-              <a:rPr lang="en-GB" sz="1200" b="0" i="0" kern="1200" dirty="0">
-                <a:solidFill>
-                  <a:schemeClr val="tx1"/>
-                </a:solidFill>
-                <a:effectLst/>
-                <a:latin typeface="+mn-lt"/>
-                <a:ea typeface="+mn-ea"/>
-                <a:cs typeface="+mn-cs"/>
-              </a:rPr>
-              <a:t> </a:t>
-            </a:r>
-            <a:r>
-              <a:rPr lang="en-GB" sz="1200" b="0" i="0" kern="1200" dirty="0" err="1">
-                <a:solidFill>
-                  <a:schemeClr val="tx1"/>
-                </a:solidFill>
-                <a:effectLst/>
-                <a:latin typeface="+mn-lt"/>
-                <a:ea typeface="+mn-ea"/>
-                <a:cs typeface="+mn-cs"/>
-              </a:rPr>
-              <a:t>Daten</a:t>
-            </a:r>
-            <a:r>
-              <a:rPr lang="en-GB" sz="1200" b="0" i="0" kern="1200" dirty="0">
-                <a:solidFill>
-                  <a:schemeClr val="tx1"/>
-                </a:solidFill>
-                <a:effectLst/>
-                <a:latin typeface="+mn-lt"/>
-                <a:ea typeface="+mn-ea"/>
-                <a:cs typeface="+mn-cs"/>
-              </a:rPr>
-              <a:t> </a:t>
-            </a:r>
-            <a:r>
-              <a:rPr lang="en-GB" sz="1200" b="0" i="0" kern="1200" dirty="0" err="1">
-                <a:solidFill>
-                  <a:schemeClr val="tx1"/>
-                </a:solidFill>
-                <a:effectLst/>
-                <a:latin typeface="+mn-lt"/>
-                <a:ea typeface="+mn-ea"/>
-                <a:cs typeface="+mn-cs"/>
-              </a:rPr>
-              <a:t>zurück</a:t>
-            </a:r>
-            <a:r>
-              <a:rPr lang="en-GB" sz="1200" b="0" i="0" kern="1200" dirty="0">
-                <a:solidFill>
-                  <a:schemeClr val="tx1"/>
-                </a:solidFill>
-                <a:effectLst/>
-                <a:latin typeface="+mn-lt"/>
-                <a:ea typeface="+mn-ea"/>
-                <a:cs typeface="+mn-cs"/>
-              </a:rPr>
-              <a:t>.</a:t>
-            </a:r>
-          </a:p>
-          <a:p>
-            <a:endParaRPr lang="en-GB" sz="1200" b="0" i="0" kern="1200" noProof="0" dirty="0">
-              <a:solidFill>
-                <a:schemeClr val="tx1"/>
-              </a:solidFill>
-              <a:effectLst/>
-              <a:latin typeface="+mn-lt"/>
-              <a:ea typeface="+mn-ea"/>
-              <a:cs typeface="+mn-cs"/>
-            </a:endParaRPr>
-          </a:p>
-          <a:p>
-            <a:r>
-              <a:rPr lang="en-GB" sz="1200" b="0" i="0" kern="1200" noProof="0" dirty="0">
-                <a:solidFill>
-                  <a:schemeClr val="tx1"/>
-                </a:solidFill>
-                <a:effectLst/>
-                <a:latin typeface="+mn-lt"/>
-                <a:ea typeface="+mn-ea"/>
-                <a:cs typeface="+mn-cs"/>
-              </a:rPr>
-              <a:t>Die Cashbox </a:t>
-            </a:r>
-            <a:r>
-              <a:rPr lang="en-GB" sz="1200" b="0" i="0" kern="1200" noProof="0" dirty="0" err="1">
-                <a:solidFill>
-                  <a:schemeClr val="tx1"/>
-                </a:solidFill>
-                <a:effectLst/>
-                <a:latin typeface="+mn-lt"/>
-                <a:ea typeface="+mn-ea"/>
-                <a:cs typeface="+mn-cs"/>
-              </a:rPr>
-              <a:t>beinhaltet</a:t>
-            </a:r>
-            <a:r>
-              <a:rPr lang="en-GB" sz="1200" b="0" i="0" kern="1200" noProof="0" dirty="0">
-                <a:solidFill>
-                  <a:schemeClr val="tx1"/>
-                </a:solidFill>
-                <a:effectLst/>
-                <a:latin typeface="+mn-lt"/>
-                <a:ea typeface="+mn-ea"/>
-                <a:cs typeface="+mn-cs"/>
-              </a:rPr>
-              <a:t> die </a:t>
-            </a:r>
-            <a:r>
-              <a:rPr lang="en-GB" sz="1200" b="0" i="0" kern="1200" noProof="0" dirty="0" err="1">
-                <a:solidFill>
-                  <a:schemeClr val="tx1"/>
-                </a:solidFill>
-                <a:effectLst/>
-                <a:latin typeface="+mn-lt"/>
-                <a:ea typeface="+mn-ea"/>
-                <a:cs typeface="+mn-cs"/>
-              </a:rPr>
-              <a:t>benötigten</a:t>
-            </a:r>
-            <a:r>
-              <a:rPr lang="en-GB" sz="1200" b="0" i="0" kern="1200" noProof="0" dirty="0">
-                <a:solidFill>
-                  <a:schemeClr val="tx1"/>
-                </a:solidFill>
-                <a:effectLst/>
-                <a:latin typeface="+mn-lt"/>
-                <a:ea typeface="+mn-ea"/>
-                <a:cs typeface="+mn-cs"/>
-              </a:rPr>
-              <a:t> </a:t>
-            </a:r>
-            <a:r>
-              <a:rPr lang="en-GB" sz="1200" b="0" i="0" kern="1200" noProof="0" dirty="0" err="1">
-                <a:solidFill>
-                  <a:schemeClr val="tx1"/>
-                </a:solidFill>
-                <a:effectLst/>
-                <a:latin typeface="+mn-lt"/>
-                <a:ea typeface="+mn-ea"/>
-                <a:cs typeface="+mn-cs"/>
-              </a:rPr>
-              <a:t>Konfigurationen</a:t>
-            </a:r>
-            <a:r>
-              <a:rPr lang="en-GB" sz="1200" b="0" i="0" kern="1200" noProof="0" dirty="0">
-                <a:solidFill>
-                  <a:schemeClr val="tx1"/>
-                </a:solidFill>
-                <a:effectLst/>
-                <a:latin typeface="+mn-lt"/>
-                <a:ea typeface="+mn-ea"/>
-                <a:cs typeface="+mn-cs"/>
-              </a:rPr>
-              <a:t> und </a:t>
-            </a:r>
-            <a:r>
-              <a:rPr lang="en-GB" sz="1200" b="0" i="0" kern="1200" noProof="0" dirty="0" err="1">
-                <a:solidFill>
-                  <a:schemeClr val="tx1"/>
-                </a:solidFill>
-                <a:effectLst/>
-                <a:latin typeface="+mn-lt"/>
-                <a:ea typeface="+mn-ea"/>
-                <a:cs typeface="+mn-cs"/>
-              </a:rPr>
-              <a:t>verbindet</a:t>
-            </a:r>
-            <a:r>
-              <a:rPr lang="en-GB" sz="1200" b="0" i="0" kern="1200" noProof="0" dirty="0">
-                <a:solidFill>
-                  <a:schemeClr val="tx1"/>
-                </a:solidFill>
-                <a:effectLst/>
-                <a:latin typeface="+mn-lt"/>
-                <a:ea typeface="+mn-ea"/>
-                <a:cs typeface="+mn-cs"/>
-              </a:rPr>
-              <a:t> </a:t>
-            </a:r>
-            <a:r>
-              <a:rPr lang="en-GB" sz="1200" b="0" i="0" kern="1200" noProof="0" dirty="0" err="1">
-                <a:solidFill>
-                  <a:schemeClr val="tx1"/>
-                </a:solidFill>
-                <a:effectLst/>
-                <a:latin typeface="+mn-lt"/>
-                <a:ea typeface="+mn-ea"/>
-                <a:cs typeface="+mn-cs"/>
-              </a:rPr>
-              <a:t>diese</a:t>
-            </a:r>
-            <a:r>
-              <a:rPr lang="en-GB" sz="1200" b="0" i="0" kern="1200" noProof="0" dirty="0">
-                <a:solidFill>
-                  <a:schemeClr val="tx1"/>
-                </a:solidFill>
-                <a:effectLst/>
-                <a:latin typeface="+mn-lt"/>
-                <a:ea typeface="+mn-ea"/>
-                <a:cs typeface="+mn-cs"/>
-              </a:rPr>
-              <a:t> </a:t>
-            </a:r>
-            <a:r>
-              <a:rPr lang="en-GB" sz="1200" b="0" i="0" kern="1200" noProof="0" dirty="0" err="1">
-                <a:solidFill>
-                  <a:schemeClr val="tx1"/>
-                </a:solidFill>
-                <a:effectLst/>
-                <a:latin typeface="+mn-lt"/>
-                <a:ea typeface="+mn-ea"/>
-                <a:cs typeface="+mn-cs"/>
-              </a:rPr>
-              <a:t>miteinader</a:t>
-            </a:r>
-            <a:r>
-              <a:rPr lang="en-GB" sz="1200" b="0" i="0" kern="1200" noProof="0" dirty="0">
-                <a:solidFill>
-                  <a:schemeClr val="tx1"/>
-                </a:solidFill>
-                <a:effectLst/>
-                <a:latin typeface="+mn-lt"/>
-                <a:ea typeface="+mn-ea"/>
-                <a:cs typeface="+mn-cs"/>
-              </a:rPr>
-              <a:t>. </a:t>
-            </a:r>
-            <a:r>
-              <a:rPr lang="en-GB" sz="1200" b="0" i="0" kern="1200" noProof="0" dirty="0" err="1">
-                <a:solidFill>
-                  <a:schemeClr val="tx1"/>
-                </a:solidFill>
-                <a:effectLst/>
-                <a:latin typeface="+mn-lt"/>
-                <a:ea typeface="+mn-ea"/>
-                <a:cs typeface="+mn-cs"/>
-              </a:rPr>
-              <a:t>Jede</a:t>
-            </a:r>
-            <a:r>
-              <a:rPr lang="en-GB" sz="1200" b="0" i="0" kern="1200" noProof="0" dirty="0">
-                <a:solidFill>
-                  <a:schemeClr val="tx1"/>
-                </a:solidFill>
-                <a:effectLst/>
-                <a:latin typeface="+mn-lt"/>
-                <a:ea typeface="+mn-ea"/>
-                <a:cs typeface="+mn-cs"/>
-              </a:rPr>
-              <a:t> Middleware </a:t>
-            </a:r>
-            <a:r>
-              <a:rPr lang="en-GB" sz="1200" b="0" i="0" kern="1200" noProof="0" dirty="0" err="1">
-                <a:solidFill>
-                  <a:schemeClr val="tx1"/>
-                </a:solidFill>
-                <a:effectLst/>
-                <a:latin typeface="+mn-lt"/>
-                <a:ea typeface="+mn-ea"/>
-                <a:cs typeface="+mn-cs"/>
-              </a:rPr>
-              <a:t>Instanz</a:t>
-            </a:r>
-            <a:r>
-              <a:rPr lang="en-GB" sz="1200" b="0" i="0" kern="1200" noProof="0" dirty="0">
-                <a:solidFill>
-                  <a:schemeClr val="tx1"/>
-                </a:solidFill>
-                <a:effectLst/>
-                <a:latin typeface="+mn-lt"/>
-                <a:ea typeface="+mn-ea"/>
-                <a:cs typeface="+mn-cs"/>
-              </a:rPr>
-              <a:t> </a:t>
-            </a:r>
-            <a:r>
-              <a:rPr lang="en-GB" sz="1200" b="0" i="0" kern="1200" noProof="0" dirty="0" err="1">
-                <a:solidFill>
-                  <a:schemeClr val="tx1"/>
-                </a:solidFill>
-                <a:effectLst/>
-                <a:latin typeface="+mn-lt"/>
-                <a:ea typeface="+mn-ea"/>
-                <a:cs typeface="+mn-cs"/>
-              </a:rPr>
-              <a:t>benötigt</a:t>
-            </a:r>
-            <a:r>
-              <a:rPr lang="en-GB" sz="1200" b="0" i="0" kern="1200" noProof="0" dirty="0">
-                <a:solidFill>
-                  <a:schemeClr val="tx1"/>
-                </a:solidFill>
-                <a:effectLst/>
-                <a:latin typeface="+mn-lt"/>
-                <a:ea typeface="+mn-ea"/>
-                <a:cs typeface="+mn-cs"/>
-              </a:rPr>
-              <a:t> </a:t>
-            </a:r>
-            <a:r>
-              <a:rPr lang="en-GB" sz="1200" b="0" i="0" kern="1200" noProof="0" dirty="0" err="1">
-                <a:solidFill>
-                  <a:schemeClr val="tx1"/>
-                </a:solidFill>
-                <a:effectLst/>
-                <a:latin typeface="+mn-lt"/>
-                <a:ea typeface="+mn-ea"/>
-                <a:cs typeface="+mn-cs"/>
-              </a:rPr>
-              <a:t>eine</a:t>
-            </a:r>
-            <a:r>
-              <a:rPr lang="en-GB" sz="1200" b="0" i="0" kern="1200" noProof="0" dirty="0">
-                <a:solidFill>
-                  <a:schemeClr val="tx1"/>
-                </a:solidFill>
-                <a:effectLst/>
-                <a:latin typeface="+mn-lt"/>
-                <a:ea typeface="+mn-ea"/>
-                <a:cs typeface="+mn-cs"/>
-              </a:rPr>
-              <a:t> Cashbox um den </a:t>
-            </a:r>
-            <a:r>
-              <a:rPr lang="en-GB" sz="1200" b="0" i="0" kern="1200" noProof="0" dirty="0" err="1">
-                <a:solidFill>
-                  <a:schemeClr val="tx1"/>
-                </a:solidFill>
-                <a:effectLst/>
-                <a:latin typeface="+mn-lt"/>
-                <a:ea typeface="+mn-ea"/>
-                <a:cs typeface="+mn-cs"/>
-              </a:rPr>
-              <a:t>Betrieb</a:t>
-            </a:r>
-            <a:r>
-              <a:rPr lang="en-GB" sz="1200" b="0" i="0" kern="1200" noProof="0" dirty="0">
-                <a:solidFill>
-                  <a:schemeClr val="tx1"/>
-                </a:solidFill>
-                <a:effectLst/>
-                <a:latin typeface="+mn-lt"/>
-                <a:ea typeface="+mn-ea"/>
-                <a:cs typeface="+mn-cs"/>
-              </a:rPr>
-              <a:t> </a:t>
-            </a:r>
-            <a:r>
-              <a:rPr lang="en-GB" sz="1200" b="0" i="0" kern="1200" noProof="0" dirty="0" err="1">
-                <a:solidFill>
-                  <a:schemeClr val="tx1"/>
-                </a:solidFill>
-                <a:effectLst/>
-                <a:latin typeface="+mn-lt"/>
-                <a:ea typeface="+mn-ea"/>
-                <a:cs typeface="+mn-cs"/>
-              </a:rPr>
-              <a:t>aufnehmen</a:t>
-            </a:r>
-            <a:r>
-              <a:rPr lang="en-GB" sz="1200" b="0" i="0" kern="1200" noProof="0" dirty="0">
-                <a:solidFill>
-                  <a:schemeClr val="tx1"/>
-                </a:solidFill>
-                <a:effectLst/>
-                <a:latin typeface="+mn-lt"/>
-                <a:ea typeface="+mn-ea"/>
-                <a:cs typeface="+mn-cs"/>
-              </a:rPr>
-              <a:t> </a:t>
-            </a:r>
-            <a:r>
-              <a:rPr lang="en-GB" sz="1200" b="0" i="0" kern="1200" noProof="0" dirty="0" err="1">
-                <a:solidFill>
-                  <a:schemeClr val="tx1"/>
-                </a:solidFill>
-                <a:effectLst/>
-                <a:latin typeface="+mn-lt"/>
-                <a:ea typeface="+mn-ea"/>
-                <a:cs typeface="+mn-cs"/>
-              </a:rPr>
-              <a:t>zu</a:t>
-            </a:r>
-            <a:r>
-              <a:rPr lang="en-GB" sz="1200" b="0" i="0" kern="1200" noProof="0" dirty="0">
-                <a:solidFill>
-                  <a:schemeClr val="tx1"/>
-                </a:solidFill>
-                <a:effectLst/>
-                <a:latin typeface="+mn-lt"/>
-                <a:ea typeface="+mn-ea"/>
-                <a:cs typeface="+mn-cs"/>
-              </a:rPr>
-              <a:t> </a:t>
-            </a:r>
-            <a:r>
-              <a:rPr lang="en-GB" sz="1200" b="0" i="0" kern="1200" noProof="0" dirty="0" err="1">
-                <a:solidFill>
-                  <a:schemeClr val="tx1"/>
-                </a:solidFill>
-                <a:effectLst/>
-                <a:latin typeface="+mn-lt"/>
-                <a:ea typeface="+mn-ea"/>
-                <a:cs typeface="+mn-cs"/>
-              </a:rPr>
-              <a:t>können</a:t>
-            </a:r>
-            <a:r>
-              <a:rPr lang="en-GB" sz="1200" b="0" i="0" kern="1200" noProof="0" dirty="0">
-                <a:solidFill>
-                  <a:schemeClr val="tx1"/>
-                </a:solidFill>
-                <a:effectLst/>
-                <a:latin typeface="+mn-lt"/>
-                <a:ea typeface="+mn-ea"/>
-                <a:cs typeface="+mn-cs"/>
-              </a:rPr>
-              <a:t>.</a:t>
+              <a:t>Die Cashbox beinhaltet die benötigten Konfigurationen und verbindet diese miteinander. Jede Middleware Instanz benötigt eine Cashbox um den Betrieb aufnehmen zu können.</a:t>
             </a:r>
             <a:endParaRPr lang="de-DE" noProof="0" dirty="0"/>
           </a:p>
@@ -5038,15 +3364,7 @@
             </a:r>
             <a:r>
               <a:rPr lang="de-DE" noProof="0" dirty="0"/>
-              <a:t> bearbeitet. Dieser kümmert sich um die </a:t>
-            </a:r>
-            <a:r>
-              <a:rPr lang="de-DE" noProof="0" dirty="0" err="1"/>
-              <a:t>Erstellug</a:t>
-            </a:r>
-            <a:r>
-              <a:rPr lang="de-DE" noProof="0" dirty="0"/>
-              <a:t> der eindeutigen, fortlaufenden Belegnummer, um die Verkettung, Signierung und die Persistenz der Daten.</a:t>
+              <a:t> bearbeitet. Dieser kümmert sich um die Erstellung der eindeutigen, fortlaufenden Belegnummer, um die Verkettung, Signierung und die Persistenz der Daten.</a:t>
             </a:r>
           </a:p>
         </p:txBody>
@@ -9088,23 +7406,7 @@
             </a:br>
             <a:r>
               <a:rPr lang="de-DE" sz="2000" dirty="0"/>
-              <a:t>(aktivieren Funktionalität: initial-, zero-, </a:t>
-            </a:r>
-            <a:r>
-              <a:rPr lang="de-DE" sz="2000" dirty="0" err="1"/>
-              <a:t>daily</a:t>
-            </a:r>
-            <a:r>
-              <a:rPr lang="de-DE" sz="2000" dirty="0"/>
-              <a:t>-, </a:t>
-            </a:r>
-            <a:r>
-              <a:rPr lang="de-DE" sz="2000" dirty="0" err="1"/>
-              <a:t>monthly</a:t>
-            </a:r>
-            <a:r>
-              <a:rPr lang="de-DE" sz="2000" dirty="0"/>
-              <a:t>-, …)</a:t>
+              <a:t>(aktivieren Funktionalität: Nullbeleg, Initialisierungsbeleg, Tagesabschlussbeleg…)</a:t>
             </a:r>
             <a:br>
               <a:rPr lang="de-DE" sz="2800" dirty="0"/>
@@ -10497,8 +8799,13 @@
           <a:p>
             <a:r>
               <a:rPr lang="de-DE" sz="2800" dirty="0"/>
-              <a:t>Phasen der Integration</a:t>
-            </a:r>
+              <a:t>Phasen der Integration </a:t>
+            </a:r>
+            <a:r>
+              <a:rPr lang="de-DE" sz="2800"/>
+              <a:t>(Empfehlung)</a:t>
+            </a:r>
+            <a:endParaRPr lang="de-DE" sz="2800" dirty="0"/>
           </a:p>
         </p:txBody>
       </p:sp>
@@ -10526,24 +8833,36 @@
             <a:endParaRPr lang="de-DE" dirty="0"/>
           </a:p>
           <a:p>
+            <a:pPr marL="514350" indent="-514350">
+              <a:buAutoNum type="arabicPeriod"/>
+            </a:pPr>
             <a:r>
               <a:rPr lang="de-DE" dirty="0"/>
               <a:t>Aufruf der lokalen Middleware</a:t>
             </a:r>
           </a:p>
           <a:p>
+            <a:pPr marL="514350" indent="-514350">
+              <a:buAutoNum type="arabicPeriod"/>
+            </a:pPr>
             <a:r>
               <a:rPr lang="de-DE" dirty="0"/>
               <a:t>Senden der Daten und Verarbeiten der Responses (Kassenbeleg, Nullbeleg, eigene Geschäftsfälle, Kassenabschluss, Tagesende, etc.)</a:t>
             </a:r>
           </a:p>
           <a:p>
+            <a:pPr marL="514350" indent="-514350">
+              <a:buAutoNum type="arabicPeriod"/>
+            </a:pPr>
             <a:r>
               <a:rPr lang="de-DE" dirty="0"/>
               <a:t>Branchenspezifische Diskussion komplexer Geschäftsfälle mit dem fiskaltrust Support Team</a:t>
             </a:r>
           </a:p>
           <a:p>
+            <a:pPr marL="514350" indent="-514350">
+              <a:buAutoNum type="arabicPeriod"/>
+            </a:pPr>
             <a:r>
               <a:rPr lang="de-DE" dirty="0"/>
               <a:t>Einladung der Kassenhändler, Rollout/</a:t>
@@ -10558,9 +8877,21 @@
             </a:r>
           </a:p>
           <a:p>
+            <a:pPr marL="514350" indent="-514350">
+              <a:buAutoNum type="arabicPeriod"/>
+            </a:pPr>
             <a:r>
               <a:rPr lang="de-DE" dirty="0"/>
               <a:t>Pilotinstallation</a:t>
+            </a:r>
+          </a:p>
+          <a:p>
+            <a:pPr marL="514350" indent="-514350">
+              <a:buAutoNum type="arabicPeriod"/>
+            </a:pPr>
+            <a:r>
+              <a:rPr lang="de-DE" dirty="0"/>
+              <a:t>Übergabe zum Rollout an Ihre Kassenhersteller</a:t>
             </a:r>
           </a:p>
         </p:txBody>
@@ -10876,12 +9207,29 @@
           </a:bodyPr>
           <a:lstStyle/>
           <a:p>
+            <a:pPr>
+              <a:buFont typeface="Symbol" pitchFamily="2" charset="2"/>
+              <a:buChar char="Þ"/>
+            </a:pPr>
+            <a:r>
+              <a:rPr lang="de-DE" dirty="0"/>
+              <a:t>Konformität mit den nationalen Gesetzen implementieren</a:t>
+            </a:r>
+          </a:p>
+          <a:p>
             <a:pPr marL="0" indent="0">
               <a:buNone/>
             </a:pPr>
+            <a:endParaRPr lang="de-DE" dirty="0"/>
+          </a:p>
+          <a:p>
+            <a:pPr>
+              <a:buFont typeface="Symbol" pitchFamily="2" charset="2"/>
+              <a:buChar char="Þ"/>
+            </a:pPr>
             <a:r>
               <a:rPr lang="de-DE" dirty="0"/>
-              <a:t>=&gt; Konformität mit den nationalen Gesetzen implementieren</a:t>
+              <a:t>Dennoch sollen die Kosten der Kassenbetreiber für das Kassensystem nicht steigen </a:t>
             </a:r>
           </a:p>
         </p:txBody>
@@ -11101,7 +9449,7 @@
         <p:spPr/>
         <p:txBody>
           <a:bodyPr>
-            <a:normAutofit/>
+            <a:normAutofit fontScale="92500" lnSpcReduction="10000"/>
           </a:bodyPr>
           <a:lstStyle/>
           <a:p>
@@ -11144,6 +9492,12 @@
             <a:r>
               <a:rPr lang="de-DE" dirty="0"/>
               <a:t>Export der Daten in den gesetzlich vorgegebenen Formaten</a:t>
+            </a:r>
+          </a:p>
+          <a:p>
+            <a:r>
+              <a:rPr lang="de-DE" dirty="0"/>
+              <a:t>„As-A-Service“, d.h. immer automatisch konform mit den aktuellen Anforderungen des entsprechenden Marktes</a:t>
             </a:r>
           </a:p>
           <a:p>

</xml_diff>

<commit_message>
add Feedback from MMI
</commit_message>
<xml_diff>
--- a/for-poscreators/presentation/onboarding_de.pptx
+++ b/for-poscreators/presentation/onboarding_de.pptx
@@ -618,15 +618,7 @@
           <a:p>
             <a:r>
               <a:rPr lang="de-DE" noProof="0" dirty="0"/>
-              <a:t>Sonderbelege führen Funktionalität aus. Z.B. Initialisierung der TSE, Tagesabschuss, Monatsabschluss, etc. Sie werden immer über einen Request mit dem Beleg-Case „</a:t>
-            </a:r>
-            <a:r>
-              <a:rPr lang="de-DE" noProof="0" dirty="0" err="1"/>
-              <a:t>zero</a:t>
-            </a:r>
-            <a:r>
-              <a:rPr lang="de-DE" noProof="0" dirty="0"/>
-              <a:t> receipt“ also Nullbeleg an die ft.Middleware gesendet.</a:t>
+              <a:t>Sonderbelege führen Funktionalität aus. Z.B. Initialisierung der TSE, Tagesabschuss, Monatsabschluss, etc.</a:t>
             </a:r>
           </a:p>
           <a:p>
@@ -674,7 +666,7 @@
             </a:pPr>
             <a:r>
               <a:rPr lang="de-DE" noProof="0" dirty="0"/>
-              <a:t>Im Falle eines Sonderbelegs werden die Daten nicht signiert – stattdessen wird die angeforderte Funktionalität ausgeführt.</a:t>
+              <a:t>Im Falle eines Sonderbelegs wird die angeforderte Funktionalität ausgeführt.</a:t>
             </a:r>
           </a:p>
           <a:p>
@@ -860,7 +852,7 @@
             </a:pPr>
             <a:r>
               <a:rPr lang="de-DE" noProof="0" dirty="0"/>
-              <a:t>Im Falle eines Request, der signiert werden muss, werden die relevanten Daten an die angeschossenen TSE gesendet und von dieser signiert. In diesem Fall ist die TSE jedoch nicht erreichbar.</a:t>
+              <a:t>Zum Signieren werden die relevanten Daten an die angeschlossenen TSE gesendet und von dieser signiert. In diesem Fall ist die TSE jedoch nicht erreichbar.</a:t>
             </a:r>
           </a:p>
           <a:p>
@@ -878,7 +870,7 @@
             </a:pPr>
             <a:r>
               <a:rPr lang="de-DE" noProof="0" dirty="0"/>
-              <a:t>Die Daten werden von der Middleware persistiert und alle 5 Sekunden an den fiskaltrust „</a:t>
+              <a:t>Die Daten werden von der Middleware persistiert und alle 5 Minuten an den fiskaltrust „</a:t>
             </a:r>
             <a:r>
               <a:rPr lang="de-DE" noProof="0" dirty="0" err="1"/>
@@ -1032,7 +1024,23 @@
           <a:p>
             <a:r>
               <a:rPr lang="de-DE" noProof="0" dirty="0"/>
-              <a:t>Sobald die TSE wieder erreichbar ist, muss das POS-System einen Nullbeleg an die ft.Middleware senden. Dies ist deshalb wichtig, weil die ft.Middleware aus Performancegründen nicht selbst versucht herauszufinden, ob die TSE wieder erreichbar ist. Wird nun ein Nullbeleg an die ft.Middleware gesendet, so versucht diese die Kommunikation mit der TSE wiederherzustellen. Klappt die Kommunikation weiterhin nicht, so wird weiterhin der </a:t>
+              <a:t>Sobald die TSE wieder erreichbar ist, muss das POS-System einen Nullbeleg an die ft.Middleware senden. Dies ist deshalb wichtig, weil die ft.Middleware nicht selbst versucht herauszufinden, ob die TSE wieder erreichbar ist um das </a:t>
+            </a:r>
+            <a:r>
+              <a:rPr lang="de-DE" sz="1200" b="0" i="0" kern="1200" dirty="0">
+                <a:solidFill>
+                  <a:schemeClr val="tx1"/>
+                </a:solidFill>
+                <a:effectLst/>
+                <a:latin typeface="+mn-lt"/>
+                <a:ea typeface="+mn-ea"/>
+                <a:cs typeface="+mn-cs"/>
+              </a:rPr>
+              <a:t>Operative Geschäft nicht durch lange Timeouts zu stören</a:t>
+            </a:r>
+            <a:r>
+              <a:rPr lang="de-DE" noProof="0" dirty="0"/>
+              <a:t>. Wird nun ein Nullbeleg an die ft.Middleware gesendet, so versucht diese die Kommunikation mit der TSE wiederherzustellen. Klappt die Kommunikation weiterhin nicht, so wird weiterhin der </a:t>
             </a:r>
             <a:r>
               <a:rPr lang="de-DE" noProof="0" dirty="0" err="1"/>
@@ -3836,15 +3844,7 @@
             </a:pPr>
             <a:r>
               <a:rPr lang="de-DE" noProof="0" dirty="0"/>
-              <a:t>Das POS-System sollte die Daten lokal persistieren. Das Persistieren der Daten ist wichtig, weil die Request-Daten nicht von der Middleware zurückgesendet werden. Zudem ist die lokale Archivierung </a:t>
-            </a:r>
-            <a:r>
-              <a:rPr lang="de-DE" noProof="0" dirty="0" err="1"/>
-              <a:t>esentiell</a:t>
-            </a:r>
-            <a:r>
-              <a:rPr lang="de-DE" noProof="0" dirty="0"/>
-              <a:t> für den Fall, dass die fiskaltrust Archivierung nicht verfügbar ist.</a:t>
+              <a:t>Das POS-System sollte die Daten lokal persistieren. Das Persistieren der Daten ist wichtig, weil die Request-Daten nicht von der Middleware zurückgesendet werden. Zudem ist die lokale Archivierung essentiell für den Fall, dass die fiskaltrust Archivierung nicht verfügbar ist.</a:t>
             </a:r>
           </a:p>
           <a:p>
@@ -3871,7 +3871,7 @@
             </a:pPr>
             <a:r>
               <a:rPr lang="de-DE" noProof="0" dirty="0"/>
-              <a:t>Im Falle eines Request, der signiert werden muss, werden die relevanten Daten an die angeschossene TSE übertragen und von dieser signiert. (Im Falle eines Sonderbelegs werden die Daten nicht von der TSE signiert - siehe dazu nächste Folie)</a:t>
+              <a:t>Zum Signieren, werden die relevanten Daten an die angeschossene TSE übertragen und von dieser signiert.</a:t>
             </a:r>
           </a:p>
           <a:p>
@@ -3880,7 +3880,7 @@
             </a:pPr>
             <a:r>
               <a:rPr lang="de-DE" noProof="0" dirty="0"/>
-              <a:t>Die Daten werden von der Middleware persistiert und alle 5 Sekunden an den fiskaltrust „</a:t>
+              <a:t>Die Daten werden von der Middleware persistiert und alle 5 Minuten an den fiskaltrust „</a:t>
             </a:r>
             <a:r>
               <a:rPr lang="de-DE" noProof="0" dirty="0" err="1"/>
@@ -7439,7 +7439,7 @@
         <p:spPr>
           <a:xfrm>
             <a:off x="975487" y="1690688"/>
-            <a:ext cx="8508238" cy="4613402"/>
+            <a:ext cx="9640852" cy="4632209"/>
           </a:xfrm>
         </p:spPr>
       </p:pic>

</xml_diff>